<commit_message>
Corrected non scipy sinc call
</commit_message>
<xml_diff>
--- a/Managing and Running Python Effectively.pptx
+++ b/Managing and Running Python Effectively.pptx
@@ -5,10 +5,10 @@
     <p:sldMasterId id="2147483648" r:id="rId1"/>
   </p:sldMasterIdLst>
   <p:notesMasterIdLst>
-    <p:notesMasterId r:id="rId22"/>
+    <p:notesMasterId r:id="rId24"/>
   </p:notesMasterIdLst>
   <p:handoutMasterIdLst>
-    <p:handoutMasterId r:id="rId23"/>
+    <p:handoutMasterId r:id="rId25"/>
   </p:handoutMasterIdLst>
   <p:sldIdLst>
     <p:sldId id="264" r:id="rId2"/>
@@ -29,8 +29,10 @@
     <p:sldId id="512" r:id="rId17"/>
     <p:sldId id="513" r:id="rId18"/>
     <p:sldId id="514" r:id="rId19"/>
-    <p:sldId id="329" r:id="rId20"/>
-    <p:sldId id="280" r:id="rId21"/>
+    <p:sldId id="515" r:id="rId20"/>
+    <p:sldId id="516" r:id="rId21"/>
+    <p:sldId id="329" r:id="rId22"/>
+    <p:sldId id="280" r:id="rId23"/>
   </p:sldIdLst>
   <p:sldSz cx="9144000" cy="6858000" type="screen4x3"/>
   <p:notesSz cx="7099300" cy="10234613"/>
@@ -152,6 +154,8 @@
             <p14:sldId id="512"/>
             <p14:sldId id="513"/>
             <p14:sldId id="514"/>
+            <p14:sldId id="515"/>
+            <p14:sldId id="516"/>
             <p14:sldId id="329"/>
             <p14:sldId id="280"/>
           </p14:sldIdLst>
@@ -1525,6 +1529,174 @@
     </p:spTree>
     <p:extLst>
       <p:ext uri="{BB962C8B-B14F-4D97-AF65-F5344CB8AC3E}">
+        <p14:creationId xmlns:p14="http://schemas.microsoft.com/office/powerpoint/2010/main" val="3976487587"/>
+      </p:ext>
+    </p:extLst>
+  </p:cSld>
+  <p:clrMapOvr>
+    <a:masterClrMapping/>
+  </p:clrMapOvr>
+</p:notes>
+</file>
+
+<file path=ppt/notesSlides/notesSlide17.xml><?xml version="1.0" encoding="utf-8"?>
+<p:notes xmlns:a="http://schemas.openxmlformats.org/drawingml/2006/main" xmlns:r="http://schemas.openxmlformats.org/officeDocument/2006/relationships" xmlns:p="http://schemas.openxmlformats.org/presentationml/2006/main">
+  <p:cSld>
+    <p:spTree>
+      <p:nvGrpSpPr>
+        <p:cNvPr id="1" name=""/>
+        <p:cNvGrpSpPr/>
+        <p:nvPr/>
+      </p:nvGrpSpPr>
+      <p:grpSpPr>
+        <a:xfrm>
+          <a:off x="0" y="0"/>
+          <a:ext cx="0" cy="0"/>
+          <a:chOff x="0" y="0"/>
+          <a:chExt cx="0" cy="0"/>
+        </a:xfrm>
+      </p:grpSpPr>
+      <p:sp>
+        <p:nvSpPr>
+          <p:cNvPr id="2" name="Slide Image Placeholder 1"/>
+          <p:cNvSpPr>
+            <a:spLocks noGrp="1" noRot="1" noChangeAspect="1"/>
+          </p:cNvSpPr>
+          <p:nvPr>
+            <p:ph type="sldImg"/>
+          </p:nvPr>
+        </p:nvSpPr>
+        <p:spPr/>
+      </p:sp>
+      <p:sp>
+        <p:nvSpPr>
+          <p:cNvPr id="3" name="Notes Placeholder 2"/>
+          <p:cNvSpPr>
+            <a:spLocks noGrp="1"/>
+          </p:cNvSpPr>
+          <p:nvPr>
+            <p:ph type="body" idx="1"/>
+          </p:nvPr>
+        </p:nvSpPr>
+        <p:spPr/>
+        <p:txBody>
+          <a:bodyPr/>
+          <a:lstStyle/>
+          <a:p>
+            <a:endParaRPr lang="en-GB" dirty="0"/>
+          </a:p>
+        </p:txBody>
+      </p:sp>
+      <p:sp>
+        <p:nvSpPr>
+          <p:cNvPr id="4" name="Slide Number Placeholder 3"/>
+          <p:cNvSpPr>
+            <a:spLocks noGrp="1"/>
+          </p:cNvSpPr>
+          <p:nvPr>
+            <p:ph type="sldNum" sz="quarter" idx="10"/>
+          </p:nvPr>
+        </p:nvSpPr>
+        <p:spPr/>
+        <p:txBody>
+          <a:bodyPr/>
+          <a:lstStyle/>
+          <a:p>
+            <a:fld id="{6A641EC8-C9F8-4A58-A1A7-F7D817526EEC}" type="slidenum">
+              <a:rPr lang="en-GB" smtClean="0"/>
+              <a:t>20</a:t>
+            </a:fld>
+            <a:endParaRPr lang="en-GB"/>
+          </a:p>
+        </p:txBody>
+      </p:sp>
+    </p:spTree>
+    <p:extLst>
+      <p:ext uri="{BB962C8B-B14F-4D97-AF65-F5344CB8AC3E}">
+        <p14:creationId xmlns:p14="http://schemas.microsoft.com/office/powerpoint/2010/main" val="1932458035"/>
+      </p:ext>
+    </p:extLst>
+  </p:cSld>
+  <p:clrMapOvr>
+    <a:masterClrMapping/>
+  </p:clrMapOvr>
+</p:notes>
+</file>
+
+<file path=ppt/notesSlides/notesSlide18.xml><?xml version="1.0" encoding="utf-8"?>
+<p:notes xmlns:a="http://schemas.openxmlformats.org/drawingml/2006/main" xmlns:r="http://schemas.openxmlformats.org/officeDocument/2006/relationships" xmlns:p="http://schemas.openxmlformats.org/presentationml/2006/main">
+  <p:cSld>
+    <p:spTree>
+      <p:nvGrpSpPr>
+        <p:cNvPr id="1" name=""/>
+        <p:cNvGrpSpPr/>
+        <p:nvPr/>
+      </p:nvGrpSpPr>
+      <p:grpSpPr>
+        <a:xfrm>
+          <a:off x="0" y="0"/>
+          <a:ext cx="0" cy="0"/>
+          <a:chOff x="0" y="0"/>
+          <a:chExt cx="0" cy="0"/>
+        </a:xfrm>
+      </p:grpSpPr>
+      <p:sp>
+        <p:nvSpPr>
+          <p:cNvPr id="2" name="Slide Image Placeholder 1"/>
+          <p:cNvSpPr>
+            <a:spLocks noGrp="1" noRot="1" noChangeAspect="1"/>
+          </p:cNvSpPr>
+          <p:nvPr>
+            <p:ph type="sldImg"/>
+          </p:nvPr>
+        </p:nvSpPr>
+        <p:spPr/>
+      </p:sp>
+      <p:sp>
+        <p:nvSpPr>
+          <p:cNvPr id="3" name="Notes Placeholder 2"/>
+          <p:cNvSpPr>
+            <a:spLocks noGrp="1"/>
+          </p:cNvSpPr>
+          <p:nvPr>
+            <p:ph type="body" idx="1"/>
+          </p:nvPr>
+        </p:nvSpPr>
+        <p:spPr/>
+        <p:txBody>
+          <a:bodyPr/>
+          <a:lstStyle/>
+          <a:p>
+            <a:endParaRPr lang="en-GB" dirty="0"/>
+          </a:p>
+        </p:txBody>
+      </p:sp>
+      <p:sp>
+        <p:nvSpPr>
+          <p:cNvPr id="4" name="Slide Number Placeholder 3"/>
+          <p:cNvSpPr>
+            <a:spLocks noGrp="1"/>
+          </p:cNvSpPr>
+          <p:nvPr>
+            <p:ph type="sldNum" sz="quarter" idx="10"/>
+          </p:nvPr>
+        </p:nvSpPr>
+        <p:spPr/>
+        <p:txBody>
+          <a:bodyPr/>
+          <a:lstStyle/>
+          <a:p>
+            <a:fld id="{6A641EC8-C9F8-4A58-A1A7-F7D817526EEC}" type="slidenum">
+              <a:rPr lang="en-GB" smtClean="0"/>
+              <a:t>21</a:t>
+            </a:fld>
+            <a:endParaRPr lang="en-GB"/>
+          </a:p>
+        </p:txBody>
+      </p:sp>
+    </p:spTree>
+    <p:extLst>
+      <p:ext uri="{BB962C8B-B14F-4D97-AF65-F5344CB8AC3E}">
         <p14:creationId xmlns:p14="http://schemas.microsoft.com/office/powerpoint/2010/main" val="1492413823"/>
       </p:ext>
     </p:extLst>
@@ -1535,7 +1707,7 @@
 </p:notes>
 </file>
 
-<file path=ppt/notesSlides/notesSlide17.xml><?xml version="1.0" encoding="utf-8"?>
+<file path=ppt/notesSlides/notesSlide19.xml><?xml version="1.0" encoding="utf-8"?>
 <p:notes xmlns:a="http://schemas.openxmlformats.org/drawingml/2006/main" xmlns:r="http://schemas.openxmlformats.org/officeDocument/2006/relationships" xmlns:p="http://schemas.openxmlformats.org/presentationml/2006/main">
   <p:cSld>
     <p:spTree>
@@ -1712,7 +1884,7 @@
                   <a:spcPct val="0"/>
                 </a:spcBef>
               </a:pPr>
-              <a:t>20</a:t>
+              <a:t>22</a:t>
             </a:fld>
             <a:endParaRPr lang="en-US" altLang="en-US"/>
           </a:p>
@@ -5694,21 +5866,35 @@
                 <a:latin typeface="Arial" panose="020B0604020202020204" pitchFamily="34" charset="0"/>
                 <a:cs typeface="Arial" panose="020B0604020202020204" pitchFamily="34" charset="0"/>
               </a:rPr>
-              <a:t>Create a new environment in Examples/</a:t>
+              <a:t>Create a new environment in </a:t>
+            </a:r>
+            <a:r>
+              <a:rPr lang="en-GB" sz="1800" dirty="0">
+                <a:latin typeface="Courier New" panose="02070309020205020404" pitchFamily="49" charset="0"/>
+                <a:cs typeface="Courier New" panose="02070309020205020404" pitchFamily="49" charset="0"/>
+              </a:rPr>
+              <a:t>Exercises/</a:t>
             </a:r>
             <a:r>
               <a:rPr lang="en-GB" sz="1800" dirty="0" err="1">
-                <a:latin typeface="Arial" panose="020B0604020202020204" pitchFamily="34" charset="0"/>
-                <a:cs typeface="Arial" panose="020B0604020202020204" pitchFamily="34" charset="0"/>
+                <a:latin typeface="Courier New" panose="02070309020205020404" pitchFamily="49" charset="0"/>
+                <a:cs typeface="Courier New" panose="02070309020205020404" pitchFamily="49" charset="0"/>
               </a:rPr>
               <a:t>Example_environment</a:t>
+            </a:r>
+            <a:r>
+              <a:rPr lang="en-GB" sz="1800" dirty="0">
+                <a:latin typeface="Courier New" panose="02070309020205020404" pitchFamily="49" charset="0"/>
+                <a:cs typeface="Courier New" panose="02070309020205020404" pitchFamily="49" charset="0"/>
+              </a:rPr>
+              <a:t> </a:t>
             </a:r>
             <a:r>
               <a:rPr lang="en-GB" sz="1800" dirty="0">
                 <a:latin typeface="Arial" panose="020B0604020202020204" pitchFamily="34" charset="0"/>
                 <a:cs typeface="Arial" panose="020B0604020202020204" pitchFamily="34" charset="0"/>
               </a:rPr>
-              <a:t> of the course materials</a:t>
+              <a:t>of the course materials</a:t>
             </a:r>
           </a:p>
           <a:p>
@@ -7588,7 +7774,7 @@
           <a:p>
             <a:r>
               <a:rPr lang="en-GB" sz="4000" dirty="0"/>
-              <a:t>Feedback</a:t>
+              <a:t>Exercise</a:t>
             </a:r>
           </a:p>
         </p:txBody>
@@ -7606,83 +7792,360 @@
         <p:spPr>
           <a:xfrm>
             <a:off x="457200" y="1600200"/>
-            <a:ext cx="8435280" cy="4876800"/>
+            <a:ext cx="8435280" cy="4800600"/>
           </a:xfrm>
         </p:spPr>
         <p:txBody>
           <a:bodyPr>
-            <a:normAutofit/>
+            <a:normAutofit fontScale="77500" lnSpcReduction="20000"/>
           </a:bodyPr>
           <a:lstStyle/>
           <a:p>
-            <a:r>
-              <a:rPr lang="en-GB" sz="3000" dirty="0"/>
-              <a:t>Once you’ve completed this course, please provide feedback</a:t>
-            </a:r>
-          </a:p>
-          <a:p>
-            <a:pPr lvl="1"/>
-            <a:r>
-              <a:rPr lang="en-GB" sz="2600" dirty="0"/>
-              <a:t>The link is </a:t>
-            </a:r>
-            <a:r>
-              <a:rPr lang="en-GB" sz="2600" u="sng" dirty="0">
-                <a:solidFill>
-                  <a:srgbClr val="000000"/>
-                </a:solidFill>
-                <a:effectLst/>
-                <a:latin typeface="Arial" panose="020B0604020202020204" pitchFamily="34" charset="0"/>
-                <a:ea typeface="Times New Roman" panose="02020603050405020304" pitchFamily="18" charset="0"/>
-                <a:cs typeface="Arial" panose="020B0604020202020204" pitchFamily="34" charset="0"/>
-                <a:hlinkClick r:id="rId3"/>
-              </a:rPr>
-              <a:t>tinyurl.com/rcds2021-22</a:t>
-            </a:r>
-            <a:endParaRPr lang="en-GB" sz="2600" u="sng" dirty="0">
-              <a:solidFill>
-                <a:srgbClr val="000000"/>
-              </a:solidFill>
-              <a:effectLst/>
-              <a:latin typeface="Arial" panose="020B0604020202020204" pitchFamily="34" charset="0"/>
-              <a:ea typeface="Times New Roman" panose="02020603050405020304" pitchFamily="18" charset="0"/>
-              <a:cs typeface="Arial" panose="020B0604020202020204" pitchFamily="34" charset="0"/>
-            </a:endParaRPr>
-          </a:p>
-          <a:p>
-            <a:pPr lvl="1"/>
-            <a:r>
-              <a:rPr lang="en-GB" sz="2600" dirty="0"/>
-              <a:t>You should also have received an email with this link</a:t>
-            </a:r>
-          </a:p>
-          <a:p>
-            <a:pPr lvl="1"/>
-            <a:r>
-              <a:rPr lang="en-GB" sz="2600" dirty="0"/>
-              <a:t>This helps us improve the class for future students</a:t>
-            </a:r>
-          </a:p>
-          <a:p>
-            <a:endParaRPr lang="en-GB" sz="3000" dirty="0"/>
+            <a:pPr>
+              <a:lnSpc>
+                <a:spcPct val="107000"/>
+              </a:lnSpc>
+            </a:pPr>
+            <a:r>
+              <a:rPr lang="en-GB" sz="2600" dirty="0">
+                <a:latin typeface="+mj-lt"/>
+                <a:cs typeface="Courier New" panose="02070309020205020404" pitchFamily="49" charset="0"/>
+              </a:rPr>
+              <a:t>Anaconda</a:t>
+            </a:r>
+          </a:p>
+          <a:p>
+            <a:pPr lvl="1">
+              <a:lnSpc>
+                <a:spcPct val="107000"/>
+              </a:lnSpc>
+            </a:pPr>
+            <a:r>
+              <a:rPr lang="en-GB" sz="2200" dirty="0">
+                <a:latin typeface="+mj-lt"/>
+                <a:cs typeface="Courier New" panose="02070309020205020404" pitchFamily="49" charset="0"/>
+              </a:rPr>
+              <a:t>In a current environment install the </a:t>
+            </a:r>
+            <a:r>
+              <a:rPr lang="en-GB" sz="2200" dirty="0" err="1">
+                <a:latin typeface="Courier New" panose="02070309020205020404" pitchFamily="49" charset="0"/>
+                <a:cs typeface="Courier New" panose="02070309020205020404" pitchFamily="49" charset="0"/>
+              </a:rPr>
+              <a:t>numpy</a:t>
+            </a:r>
+            <a:r>
+              <a:rPr lang="en-GB" sz="2200" dirty="0">
+                <a:latin typeface="+mj-lt"/>
+                <a:cs typeface="Courier New" panose="02070309020205020404" pitchFamily="49" charset="0"/>
+              </a:rPr>
+              <a:t> package</a:t>
+            </a:r>
+          </a:p>
+          <a:p>
+            <a:pPr lvl="1">
+              <a:lnSpc>
+                <a:spcPct val="107000"/>
+              </a:lnSpc>
+            </a:pPr>
+            <a:r>
+              <a:rPr lang="en-GB" sz="2200" dirty="0">
+                <a:latin typeface="+mj-lt"/>
+                <a:cs typeface="Courier New" panose="02070309020205020404" pitchFamily="49" charset="0"/>
+              </a:rPr>
+              <a:t>Generate a requirements file named </a:t>
+            </a:r>
+            <a:r>
+              <a:rPr lang="en-GB" sz="2200" dirty="0">
+                <a:latin typeface="Courier New" panose="02070309020205020404" pitchFamily="49" charset="0"/>
+                <a:cs typeface="Courier New" panose="02070309020205020404" pitchFamily="49" charset="0"/>
+              </a:rPr>
+              <a:t>requirements_anaconda.txt </a:t>
+            </a:r>
+            <a:r>
+              <a:rPr lang="en-GB" sz="2200" dirty="0">
+                <a:latin typeface="+mj-lt"/>
+                <a:cs typeface="Courier New" panose="02070309020205020404" pitchFamily="49" charset="0"/>
+              </a:rPr>
+              <a:t>in the </a:t>
+            </a:r>
+            <a:r>
+              <a:rPr lang="en-GB" sz="2200" dirty="0">
+                <a:latin typeface="Courier New" panose="02070309020205020404" pitchFamily="49" charset="0"/>
+                <a:cs typeface="Courier New" panose="02070309020205020404" pitchFamily="49" charset="0"/>
+              </a:rPr>
+              <a:t>Exercises/requirements </a:t>
+            </a:r>
+            <a:r>
+              <a:rPr lang="en-GB" sz="2200" dirty="0">
+                <a:latin typeface="+mj-lt"/>
+                <a:cs typeface="Courier New" panose="02070309020205020404" pitchFamily="49" charset="0"/>
+              </a:rPr>
+              <a:t>directory</a:t>
+            </a:r>
+          </a:p>
+          <a:p>
+            <a:pPr lvl="1">
+              <a:lnSpc>
+                <a:spcPct val="107000"/>
+              </a:lnSpc>
+            </a:pPr>
+            <a:r>
+              <a:rPr lang="en-GB" sz="2200" dirty="0">
+                <a:latin typeface="+mj-lt"/>
+                <a:cs typeface="Courier New" panose="02070309020205020404" pitchFamily="49" charset="0"/>
+              </a:rPr>
+              <a:t>Create a new environment using this requirements file Check the new environment has </a:t>
+            </a:r>
+            <a:r>
+              <a:rPr lang="en-GB" sz="2200" dirty="0" err="1">
+                <a:latin typeface="Courier New" panose="02070309020205020404" pitchFamily="49" charset="0"/>
+                <a:cs typeface="Courier New" panose="02070309020205020404" pitchFamily="49" charset="0"/>
+              </a:rPr>
+              <a:t>numpy</a:t>
+            </a:r>
+            <a:r>
+              <a:rPr lang="en-GB" sz="2200" dirty="0">
+                <a:latin typeface="+mj-lt"/>
+                <a:cs typeface="Courier New" panose="02070309020205020404" pitchFamily="49" charset="0"/>
+              </a:rPr>
+              <a:t> installed</a:t>
+            </a:r>
+          </a:p>
+          <a:p>
+            <a:pPr>
+              <a:lnSpc>
+                <a:spcPct val="107000"/>
+              </a:lnSpc>
+            </a:pPr>
+            <a:r>
+              <a:rPr lang="en-GB" sz="2600" dirty="0">
+                <a:latin typeface="+mj-lt"/>
+                <a:cs typeface="Courier New" panose="02070309020205020404" pitchFamily="49" charset="0"/>
+              </a:rPr>
+              <a:t>Pip</a:t>
+            </a:r>
+          </a:p>
+          <a:p>
+            <a:pPr lvl="1">
+              <a:lnSpc>
+                <a:spcPct val="107000"/>
+              </a:lnSpc>
+            </a:pPr>
+            <a:r>
+              <a:rPr lang="en-GB" sz="2200" dirty="0">
+                <a:latin typeface="+mj-lt"/>
+                <a:cs typeface="Courier New" panose="02070309020205020404" pitchFamily="49" charset="0"/>
+              </a:rPr>
+              <a:t>In a current environment install the </a:t>
+            </a:r>
+            <a:r>
+              <a:rPr lang="en-GB" sz="2200" dirty="0" err="1">
+                <a:latin typeface="Courier New" panose="02070309020205020404" pitchFamily="49" charset="0"/>
+                <a:cs typeface="Courier New" panose="02070309020205020404" pitchFamily="49" charset="0"/>
+              </a:rPr>
+              <a:t>numpy</a:t>
+            </a:r>
+            <a:r>
+              <a:rPr lang="en-GB" sz="2200" dirty="0">
+                <a:latin typeface="+mj-lt"/>
+                <a:cs typeface="Courier New" panose="02070309020205020404" pitchFamily="49" charset="0"/>
+              </a:rPr>
+              <a:t> package</a:t>
+            </a:r>
+          </a:p>
+          <a:p>
+            <a:pPr lvl="1">
+              <a:lnSpc>
+                <a:spcPct val="107000"/>
+              </a:lnSpc>
+            </a:pPr>
+            <a:r>
+              <a:rPr lang="en-GB" sz="2200" dirty="0">
+                <a:latin typeface="+mj-lt"/>
+                <a:cs typeface="Courier New" panose="02070309020205020404" pitchFamily="49" charset="0"/>
+              </a:rPr>
+              <a:t>Generate a requirements file named </a:t>
+            </a:r>
+            <a:r>
+              <a:rPr lang="en-GB" sz="2200" dirty="0">
+                <a:latin typeface="Courier New" panose="02070309020205020404" pitchFamily="49" charset="0"/>
+                <a:cs typeface="Courier New" panose="02070309020205020404" pitchFamily="49" charset="0"/>
+              </a:rPr>
+              <a:t>requirements_pip.txt </a:t>
+            </a:r>
+            <a:r>
+              <a:rPr lang="en-GB" sz="2200" dirty="0">
+                <a:latin typeface="+mj-lt"/>
+                <a:cs typeface="Courier New" panose="02070309020205020404" pitchFamily="49" charset="0"/>
+              </a:rPr>
+              <a:t>in the </a:t>
+            </a:r>
+            <a:r>
+              <a:rPr lang="en-GB" sz="2200" dirty="0">
+                <a:latin typeface="Courier New" panose="02070309020205020404" pitchFamily="49" charset="0"/>
+                <a:cs typeface="Courier New" panose="02070309020205020404" pitchFamily="49" charset="0"/>
+              </a:rPr>
+              <a:t>Exercises/requirements </a:t>
+            </a:r>
+            <a:r>
+              <a:rPr lang="en-GB" sz="2200" dirty="0">
+                <a:latin typeface="+mj-lt"/>
+                <a:cs typeface="Courier New" panose="02070309020205020404" pitchFamily="49" charset="0"/>
+              </a:rPr>
+              <a:t>directory</a:t>
+            </a:r>
+          </a:p>
+          <a:p>
+            <a:pPr lvl="1">
+              <a:lnSpc>
+                <a:spcPct val="107000"/>
+              </a:lnSpc>
+            </a:pPr>
+            <a:r>
+              <a:rPr lang="en-GB" sz="2200" dirty="0">
+                <a:latin typeface="+mj-lt"/>
+                <a:cs typeface="Courier New" panose="02070309020205020404" pitchFamily="49" charset="0"/>
+              </a:rPr>
+              <a:t>Activate the virtual environment you created in the previous exercise</a:t>
+            </a:r>
+          </a:p>
+          <a:p>
+            <a:pPr lvl="1">
+              <a:lnSpc>
+                <a:spcPct val="107000"/>
+              </a:lnSpc>
+            </a:pPr>
+            <a:r>
+              <a:rPr lang="en-GB" sz="2200" dirty="0">
+                <a:latin typeface="+mj-lt"/>
+                <a:cs typeface="Courier New" panose="02070309020205020404" pitchFamily="49" charset="0"/>
+              </a:rPr>
+              <a:t>In the terminal write </a:t>
+            </a:r>
+            <a:r>
+              <a:rPr lang="en-GB" sz="2200" dirty="0">
+                <a:latin typeface="Courier New" panose="02070309020205020404" pitchFamily="49" charset="0"/>
+                <a:cs typeface="Courier New" panose="02070309020205020404" pitchFamily="49" charset="0"/>
+              </a:rPr>
+              <a:t>python</a:t>
+            </a:r>
+            <a:r>
+              <a:rPr lang="en-GB" sz="2200" dirty="0">
+                <a:latin typeface="+mj-lt"/>
+                <a:cs typeface="Courier New" panose="02070309020205020404" pitchFamily="49" charset="0"/>
+              </a:rPr>
+              <a:t> then </a:t>
+            </a:r>
+            <a:r>
+              <a:rPr lang="en-GB" sz="2200" dirty="0">
+                <a:latin typeface="Courier New" panose="02070309020205020404" pitchFamily="49" charset="0"/>
+                <a:cs typeface="Courier New" panose="02070309020205020404" pitchFamily="49" charset="0"/>
+              </a:rPr>
+              <a:t>import </a:t>
+            </a:r>
+            <a:r>
+              <a:rPr lang="en-GB" sz="2200" dirty="0" err="1">
+                <a:latin typeface="Courier New" panose="02070309020205020404" pitchFamily="49" charset="0"/>
+                <a:cs typeface="Courier New" panose="02070309020205020404" pitchFamily="49" charset="0"/>
+              </a:rPr>
+              <a:t>numpy</a:t>
+            </a:r>
+            <a:r>
+              <a:rPr lang="en-GB" sz="2200" dirty="0">
+                <a:latin typeface="Courier New" panose="02070309020205020404" pitchFamily="49" charset="0"/>
+                <a:cs typeface="Courier New" panose="02070309020205020404" pitchFamily="49" charset="0"/>
+              </a:rPr>
+              <a:t> </a:t>
+            </a:r>
+            <a:r>
+              <a:rPr lang="en-GB" sz="2200" dirty="0">
+                <a:latin typeface="+mj-lt"/>
+                <a:cs typeface="Courier New" panose="02070309020205020404" pitchFamily="49" charset="0"/>
+              </a:rPr>
+              <a:t>to verify </a:t>
+            </a:r>
+            <a:r>
+              <a:rPr lang="en-GB" sz="2200" dirty="0" err="1">
+                <a:latin typeface="+mj-lt"/>
+                <a:cs typeface="Courier New" panose="02070309020205020404" pitchFamily="49" charset="0"/>
+              </a:rPr>
+              <a:t>numpy</a:t>
+            </a:r>
+            <a:r>
+              <a:rPr lang="en-GB" sz="2200" dirty="0">
+                <a:latin typeface="+mj-lt"/>
+                <a:cs typeface="Courier New" panose="02070309020205020404" pitchFamily="49" charset="0"/>
+              </a:rPr>
+              <a:t> is installed</a:t>
+            </a:r>
+          </a:p>
+          <a:p>
+            <a:pPr>
+              <a:lnSpc>
+                <a:spcPct val="107000"/>
+              </a:lnSpc>
+            </a:pPr>
+            <a:r>
+              <a:rPr lang="en-GB" sz="2600" dirty="0">
+                <a:latin typeface="+mj-lt"/>
+                <a:cs typeface="Courier New" panose="02070309020205020404" pitchFamily="49" charset="0"/>
+              </a:rPr>
+              <a:t>Compare </a:t>
+            </a:r>
+            <a:r>
+              <a:rPr lang="en-GB" sz="2800" dirty="0">
+                <a:latin typeface="Courier New" panose="02070309020205020404" pitchFamily="49" charset="0"/>
+                <a:cs typeface="Courier New" panose="02070309020205020404" pitchFamily="49" charset="0"/>
+              </a:rPr>
+              <a:t>requirements_anaconda.txt </a:t>
+            </a:r>
+            <a:r>
+              <a:rPr lang="en-GB" sz="2800" dirty="0">
+                <a:latin typeface="+mj-lt"/>
+                <a:cs typeface="Courier New" panose="02070309020205020404" pitchFamily="49" charset="0"/>
+              </a:rPr>
+              <a:t>and</a:t>
+            </a:r>
+            <a:r>
+              <a:rPr lang="en-GB" sz="2800" dirty="0">
+                <a:latin typeface="Courier New" panose="02070309020205020404" pitchFamily="49" charset="0"/>
+                <a:cs typeface="Courier New" panose="02070309020205020404" pitchFamily="49" charset="0"/>
+              </a:rPr>
+              <a:t> requirements_pip.txt</a:t>
+            </a:r>
+          </a:p>
+          <a:p>
+            <a:pPr lvl="1">
+              <a:lnSpc>
+                <a:spcPct val="107000"/>
+              </a:lnSpc>
+            </a:pPr>
+            <a:r>
+              <a:rPr lang="en-GB" sz="2200" dirty="0">
+                <a:latin typeface="+mj-lt"/>
+                <a:cs typeface="Courier New" panose="02070309020205020404" pitchFamily="49" charset="0"/>
+              </a:rPr>
+              <a:t>What differences can you see in their format?</a:t>
+            </a:r>
           </a:p>
         </p:txBody>
       </p:sp>
     </p:spTree>
     <p:extLst>
       <p:ext uri="{BB962C8B-B14F-4D97-AF65-F5344CB8AC3E}">
-        <p14:creationId xmlns:p14="http://schemas.microsoft.com/office/powerpoint/2010/main" val="2122788927"/>
+        <p14:creationId xmlns:p14="http://schemas.microsoft.com/office/powerpoint/2010/main" val="2411935850"/>
       </p:ext>
     </p:extLst>
   </p:cSld>
   <p:clrMapOvr>
     <a:masterClrMapping/>
   </p:clrMapOvr>
-  <mc:AlternateContent xmlns:mc="http://schemas.openxmlformats.org/markup-compatibility/2006" xmlns:p14="http://schemas.microsoft.com/office/powerpoint/2010/main">
-    <mc:Choice Requires="p14">
+  <mc:AlternateContent xmlns:mc="http://schemas.openxmlformats.org/markup-compatibility/2006">
+    <mc:Choice xmlns:p14="http://schemas.microsoft.com/office/powerpoint/2010/main" Requires="p14">
       <p:transition p14:dur="10"/>
     </mc:Choice>
-    <mc:Fallback xmlns="">
+    <mc:Fallback>
       <p:transition/>
     </mc:Fallback>
   </mc:AlternateContent>
@@ -7816,6 +8279,319 @@
 </file>
 
 <file path=ppt/slides/slide20.xml><?xml version="1.0" encoding="utf-8"?>
+<p:sld xmlns:a="http://schemas.openxmlformats.org/drawingml/2006/main" xmlns:r="http://schemas.openxmlformats.org/officeDocument/2006/relationships" xmlns:p="http://schemas.openxmlformats.org/presentationml/2006/main">
+  <p:cSld>
+    <p:spTree>
+      <p:nvGrpSpPr>
+        <p:cNvPr id="1" name=""/>
+        <p:cNvGrpSpPr/>
+        <p:nvPr/>
+      </p:nvGrpSpPr>
+      <p:grpSpPr>
+        <a:xfrm>
+          <a:off x="0" y="0"/>
+          <a:ext cx="0" cy="0"/>
+          <a:chOff x="0" y="0"/>
+          <a:chExt cx="0" cy="0"/>
+        </a:xfrm>
+      </p:grpSpPr>
+      <p:sp>
+        <p:nvSpPr>
+          <p:cNvPr id="2" name="Title 1"/>
+          <p:cNvSpPr>
+            <a:spLocks noGrp="1"/>
+          </p:cNvSpPr>
+          <p:nvPr>
+            <p:ph type="title"/>
+          </p:nvPr>
+        </p:nvSpPr>
+        <p:spPr/>
+        <p:txBody>
+          <a:bodyPr/>
+          <a:lstStyle/>
+          <a:p>
+            <a:r>
+              <a:rPr lang="en-GB" sz="4000" dirty="0"/>
+              <a:t>Python Commands in the Command Line</a:t>
+            </a:r>
+          </a:p>
+        </p:txBody>
+      </p:sp>
+      <p:sp>
+        <p:nvSpPr>
+          <p:cNvPr id="3" name="Content Placeholder 2"/>
+          <p:cNvSpPr>
+            <a:spLocks noGrp="1"/>
+          </p:cNvSpPr>
+          <p:nvPr>
+            <p:ph idx="1"/>
+          </p:nvPr>
+        </p:nvSpPr>
+        <p:spPr>
+          <a:xfrm>
+            <a:off x="457200" y="1600200"/>
+            <a:ext cx="8435280" cy="4800600"/>
+          </a:xfrm>
+        </p:spPr>
+        <p:txBody>
+          <a:bodyPr>
+            <a:normAutofit/>
+          </a:bodyPr>
+          <a:lstStyle/>
+          <a:p>
+            <a:pPr>
+              <a:lnSpc>
+                <a:spcPct val="107000"/>
+              </a:lnSpc>
+            </a:pPr>
+            <a:r>
+              <a:rPr lang="en-GB" sz="2600" dirty="0">
+                <a:latin typeface="+mj-lt"/>
+                <a:cs typeface="Courier New" panose="02070309020205020404" pitchFamily="49" charset="0"/>
+              </a:rPr>
+              <a:t>Individual Python commands can be run directly in the command line, Anaconda terminal, etc</a:t>
+            </a:r>
+          </a:p>
+          <a:p>
+            <a:pPr>
+              <a:lnSpc>
+                <a:spcPct val="107000"/>
+              </a:lnSpc>
+            </a:pPr>
+            <a:r>
+              <a:rPr lang="en-GB" sz="2600" dirty="0">
+                <a:latin typeface="+mj-lt"/>
+                <a:cs typeface="Courier New" panose="02070309020205020404" pitchFamily="49" charset="0"/>
+              </a:rPr>
+              <a:t>Type </a:t>
+            </a:r>
+            <a:r>
+              <a:rPr lang="en-GB" sz="2600" dirty="0">
+                <a:latin typeface="Courier New" panose="02070309020205020404" pitchFamily="49" charset="0"/>
+                <a:cs typeface="Courier New" panose="02070309020205020404" pitchFamily="49" charset="0"/>
+              </a:rPr>
+              <a:t>python</a:t>
+            </a:r>
+          </a:p>
+          <a:p>
+            <a:pPr>
+              <a:lnSpc>
+                <a:spcPct val="107000"/>
+              </a:lnSpc>
+            </a:pPr>
+            <a:r>
+              <a:rPr lang="en-GB" sz="2600" dirty="0">
+                <a:latin typeface="+mj-lt"/>
+                <a:cs typeface="Courier New" panose="02070309020205020404" pitchFamily="49" charset="0"/>
+              </a:rPr>
+              <a:t>Type individual Python commands</a:t>
+            </a:r>
+          </a:p>
+          <a:p>
+            <a:pPr>
+              <a:lnSpc>
+                <a:spcPct val="107000"/>
+              </a:lnSpc>
+            </a:pPr>
+            <a:r>
+              <a:rPr lang="en-GB" sz="2600" dirty="0">
+                <a:latin typeface="+mj-lt"/>
+                <a:cs typeface="Courier New" panose="02070309020205020404" pitchFamily="49" charset="0"/>
+              </a:rPr>
+              <a:t>If using commands that require indentation (such as </a:t>
+            </a:r>
+            <a:r>
+              <a:rPr lang="en-GB" sz="2600" dirty="0">
+                <a:latin typeface="Courier New" panose="02070309020205020404" pitchFamily="49" charset="0"/>
+                <a:cs typeface="Courier New" panose="02070309020205020404" pitchFamily="49" charset="0"/>
+              </a:rPr>
+              <a:t>for</a:t>
+            </a:r>
+            <a:r>
+              <a:rPr lang="en-GB" sz="2600" dirty="0">
+                <a:latin typeface="+mj-lt"/>
+                <a:cs typeface="Courier New" panose="02070309020205020404" pitchFamily="49" charset="0"/>
+              </a:rPr>
+              <a:t> or </a:t>
+            </a:r>
+            <a:r>
+              <a:rPr lang="en-GB" sz="2600" dirty="0">
+                <a:latin typeface="Courier New" panose="02070309020205020404" pitchFamily="49" charset="0"/>
+                <a:cs typeface="Courier New" panose="02070309020205020404" pitchFamily="49" charset="0"/>
+              </a:rPr>
+              <a:t>if</a:t>
+            </a:r>
+            <a:r>
+              <a:rPr lang="en-GB" sz="2600" dirty="0">
+                <a:latin typeface="+mj-lt"/>
+                <a:cs typeface="Courier New" panose="02070309020205020404" pitchFamily="49" charset="0"/>
+              </a:rPr>
+              <a:t>) future commands will be taken as the indented block (indentation still required) until an empty line is entered</a:t>
+            </a:r>
+            <a:endParaRPr lang="en-GB" sz="2200" dirty="0">
+              <a:latin typeface="+mj-lt"/>
+              <a:cs typeface="Courier New" panose="02070309020205020404" pitchFamily="49" charset="0"/>
+            </a:endParaRPr>
+          </a:p>
+        </p:txBody>
+      </p:sp>
+    </p:spTree>
+    <p:extLst>
+      <p:ext uri="{BB962C8B-B14F-4D97-AF65-F5344CB8AC3E}">
+        <p14:creationId xmlns:p14="http://schemas.microsoft.com/office/powerpoint/2010/main" val="3359015176"/>
+      </p:ext>
+    </p:extLst>
+  </p:cSld>
+  <p:clrMapOvr>
+    <a:masterClrMapping/>
+  </p:clrMapOvr>
+  <mc:AlternateContent xmlns:mc="http://schemas.openxmlformats.org/markup-compatibility/2006">
+    <mc:Choice xmlns:p14="http://schemas.microsoft.com/office/powerpoint/2010/main" Requires="p14">
+      <p:transition p14:dur="10"/>
+    </mc:Choice>
+    <mc:Fallback>
+      <p:transition/>
+    </mc:Fallback>
+  </mc:AlternateContent>
+</p:sld>
+</file>
+
+<file path=ppt/slides/slide21.xml><?xml version="1.0" encoding="utf-8"?>
+<p:sld xmlns:a="http://schemas.openxmlformats.org/drawingml/2006/main" xmlns:r="http://schemas.openxmlformats.org/officeDocument/2006/relationships" xmlns:p="http://schemas.openxmlformats.org/presentationml/2006/main">
+  <p:cSld>
+    <p:spTree>
+      <p:nvGrpSpPr>
+        <p:cNvPr id="1" name=""/>
+        <p:cNvGrpSpPr/>
+        <p:nvPr/>
+      </p:nvGrpSpPr>
+      <p:grpSpPr>
+        <a:xfrm>
+          <a:off x="0" y="0"/>
+          <a:ext cx="0" cy="0"/>
+          <a:chOff x="0" y="0"/>
+          <a:chExt cx="0" cy="0"/>
+        </a:xfrm>
+      </p:grpSpPr>
+      <p:sp>
+        <p:nvSpPr>
+          <p:cNvPr id="2" name="Title 1"/>
+          <p:cNvSpPr>
+            <a:spLocks noGrp="1"/>
+          </p:cNvSpPr>
+          <p:nvPr>
+            <p:ph type="title"/>
+          </p:nvPr>
+        </p:nvSpPr>
+        <p:spPr/>
+        <p:txBody>
+          <a:bodyPr/>
+          <a:lstStyle/>
+          <a:p>
+            <a:r>
+              <a:rPr lang="en-GB" sz="4000" dirty="0"/>
+              <a:t>Feedback</a:t>
+            </a:r>
+          </a:p>
+        </p:txBody>
+      </p:sp>
+      <p:sp>
+        <p:nvSpPr>
+          <p:cNvPr id="3" name="Content Placeholder 2"/>
+          <p:cNvSpPr>
+            <a:spLocks noGrp="1"/>
+          </p:cNvSpPr>
+          <p:nvPr>
+            <p:ph idx="1"/>
+          </p:nvPr>
+        </p:nvSpPr>
+        <p:spPr>
+          <a:xfrm>
+            <a:off x="457200" y="1600200"/>
+            <a:ext cx="8435280" cy="4876800"/>
+          </a:xfrm>
+        </p:spPr>
+        <p:txBody>
+          <a:bodyPr>
+            <a:normAutofit/>
+          </a:bodyPr>
+          <a:lstStyle/>
+          <a:p>
+            <a:r>
+              <a:rPr lang="en-GB" sz="3000" dirty="0"/>
+              <a:t>Once you’ve completed this course, please provide feedback</a:t>
+            </a:r>
+          </a:p>
+          <a:p>
+            <a:pPr lvl="1"/>
+            <a:r>
+              <a:rPr lang="en-GB" sz="2600" dirty="0"/>
+              <a:t>The link is </a:t>
+            </a:r>
+            <a:r>
+              <a:rPr lang="en-GB" sz="2600" u="sng" dirty="0">
+                <a:solidFill>
+                  <a:srgbClr val="000000"/>
+                </a:solidFill>
+                <a:effectLst/>
+                <a:latin typeface="Arial" panose="020B0604020202020204" pitchFamily="34" charset="0"/>
+                <a:ea typeface="Times New Roman" panose="02020603050405020304" pitchFamily="18" charset="0"/>
+                <a:cs typeface="Arial" panose="020B0604020202020204" pitchFamily="34" charset="0"/>
+                <a:hlinkClick r:id="rId3"/>
+              </a:rPr>
+              <a:t>tinyurl.com/rcds2021-22</a:t>
+            </a:r>
+            <a:endParaRPr lang="en-GB" sz="2600" u="sng" dirty="0">
+              <a:solidFill>
+                <a:srgbClr val="000000"/>
+              </a:solidFill>
+              <a:effectLst/>
+              <a:latin typeface="Arial" panose="020B0604020202020204" pitchFamily="34" charset="0"/>
+              <a:ea typeface="Times New Roman" panose="02020603050405020304" pitchFamily="18" charset="0"/>
+              <a:cs typeface="Arial" panose="020B0604020202020204" pitchFamily="34" charset="0"/>
+            </a:endParaRPr>
+          </a:p>
+          <a:p>
+            <a:pPr lvl="1"/>
+            <a:r>
+              <a:rPr lang="en-GB" sz="2600" dirty="0"/>
+              <a:t>You should also have received an email with this link</a:t>
+            </a:r>
+          </a:p>
+          <a:p>
+            <a:pPr lvl="1"/>
+            <a:r>
+              <a:rPr lang="en-GB" sz="2600" dirty="0"/>
+              <a:t>This helps us improve the class for future students</a:t>
+            </a:r>
+          </a:p>
+          <a:p>
+            <a:endParaRPr lang="en-GB" sz="3000" dirty="0"/>
+          </a:p>
+        </p:txBody>
+      </p:sp>
+    </p:spTree>
+    <p:extLst>
+      <p:ext uri="{BB962C8B-B14F-4D97-AF65-F5344CB8AC3E}">
+        <p14:creationId xmlns:p14="http://schemas.microsoft.com/office/powerpoint/2010/main" val="2122788927"/>
+      </p:ext>
+    </p:extLst>
+  </p:cSld>
+  <p:clrMapOvr>
+    <a:masterClrMapping/>
+  </p:clrMapOvr>
+  <mc:AlternateContent xmlns:mc="http://schemas.openxmlformats.org/markup-compatibility/2006" xmlns:p14="http://schemas.microsoft.com/office/powerpoint/2010/main">
+    <mc:Choice Requires="p14">
+      <p:transition p14:dur="10"/>
+    </mc:Choice>
+    <mc:Fallback xmlns="">
+      <p:transition/>
+    </mc:Fallback>
+  </mc:AlternateContent>
+</p:sld>
+</file>
+
+<file path=ppt/slides/slide22.xml><?xml version="1.0" encoding="utf-8"?>
 <p:sld xmlns:a="http://schemas.openxmlformats.org/drawingml/2006/main" xmlns:r="http://schemas.openxmlformats.org/officeDocument/2006/relationships" xmlns:p="http://schemas.openxmlformats.org/presentationml/2006/main">
   <p:cSld>
     <p:spTree>

</xml_diff>

<commit_message>
Update Managing and Running Python Effectively.pptx
</commit_message>
<xml_diff>
--- a/Managing and Running Python Effectively.pptx
+++ b/Managing and Running Python Effectively.pptx
@@ -29,7 +29,7 @@
     <p:sldId id="512" r:id="rId17"/>
     <p:sldId id="513" r:id="rId18"/>
     <p:sldId id="514" r:id="rId19"/>
-    <p:sldId id="515" r:id="rId20"/>
+    <p:sldId id="518" r:id="rId20"/>
     <p:sldId id="516" r:id="rId21"/>
     <p:sldId id="329" r:id="rId22"/>
     <p:sldId id="280" r:id="rId23"/>
@@ -154,7 +154,7 @@
             <p14:sldId id="512"/>
             <p14:sldId id="513"/>
             <p14:sldId id="514"/>
-            <p14:sldId id="515"/>
+            <p14:sldId id="518"/>
             <p14:sldId id="516"/>
             <p14:sldId id="329"/>
             <p14:sldId id="280"/>
@@ -432,7 +432,7 @@
           <a:p>
             <a:fld id="{88EB714B-C3CC-4216-88C1-02913905B1CF}" type="datetimeFigureOut">
               <a:rPr lang="en-GB" smtClean="0"/>
-              <a:t>14/10/2021</a:t>
+              <a:t>18/10/2021</a:t>
             </a:fld>
             <a:endParaRPr lang="en-GB"/>
           </a:p>
@@ -1529,7 +1529,7 @@
     </p:spTree>
     <p:extLst>
       <p:ext uri="{BB962C8B-B14F-4D97-AF65-F5344CB8AC3E}">
-        <p14:creationId xmlns:p14="http://schemas.microsoft.com/office/powerpoint/2010/main" val="3976487587"/>
+        <p14:creationId xmlns:p14="http://schemas.microsoft.com/office/powerpoint/2010/main" val="3040209493"/>
       </p:ext>
     </p:extLst>
   </p:cSld>
@@ -2989,7 +2989,7 @@
           <a:p>
             <a:fld id="{EB0080F8-EA1C-491D-963C-2C881B2F918F}" type="datetimeFigureOut">
               <a:rPr lang="en-GB" smtClean="0"/>
-              <a:t>14/10/2021</a:t>
+              <a:t>18/10/2021</a:t>
             </a:fld>
             <a:endParaRPr lang="en-GB"/>
           </a:p>
@@ -3139,7 +3139,7 @@
           <a:p>
             <a:fld id="{EB0080F8-EA1C-491D-963C-2C881B2F918F}" type="datetimeFigureOut">
               <a:rPr lang="en-GB" smtClean="0"/>
-              <a:t>14/10/2021</a:t>
+              <a:t>18/10/2021</a:t>
             </a:fld>
             <a:endParaRPr lang="en-GB"/>
           </a:p>
@@ -4672,7 +4672,7 @@
           <a:p>
             <a:fld id="{EB0080F8-EA1C-491D-963C-2C881B2F918F}" type="datetimeFigureOut">
               <a:rPr lang="en-GB" smtClean="0"/>
-              <a:t>14/10/2021</a:t>
+              <a:t>18/10/2021</a:t>
             </a:fld>
             <a:endParaRPr lang="en-GB"/>
           </a:p>
@@ -7317,11 +7317,11 @@
   <p:clrMapOvr>
     <a:masterClrMapping/>
   </p:clrMapOvr>
-  <mc:AlternateContent xmlns:mc="http://schemas.openxmlformats.org/markup-compatibility/2006">
-    <mc:Choice xmlns:p14="http://schemas.microsoft.com/office/powerpoint/2010/main" Requires="p14">
+  <mc:AlternateContent xmlns:mc="http://schemas.openxmlformats.org/markup-compatibility/2006" xmlns:p14="http://schemas.microsoft.com/office/powerpoint/2010/main">
+    <mc:Choice Requires="p14">
       <p:transition p14:dur="10"/>
     </mc:Choice>
-    <mc:Fallback>
+    <mc:Fallback xmlns="">
       <p:transition/>
     </mc:Fallback>
   </mc:AlternateContent>
@@ -7729,11 +7729,11 @@
   <p:clrMapOvr>
     <a:masterClrMapping/>
   </p:clrMapOvr>
-  <mc:AlternateContent xmlns:mc="http://schemas.openxmlformats.org/markup-compatibility/2006">
-    <mc:Choice xmlns:p14="http://schemas.microsoft.com/office/powerpoint/2010/main" Requires="p14">
+  <mc:AlternateContent xmlns:mc="http://schemas.openxmlformats.org/markup-compatibility/2006" xmlns:p14="http://schemas.microsoft.com/office/powerpoint/2010/main">
+    <mc:Choice Requires="p14">
       <p:transition p14:dur="10"/>
     </mc:Choice>
-    <mc:Fallback>
+    <mc:Fallback xmlns="">
       <p:transition/>
     </mc:Fallback>
   </mc:AlternateContent>
@@ -7774,7 +7774,7 @@
           <a:p>
             <a:r>
               <a:rPr lang="en-GB" sz="4000" dirty="0"/>
-              <a:t>Exercise</a:t>
+              <a:t>Python Kernels</a:t>
             </a:r>
           </a:p>
         </p:txBody>
@@ -7792,12 +7792,12 @@
         <p:spPr>
           <a:xfrm>
             <a:off x="457200" y="1600200"/>
-            <a:ext cx="8435280" cy="4800600"/>
+            <a:ext cx="8527001" cy="4800600"/>
           </a:xfrm>
         </p:spPr>
         <p:txBody>
           <a:bodyPr>
-            <a:normAutofit fontScale="77500" lnSpcReduction="20000"/>
+            <a:normAutofit/>
           </a:bodyPr>
           <a:lstStyle/>
           <a:p>
@@ -7811,105 +7811,7 @@
                 <a:latin typeface="+mj-lt"/>
                 <a:cs typeface="Courier New" panose="02070309020205020404" pitchFamily="49" charset="0"/>
               </a:rPr>
-              <a:t>Anaconda</a:t>
-            </a:r>
-          </a:p>
-          <a:p>
-            <a:pPr lvl="1">
-              <a:lnSpc>
-                <a:spcPct val="107000"/>
-              </a:lnSpc>
-            </a:pPr>
-            <a:r>
-              <a:rPr lang="en-GB" sz="2200" dirty="0">
-                <a:latin typeface="+mj-lt"/>
-                <a:cs typeface="Courier New" panose="02070309020205020404" pitchFamily="49" charset="0"/>
-              </a:rPr>
-              <a:t>In a current environment install the </a:t>
-            </a:r>
-            <a:r>
-              <a:rPr lang="en-GB" sz="2200" dirty="0" err="1">
-                <a:latin typeface="Courier New" panose="02070309020205020404" pitchFamily="49" charset="0"/>
-                <a:cs typeface="Courier New" panose="02070309020205020404" pitchFamily="49" charset="0"/>
-              </a:rPr>
-              <a:t>numpy</a:t>
-            </a:r>
-            <a:r>
-              <a:rPr lang="en-GB" sz="2200" dirty="0">
-                <a:latin typeface="+mj-lt"/>
-                <a:cs typeface="Courier New" panose="02070309020205020404" pitchFamily="49" charset="0"/>
-              </a:rPr>
-              <a:t> package</a:t>
-            </a:r>
-          </a:p>
-          <a:p>
-            <a:pPr lvl="1">
-              <a:lnSpc>
-                <a:spcPct val="107000"/>
-              </a:lnSpc>
-            </a:pPr>
-            <a:r>
-              <a:rPr lang="en-GB" sz="2200" dirty="0">
-                <a:latin typeface="+mj-lt"/>
-                <a:cs typeface="Courier New" panose="02070309020205020404" pitchFamily="49" charset="0"/>
-              </a:rPr>
-              <a:t>Generate a requirements file named </a:t>
-            </a:r>
-            <a:r>
-              <a:rPr lang="en-GB" sz="2200" dirty="0">
-                <a:latin typeface="Courier New" panose="02070309020205020404" pitchFamily="49" charset="0"/>
-                <a:cs typeface="Courier New" panose="02070309020205020404" pitchFamily="49" charset="0"/>
-              </a:rPr>
-              <a:t>requirements_anaconda.txt </a:t>
-            </a:r>
-            <a:r>
-              <a:rPr lang="en-GB" sz="2200" dirty="0">
-                <a:latin typeface="+mj-lt"/>
-                <a:cs typeface="Courier New" panose="02070309020205020404" pitchFamily="49" charset="0"/>
-              </a:rPr>
-              <a:t>in the </a:t>
-            </a:r>
-            <a:r>
-              <a:rPr lang="en-GB" sz="2200" dirty="0">
-                <a:latin typeface="Courier New" panose="02070309020205020404" pitchFamily="49" charset="0"/>
-                <a:cs typeface="Courier New" panose="02070309020205020404" pitchFamily="49" charset="0"/>
-              </a:rPr>
-              <a:t>Exercises/requirements </a:t>
-            </a:r>
-            <a:r>
-              <a:rPr lang="en-GB" sz="2200" dirty="0">
-                <a:latin typeface="+mj-lt"/>
-                <a:cs typeface="Courier New" panose="02070309020205020404" pitchFamily="49" charset="0"/>
-              </a:rPr>
-              <a:t>directory</a:t>
-            </a:r>
-          </a:p>
-          <a:p>
-            <a:pPr lvl="1">
-              <a:lnSpc>
-                <a:spcPct val="107000"/>
-              </a:lnSpc>
-            </a:pPr>
-            <a:r>
-              <a:rPr lang="en-GB" sz="2200" dirty="0">
-                <a:latin typeface="+mj-lt"/>
-                <a:cs typeface="Courier New" panose="02070309020205020404" pitchFamily="49" charset="0"/>
-              </a:rPr>
-              <a:t>Create a new environment using this requirements file Check the new environment has </a:t>
-            </a:r>
-            <a:r>
-              <a:rPr lang="en-GB" sz="2200" dirty="0" err="1">
-                <a:latin typeface="Courier New" panose="02070309020205020404" pitchFamily="49" charset="0"/>
-                <a:cs typeface="Courier New" panose="02070309020205020404" pitchFamily="49" charset="0"/>
-              </a:rPr>
-              <a:t>numpy</a:t>
-            </a:r>
-            <a:r>
-              <a:rPr lang="en-GB" sz="2200" dirty="0">
-                <a:latin typeface="+mj-lt"/>
-                <a:cs typeface="Courier New" panose="02070309020205020404" pitchFamily="49" charset="0"/>
-              </a:rPr>
-              <a:t> installed</a:t>
+              <a:t>An operating system process that runs Python code</a:t>
             </a:r>
           </a:p>
           <a:p>
@@ -7923,161 +7825,7 @@
                 <a:latin typeface="+mj-lt"/>
                 <a:cs typeface="Courier New" panose="02070309020205020404" pitchFamily="49" charset="0"/>
               </a:rPr>
-              <a:t>Pip</a:t>
-            </a:r>
-          </a:p>
-          <a:p>
-            <a:pPr lvl="1">
-              <a:lnSpc>
-                <a:spcPct val="107000"/>
-              </a:lnSpc>
-            </a:pPr>
-            <a:r>
-              <a:rPr lang="en-GB" sz="2200" dirty="0">
-                <a:latin typeface="+mj-lt"/>
-                <a:cs typeface="Courier New" panose="02070309020205020404" pitchFamily="49" charset="0"/>
-              </a:rPr>
-              <a:t>In a current environment install the </a:t>
-            </a:r>
-            <a:r>
-              <a:rPr lang="en-GB" sz="2200" dirty="0" err="1">
-                <a:latin typeface="Courier New" panose="02070309020205020404" pitchFamily="49" charset="0"/>
-                <a:cs typeface="Courier New" panose="02070309020205020404" pitchFamily="49" charset="0"/>
-              </a:rPr>
-              <a:t>numpy</a:t>
-            </a:r>
-            <a:r>
-              <a:rPr lang="en-GB" sz="2200" dirty="0">
-                <a:latin typeface="+mj-lt"/>
-                <a:cs typeface="Courier New" panose="02070309020205020404" pitchFamily="49" charset="0"/>
-              </a:rPr>
-              <a:t> package</a:t>
-            </a:r>
-          </a:p>
-          <a:p>
-            <a:pPr lvl="1">
-              <a:lnSpc>
-                <a:spcPct val="107000"/>
-              </a:lnSpc>
-            </a:pPr>
-            <a:r>
-              <a:rPr lang="en-GB" sz="2200" dirty="0">
-                <a:latin typeface="+mj-lt"/>
-                <a:cs typeface="Courier New" panose="02070309020205020404" pitchFamily="49" charset="0"/>
-              </a:rPr>
-              <a:t>Generate a requirements file named </a:t>
-            </a:r>
-            <a:r>
-              <a:rPr lang="en-GB" sz="2200" dirty="0">
-                <a:latin typeface="Courier New" panose="02070309020205020404" pitchFamily="49" charset="0"/>
-                <a:cs typeface="Courier New" panose="02070309020205020404" pitchFamily="49" charset="0"/>
-              </a:rPr>
-              <a:t>requirements_pip.txt </a:t>
-            </a:r>
-            <a:r>
-              <a:rPr lang="en-GB" sz="2200" dirty="0">
-                <a:latin typeface="+mj-lt"/>
-                <a:cs typeface="Courier New" panose="02070309020205020404" pitchFamily="49" charset="0"/>
-              </a:rPr>
-              <a:t>in the </a:t>
-            </a:r>
-            <a:r>
-              <a:rPr lang="en-GB" sz="2200" dirty="0">
-                <a:latin typeface="Courier New" panose="02070309020205020404" pitchFamily="49" charset="0"/>
-                <a:cs typeface="Courier New" panose="02070309020205020404" pitchFamily="49" charset="0"/>
-              </a:rPr>
-              <a:t>Exercises/requirements </a:t>
-            </a:r>
-            <a:r>
-              <a:rPr lang="en-GB" sz="2200" dirty="0">
-                <a:latin typeface="+mj-lt"/>
-                <a:cs typeface="Courier New" panose="02070309020205020404" pitchFamily="49" charset="0"/>
-              </a:rPr>
-              <a:t>directory</a:t>
-            </a:r>
-          </a:p>
-          <a:p>
-            <a:pPr lvl="1">
-              <a:lnSpc>
-                <a:spcPct val="107000"/>
-              </a:lnSpc>
-            </a:pPr>
-            <a:r>
-              <a:rPr lang="en-GB" sz="2200" dirty="0">
-                <a:latin typeface="+mj-lt"/>
-                <a:cs typeface="Courier New" panose="02070309020205020404" pitchFamily="49" charset="0"/>
-              </a:rPr>
-              <a:t>Activate the virtual environment you created in the previous exercise</a:t>
-            </a:r>
-          </a:p>
-          <a:p>
-            <a:pPr lvl="1">
-              <a:lnSpc>
-                <a:spcPct val="107000"/>
-              </a:lnSpc>
-            </a:pPr>
-            <a:r>
-              <a:rPr lang="en-GB" sz="2200" dirty="0">
-                <a:latin typeface="+mj-lt"/>
-                <a:cs typeface="Courier New" panose="02070309020205020404" pitchFamily="49" charset="0"/>
-              </a:rPr>
-              <a:t>In the terminal write </a:t>
-            </a:r>
-            <a:r>
-              <a:rPr lang="en-GB" sz="2200" dirty="0">
-                <a:latin typeface="Courier New" panose="02070309020205020404" pitchFamily="49" charset="0"/>
-                <a:cs typeface="Courier New" panose="02070309020205020404" pitchFamily="49" charset="0"/>
-              </a:rPr>
-              <a:t>python</a:t>
-            </a:r>
-            <a:r>
-              <a:rPr lang="en-GB" sz="2200" dirty="0">
-                <a:latin typeface="+mj-lt"/>
-                <a:cs typeface="Courier New" panose="02070309020205020404" pitchFamily="49" charset="0"/>
-              </a:rPr>
-              <a:t> then </a:t>
-            </a:r>
-            <a:r>
-              <a:rPr lang="en-GB" sz="2200" dirty="0">
-                <a:latin typeface="Courier New" panose="02070309020205020404" pitchFamily="49" charset="0"/>
-                <a:cs typeface="Courier New" panose="02070309020205020404" pitchFamily="49" charset="0"/>
-              </a:rPr>
-              <a:t>import </a:t>
-            </a:r>
-            <a:r>
-              <a:rPr lang="en-GB" sz="2200" dirty="0" err="1">
-                <a:latin typeface="Courier New" panose="02070309020205020404" pitchFamily="49" charset="0"/>
-                <a:cs typeface="Courier New" panose="02070309020205020404" pitchFamily="49" charset="0"/>
-              </a:rPr>
-              <a:t>numpy</a:t>
-            </a:r>
-            <a:r>
-              <a:rPr lang="en-GB" sz="2200" dirty="0">
-                <a:latin typeface="Courier New" panose="02070309020205020404" pitchFamily="49" charset="0"/>
-                <a:cs typeface="Courier New" panose="02070309020205020404" pitchFamily="49" charset="0"/>
-              </a:rPr>
-              <a:t> </a:t>
-            </a:r>
-            <a:r>
-              <a:rPr lang="en-GB" sz="2200" dirty="0">
-                <a:latin typeface="+mj-lt"/>
-                <a:cs typeface="Courier New" panose="02070309020205020404" pitchFamily="49" charset="0"/>
-              </a:rPr>
-              <a:t>to verify </a:t>
-            </a:r>
-            <a:r>
-              <a:rPr lang="en-GB" sz="2200" dirty="0" err="1">
-                <a:latin typeface="+mj-lt"/>
-                <a:cs typeface="Courier New" panose="02070309020205020404" pitchFamily="49" charset="0"/>
-              </a:rPr>
-              <a:t>numpy</a:t>
-            </a:r>
-            <a:r>
-              <a:rPr lang="en-GB" sz="2200" dirty="0">
-                <a:latin typeface="+mj-lt"/>
-                <a:cs typeface="Courier New" panose="02070309020205020404" pitchFamily="49" charset="0"/>
-              </a:rPr>
-              <a:t> is installed</a:t>
+              <a:t>Separate to the front-end applications that you use to read/write code</a:t>
             </a:r>
           </a:p>
           <a:p>
@@ -8091,50 +7839,90 @@
                 <a:latin typeface="+mj-lt"/>
                 <a:cs typeface="Courier New" panose="02070309020205020404" pitchFamily="49" charset="0"/>
               </a:rPr>
-              <a:t>Compare </a:t>
-            </a:r>
-            <a:r>
-              <a:rPr lang="en-GB" sz="2800" dirty="0">
-                <a:latin typeface="Courier New" panose="02070309020205020404" pitchFamily="49" charset="0"/>
-                <a:cs typeface="Courier New" panose="02070309020205020404" pitchFamily="49" charset="0"/>
-              </a:rPr>
-              <a:t>requirements_anaconda.txt </a:t>
-            </a:r>
-            <a:r>
-              <a:rPr lang="en-GB" sz="2800" dirty="0">
+              <a:t>May run for a long time</a:t>
+            </a:r>
+          </a:p>
+          <a:p>
+            <a:pPr>
+              <a:lnSpc>
+                <a:spcPct val="107000"/>
+              </a:lnSpc>
+            </a:pPr>
+            <a:r>
+              <a:rPr lang="en-GB" sz="2600" dirty="0">
                 <a:latin typeface="+mj-lt"/>
                 <a:cs typeface="Courier New" panose="02070309020205020404" pitchFamily="49" charset="0"/>
               </a:rPr>
-              <a:t>and</a:t>
-            </a:r>
-            <a:r>
-              <a:rPr lang="en-GB" sz="2800" dirty="0">
-                <a:latin typeface="Courier New" panose="02070309020205020404" pitchFamily="49" charset="0"/>
-                <a:cs typeface="Courier New" panose="02070309020205020404" pitchFamily="49" charset="0"/>
-              </a:rPr>
-              <a:t> requirements_pip.txt</a:t>
-            </a:r>
-          </a:p>
-          <a:p>
-            <a:pPr lvl="1">
+              <a:t>May be hosted locally or remotely</a:t>
+            </a:r>
+          </a:p>
+          <a:p>
+            <a:pPr>
               <a:lnSpc>
                 <a:spcPct val="107000"/>
               </a:lnSpc>
             </a:pPr>
             <a:r>
-              <a:rPr lang="en-GB" sz="2200" dirty="0">
+              <a:rPr lang="en-GB" sz="2600" dirty="0">
                 <a:latin typeface="+mj-lt"/>
                 <a:cs typeface="Courier New" panose="02070309020205020404" pitchFamily="49" charset="0"/>
               </a:rPr>
-              <a:t>What differences can you see in their format?</a:t>
-            </a:r>
-          </a:p>
-        </p:txBody>
-      </p:sp>
+              <a:t>Many applications can create a kernel</a:t>
+            </a:r>
+          </a:p>
+        </p:txBody>
+      </p:sp>
+      <p:pic>
+        <p:nvPicPr>
+          <p:cNvPr id="1026" name="Picture 2">
+            <a:extLst>
+              <a:ext uri="{FF2B5EF4-FFF2-40B4-BE49-F238E27FC236}">
+                <a16:creationId xmlns:a16="http://schemas.microsoft.com/office/drawing/2014/main" id="{20F918A7-2567-4941-AEE0-EEA130511948}"/>
+              </a:ext>
+            </a:extLst>
+          </p:cNvPr>
+          <p:cNvPicPr>
+            <a:picLocks noChangeAspect="1" noChangeArrowheads="1"/>
+          </p:cNvPicPr>
+          <p:nvPr/>
+        </p:nvPicPr>
+        <p:blipFill>
+          <a:blip r:embed="rId3">
+            <a:extLst>
+              <a:ext uri="{28A0092B-C50C-407E-A947-70E740481C1C}">
+                <a14:useLocalDpi xmlns:a14="http://schemas.microsoft.com/office/drawing/2010/main" val="0"/>
+              </a:ext>
+            </a:extLst>
+          </a:blip>
+          <a:srcRect/>
+          <a:stretch>
+            <a:fillRect/>
+          </a:stretch>
+        </p:blipFill>
+        <p:spPr bwMode="auto">
+          <a:xfrm>
+            <a:off x="1910178" y="4536951"/>
+            <a:ext cx="5323643" cy="2262548"/>
+          </a:xfrm>
+          <a:prstGeom prst="rect">
+            <a:avLst/>
+          </a:prstGeom>
+          <a:noFill/>
+          <a:extLst>
+            <a:ext uri="{909E8E84-426E-40DD-AFC4-6F175D3DCCD1}">
+              <a14:hiddenFill xmlns:a14="http://schemas.microsoft.com/office/drawing/2010/main">
+                <a:solidFill>
+                  <a:srgbClr val="FFFFFF"/>
+                </a:solidFill>
+              </a14:hiddenFill>
+            </a:ext>
+          </a:extLst>
+        </p:spPr>
+      </p:pic>
     </p:spTree>
     <p:extLst>
       <p:ext uri="{BB962C8B-B14F-4D97-AF65-F5344CB8AC3E}">
-        <p14:creationId xmlns:p14="http://schemas.microsoft.com/office/powerpoint/2010/main" val="2411935850"/>
+        <p14:creationId xmlns:p14="http://schemas.microsoft.com/office/powerpoint/2010/main" val="595436555"/>
       </p:ext>
     </p:extLst>
   </p:cSld>
@@ -8370,21 +8158,14 @@
                 <a:latin typeface="Courier New" panose="02070309020205020404" pitchFamily="49" charset="0"/>
                 <a:cs typeface="Courier New" panose="02070309020205020404" pitchFamily="49" charset="0"/>
               </a:rPr>
-              <a:t>python</a:t>
-            </a:r>
-          </a:p>
-          <a:p>
-            <a:pPr>
-              <a:lnSpc>
-                <a:spcPct val="107000"/>
-              </a:lnSpc>
-            </a:pPr>
+              <a:t>python </a:t>
+            </a:r>
             <a:r>
               <a:rPr lang="en-GB" sz="2600" dirty="0">
                 <a:latin typeface="+mj-lt"/>
                 <a:cs typeface="Courier New" panose="02070309020205020404" pitchFamily="49" charset="0"/>
               </a:rPr>
-              <a:t>Type individual Python commands</a:t>
+              <a:t>to create a kernel</a:t>
             </a:r>
           </a:p>
           <a:p>
@@ -8398,6 +8179,20 @@
                 <a:latin typeface="+mj-lt"/>
                 <a:cs typeface="Courier New" panose="02070309020205020404" pitchFamily="49" charset="0"/>
               </a:rPr>
+              <a:t>Type individual Python commands</a:t>
+            </a:r>
+          </a:p>
+          <a:p>
+            <a:pPr>
+              <a:lnSpc>
+                <a:spcPct val="107000"/>
+              </a:lnSpc>
+            </a:pPr>
+            <a:r>
+              <a:rPr lang="en-GB" sz="2600" dirty="0">
+                <a:latin typeface="+mj-lt"/>
+                <a:cs typeface="Courier New" panose="02070309020205020404" pitchFamily="49" charset="0"/>
+              </a:rPr>
               <a:t>If using commands that require indentation (such as </a:t>
             </a:r>
             <a:r>
@@ -8427,6 +8222,20 @@
                 <a:cs typeface="Courier New" panose="02070309020205020404" pitchFamily="49" charset="0"/>
               </a:rPr>
               <a:t>) future commands will be taken as the indented block (indentation still required) until an empty line is entered</a:t>
+            </a:r>
+          </a:p>
+          <a:p>
+            <a:pPr>
+              <a:lnSpc>
+                <a:spcPct val="107000"/>
+              </a:lnSpc>
+            </a:pPr>
+            <a:r>
+              <a:rPr lang="en-GB" sz="2600" dirty="0">
+                <a:latin typeface="+mj-lt"/>
+                <a:cs typeface="Courier New" panose="02070309020205020404" pitchFamily="49" charset="0"/>
+              </a:rPr>
+              <a:t>Generally not a good option except for very short pieces of code</a:t>
             </a:r>
             <a:endParaRPr lang="en-GB" sz="2200" dirty="0">
               <a:latin typeface="+mj-lt"/>
@@ -8445,11 +8254,11 @@
   <p:clrMapOvr>
     <a:masterClrMapping/>
   </p:clrMapOvr>
-  <mc:AlternateContent xmlns:mc="http://schemas.openxmlformats.org/markup-compatibility/2006">
-    <mc:Choice xmlns:p14="http://schemas.microsoft.com/office/powerpoint/2010/main" Requires="p14">
+  <mc:AlternateContent xmlns:mc="http://schemas.openxmlformats.org/markup-compatibility/2006" xmlns:p14="http://schemas.microsoft.com/office/powerpoint/2010/main">
+    <mc:Choice Requires="p14">
       <p:transition p14:dur="10"/>
     </mc:Choice>
-    <mc:Fallback>
+    <mc:Fallback xmlns="">
       <p:transition/>
     </mc:Fallback>
   </mc:AlternateContent>

</xml_diff>

<commit_message>
Running Python files from the command line
</commit_message>
<xml_diff>
--- a/Managing and Running Python Effectively.pptx
+++ b/Managing and Running Python Effectively.pptx
@@ -5,10 +5,10 @@
     <p:sldMasterId id="2147483648" r:id="rId1"/>
   </p:sldMasterIdLst>
   <p:notesMasterIdLst>
-    <p:notesMasterId r:id="rId24"/>
+    <p:notesMasterId r:id="rId25"/>
   </p:notesMasterIdLst>
   <p:handoutMasterIdLst>
-    <p:handoutMasterId r:id="rId25"/>
+    <p:handoutMasterId r:id="rId26"/>
   </p:handoutMasterIdLst>
   <p:sldIdLst>
     <p:sldId id="264" r:id="rId2"/>
@@ -31,8 +31,9 @@
     <p:sldId id="514" r:id="rId19"/>
     <p:sldId id="518" r:id="rId20"/>
     <p:sldId id="516" r:id="rId21"/>
-    <p:sldId id="329" r:id="rId22"/>
-    <p:sldId id="280" r:id="rId23"/>
+    <p:sldId id="519" r:id="rId22"/>
+    <p:sldId id="329" r:id="rId23"/>
+    <p:sldId id="280" r:id="rId24"/>
   </p:sldIdLst>
   <p:sldSz cx="9144000" cy="6858000" type="screen4x3"/>
   <p:notesSz cx="7099300" cy="10234613"/>
@@ -156,6 +157,7 @@
             <p14:sldId id="514"/>
             <p14:sldId id="518"/>
             <p14:sldId id="516"/>
+            <p14:sldId id="519"/>
             <p14:sldId id="329"/>
             <p14:sldId id="280"/>
           </p14:sldIdLst>
@@ -1697,6 +1699,90 @@
     </p:spTree>
     <p:extLst>
       <p:ext uri="{BB962C8B-B14F-4D97-AF65-F5344CB8AC3E}">
+        <p14:creationId xmlns:p14="http://schemas.microsoft.com/office/powerpoint/2010/main" val="2324684938"/>
+      </p:ext>
+    </p:extLst>
+  </p:cSld>
+  <p:clrMapOvr>
+    <a:masterClrMapping/>
+  </p:clrMapOvr>
+</p:notes>
+</file>
+
+<file path=ppt/notesSlides/notesSlide19.xml><?xml version="1.0" encoding="utf-8"?>
+<p:notes xmlns:a="http://schemas.openxmlformats.org/drawingml/2006/main" xmlns:r="http://schemas.openxmlformats.org/officeDocument/2006/relationships" xmlns:p="http://schemas.openxmlformats.org/presentationml/2006/main">
+  <p:cSld>
+    <p:spTree>
+      <p:nvGrpSpPr>
+        <p:cNvPr id="1" name=""/>
+        <p:cNvGrpSpPr/>
+        <p:nvPr/>
+      </p:nvGrpSpPr>
+      <p:grpSpPr>
+        <a:xfrm>
+          <a:off x="0" y="0"/>
+          <a:ext cx="0" cy="0"/>
+          <a:chOff x="0" y="0"/>
+          <a:chExt cx="0" cy="0"/>
+        </a:xfrm>
+      </p:grpSpPr>
+      <p:sp>
+        <p:nvSpPr>
+          <p:cNvPr id="2" name="Slide Image Placeholder 1"/>
+          <p:cNvSpPr>
+            <a:spLocks noGrp="1" noRot="1" noChangeAspect="1"/>
+          </p:cNvSpPr>
+          <p:nvPr>
+            <p:ph type="sldImg"/>
+          </p:nvPr>
+        </p:nvSpPr>
+        <p:spPr/>
+      </p:sp>
+      <p:sp>
+        <p:nvSpPr>
+          <p:cNvPr id="3" name="Notes Placeholder 2"/>
+          <p:cNvSpPr>
+            <a:spLocks noGrp="1"/>
+          </p:cNvSpPr>
+          <p:nvPr>
+            <p:ph type="body" idx="1"/>
+          </p:nvPr>
+        </p:nvSpPr>
+        <p:spPr/>
+        <p:txBody>
+          <a:bodyPr/>
+          <a:lstStyle/>
+          <a:p>
+            <a:endParaRPr lang="en-GB" dirty="0"/>
+          </a:p>
+        </p:txBody>
+      </p:sp>
+      <p:sp>
+        <p:nvSpPr>
+          <p:cNvPr id="4" name="Slide Number Placeholder 3"/>
+          <p:cNvSpPr>
+            <a:spLocks noGrp="1"/>
+          </p:cNvSpPr>
+          <p:nvPr>
+            <p:ph type="sldNum" sz="quarter" idx="10"/>
+          </p:nvPr>
+        </p:nvSpPr>
+        <p:spPr/>
+        <p:txBody>
+          <a:bodyPr/>
+          <a:lstStyle/>
+          <a:p>
+            <a:fld id="{6A641EC8-C9F8-4A58-A1A7-F7D817526EEC}" type="slidenum">
+              <a:rPr lang="en-GB" smtClean="0"/>
+              <a:t>22</a:t>
+            </a:fld>
+            <a:endParaRPr lang="en-GB"/>
+          </a:p>
+        </p:txBody>
+      </p:sp>
+    </p:spTree>
+    <p:extLst>
+      <p:ext uri="{BB962C8B-B14F-4D97-AF65-F5344CB8AC3E}">
         <p14:creationId xmlns:p14="http://schemas.microsoft.com/office/powerpoint/2010/main" val="1492413823"/>
       </p:ext>
     </p:extLst>
@@ -1707,7 +1793,91 @@
 </p:notes>
 </file>
 
-<file path=ppt/notesSlides/notesSlide19.xml><?xml version="1.0" encoding="utf-8"?>
+<file path=ppt/notesSlides/notesSlide2.xml><?xml version="1.0" encoding="utf-8"?>
+<p:notes xmlns:a="http://schemas.openxmlformats.org/drawingml/2006/main" xmlns:r="http://schemas.openxmlformats.org/officeDocument/2006/relationships" xmlns:p="http://schemas.openxmlformats.org/presentationml/2006/main">
+  <p:cSld>
+    <p:spTree>
+      <p:nvGrpSpPr>
+        <p:cNvPr id="1" name=""/>
+        <p:cNvGrpSpPr/>
+        <p:nvPr/>
+      </p:nvGrpSpPr>
+      <p:grpSpPr>
+        <a:xfrm>
+          <a:off x="0" y="0"/>
+          <a:ext cx="0" cy="0"/>
+          <a:chOff x="0" y="0"/>
+          <a:chExt cx="0" cy="0"/>
+        </a:xfrm>
+      </p:grpSpPr>
+      <p:sp>
+        <p:nvSpPr>
+          <p:cNvPr id="2" name="Slide Image Placeholder 1"/>
+          <p:cNvSpPr>
+            <a:spLocks noGrp="1" noRot="1" noChangeAspect="1"/>
+          </p:cNvSpPr>
+          <p:nvPr>
+            <p:ph type="sldImg"/>
+          </p:nvPr>
+        </p:nvSpPr>
+        <p:spPr/>
+      </p:sp>
+      <p:sp>
+        <p:nvSpPr>
+          <p:cNvPr id="3" name="Notes Placeholder 2"/>
+          <p:cNvSpPr>
+            <a:spLocks noGrp="1"/>
+          </p:cNvSpPr>
+          <p:nvPr>
+            <p:ph type="body" idx="1"/>
+          </p:nvPr>
+        </p:nvSpPr>
+        <p:spPr/>
+        <p:txBody>
+          <a:bodyPr/>
+          <a:lstStyle/>
+          <a:p>
+            <a:endParaRPr lang="en-GB" dirty="0"/>
+          </a:p>
+        </p:txBody>
+      </p:sp>
+      <p:sp>
+        <p:nvSpPr>
+          <p:cNvPr id="4" name="Slide Number Placeholder 3"/>
+          <p:cNvSpPr>
+            <a:spLocks noGrp="1"/>
+          </p:cNvSpPr>
+          <p:nvPr>
+            <p:ph type="sldNum" sz="quarter" idx="10"/>
+          </p:nvPr>
+        </p:nvSpPr>
+        <p:spPr/>
+        <p:txBody>
+          <a:bodyPr/>
+          <a:lstStyle/>
+          <a:p>
+            <a:fld id="{6A641EC8-C9F8-4A58-A1A7-F7D817526EEC}" type="slidenum">
+              <a:rPr lang="en-GB" smtClean="0"/>
+              <a:t>5</a:t>
+            </a:fld>
+            <a:endParaRPr lang="en-GB"/>
+          </a:p>
+        </p:txBody>
+      </p:sp>
+    </p:spTree>
+    <p:extLst>
+      <p:ext uri="{BB962C8B-B14F-4D97-AF65-F5344CB8AC3E}">
+        <p14:creationId xmlns:p14="http://schemas.microsoft.com/office/powerpoint/2010/main" val="2283586298"/>
+      </p:ext>
+    </p:extLst>
+  </p:cSld>
+  <p:clrMapOvr>
+    <a:masterClrMapping/>
+  </p:clrMapOvr>
+</p:notes>
+</file>
+
+<file path=ppt/notesSlides/notesSlide20.xml><?xml version="1.0" encoding="utf-8"?>
 <p:notes xmlns:a="http://schemas.openxmlformats.org/drawingml/2006/main" xmlns:r="http://schemas.openxmlformats.org/officeDocument/2006/relationships" xmlns:p="http://schemas.openxmlformats.org/presentationml/2006/main">
   <p:cSld>
     <p:spTree>
@@ -1884,7 +2054,7 @@
                   <a:spcPct val="0"/>
                 </a:spcBef>
               </a:pPr>
-              <a:t>22</a:t>
+              <a:t>23</a:t>
             </a:fld>
             <a:endParaRPr lang="en-US" altLang="en-US"/>
           </a:p>
@@ -1949,90 +2119,6 @@
     <p:extLst>
       <p:ext uri="{BB962C8B-B14F-4D97-AF65-F5344CB8AC3E}">
         <p14:creationId xmlns:p14="http://schemas.microsoft.com/office/powerpoint/2010/main" val="1829525107"/>
-      </p:ext>
-    </p:extLst>
-  </p:cSld>
-  <p:clrMapOvr>
-    <a:masterClrMapping/>
-  </p:clrMapOvr>
-</p:notes>
-</file>
-
-<file path=ppt/notesSlides/notesSlide2.xml><?xml version="1.0" encoding="utf-8"?>
-<p:notes xmlns:a="http://schemas.openxmlformats.org/drawingml/2006/main" xmlns:r="http://schemas.openxmlformats.org/officeDocument/2006/relationships" xmlns:p="http://schemas.openxmlformats.org/presentationml/2006/main">
-  <p:cSld>
-    <p:spTree>
-      <p:nvGrpSpPr>
-        <p:cNvPr id="1" name=""/>
-        <p:cNvGrpSpPr/>
-        <p:nvPr/>
-      </p:nvGrpSpPr>
-      <p:grpSpPr>
-        <a:xfrm>
-          <a:off x="0" y="0"/>
-          <a:ext cx="0" cy="0"/>
-          <a:chOff x="0" y="0"/>
-          <a:chExt cx="0" cy="0"/>
-        </a:xfrm>
-      </p:grpSpPr>
-      <p:sp>
-        <p:nvSpPr>
-          <p:cNvPr id="2" name="Slide Image Placeholder 1"/>
-          <p:cNvSpPr>
-            <a:spLocks noGrp="1" noRot="1" noChangeAspect="1"/>
-          </p:cNvSpPr>
-          <p:nvPr>
-            <p:ph type="sldImg"/>
-          </p:nvPr>
-        </p:nvSpPr>
-        <p:spPr/>
-      </p:sp>
-      <p:sp>
-        <p:nvSpPr>
-          <p:cNvPr id="3" name="Notes Placeholder 2"/>
-          <p:cNvSpPr>
-            <a:spLocks noGrp="1"/>
-          </p:cNvSpPr>
-          <p:nvPr>
-            <p:ph type="body" idx="1"/>
-          </p:nvPr>
-        </p:nvSpPr>
-        <p:spPr/>
-        <p:txBody>
-          <a:bodyPr/>
-          <a:lstStyle/>
-          <a:p>
-            <a:endParaRPr lang="en-GB" dirty="0"/>
-          </a:p>
-        </p:txBody>
-      </p:sp>
-      <p:sp>
-        <p:nvSpPr>
-          <p:cNvPr id="4" name="Slide Number Placeholder 3"/>
-          <p:cNvSpPr>
-            <a:spLocks noGrp="1"/>
-          </p:cNvSpPr>
-          <p:nvPr>
-            <p:ph type="sldNum" sz="quarter" idx="10"/>
-          </p:nvPr>
-        </p:nvSpPr>
-        <p:spPr/>
-        <p:txBody>
-          <a:bodyPr/>
-          <a:lstStyle/>
-          <a:p>
-            <a:fld id="{6A641EC8-C9F8-4A58-A1A7-F7D817526EEC}" type="slidenum">
-              <a:rPr lang="en-GB" smtClean="0"/>
-              <a:t>5</a:t>
-            </a:fld>
-            <a:endParaRPr lang="en-GB"/>
-          </a:p>
-        </p:txBody>
-      </p:sp>
-    </p:spTree>
-    <p:extLst>
-      <p:ext uri="{BB962C8B-B14F-4D97-AF65-F5344CB8AC3E}">
-        <p14:creationId xmlns:p14="http://schemas.microsoft.com/office/powerpoint/2010/main" val="2283586298"/>
       </p:ext>
     </p:extLst>
   </p:cSld>
@@ -8299,6 +8385,170 @@
           <a:p>
             <a:r>
               <a:rPr lang="en-GB" sz="4000" dirty="0"/>
+              <a:t>Running Python Files From the Command Line</a:t>
+            </a:r>
+          </a:p>
+        </p:txBody>
+      </p:sp>
+      <p:sp>
+        <p:nvSpPr>
+          <p:cNvPr id="3" name="Content Placeholder 2"/>
+          <p:cNvSpPr>
+            <a:spLocks noGrp="1"/>
+          </p:cNvSpPr>
+          <p:nvPr>
+            <p:ph idx="1"/>
+          </p:nvPr>
+        </p:nvSpPr>
+        <p:spPr>
+          <a:xfrm>
+            <a:off x="457200" y="1600200"/>
+            <a:ext cx="8435280" cy="4800600"/>
+          </a:xfrm>
+        </p:spPr>
+        <p:txBody>
+          <a:bodyPr>
+            <a:normAutofit/>
+          </a:bodyPr>
+          <a:lstStyle/>
+          <a:p>
+            <a:pPr>
+              <a:lnSpc>
+                <a:spcPct val="107000"/>
+              </a:lnSpc>
+            </a:pPr>
+            <a:r>
+              <a:rPr lang="en-GB" sz="2600" dirty="0">
+                <a:latin typeface="+mj-lt"/>
+                <a:cs typeface="Courier New" panose="02070309020205020404" pitchFamily="49" charset="0"/>
+              </a:rPr>
+              <a:t>Python files can be run from the command line</a:t>
+            </a:r>
+          </a:p>
+          <a:p>
+            <a:pPr lvl="1">
+              <a:lnSpc>
+                <a:spcPct val="107000"/>
+              </a:lnSpc>
+            </a:pPr>
+            <a:r>
+              <a:rPr lang="en-GB" sz="2200" dirty="0">
+                <a:latin typeface="+mj-lt"/>
+                <a:cs typeface="Courier New" panose="02070309020205020404" pitchFamily="49" charset="0"/>
+              </a:rPr>
+              <a:t>Linux/Mac terminal</a:t>
+            </a:r>
+          </a:p>
+          <a:p>
+            <a:pPr lvl="1">
+              <a:lnSpc>
+                <a:spcPct val="107000"/>
+              </a:lnSpc>
+            </a:pPr>
+            <a:r>
+              <a:rPr lang="en-GB" sz="2200" dirty="0">
+                <a:latin typeface="+mj-lt"/>
+                <a:cs typeface="Courier New" panose="02070309020205020404" pitchFamily="49" charset="0"/>
+              </a:rPr>
+              <a:t>Windows </a:t>
+            </a:r>
+            <a:r>
+              <a:rPr lang="en-GB" sz="2200" dirty="0" err="1">
+                <a:latin typeface="+mj-lt"/>
+                <a:cs typeface="Courier New" panose="02070309020205020404" pitchFamily="49" charset="0"/>
+              </a:rPr>
+              <a:t>powershell</a:t>
+            </a:r>
+            <a:r>
+              <a:rPr lang="en-GB" sz="2200" dirty="0">
+                <a:latin typeface="+mj-lt"/>
+                <a:cs typeface="Courier New" panose="02070309020205020404" pitchFamily="49" charset="0"/>
+              </a:rPr>
+              <a:t>/command prompt</a:t>
+            </a:r>
+          </a:p>
+          <a:p>
+            <a:pPr lvl="1">
+              <a:lnSpc>
+                <a:spcPct val="107000"/>
+              </a:lnSpc>
+            </a:pPr>
+            <a:r>
+              <a:rPr lang="en-GB" sz="2200" dirty="0">
+                <a:latin typeface="+mj-lt"/>
+                <a:cs typeface="Courier New" panose="02070309020205020404" pitchFamily="49" charset="0"/>
+              </a:rPr>
+              <a:t>Terminal in IDE can use </a:t>
+            </a:r>
+            <a:r>
+              <a:rPr lang="en-GB" sz="2200">
+                <a:latin typeface="+mj-lt"/>
+                <a:cs typeface="Courier New" panose="02070309020205020404" pitchFamily="49" charset="0"/>
+              </a:rPr>
+              <a:t>these programs</a:t>
+            </a:r>
+            <a:endParaRPr lang="en-GB" sz="2200" dirty="0">
+              <a:latin typeface="+mj-lt"/>
+              <a:cs typeface="Courier New" panose="02070309020205020404" pitchFamily="49" charset="0"/>
+            </a:endParaRPr>
+          </a:p>
+        </p:txBody>
+      </p:sp>
+    </p:spTree>
+    <p:extLst>
+      <p:ext uri="{BB962C8B-B14F-4D97-AF65-F5344CB8AC3E}">
+        <p14:creationId xmlns:p14="http://schemas.microsoft.com/office/powerpoint/2010/main" val="4021047026"/>
+      </p:ext>
+    </p:extLst>
+  </p:cSld>
+  <p:clrMapOvr>
+    <a:masterClrMapping/>
+  </p:clrMapOvr>
+  <mc:AlternateContent xmlns:mc="http://schemas.openxmlformats.org/markup-compatibility/2006">
+    <mc:Choice xmlns:p14="http://schemas.microsoft.com/office/powerpoint/2010/main" Requires="p14">
+      <p:transition p14:dur="10"/>
+    </mc:Choice>
+    <mc:Fallback>
+      <p:transition/>
+    </mc:Fallback>
+  </mc:AlternateContent>
+</p:sld>
+</file>
+
+<file path=ppt/slides/slide22.xml><?xml version="1.0" encoding="utf-8"?>
+<p:sld xmlns:a="http://schemas.openxmlformats.org/drawingml/2006/main" xmlns:r="http://schemas.openxmlformats.org/officeDocument/2006/relationships" xmlns:p="http://schemas.openxmlformats.org/presentationml/2006/main">
+  <p:cSld>
+    <p:spTree>
+      <p:nvGrpSpPr>
+        <p:cNvPr id="1" name=""/>
+        <p:cNvGrpSpPr/>
+        <p:nvPr/>
+      </p:nvGrpSpPr>
+      <p:grpSpPr>
+        <a:xfrm>
+          <a:off x="0" y="0"/>
+          <a:ext cx="0" cy="0"/>
+          <a:chOff x="0" y="0"/>
+          <a:chExt cx="0" cy="0"/>
+        </a:xfrm>
+      </p:grpSpPr>
+      <p:sp>
+        <p:nvSpPr>
+          <p:cNvPr id="2" name="Title 1"/>
+          <p:cNvSpPr>
+            <a:spLocks noGrp="1"/>
+          </p:cNvSpPr>
+          <p:nvPr>
+            <p:ph type="title"/>
+          </p:nvPr>
+        </p:nvSpPr>
+        <p:spPr/>
+        <p:txBody>
+          <a:bodyPr/>
+          <a:lstStyle/>
+          <a:p>
+            <a:r>
+              <a:rPr lang="en-GB" sz="4000" dirty="0"/>
               <a:t>Feedback</a:t>
             </a:r>
           </a:p>
@@ -8400,7 +8650,7 @@
 </p:sld>
 </file>
 
-<file path=ppt/slides/slide22.xml><?xml version="1.0" encoding="utf-8"?>
+<file path=ppt/slides/slide23.xml><?xml version="1.0" encoding="utf-8"?>
 <p:sld xmlns:a="http://schemas.openxmlformats.org/drawingml/2006/main" xmlns:r="http://schemas.openxmlformats.org/officeDocument/2006/relationships" xmlns:p="http://schemas.openxmlformats.org/presentationml/2006/main">
   <p:cSld>
     <p:spTree>

</xml_diff>

<commit_message>
Added comments to examples and exercise files
</commit_message>
<xml_diff>
--- a/Managing and Running Python Effectively.pptx
+++ b/Managing and Running Python Effectively.pptx
@@ -466,7 +466,7 @@
           <a:p>
             <a:fld id="{88EB714B-C3CC-4216-88C1-02913905B1CF}" type="datetimeFigureOut">
               <a:rPr lang="en-GB" smtClean="0"/>
-              <a:t>11/11/2021</a:t>
+              <a:t>12/11/2021</a:t>
             </a:fld>
             <a:endParaRPr lang="en-GB"/>
           </a:p>
@@ -4451,7 +4451,7 @@
           <a:p>
             <a:fld id="{EB0080F8-EA1C-491D-963C-2C881B2F918F}" type="datetimeFigureOut">
               <a:rPr lang="en-GB" smtClean="0"/>
-              <a:t>11/11/2021</a:t>
+              <a:t>12/11/2021</a:t>
             </a:fld>
             <a:endParaRPr lang="en-GB"/>
           </a:p>
@@ -4601,7 +4601,7 @@
           <a:p>
             <a:fld id="{EB0080F8-EA1C-491D-963C-2C881B2F918F}" type="datetimeFigureOut">
               <a:rPr lang="en-GB" smtClean="0"/>
-              <a:t>11/11/2021</a:t>
+              <a:t>12/11/2021</a:t>
             </a:fld>
             <a:endParaRPr lang="en-GB"/>
           </a:p>
@@ -6134,7 +6134,7 @@
           <a:p>
             <a:fld id="{EB0080F8-EA1C-491D-963C-2C881B2F918F}" type="datetimeFigureOut">
               <a:rPr lang="en-GB" smtClean="0"/>
-              <a:t>11/11/2021</a:t>
+              <a:t>12/11/2021</a:t>
             </a:fld>
             <a:endParaRPr lang="en-GB"/>
           </a:p>
@@ -10697,7 +10697,14 @@
                 <a:latin typeface="+mj-lt"/>
                 <a:cs typeface="Courier New" panose="02070309020205020404" pitchFamily="49" charset="0"/>
               </a:rPr>
-              <a:t>If this is the file directly run (such as from the command line) this will have the value __main__</a:t>
+              <a:t>If this is the file directly run (such as from the command line) this will have the value </a:t>
+            </a:r>
+            <a:r>
+              <a:rPr lang="en-GB" sz="2600" dirty="0">
+                <a:latin typeface="Courier New" panose="02070309020205020404" pitchFamily="49" charset="0"/>
+                <a:cs typeface="Courier New" panose="02070309020205020404" pitchFamily="49" charset="0"/>
+              </a:rPr>
+              <a:t>__main__</a:t>
             </a:r>
           </a:p>
           <a:p>
@@ -11382,6 +11389,27 @@
                 <a:cs typeface="Courier New" panose="02070309020205020404" pitchFamily="49" charset="0"/>
               </a:rPr>
               <a:t>invokes a module of the following name</a:t>
+            </a:r>
+          </a:p>
+          <a:p>
+            <a:pPr>
+              <a:lnSpc>
+                <a:spcPct val="107000"/>
+              </a:lnSpc>
+            </a:pPr>
+            <a:r>
+              <a:rPr lang="en-GB" sz="2600" dirty="0">
+                <a:latin typeface="+mj-lt"/>
+                <a:cs typeface="Courier New" panose="02070309020205020404" pitchFamily="49" charset="0"/>
+              </a:rPr>
+              <a:t>Can be used to check code and work and that </a:t>
+            </a:r>
+            <a:r>
+              <a:rPr lang="en-GB" sz="2600">
+                <a:latin typeface="+mj-lt"/>
+                <a:cs typeface="Courier New" panose="02070309020205020404" pitchFamily="49" charset="0"/>
+              </a:rPr>
+              <a:t>it continues to work</a:t>
             </a:r>
             <a:endParaRPr lang="en-GB" sz="2200" dirty="0">
               <a:latin typeface="Courier New" panose="02070309020205020404" pitchFamily="49" charset="0"/>

</xml_diff>

<commit_message>
Updated notes and sample exercise solution structure
</commit_message>
<xml_diff>
--- a/Managing and Running Python Effectively.pptx
+++ b/Managing and Running Python Effectively.pptx
@@ -967,8 +967,27 @@
           <a:bodyPr/>
           <a:lstStyle/>
           <a:p>
-            <a:pPr eaLnBrk="1" hangingPunct="1"/>
-            <a:endParaRPr lang="en-GB" altLang="en-US" dirty="0"/>
+            <a:pPr marL="0" marR="0" lvl="0" indent="0" algn="l" defTabSz="914400" rtl="0" eaLnBrk="1" fontAlgn="auto" latinLnBrk="0" hangingPunct="1">
+              <a:lnSpc>
+                <a:spcPct val="100000"/>
+              </a:lnSpc>
+              <a:spcBef>
+                <a:spcPts val="0"/>
+              </a:spcBef>
+              <a:spcAft>
+                <a:spcPts val="0"/>
+              </a:spcAft>
+              <a:buClrTx/>
+              <a:buSzTx/>
+              <a:buFontTx/>
+              <a:buNone/>
+              <a:tabLst/>
+              <a:defRPr/>
+            </a:pPr>
+            <a:r>
+              <a:rPr lang="en-GB" dirty="0"/>
+              <a:t>No additional notes.</a:t>
+            </a:r>
           </a:p>
         </p:txBody>
       </p:sp>
@@ -1029,9 +1048,37 @@
           <a:bodyPr/>
           <a:lstStyle/>
           <a:p>
+            <a:pPr marL="0" marR="0" lvl="0" indent="0" algn="l" defTabSz="914400" rtl="0" eaLnBrk="1" fontAlgn="auto" latinLnBrk="0" hangingPunct="1">
+              <a:lnSpc>
+                <a:spcPct val="100000"/>
+              </a:lnSpc>
+              <a:spcBef>
+                <a:spcPts val="0"/>
+              </a:spcBef>
+              <a:spcAft>
+                <a:spcPts val="0"/>
+              </a:spcAft>
+              <a:buClrTx/>
+              <a:buSzTx/>
+              <a:buFontTx/>
+              <a:buNone/>
+              <a:tabLst/>
+              <a:defRPr/>
+            </a:pPr>
+            <a:r>
+              <a:rPr lang="en-GB" dirty="0" err="1"/>
+              <a:t>Venv</a:t>
+            </a:r>
             <a:r>
               <a:rPr lang="en-GB" dirty="0"/>
-              <a:t>A package manager is a program used to install packages and libraries in the current Python environment which can then be used by any programs run using that environment. Packages managers are able to install packages registered in a package index. As you become a more advanced programmer, you may one day contribute to libraries stored in a package index.</a:t>
+              <a:t> is a Python modules which allows the creation of multiple “virtual environments” within a single Python installation. </a:t>
+            </a:r>
+            <a:r>
+              <a:rPr lang="en-GB" sz="1200" dirty="0">
+                <a:latin typeface="Courier New" panose="02070309020205020404" pitchFamily="49" charset="0"/>
+                <a:cs typeface="Courier New" panose="02070309020205020404" pitchFamily="49" charset="0"/>
+              </a:rPr>
+              <a:t>We can use these virtual environments in a similar way to environments managed by Anaconda. As such, you will normally choose to use one method or the other, not both.</a:t>
             </a:r>
           </a:p>
           <a:p>
@@ -1040,8 +1087,152 @@
           <a:p>
             <a:r>
               <a:rPr lang="en-GB" dirty="0"/>
-              <a:t>Generally, package managers are the easiest and most convenient way to manages packages</a:t>
-            </a:r>
+              <a:t>By writing “</a:t>
+            </a:r>
+            <a:r>
+              <a:rPr lang="en-GB" sz="1200" dirty="0">
+                <a:latin typeface="Courier New" panose="02070309020205020404" pitchFamily="49" charset="0"/>
+                <a:cs typeface="Courier New" panose="02070309020205020404" pitchFamily="49" charset="0"/>
+              </a:rPr>
+              <a:t>python3 -m </a:t>
+            </a:r>
+            <a:r>
+              <a:rPr lang="en-GB" sz="1200" dirty="0" err="1">
+                <a:latin typeface="Courier New" panose="02070309020205020404" pitchFamily="49" charset="0"/>
+                <a:cs typeface="Courier New" panose="02070309020205020404" pitchFamily="49" charset="0"/>
+              </a:rPr>
+              <a:t>venv</a:t>
+            </a:r>
+            <a:r>
+              <a:rPr lang="en-GB" sz="1200" dirty="0">
+                <a:latin typeface="Courier New" panose="02070309020205020404" pitchFamily="49" charset="0"/>
+                <a:cs typeface="Courier New" panose="02070309020205020404" pitchFamily="49" charset="0"/>
+              </a:rPr>
+              <a:t> .\Exercises\</a:t>
+            </a:r>
+            <a:r>
+              <a:rPr lang="en-GB" sz="1200" dirty="0" err="1">
+                <a:latin typeface="Courier New" panose="02070309020205020404" pitchFamily="49" charset="0"/>
+                <a:cs typeface="Courier New" panose="02070309020205020404" pitchFamily="49" charset="0"/>
+              </a:rPr>
+              <a:t>Example_environment</a:t>
+            </a:r>
+            <a:r>
+              <a:rPr lang="en-GB" sz="1200" dirty="0">
+                <a:latin typeface="Courier New" panose="02070309020205020404" pitchFamily="49" charset="0"/>
+                <a:cs typeface="Courier New" panose="02070309020205020404" pitchFamily="49" charset="0"/>
+              </a:rPr>
+              <a:t>\”  we will create an environment that is stored inside the specified directory. Note that the slashes will need to be other way around in Mac and Linux due to the different convention of how slashes operate in Mac and Linux. This new environment will use the same version of Python as the currently active Python version. </a:t>
+            </a:r>
+          </a:p>
+          <a:p>
+            <a:r>
+              <a:rPr lang="en-GB" sz="1200" dirty="0">
+                <a:latin typeface="Courier New" panose="02070309020205020404" pitchFamily="49" charset="0"/>
+                <a:cs typeface="Courier New" panose="02070309020205020404" pitchFamily="49" charset="0"/>
+              </a:rPr>
+              <a:t>To activate this new environment, different commands will be used dependent on whether you’re using Windows, or Apple or Linux. You should see the name of the directory in parentheses at the start of the command line, indicating that the environment is active. If we install modules they will be installed in this environment and if we run files it will use this environment. Regardless of operating system, typing “deactivate” will deactivate the virtual environment.</a:t>
+            </a:r>
+          </a:p>
+          <a:p>
+            <a:endParaRPr lang="en-GB" sz="1200" dirty="0">
+              <a:latin typeface="Courier New" panose="02070309020205020404" pitchFamily="49" charset="0"/>
+              <a:cs typeface="Courier New" panose="02070309020205020404" pitchFamily="49" charset="0"/>
+            </a:endParaRPr>
+          </a:p>
+          <a:p>
+            <a:r>
+              <a:rPr lang="en-GB" sz="1200" dirty="0">
+                <a:latin typeface="Courier New" panose="02070309020205020404" pitchFamily="49" charset="0"/>
+                <a:cs typeface="Courier New" panose="02070309020205020404" pitchFamily="49" charset="0"/>
+              </a:rPr>
+              <a:t>Demonstration: Open up VS Code and open a command prompt terminal (check it’s command prompt not </a:t>
+            </a:r>
+            <a:r>
+              <a:rPr lang="en-GB" sz="1200" dirty="0" err="1">
+                <a:latin typeface="Courier New" panose="02070309020205020404" pitchFamily="49" charset="0"/>
+                <a:cs typeface="Courier New" panose="02070309020205020404" pitchFamily="49" charset="0"/>
+              </a:rPr>
+              <a:t>Powershell</a:t>
+            </a:r>
+            <a:r>
+              <a:rPr lang="en-GB" sz="1200" dirty="0">
+                <a:latin typeface="Courier New" panose="02070309020205020404" pitchFamily="49" charset="0"/>
+                <a:cs typeface="Courier New" panose="02070309020205020404" pitchFamily="49" charset="0"/>
+              </a:rPr>
+              <a:t>). Change directory into main directory of the course materials. Use the command “python3 -m </a:t>
+            </a:r>
+            <a:r>
+              <a:rPr lang="en-GB" sz="1200" dirty="0" err="1">
+                <a:latin typeface="Courier New" panose="02070309020205020404" pitchFamily="49" charset="0"/>
+                <a:cs typeface="Courier New" panose="02070309020205020404" pitchFamily="49" charset="0"/>
+              </a:rPr>
+              <a:t>venv</a:t>
+            </a:r>
+            <a:r>
+              <a:rPr lang="en-GB" sz="1200" dirty="0">
+                <a:latin typeface="Courier New" panose="02070309020205020404" pitchFamily="49" charset="0"/>
+                <a:cs typeface="Courier New" panose="02070309020205020404" pitchFamily="49" charset="0"/>
+              </a:rPr>
+              <a:t> .\Exercises\</a:t>
+            </a:r>
+            <a:r>
+              <a:rPr lang="en-GB" sz="1200" dirty="0" err="1">
+                <a:latin typeface="Courier New" panose="02070309020205020404" pitchFamily="49" charset="0"/>
+                <a:cs typeface="Courier New" panose="02070309020205020404" pitchFamily="49" charset="0"/>
+              </a:rPr>
+              <a:t>Example_environment</a:t>
+            </a:r>
+            <a:r>
+              <a:rPr lang="en-GB" sz="1200" dirty="0">
+                <a:latin typeface="Courier New" panose="02070309020205020404" pitchFamily="49" charset="0"/>
+                <a:cs typeface="Courier New" panose="02070309020205020404" pitchFamily="49" charset="0"/>
+              </a:rPr>
+              <a:t>\ “ to create a new environment. Use the command “</a:t>
+            </a:r>
+            <a:r>
+              <a:rPr lang="fr-FR" dirty="0">
+                <a:latin typeface="Courier New" panose="02070309020205020404" pitchFamily="49" charset="0"/>
+                <a:cs typeface="Courier New" panose="02070309020205020404" pitchFamily="49" charset="0"/>
+              </a:rPr>
+              <a:t>.\</a:t>
+            </a:r>
+            <a:r>
+              <a:rPr lang="fr-FR" dirty="0" err="1">
+                <a:latin typeface="Courier New" panose="02070309020205020404" pitchFamily="49" charset="0"/>
+                <a:cs typeface="Courier New" panose="02070309020205020404" pitchFamily="49" charset="0"/>
+              </a:rPr>
+              <a:t>Exercises</a:t>
+            </a:r>
+            <a:r>
+              <a:rPr lang="fr-FR" dirty="0">
+                <a:latin typeface="Courier New" panose="02070309020205020404" pitchFamily="49" charset="0"/>
+                <a:cs typeface="Courier New" panose="02070309020205020404" pitchFamily="49" charset="0"/>
+              </a:rPr>
+              <a:t>\</a:t>
+            </a:r>
+            <a:r>
+              <a:rPr lang="fr-FR" dirty="0" err="1">
+                <a:latin typeface="Courier New" panose="02070309020205020404" pitchFamily="49" charset="0"/>
+                <a:cs typeface="Courier New" panose="02070309020205020404" pitchFamily="49" charset="0"/>
+              </a:rPr>
+              <a:t>Example_environment</a:t>
+            </a:r>
+            <a:r>
+              <a:rPr lang="fr-FR" dirty="0">
+                <a:latin typeface="Courier New" panose="02070309020205020404" pitchFamily="49" charset="0"/>
+                <a:cs typeface="Courier New" panose="02070309020205020404" pitchFamily="49" charset="0"/>
+              </a:rPr>
+              <a:t>\Scripts\activate.bat</a:t>
+            </a:r>
+            <a:r>
+              <a:rPr lang="en-GB" dirty="0">
+                <a:latin typeface="Courier New" panose="02070309020205020404" pitchFamily="49" charset="0"/>
+                <a:cs typeface="Courier New" panose="02070309020205020404" pitchFamily="49" charset="0"/>
+              </a:rPr>
+              <a:t>” to activate it. Note the name of the directory in parentheses. Use the command “deactivate” to deactivate it.</a:t>
+            </a:r>
+            <a:endParaRPr lang="en-GB" dirty="0"/>
           </a:p>
         </p:txBody>
       </p:sp>
@@ -1062,7 +1253,7 @@
           <a:p>
             <a:fld id="{6A641EC8-C9F8-4A58-A1A7-F7D817526EEC}" type="slidenum">
               <a:rPr lang="en-GB" smtClean="0"/>
-              <a:t>13</a:t>
+              <a:t>10</a:t>
             </a:fld>
             <a:endParaRPr lang="en-GB"/>
           </a:p>
@@ -1071,7 +1262,7 @@
     </p:spTree>
     <p:extLst>
       <p:ext uri="{BB962C8B-B14F-4D97-AF65-F5344CB8AC3E}">
-        <p14:creationId xmlns:p14="http://schemas.microsoft.com/office/powerpoint/2010/main" val="128422079"/>
+        <p14:creationId xmlns:p14="http://schemas.microsoft.com/office/powerpoint/2010/main" val="939960531"/>
       </p:ext>
     </p:extLst>
   </p:cSld>
@@ -1125,69 +1316,7 @@
           <a:bodyPr/>
           <a:lstStyle/>
           <a:p>
-            <a:r>
-              <a:rPr lang="en-GB" dirty="0"/>
-              <a:t>Pip is a package manager available in stand-alone Python installations and Anaconda that accesses modules stored in the </a:t>
-            </a:r>
-            <a:r>
-              <a:rPr lang="en-GB" dirty="0" err="1"/>
-              <a:t>PyPI</a:t>
-            </a:r>
-            <a:r>
-              <a:rPr lang="en-GB" dirty="0"/>
-              <a:t> package index. It is one of the most common and popular package managers.</a:t>
-            </a:r>
-          </a:p>
-          <a:p>
             <a:endParaRPr lang="en-GB" dirty="0"/>
-          </a:p>
-          <a:p>
-            <a:r>
-              <a:rPr lang="en-GB" dirty="0"/>
-              <a:t>Typing “pip3” into a terminal will display a list of available commands. Note that typing “pip” may also activate a version of Pip designed to work with Python 2. This may still work with Python 3, but you are largely better of using “pip3”.</a:t>
-            </a:r>
-          </a:p>
-          <a:p>
-            <a:endParaRPr lang="en-GB" dirty="0"/>
-          </a:p>
-          <a:p>
-            <a:r>
-              <a:rPr lang="en-GB" dirty="0"/>
-              <a:t>The most common command you will need is “pip3 install” followed by the name of the package. This will install the named packaged in the active Python environment. Typing “pip3 uninstall” followed by the name of an installed package will uninstall it.</a:t>
-            </a:r>
-          </a:p>
-          <a:p>
-            <a:endParaRPr lang="en-GB" dirty="0"/>
-          </a:p>
-          <a:p>
-            <a:r>
-              <a:rPr lang="en-GB" dirty="0"/>
-              <a:t>Demonstration: Activate an environment created in this session. Use the command “pip3 install </a:t>
-            </a:r>
-            <a:r>
-              <a:rPr lang="en-GB" dirty="0" err="1"/>
-              <a:t>numpy</a:t>
-            </a:r>
-            <a:r>
-              <a:rPr lang="en-GB" dirty="0"/>
-              <a:t>” to install </a:t>
-            </a:r>
-            <a:r>
-              <a:rPr lang="en-GB" dirty="0" err="1"/>
-              <a:t>numpy</a:t>
-            </a:r>
-            <a:r>
-              <a:rPr lang="en-GB" dirty="0"/>
-              <a:t>. Use the “pip3 uninstall </a:t>
-            </a:r>
-            <a:r>
-              <a:rPr lang="en-GB" dirty="0" err="1"/>
-              <a:t>numpy</a:t>
-            </a:r>
-            <a:r>
-              <a:rPr lang="en-GB" dirty="0"/>
-              <a:t>” command to uninstall it.</a:t>
-            </a:r>
           </a:p>
         </p:txBody>
       </p:sp>
@@ -1208,7 +1337,7 @@
           <a:p>
             <a:fld id="{6A641EC8-C9F8-4A58-A1A7-F7D817526EEC}" type="slidenum">
               <a:rPr lang="en-GB" smtClean="0"/>
-              <a:t>14</a:t>
+              <a:t>11</a:t>
             </a:fld>
             <a:endParaRPr lang="en-GB"/>
           </a:p>
@@ -1217,7 +1346,7 @@
     </p:spTree>
     <p:extLst>
       <p:ext uri="{BB962C8B-B14F-4D97-AF65-F5344CB8AC3E}">
-        <p14:creationId xmlns:p14="http://schemas.microsoft.com/office/powerpoint/2010/main" val="279107706"/>
+        <p14:creationId xmlns:p14="http://schemas.microsoft.com/office/powerpoint/2010/main" val="1781581534"/>
       </p:ext>
     </p:extLst>
   </p:cSld>
@@ -1272,132 +1401,52 @@
           <a:lstStyle/>
           <a:p>
             <a:r>
+              <a:rPr lang="en-GB" dirty="0"/>
+              <a:t>Before we move further, we’re going to take a little time to define some terms that we’ll be using.</a:t>
+            </a:r>
+          </a:p>
+          <a:p>
+            <a:endParaRPr lang="en-GB" dirty="0"/>
+          </a:p>
+          <a:p>
+            <a:r>
+              <a:rPr lang="en-GB" dirty="0"/>
+              <a:t>A Python script is a plain text file which typically has the extension “.</a:t>
+            </a:r>
+            <a:r>
               <a:rPr lang="en-GB" dirty="0" err="1"/>
-              <a:t>Conda</a:t>
+              <a:t>py</a:t>
             </a:r>
             <a:r>
               <a:rPr lang="en-GB" dirty="0"/>
-              <a:t> is a package manager bundled with Anaconda. It accesses packages stored in the Anaconda package index. Note that most popular packages will be available in all common package indexes.</a:t>
+              <a:t>”. This contains Python code and is designed to be able to be run directly. A “module” is also a “.</a:t>
+            </a:r>
+            <a:r>
+              <a:rPr lang="en-GB" dirty="0" err="1"/>
+              <a:t>py</a:t>
+            </a:r>
+            <a:r>
+              <a:rPr lang="en-GB" dirty="0"/>
+              <a:t>” file but it is not designed to be run directly, but instead may be accessed from other modules using the “import” statement. A script and a module are the same type of file, the distinction comes from their intended use rather than some technical difference.</a:t>
             </a:r>
           </a:p>
           <a:p>
             <a:endParaRPr lang="en-GB" dirty="0"/>
           </a:p>
           <a:p>
-            <a:pPr marL="0" marR="0" lvl="0" indent="0" algn="l" defTabSz="914400" rtl="0" eaLnBrk="1" fontAlgn="auto" latinLnBrk="0" hangingPunct="1">
-              <a:lnSpc>
-                <a:spcPct val="100000"/>
-              </a:lnSpc>
-              <a:spcBef>
-                <a:spcPts val="0"/>
-              </a:spcBef>
-              <a:spcAft>
-                <a:spcPts val="0"/>
-              </a:spcAft>
-              <a:buClrTx/>
-              <a:buSzTx/>
-              <a:buFontTx/>
-              <a:buNone/>
-              <a:tabLst/>
-              <a:defRPr/>
-            </a:pPr>
             <a:r>
               <a:rPr lang="en-GB" dirty="0"/>
-              <a:t>Typing “</a:t>
-            </a:r>
-            <a:r>
-              <a:rPr lang="en-GB" dirty="0" err="1"/>
-              <a:t>conda</a:t>
-            </a:r>
+              <a:t>A package is a collection of modules which typically has some kind of cohesive purpose.  This may be a collection of several files in a directory structure. Often a package will contain a file named “__init__.py”. This can contain code to be executed when the package is initialised but can also be empty. Its mere existence causes Python to treat the files in the package differently to normal modules. This prevents naming conflicts where directories within the module would otherwise hide modules loaded later in the initialisation process.</a:t>
+            </a:r>
+          </a:p>
+          <a:p>
+            <a:endParaRPr lang="en-GB" dirty="0"/>
+          </a:p>
+          <a:p>
             <a:r>
               <a:rPr lang="en-GB" dirty="0"/>
-              <a:t>” in an Anaconda terminal will display a list of available commands. The most common command you will need is “</a:t>
-            </a:r>
-            <a:r>
-              <a:rPr lang="en-GB" dirty="0" err="1"/>
-              <a:t>conda</a:t>
-            </a:r>
-            <a:r>
-              <a:rPr lang="en-GB" dirty="0"/>
-              <a:t> install” followed by the name of the package. This will install the named packaged in the active Python environment. Typing “</a:t>
-            </a:r>
-            <a:r>
-              <a:rPr lang="en-GB" dirty="0" err="1"/>
-              <a:t>conda</a:t>
-            </a:r>
-            <a:r>
-              <a:rPr lang="en-GB" dirty="0"/>
-              <a:t> uninstall” followed by the name of an installed package will uninstall it.</a:t>
-            </a:r>
-          </a:p>
-          <a:p>
-            <a:endParaRPr lang="en-GB" dirty="0"/>
-          </a:p>
-          <a:p>
-            <a:pPr marL="0" marR="0" lvl="0" indent="0" algn="l" defTabSz="914400" rtl="0" eaLnBrk="1" fontAlgn="auto" latinLnBrk="0" hangingPunct="1">
-              <a:lnSpc>
-                <a:spcPct val="100000"/>
-              </a:lnSpc>
-              <a:spcBef>
-                <a:spcPts val="0"/>
-              </a:spcBef>
-              <a:spcAft>
-                <a:spcPts val="0"/>
-              </a:spcAft>
-              <a:buClrTx/>
-              <a:buSzTx/>
-              <a:buFontTx/>
-              <a:buNone/>
-              <a:tabLst/>
-              <a:defRPr/>
-            </a:pPr>
-            <a:r>
-              <a:rPr lang="en-GB" dirty="0"/>
-              <a:t>Demonstration: Activate an environment created in this session. Use the command “</a:t>
-            </a:r>
-            <a:r>
-              <a:rPr lang="en-GB" dirty="0" err="1"/>
-              <a:t>conda</a:t>
-            </a:r>
-            <a:r>
-              <a:rPr lang="en-GB" dirty="0"/>
-              <a:t> install </a:t>
-            </a:r>
-            <a:r>
-              <a:rPr lang="en-GB" dirty="0" err="1"/>
-              <a:t>numpy</a:t>
-            </a:r>
-            <a:r>
-              <a:rPr lang="en-GB" dirty="0"/>
-              <a:t>” to install </a:t>
-            </a:r>
-            <a:r>
-              <a:rPr lang="en-GB" dirty="0" err="1"/>
-              <a:t>numpy</a:t>
-            </a:r>
-            <a:r>
-              <a:rPr lang="en-GB" dirty="0"/>
-              <a:t>. Use the “</a:t>
-            </a:r>
-            <a:r>
-              <a:rPr lang="en-GB" dirty="0" err="1"/>
-              <a:t>conda</a:t>
-            </a:r>
-            <a:r>
-              <a:rPr lang="en-GB" dirty="0"/>
-              <a:t> uninstall </a:t>
-            </a:r>
-            <a:r>
-              <a:rPr lang="en-GB" dirty="0" err="1"/>
-              <a:t>numpy</a:t>
-            </a:r>
-            <a:r>
-              <a:rPr lang="en-GB" dirty="0"/>
-              <a:t>” command to uninstall it.</a:t>
-            </a:r>
-          </a:p>
-          <a:p>
-            <a:endParaRPr lang="en-GB" dirty="0"/>
+              <a:t>A library is a (sometimes large) collection of modules, such as matplotlib. The Python standard library is a collection of modules, such as the “math” module, which is included in a Python installation.</a:t>
+            </a:r>
           </a:p>
         </p:txBody>
       </p:sp>
@@ -1418,7 +1467,7 @@
           <a:p>
             <a:fld id="{6A641EC8-C9F8-4A58-A1A7-F7D817526EEC}" type="slidenum">
               <a:rPr lang="en-GB" smtClean="0"/>
-              <a:t>15</a:t>
+              <a:t>12</a:t>
             </a:fld>
             <a:endParaRPr lang="en-GB"/>
           </a:p>
@@ -1427,7 +1476,7 @@
     </p:spTree>
     <p:extLst>
       <p:ext uri="{BB962C8B-B14F-4D97-AF65-F5344CB8AC3E}">
-        <p14:creationId xmlns:p14="http://schemas.microsoft.com/office/powerpoint/2010/main" val="2270243636"/>
+        <p14:creationId xmlns:p14="http://schemas.microsoft.com/office/powerpoint/2010/main" val="771415652"/>
       </p:ext>
     </p:extLst>
   </p:cSld>
@@ -1483,7 +1532,7 @@
           <a:p>
             <a:r>
               <a:rPr lang="en-GB" dirty="0"/>
-              <a:t>A requirements file contains a list of required modules, referred to as dependencies for the current project by collecting the names and versions of all packages installed in the current environment. This can allow you to easily tell someone who will be working on or using your project how to set up an appropriate Python environment.</a:t>
+              <a:t>A package manager is a program used to install packages and libraries in the current Python environment which can then be used by any programs run using that environment. Packages managers are able to install packages registered in a package index. As you become a more advanced programmer, you may one day contribute to libraries stored in a package index.</a:t>
             </a:r>
           </a:p>
           <a:p>
@@ -1492,93 +1541,7 @@
           <a:p>
             <a:r>
               <a:rPr lang="en-GB" dirty="0"/>
-              <a:t>In pip, a requirements file can be generated by writing “pip3 freeze &gt;” and then the path to the requirements file you want to create. In </a:t>
-            </a:r>
-            <a:r>
-              <a:rPr lang="en-GB" dirty="0" err="1"/>
-              <a:t>conda</a:t>
-            </a:r>
-            <a:r>
-              <a:rPr lang="en-GB" dirty="0"/>
-              <a:t>, use the command “</a:t>
-            </a:r>
-            <a:r>
-              <a:rPr lang="en-GB" dirty="0" err="1"/>
-              <a:t>conda</a:t>
-            </a:r>
-            <a:r>
-              <a:rPr lang="en-GB" dirty="0"/>
-              <a:t> list –e &gt;” and then the path to the requirements file you want to create. Note that Pip and Anaconda use different file formats for their requirements files, so you cannot simply create a requirements file in Pip to use in Anaconda or vice versa. Also note that this list will likely contain the names of packages you haven’t installed yourself, because they were installed automatically when the environment was created.</a:t>
-            </a:r>
-          </a:p>
-          <a:p>
-            <a:endParaRPr lang="en-GB" dirty="0"/>
-          </a:p>
-          <a:p>
-            <a:r>
-              <a:rPr lang="en-GB" dirty="0"/>
-              <a:t>You can also manually create a requirements file, so long as you follow the syntax rules and know valid version numbers for each package.</a:t>
-            </a:r>
-          </a:p>
-          <a:p>
-            <a:endParaRPr lang="en-GB" dirty="0"/>
-          </a:p>
-          <a:p>
-            <a:pPr marL="0" marR="0" lvl="0" indent="0" algn="l" defTabSz="914400" rtl="0" eaLnBrk="1" fontAlgn="auto" latinLnBrk="0" hangingPunct="1">
-              <a:lnSpc>
-                <a:spcPct val="100000"/>
-              </a:lnSpc>
-              <a:spcBef>
-                <a:spcPts val="0"/>
-              </a:spcBef>
-              <a:spcAft>
-                <a:spcPts val="0"/>
-              </a:spcAft>
-              <a:buClrTx/>
-              <a:buSzTx/>
-              <a:buFontTx/>
-              <a:buNone/>
-              <a:tabLst/>
-              <a:defRPr/>
-            </a:pPr>
-            <a:r>
-              <a:rPr lang="en-GB" dirty="0"/>
-              <a:t>Demonstration: Use the command “</a:t>
-            </a:r>
-            <a:r>
-              <a:rPr lang="en-GB" sz="1200" dirty="0">
-                <a:latin typeface="Courier New" panose="02070309020205020404" pitchFamily="49" charset="0"/>
-                <a:cs typeface="Courier New" panose="02070309020205020404" pitchFamily="49" charset="0"/>
-              </a:rPr>
-              <a:t>pip3 freeze &gt; requirements_pip.txt” to create a pip requirements file using pip and open it. Use the command “</a:t>
-            </a:r>
-            <a:r>
-              <a:rPr lang="en-GB" sz="1200" dirty="0" err="1">
-                <a:latin typeface="Courier New" panose="02070309020205020404" pitchFamily="49" charset="0"/>
-                <a:cs typeface="Courier New" panose="02070309020205020404" pitchFamily="49" charset="0"/>
-              </a:rPr>
-              <a:t>conda</a:t>
-            </a:r>
-            <a:r>
-              <a:rPr lang="en-GB" sz="1200" dirty="0">
-                <a:latin typeface="Courier New" panose="02070309020205020404" pitchFamily="49" charset="0"/>
-                <a:cs typeface="Courier New" panose="02070309020205020404" pitchFamily="49" charset="0"/>
-              </a:rPr>
-              <a:t> list -e &gt; requirements_conda.txt” to create a </a:t>
-            </a:r>
-            <a:r>
-              <a:rPr lang="en-GB" sz="1200" dirty="0" err="1">
-                <a:latin typeface="Courier New" panose="02070309020205020404" pitchFamily="49" charset="0"/>
-                <a:cs typeface="Courier New" panose="02070309020205020404" pitchFamily="49" charset="0"/>
-              </a:rPr>
-              <a:t>conda</a:t>
-            </a:r>
-            <a:r>
-              <a:rPr lang="en-GB" sz="1200" dirty="0">
-                <a:latin typeface="Courier New" panose="02070309020205020404" pitchFamily="49" charset="0"/>
-                <a:cs typeface="Courier New" panose="02070309020205020404" pitchFamily="49" charset="0"/>
-              </a:rPr>
-              <a:t> requirements file and open it. Then delete it.</a:t>
+              <a:t>Generally, package managers are the easiest and most convenient way to manages packages</a:t>
             </a:r>
           </a:p>
         </p:txBody>
@@ -1600,7 +1563,7 @@
           <a:p>
             <a:fld id="{6A641EC8-C9F8-4A58-A1A7-F7D817526EEC}" type="slidenum">
               <a:rPr lang="en-GB" smtClean="0"/>
-              <a:t>16</a:t>
+              <a:t>13</a:t>
             </a:fld>
             <a:endParaRPr lang="en-GB"/>
           </a:p>
@@ -1609,7 +1572,7 @@
     </p:spTree>
     <p:extLst>
       <p:ext uri="{BB962C8B-B14F-4D97-AF65-F5344CB8AC3E}">
-        <p14:creationId xmlns:p14="http://schemas.microsoft.com/office/powerpoint/2010/main" val="342142430"/>
+        <p14:creationId xmlns:p14="http://schemas.microsoft.com/office/powerpoint/2010/main" val="128422079"/>
       </p:ext>
     </p:extLst>
   </p:cSld>
@@ -1665,123 +1628,67 @@
           <a:p>
             <a:r>
               <a:rPr lang="en-GB" dirty="0"/>
-              <a:t>In Anaconda, you create a new environment managed by Anaconda with the command “</a:t>
-            </a:r>
-            <a:r>
-              <a:rPr lang="en-GB" sz="1200" dirty="0" err="1">
-                <a:latin typeface="Courier New" panose="02070309020205020404" pitchFamily="49" charset="0"/>
-                <a:cs typeface="Courier New" panose="02070309020205020404" pitchFamily="49" charset="0"/>
-              </a:rPr>
-              <a:t>conda</a:t>
-            </a:r>
-            <a:r>
-              <a:rPr lang="en-GB" sz="1200" dirty="0">
-                <a:latin typeface="Courier New" panose="02070309020205020404" pitchFamily="49" charset="0"/>
-                <a:cs typeface="Courier New" panose="02070309020205020404" pitchFamily="49" charset="0"/>
-              </a:rPr>
-              <a:t> create --name </a:t>
-            </a:r>
-            <a:r>
-              <a:rPr lang="en-GB" sz="1200" dirty="0" err="1">
-                <a:latin typeface="Courier New" panose="02070309020205020404" pitchFamily="49" charset="0"/>
-                <a:cs typeface="Courier New" panose="02070309020205020404" pitchFamily="49" charset="0"/>
-              </a:rPr>
-              <a:t>env_name</a:t>
-            </a:r>
-            <a:r>
-              <a:rPr lang="en-GB" sz="1200" dirty="0">
-                <a:latin typeface="Courier New" panose="02070309020205020404" pitchFamily="49" charset="0"/>
-                <a:cs typeface="Courier New" panose="02070309020205020404" pitchFamily="49" charset="0"/>
-              </a:rPr>
-              <a:t> –file” and then the path to the file you want to use. This will create a brand new environment with the specified packages installed.</a:t>
-            </a:r>
-          </a:p>
-          <a:p>
-            <a:endParaRPr lang="en-GB" sz="1200" dirty="0">
-              <a:latin typeface="Courier New" panose="02070309020205020404" pitchFamily="49" charset="0"/>
-              <a:cs typeface="Courier New" panose="02070309020205020404" pitchFamily="49" charset="0"/>
-            </a:endParaRPr>
-          </a:p>
-          <a:p>
-            <a:r>
-              <a:rPr lang="en-GB" sz="1200" dirty="0">
-                <a:latin typeface="Courier New" panose="02070309020205020404" pitchFamily="49" charset="0"/>
-                <a:cs typeface="Courier New" panose="02070309020205020404" pitchFamily="49" charset="0"/>
-              </a:rPr>
-              <a:t>In pip, you can use the command “pip3 install – r” followed by the path to the requirements file. This will install all the packages named in the requirements file into the currently active environment. This does not create a new environment like the </a:t>
-            </a:r>
-            <a:r>
-              <a:rPr lang="en-GB" sz="1200" dirty="0" err="1">
-                <a:latin typeface="Courier New" panose="02070309020205020404" pitchFamily="49" charset="0"/>
-                <a:cs typeface="Courier New" panose="02070309020205020404" pitchFamily="49" charset="0"/>
-              </a:rPr>
-              <a:t>conda</a:t>
-            </a:r>
-            <a:r>
-              <a:rPr lang="en-GB" sz="1200" dirty="0">
-                <a:latin typeface="Courier New" panose="02070309020205020404" pitchFamily="49" charset="0"/>
-                <a:cs typeface="Courier New" panose="02070309020205020404" pitchFamily="49" charset="0"/>
-              </a:rPr>
-              <a:t> command but instead adds to an existing environment.</a:t>
-            </a:r>
-          </a:p>
-          <a:p>
-            <a:endParaRPr lang="en-GB" sz="1200" dirty="0">
-              <a:latin typeface="Courier New" panose="02070309020205020404" pitchFamily="49" charset="0"/>
-              <a:cs typeface="Courier New" panose="02070309020205020404" pitchFamily="49" charset="0"/>
-            </a:endParaRPr>
-          </a:p>
-          <a:p>
-            <a:r>
-              <a:rPr lang="en-GB" sz="1200" dirty="0">
-                <a:latin typeface="Courier New" panose="02070309020205020404" pitchFamily="49" charset="0"/>
-                <a:cs typeface="Courier New" panose="02070309020205020404" pitchFamily="49" charset="0"/>
-              </a:rPr>
-              <a:t>Demonstration: Create a new </a:t>
-            </a:r>
-            <a:r>
-              <a:rPr lang="en-GB" sz="1200" dirty="0" err="1">
-                <a:latin typeface="Courier New" panose="02070309020205020404" pitchFamily="49" charset="0"/>
-                <a:cs typeface="Courier New" panose="02070309020205020404" pitchFamily="49" charset="0"/>
-              </a:rPr>
-              <a:t>conda</a:t>
-            </a:r>
-            <a:r>
-              <a:rPr lang="en-GB" sz="1200" dirty="0">
-                <a:latin typeface="Courier New" panose="02070309020205020404" pitchFamily="49" charset="0"/>
-                <a:cs typeface="Courier New" panose="02070309020205020404" pitchFamily="49" charset="0"/>
-              </a:rPr>
-              <a:t> environment using the requirements file generated in the previous example using the command “</a:t>
-            </a:r>
-            <a:r>
-              <a:rPr lang="en-GB" sz="1200" dirty="0" err="1">
-                <a:latin typeface="Courier New" panose="02070309020205020404" pitchFamily="49" charset="0"/>
-                <a:cs typeface="Courier New" panose="02070309020205020404" pitchFamily="49" charset="0"/>
-              </a:rPr>
-              <a:t>conda</a:t>
-            </a:r>
-            <a:r>
-              <a:rPr lang="en-GB" sz="1200" dirty="0">
-                <a:latin typeface="Courier New" panose="02070309020205020404" pitchFamily="49" charset="0"/>
-                <a:cs typeface="Courier New" panose="02070309020205020404" pitchFamily="49" charset="0"/>
-              </a:rPr>
-              <a:t> create –name </a:t>
-            </a:r>
-            <a:r>
-              <a:rPr lang="en-GB" sz="1200" dirty="0" err="1">
-                <a:latin typeface="Courier New" panose="02070309020205020404" pitchFamily="49" charset="0"/>
-                <a:cs typeface="Courier New" panose="02070309020205020404" pitchFamily="49" charset="0"/>
-              </a:rPr>
-              <a:t>req</a:t>
-            </a:r>
-            <a:r>
-              <a:rPr lang="en-GB" sz="1200" dirty="0">
-                <a:latin typeface="Courier New" panose="02070309020205020404" pitchFamily="49" charset="0"/>
-                <a:cs typeface="Courier New" panose="02070309020205020404" pitchFamily="49" charset="0"/>
-              </a:rPr>
-              <a:t> –file requirements_conda.txt </a:t>
-            </a:r>
+              <a:t>Pip is a package manager available in stand-alone Python installations and Anaconda that accesses modules stored in the </a:t>
+            </a:r>
+            <a:r>
+              <a:rPr lang="en-GB" dirty="0" err="1"/>
+              <a:t>PyPI</a:t>
+            </a:r>
+            <a:r>
+              <a:rPr lang="en-GB" dirty="0"/>
+              <a:t> package index. It is one of the most common and popular package managers.</a:t>
+            </a:r>
+          </a:p>
+          <a:p>
             <a:endParaRPr lang="en-GB" dirty="0"/>
+          </a:p>
+          <a:p>
+            <a:r>
+              <a:rPr lang="en-GB" dirty="0"/>
+              <a:t>Typing “pip3” into a terminal will display a list of available commands. Note that typing “pip” may also activate a version of Pip designed to work with Python 2. This may still work with Python 3, but you are largely better of using “pip3”.</a:t>
+            </a:r>
+          </a:p>
+          <a:p>
+            <a:endParaRPr lang="en-GB" dirty="0"/>
+          </a:p>
+          <a:p>
+            <a:r>
+              <a:rPr lang="en-GB" dirty="0"/>
+              <a:t>The most common command you will need is “pip3 install” followed by the name of the package. This will install the named packaged in the active Python environment. Typing “pip3 uninstall” followed by the name of an installed package will uninstall it.</a:t>
+            </a:r>
+          </a:p>
+          <a:p>
+            <a:endParaRPr lang="en-GB" dirty="0"/>
+          </a:p>
+          <a:p>
+            <a:r>
+              <a:rPr lang="en-GB" dirty="0"/>
+              <a:t>Demonstration: Activate an environment created in this session. Use the command “pip3 install </a:t>
+            </a:r>
+            <a:r>
+              <a:rPr lang="en-GB" dirty="0" err="1"/>
+              <a:t>numpy</a:t>
+            </a:r>
+            <a:r>
+              <a:rPr lang="en-GB" dirty="0"/>
+              <a:t>” to install </a:t>
+            </a:r>
+            <a:r>
+              <a:rPr lang="en-GB" dirty="0" err="1"/>
+              <a:t>numpy</a:t>
+            </a:r>
+            <a:r>
+              <a:rPr lang="en-GB" dirty="0"/>
+              <a:t>. Use the “pip3 uninstall </a:t>
+            </a:r>
+            <a:r>
+              <a:rPr lang="en-GB" dirty="0" err="1"/>
+              <a:t>numpy</a:t>
+            </a:r>
+            <a:r>
+              <a:rPr lang="en-GB" dirty="0"/>
+              <a:t>” command to uninstall it.</a:t>
+            </a:r>
           </a:p>
         </p:txBody>
       </p:sp>
@@ -1802,7 +1709,7 @@
           <a:p>
             <a:fld id="{6A641EC8-C9F8-4A58-A1A7-F7D817526EEC}" type="slidenum">
               <a:rPr lang="en-GB" smtClean="0"/>
-              <a:t>17</a:t>
+              <a:t>14</a:t>
             </a:fld>
             <a:endParaRPr lang="en-GB"/>
           </a:p>
@@ -1811,7 +1718,7 @@
     </p:spTree>
     <p:extLst>
       <p:ext uri="{BB962C8B-B14F-4D97-AF65-F5344CB8AC3E}">
-        <p14:creationId xmlns:p14="http://schemas.microsoft.com/office/powerpoint/2010/main" val="595670898"/>
+        <p14:creationId xmlns:p14="http://schemas.microsoft.com/office/powerpoint/2010/main" val="279107706"/>
       </p:ext>
     </p:extLst>
   </p:cSld>
@@ -1865,6 +1772,132 @@
           <a:bodyPr/>
           <a:lstStyle/>
           <a:p>
+            <a:r>
+              <a:rPr lang="en-GB" dirty="0" err="1"/>
+              <a:t>Conda</a:t>
+            </a:r>
+            <a:r>
+              <a:rPr lang="en-GB" dirty="0"/>
+              <a:t> is a package manager bundled with Anaconda. It accesses packages stored in the Anaconda package index. Note that most popular packages will be available in all common package indexes.</a:t>
+            </a:r>
+          </a:p>
+          <a:p>
+            <a:endParaRPr lang="en-GB" dirty="0"/>
+          </a:p>
+          <a:p>
+            <a:pPr marL="0" marR="0" lvl="0" indent="0" algn="l" defTabSz="914400" rtl="0" eaLnBrk="1" fontAlgn="auto" latinLnBrk="0" hangingPunct="1">
+              <a:lnSpc>
+                <a:spcPct val="100000"/>
+              </a:lnSpc>
+              <a:spcBef>
+                <a:spcPts val="0"/>
+              </a:spcBef>
+              <a:spcAft>
+                <a:spcPts val="0"/>
+              </a:spcAft>
+              <a:buClrTx/>
+              <a:buSzTx/>
+              <a:buFontTx/>
+              <a:buNone/>
+              <a:tabLst/>
+              <a:defRPr/>
+            </a:pPr>
+            <a:r>
+              <a:rPr lang="en-GB" dirty="0"/>
+              <a:t>Typing “</a:t>
+            </a:r>
+            <a:r>
+              <a:rPr lang="en-GB" dirty="0" err="1"/>
+              <a:t>conda</a:t>
+            </a:r>
+            <a:r>
+              <a:rPr lang="en-GB" dirty="0"/>
+              <a:t>” in an Anaconda terminal will display a list of available commands. The most common command you will need is “</a:t>
+            </a:r>
+            <a:r>
+              <a:rPr lang="en-GB" dirty="0" err="1"/>
+              <a:t>conda</a:t>
+            </a:r>
+            <a:r>
+              <a:rPr lang="en-GB" dirty="0"/>
+              <a:t> install” followed by the name of the package. This will install the named packaged in the active Python environment. Typing “</a:t>
+            </a:r>
+            <a:r>
+              <a:rPr lang="en-GB" dirty="0" err="1"/>
+              <a:t>conda</a:t>
+            </a:r>
+            <a:r>
+              <a:rPr lang="en-GB" dirty="0"/>
+              <a:t> uninstall” followed by the name of an installed package will uninstall it.</a:t>
+            </a:r>
+          </a:p>
+          <a:p>
+            <a:endParaRPr lang="en-GB" dirty="0"/>
+          </a:p>
+          <a:p>
+            <a:pPr marL="0" marR="0" lvl="0" indent="0" algn="l" defTabSz="914400" rtl="0" eaLnBrk="1" fontAlgn="auto" latinLnBrk="0" hangingPunct="1">
+              <a:lnSpc>
+                <a:spcPct val="100000"/>
+              </a:lnSpc>
+              <a:spcBef>
+                <a:spcPts val="0"/>
+              </a:spcBef>
+              <a:spcAft>
+                <a:spcPts val="0"/>
+              </a:spcAft>
+              <a:buClrTx/>
+              <a:buSzTx/>
+              <a:buFontTx/>
+              <a:buNone/>
+              <a:tabLst/>
+              <a:defRPr/>
+            </a:pPr>
+            <a:r>
+              <a:rPr lang="en-GB" dirty="0"/>
+              <a:t>Demonstration: Activate an environment created in this session. Use the command “</a:t>
+            </a:r>
+            <a:r>
+              <a:rPr lang="en-GB" dirty="0" err="1"/>
+              <a:t>conda</a:t>
+            </a:r>
+            <a:r>
+              <a:rPr lang="en-GB" dirty="0"/>
+              <a:t> install </a:t>
+            </a:r>
+            <a:r>
+              <a:rPr lang="en-GB" dirty="0" err="1"/>
+              <a:t>numpy</a:t>
+            </a:r>
+            <a:r>
+              <a:rPr lang="en-GB" dirty="0"/>
+              <a:t>” to install </a:t>
+            </a:r>
+            <a:r>
+              <a:rPr lang="en-GB" dirty="0" err="1"/>
+              <a:t>numpy</a:t>
+            </a:r>
+            <a:r>
+              <a:rPr lang="en-GB" dirty="0"/>
+              <a:t>. Use the “</a:t>
+            </a:r>
+            <a:r>
+              <a:rPr lang="en-GB" dirty="0" err="1"/>
+              <a:t>conda</a:t>
+            </a:r>
+            <a:r>
+              <a:rPr lang="en-GB" dirty="0"/>
+              <a:t> uninstall </a:t>
+            </a:r>
+            <a:r>
+              <a:rPr lang="en-GB" dirty="0" err="1"/>
+              <a:t>numpy</a:t>
+            </a:r>
+            <a:r>
+              <a:rPr lang="en-GB" dirty="0"/>
+              <a:t>” command to uninstall it.</a:t>
+            </a:r>
+          </a:p>
+          <a:p>
             <a:endParaRPr lang="en-GB" dirty="0"/>
           </a:p>
         </p:txBody>
@@ -1886,7 +1919,7 @@
           <a:p>
             <a:fld id="{6A641EC8-C9F8-4A58-A1A7-F7D817526EEC}" type="slidenum">
               <a:rPr lang="en-GB" smtClean="0"/>
-              <a:t>18</a:t>
+              <a:t>15</a:t>
             </a:fld>
             <a:endParaRPr lang="en-GB"/>
           </a:p>
@@ -1895,7 +1928,7 @@
     </p:spTree>
     <p:extLst>
       <p:ext uri="{BB962C8B-B14F-4D97-AF65-F5344CB8AC3E}">
-        <p14:creationId xmlns:p14="http://schemas.microsoft.com/office/powerpoint/2010/main" val="2312806874"/>
+        <p14:creationId xmlns:p14="http://schemas.microsoft.com/office/powerpoint/2010/main" val="2270243636"/>
       </p:ext>
     </p:extLst>
   </p:cSld>
@@ -1951,7 +1984,102 @@
           <a:p>
             <a:r>
               <a:rPr lang="en-GB" dirty="0"/>
-              <a:t>A Python “kernel” is n operating system process that runs Python code. It exists separately to the applications with a graphical user interface you use to write code. A single Python kernel may be active for a long time ad will sit idle when no code is running. When using a Python kernel, it may run on your computer, or hosted remotely on a server. Many applications can create a kernel.</a:t>
+              <a:t>A requirements file contains a list of required modules, referred to as dependencies for the current project by collecting the names and versions of all packages installed in the current environment. This can allow you to easily tell someone who will be working on or using your project how to set up an appropriate Python environment.</a:t>
+            </a:r>
+          </a:p>
+          <a:p>
+            <a:endParaRPr lang="en-GB" dirty="0"/>
+          </a:p>
+          <a:p>
+            <a:r>
+              <a:rPr lang="en-GB" dirty="0"/>
+              <a:t>In pip, a requirements file can be generated by writing “pip3 freeze &gt;” and then the path to the requirements file you want to create. In </a:t>
+            </a:r>
+            <a:r>
+              <a:rPr lang="en-GB" dirty="0" err="1"/>
+              <a:t>conda</a:t>
+            </a:r>
+            <a:r>
+              <a:rPr lang="en-GB" dirty="0"/>
+              <a:t>, use the command “</a:t>
+            </a:r>
+            <a:r>
+              <a:rPr lang="en-GB" dirty="0" err="1"/>
+              <a:t>conda</a:t>
+            </a:r>
+            <a:r>
+              <a:rPr lang="en-GB" dirty="0"/>
+              <a:t> list –e &gt;” and then the path to the requirements file you want to create. Note that Pip and Anaconda use different file formats for their requirements files, so you cannot simply create a requirements file in Pip to use in Anaconda or vice versa. Also note that this list will likely contain the names of packages you haven’t installed yourself, because they were installed automatically when the environment was created.</a:t>
+            </a:r>
+          </a:p>
+          <a:p>
+            <a:endParaRPr lang="en-GB" dirty="0"/>
+          </a:p>
+          <a:p>
+            <a:r>
+              <a:rPr lang="en-GB" dirty="0"/>
+              <a:t>You can also manually create a requirements file, so long as you follow the syntax rules and know valid version numbers for each package.</a:t>
+            </a:r>
+          </a:p>
+          <a:p>
+            <a:endParaRPr lang="en-GB" dirty="0"/>
+          </a:p>
+          <a:p>
+            <a:pPr marL="0" marR="0" lvl="0" indent="0" algn="l" defTabSz="914400" rtl="0" eaLnBrk="1" fontAlgn="auto" latinLnBrk="0" hangingPunct="1">
+              <a:lnSpc>
+                <a:spcPct val="100000"/>
+              </a:lnSpc>
+              <a:spcBef>
+                <a:spcPts val="0"/>
+              </a:spcBef>
+              <a:spcAft>
+                <a:spcPts val="0"/>
+              </a:spcAft>
+              <a:buClrTx/>
+              <a:buSzTx/>
+              <a:buFontTx/>
+              <a:buNone/>
+              <a:tabLst/>
+              <a:defRPr/>
+            </a:pPr>
+            <a:r>
+              <a:rPr lang="en-GB" dirty="0"/>
+              <a:t>Demonstration: Use the command “</a:t>
+            </a:r>
+            <a:r>
+              <a:rPr lang="en-GB" sz="1200" dirty="0">
+                <a:latin typeface="Courier New" panose="02070309020205020404" pitchFamily="49" charset="0"/>
+                <a:cs typeface="Courier New" panose="02070309020205020404" pitchFamily="49" charset="0"/>
+              </a:rPr>
+              <a:t>pip3 freeze &gt; requirements_pip.txt” to create a pip requirements file using pip and open it. Use the command “</a:t>
+            </a:r>
+            <a:r>
+              <a:rPr lang="en-GB" sz="1200" dirty="0" err="1">
+                <a:latin typeface="Courier New" panose="02070309020205020404" pitchFamily="49" charset="0"/>
+                <a:cs typeface="Courier New" panose="02070309020205020404" pitchFamily="49" charset="0"/>
+              </a:rPr>
+              <a:t>conda</a:t>
+            </a:r>
+            <a:r>
+              <a:rPr lang="en-GB" sz="1200" dirty="0">
+                <a:latin typeface="Courier New" panose="02070309020205020404" pitchFamily="49" charset="0"/>
+                <a:cs typeface="Courier New" panose="02070309020205020404" pitchFamily="49" charset="0"/>
+              </a:rPr>
+              <a:t> list -e &gt; requirements_conda.txt” to create a </a:t>
+            </a:r>
+            <a:r>
+              <a:rPr lang="en-GB" sz="1200" dirty="0" err="1">
+                <a:latin typeface="Courier New" panose="02070309020205020404" pitchFamily="49" charset="0"/>
+                <a:cs typeface="Courier New" panose="02070309020205020404" pitchFamily="49" charset="0"/>
+              </a:rPr>
+              <a:t>conda</a:t>
+            </a:r>
+            <a:r>
+              <a:rPr lang="en-GB" sz="1200" dirty="0">
+                <a:latin typeface="Courier New" panose="02070309020205020404" pitchFamily="49" charset="0"/>
+                <a:cs typeface="Courier New" panose="02070309020205020404" pitchFamily="49" charset="0"/>
+              </a:rPr>
+              <a:t> requirements file and open it. Then delete it.</a:t>
             </a:r>
           </a:p>
         </p:txBody>
@@ -1973,7 +2101,7 @@
           <a:p>
             <a:fld id="{6A641EC8-C9F8-4A58-A1A7-F7D817526EEC}" type="slidenum">
               <a:rPr lang="en-GB" smtClean="0"/>
-              <a:t>19</a:t>
+              <a:t>16</a:t>
             </a:fld>
             <a:endParaRPr lang="en-GB"/>
           </a:p>
@@ -1982,7 +2110,7 @@
     </p:spTree>
     <p:extLst>
       <p:ext uri="{BB962C8B-B14F-4D97-AF65-F5344CB8AC3E}">
-        <p14:creationId xmlns:p14="http://schemas.microsoft.com/office/powerpoint/2010/main" val="3040209493"/>
+        <p14:creationId xmlns:p14="http://schemas.microsoft.com/office/powerpoint/2010/main" val="342142430"/>
       </p:ext>
     </p:extLst>
   </p:cSld>
@@ -2038,41 +2166,123 @@
           <a:p>
             <a:r>
               <a:rPr lang="en-GB" dirty="0"/>
-              <a:t>It’s possible to open a Python kernel on the command line (such as the terminal in Linux or Mac, or the </a:t>
-            </a:r>
-            <a:r>
-              <a:rPr lang="en-GB" dirty="0" err="1"/>
-              <a:t>powerhsell</a:t>
-            </a:r>
-            <a:r>
-              <a:rPr lang="en-GB" dirty="0"/>
-              <a:t> or command prompt in Windows, or MCD.exe from within Anaconda) by typing “python”. Following this, further commands will be interpreted as individual Python commands. It’s possible to include indented blocks, such as “for” or “if” statements, using spaces to mark the level of indent. The indented blocks can e ended when a blank line is entered. However, this interface is cumbersome and difficult to use, and the code entered will not be saved to be re-used. Thus, this is only really useful for testing very short pieces of code – perhaps checking a module is installed and can be imported.</a:t>
-            </a:r>
-          </a:p>
-          <a:p>
+              <a:t>In Anaconda, you create a new environment managed by Anaconda with the command “</a:t>
+            </a:r>
+            <a:r>
+              <a:rPr lang="en-GB" sz="1200" dirty="0" err="1">
+                <a:latin typeface="Courier New" panose="02070309020205020404" pitchFamily="49" charset="0"/>
+                <a:cs typeface="Courier New" panose="02070309020205020404" pitchFamily="49" charset="0"/>
+              </a:rPr>
+              <a:t>conda</a:t>
+            </a:r>
+            <a:r>
+              <a:rPr lang="en-GB" sz="1200" dirty="0">
+                <a:latin typeface="Courier New" panose="02070309020205020404" pitchFamily="49" charset="0"/>
+                <a:cs typeface="Courier New" panose="02070309020205020404" pitchFamily="49" charset="0"/>
+              </a:rPr>
+              <a:t> create --name </a:t>
+            </a:r>
+            <a:r>
+              <a:rPr lang="en-GB" sz="1200" dirty="0" err="1">
+                <a:latin typeface="Courier New" panose="02070309020205020404" pitchFamily="49" charset="0"/>
+                <a:cs typeface="Courier New" panose="02070309020205020404" pitchFamily="49" charset="0"/>
+              </a:rPr>
+              <a:t>env_name</a:t>
+            </a:r>
+            <a:r>
+              <a:rPr lang="en-GB" sz="1200" dirty="0">
+                <a:latin typeface="Courier New" panose="02070309020205020404" pitchFamily="49" charset="0"/>
+                <a:cs typeface="Courier New" panose="02070309020205020404" pitchFamily="49" charset="0"/>
+              </a:rPr>
+              <a:t> –file” and then the path to the file you want to use. This will create a brand new environment with the specified packages installed.</a:t>
+            </a:r>
+          </a:p>
+          <a:p>
+            <a:endParaRPr lang="en-GB" sz="1200" dirty="0">
+              <a:latin typeface="Courier New" panose="02070309020205020404" pitchFamily="49" charset="0"/>
+              <a:cs typeface="Courier New" panose="02070309020205020404" pitchFamily="49" charset="0"/>
+            </a:endParaRPr>
+          </a:p>
+          <a:p>
+            <a:r>
+              <a:rPr lang="en-GB" sz="1200" dirty="0">
+                <a:latin typeface="Courier New" panose="02070309020205020404" pitchFamily="49" charset="0"/>
+                <a:cs typeface="Courier New" panose="02070309020205020404" pitchFamily="49" charset="0"/>
+              </a:rPr>
+              <a:t>In pip, you can use the command “pip3 install – r” followed by the path to the requirements file. This will install all the packages named in the requirements file into the currently active environment. This does not create a new environment like the </a:t>
+            </a:r>
+            <a:r>
+              <a:rPr lang="en-GB" sz="1200" dirty="0" err="1">
+                <a:latin typeface="Courier New" panose="02070309020205020404" pitchFamily="49" charset="0"/>
+                <a:cs typeface="Courier New" panose="02070309020205020404" pitchFamily="49" charset="0"/>
+              </a:rPr>
+              <a:t>conda</a:t>
+            </a:r>
+            <a:r>
+              <a:rPr lang="en-GB" sz="1200" dirty="0">
+                <a:latin typeface="Courier New" panose="02070309020205020404" pitchFamily="49" charset="0"/>
+                <a:cs typeface="Courier New" panose="02070309020205020404" pitchFamily="49" charset="0"/>
+              </a:rPr>
+              <a:t> command but instead adds to an existing environment.</a:t>
+            </a:r>
+          </a:p>
+          <a:p>
+            <a:endParaRPr lang="en-GB" sz="1200" dirty="0">
+              <a:latin typeface="Courier New" panose="02070309020205020404" pitchFamily="49" charset="0"/>
+              <a:cs typeface="Courier New" panose="02070309020205020404" pitchFamily="49" charset="0"/>
+            </a:endParaRPr>
+          </a:p>
+          <a:p>
+            <a:r>
+              <a:rPr lang="en-GB" sz="1200" dirty="0">
+                <a:latin typeface="Courier New" panose="02070309020205020404" pitchFamily="49" charset="0"/>
+                <a:cs typeface="Courier New" panose="02070309020205020404" pitchFamily="49" charset="0"/>
+              </a:rPr>
+              <a:t>Demonstration: Create a new </a:t>
+            </a:r>
+            <a:r>
+              <a:rPr lang="en-GB" sz="1200" dirty="0" err="1">
+                <a:latin typeface="Courier New" panose="02070309020205020404" pitchFamily="49" charset="0"/>
+                <a:cs typeface="Courier New" panose="02070309020205020404" pitchFamily="49" charset="0"/>
+              </a:rPr>
+              <a:t>conda</a:t>
+            </a:r>
+            <a:r>
+              <a:rPr lang="en-GB" sz="1200" dirty="0">
+                <a:latin typeface="Courier New" panose="02070309020205020404" pitchFamily="49" charset="0"/>
+                <a:cs typeface="Courier New" panose="02070309020205020404" pitchFamily="49" charset="0"/>
+              </a:rPr>
+              <a:t> environment using the requirements file generated in the previous example using the command “</a:t>
+            </a:r>
+            <a:r>
+              <a:rPr lang="en-GB" sz="1200" dirty="0" err="1">
+                <a:latin typeface="Courier New" panose="02070309020205020404" pitchFamily="49" charset="0"/>
+                <a:cs typeface="Courier New" panose="02070309020205020404" pitchFamily="49" charset="0"/>
+              </a:rPr>
+              <a:t>conda</a:t>
+            </a:r>
+            <a:r>
+              <a:rPr lang="en-GB" sz="1200" dirty="0">
+                <a:latin typeface="Courier New" panose="02070309020205020404" pitchFamily="49" charset="0"/>
+                <a:cs typeface="Courier New" panose="02070309020205020404" pitchFamily="49" charset="0"/>
+              </a:rPr>
+              <a:t> create –name </a:t>
+            </a:r>
+            <a:r>
+              <a:rPr lang="en-GB" sz="1200" dirty="0" err="1">
+                <a:latin typeface="Courier New" panose="02070309020205020404" pitchFamily="49" charset="0"/>
+                <a:cs typeface="Courier New" panose="02070309020205020404" pitchFamily="49" charset="0"/>
+              </a:rPr>
+              <a:t>req</a:t>
+            </a:r>
+            <a:r>
+              <a:rPr lang="en-GB" sz="1200" dirty="0">
+                <a:latin typeface="Courier New" panose="02070309020205020404" pitchFamily="49" charset="0"/>
+                <a:cs typeface="Courier New" panose="02070309020205020404" pitchFamily="49" charset="0"/>
+              </a:rPr>
+              <a:t> –file requirements_conda.txt </a:t>
+            </a:r>
             <a:endParaRPr lang="en-GB" dirty="0"/>
-          </a:p>
-          <a:p>
-            <a:r>
-              <a:rPr lang="en-GB" dirty="0"/>
-              <a:t>Demonstration: Open terminal. Type “python”. Type “print(“Hi”). Type “for </a:t>
-            </a:r>
-            <a:r>
-              <a:rPr lang="en-GB" dirty="0" err="1"/>
-              <a:t>i</a:t>
-            </a:r>
-            <a:r>
-              <a:rPr lang="en-GB" dirty="0"/>
-              <a:t> in range(5):”. Type “ print(</a:t>
-            </a:r>
-            <a:r>
-              <a:rPr lang="en-GB" dirty="0" err="1"/>
-              <a:t>i</a:t>
-            </a:r>
-            <a:r>
-              <a:rPr lang="en-GB" dirty="0"/>
-              <a:t>)” (note the space before “print”). Type “ print(“A”)”. Type “”.</a:t>
-            </a:r>
           </a:p>
         </p:txBody>
       </p:sp>
@@ -2093,7 +2303,7 @@
           <a:p>
             <a:fld id="{6A641EC8-C9F8-4A58-A1A7-F7D817526EEC}" type="slidenum">
               <a:rPr lang="en-GB" smtClean="0"/>
-              <a:t>20</a:t>
+              <a:t>17</a:t>
             </a:fld>
             <a:endParaRPr lang="en-GB"/>
           </a:p>
@@ -2102,7 +2312,7 @@
     </p:spTree>
     <p:extLst>
       <p:ext uri="{BB962C8B-B14F-4D97-AF65-F5344CB8AC3E}">
-        <p14:creationId xmlns:p14="http://schemas.microsoft.com/office/powerpoint/2010/main" val="1932458035"/>
+        <p14:creationId xmlns:p14="http://schemas.microsoft.com/office/powerpoint/2010/main" val="595670898"/>
       </p:ext>
     </p:extLst>
   </p:cSld>
@@ -2158,270 +2368,7 @@
           <a:p>
             <a:r>
               <a:rPr lang="en-GB" dirty="0"/>
-              <a:t>Jupyter notebooks are a type of file based around the JSON file format ad typically have the extension “.</a:t>
-            </a:r>
-            <a:r>
-              <a:rPr lang="en-GB" dirty="0" err="1"/>
-              <a:t>ipynb</a:t>
-            </a:r>
-            <a:r>
-              <a:rPr lang="en-GB" dirty="0"/>
-              <a:t>”. They are a series of cells containing either markdown code or Python code. Markdown cells contain static content that can flexibly display text, images, equations and so on. The Python cells may be individually run to execute the code they contain. Normally, when a Jupyter notebook is opened, a Python kernel is created and an interface for editing and running code is opened in the browser. There area variety of applications that can view, edit and run a Jupyter Notebook, including Anaconda which runs on your computer and Google </a:t>
-            </a:r>
-            <a:r>
-              <a:rPr lang="en-GB" dirty="0" err="1"/>
-              <a:t>Colab</a:t>
-            </a:r>
-            <a:r>
-              <a:rPr lang="en-GB" dirty="0"/>
-              <a:t>, which run remotely on Google’s servers.</a:t>
-            </a:r>
-            <a:br>
-              <a:rPr lang="en-GB" dirty="0"/>
-            </a:br>
-            <a:br>
-              <a:rPr lang="en-GB" dirty="0"/>
-            </a:br>
-            <a:r>
-              <a:rPr lang="en-GB" dirty="0"/>
-              <a:t>Demonstration (</a:t>
-            </a:r>
-            <a:r>
-              <a:rPr lang="en-GB" dirty="0" err="1"/>
-              <a:t>Colab</a:t>
-            </a:r>
-            <a:r>
-              <a:rPr lang="en-GB" dirty="0"/>
-              <a:t>): Search for “</a:t>
-            </a:r>
-            <a:r>
-              <a:rPr lang="en-GB" dirty="0" err="1"/>
-              <a:t>colab</a:t>
-            </a:r>
-            <a:r>
-              <a:rPr lang="en-GB" dirty="0"/>
-              <a:t>”. Open “Welcome to </a:t>
-            </a:r>
-            <a:r>
-              <a:rPr lang="en-GB" dirty="0" err="1"/>
-              <a:t>Colaboratory</a:t>
-            </a:r>
-            <a:r>
-              <a:rPr lang="en-GB" dirty="0"/>
-              <a:t> and run a code cell.</a:t>
-            </a:r>
-          </a:p>
-          <a:p>
-            <a:endParaRPr lang="en-GB" dirty="0"/>
-          </a:p>
-          <a:p>
-            <a:pPr marL="0" marR="0" lvl="0" indent="0" algn="l" defTabSz="914400" rtl="0" eaLnBrk="1" fontAlgn="auto" latinLnBrk="0" hangingPunct="1">
-              <a:lnSpc>
-                <a:spcPct val="100000"/>
-              </a:lnSpc>
-              <a:spcBef>
-                <a:spcPts val="0"/>
-              </a:spcBef>
-              <a:spcAft>
-                <a:spcPts val="0"/>
-              </a:spcAft>
-              <a:buClrTx/>
-              <a:buSzTx/>
-              <a:buFontTx/>
-              <a:buNone/>
-              <a:tabLst/>
-              <a:defRPr/>
-            </a:pPr>
-            <a:r>
-              <a:rPr lang="en-GB" dirty="0"/>
-              <a:t>Demonstration (Anaconda): Open Anaconda. Launch Jupyter Notebook. Open </a:t>
-            </a:r>
-            <a:r>
-              <a:rPr lang="en-GB" dirty="0">
-                <a:solidFill>
-                  <a:schemeClr val="accent1"/>
-                </a:solidFill>
-              </a:rPr>
-              <a:t>Examples/Notebooks/</a:t>
-            </a:r>
-            <a:r>
-              <a:rPr lang="en-GB" dirty="0" err="1">
-                <a:solidFill>
-                  <a:schemeClr val="accent1"/>
-                </a:solidFill>
-              </a:rPr>
-              <a:t>Sample.ipynb</a:t>
-            </a:r>
-            <a:r>
-              <a:rPr lang="en-GB" dirty="0">
-                <a:solidFill>
-                  <a:schemeClr val="accent1"/>
-                </a:solidFill>
-              </a:rPr>
-              <a:t>.</a:t>
-            </a:r>
-          </a:p>
-          <a:p>
-            <a:pPr marL="0" marR="0" lvl="0" indent="0" algn="l" defTabSz="914400" rtl="0" eaLnBrk="1" fontAlgn="auto" latinLnBrk="0" hangingPunct="1">
-              <a:lnSpc>
-                <a:spcPct val="100000"/>
-              </a:lnSpc>
-              <a:spcBef>
-                <a:spcPts val="0"/>
-              </a:spcBef>
-              <a:spcAft>
-                <a:spcPts val="0"/>
-              </a:spcAft>
-              <a:buClrTx/>
-              <a:buSzTx/>
-              <a:buFontTx/>
-              <a:buNone/>
-              <a:tabLst/>
-              <a:defRPr/>
-            </a:pPr>
-            <a:endParaRPr lang="en-GB" dirty="0">
-              <a:solidFill>
-                <a:schemeClr val="accent1"/>
-              </a:solidFill>
-            </a:endParaRPr>
-          </a:p>
-          <a:p>
-            <a:pPr marL="0" marR="0" lvl="0" indent="0" algn="l" defTabSz="914400" rtl="0" eaLnBrk="1" fontAlgn="auto" latinLnBrk="0" hangingPunct="1">
-              <a:lnSpc>
-                <a:spcPct val="100000"/>
-              </a:lnSpc>
-              <a:spcBef>
-                <a:spcPts val="0"/>
-              </a:spcBef>
-              <a:spcAft>
-                <a:spcPts val="0"/>
-              </a:spcAft>
-              <a:buClrTx/>
-              <a:buSzTx/>
-              <a:buFontTx/>
-              <a:buNone/>
-              <a:tabLst/>
-              <a:defRPr/>
-            </a:pPr>
-            <a:r>
-              <a:rPr lang="en-GB" dirty="0">
-                <a:solidFill>
-                  <a:schemeClr val="accent1"/>
-                </a:solidFill>
-              </a:rPr>
-              <a:t>It’s possible to include console commands by beginning the line with an exclamation mark. For instance, in the Notebook opened in Anaconda, we use the current python command to install </a:t>
-            </a:r>
-            <a:r>
-              <a:rPr lang="en-GB" dirty="0" err="1">
-                <a:solidFill>
-                  <a:schemeClr val="accent1"/>
-                </a:solidFill>
-              </a:rPr>
-              <a:t>numpy</a:t>
-            </a:r>
-            <a:r>
-              <a:rPr lang="en-GB" dirty="0">
-                <a:solidFill>
-                  <a:schemeClr val="accent1"/>
-                </a:solidFill>
-              </a:rPr>
-              <a:t> and matplotlib from within  Notebook. This particular use can be useful if you want to ship a notebook without a full Python environment, but this can be sued for all sorts of things. Commands beginning with a “$” are </a:t>
-            </a:r>
-            <a:r>
-              <a:rPr lang="en-GB" dirty="0" err="1">
-                <a:solidFill>
-                  <a:schemeClr val="accent1"/>
-                </a:solidFill>
-              </a:rPr>
-              <a:t>iPython</a:t>
-            </a:r>
-            <a:r>
-              <a:rPr lang="en-GB" dirty="0">
-                <a:solidFill>
-                  <a:schemeClr val="accent1"/>
-                </a:solidFill>
-              </a:rPr>
-              <a:t> commands. </a:t>
-            </a:r>
-            <a:r>
-              <a:rPr lang="en-GB" dirty="0" err="1">
-                <a:solidFill>
-                  <a:schemeClr val="accent1"/>
-                </a:solidFill>
-              </a:rPr>
-              <a:t>iPython</a:t>
-            </a:r>
-            <a:r>
-              <a:rPr lang="en-GB" dirty="0">
-                <a:solidFill>
-                  <a:schemeClr val="accent1"/>
-                </a:solidFill>
-              </a:rPr>
-              <a:t> is a particular type of Python run in Notebooks and contains some extra features. Command line commands and </a:t>
-            </a:r>
-            <a:r>
-              <a:rPr lang="en-GB" dirty="0" err="1">
-                <a:solidFill>
-                  <a:schemeClr val="accent1"/>
-                </a:solidFill>
-              </a:rPr>
-              <a:t>iPython</a:t>
-            </a:r>
-            <a:r>
-              <a:rPr lang="en-GB" dirty="0">
-                <a:solidFill>
-                  <a:schemeClr val="accent1"/>
-                </a:solidFill>
-              </a:rPr>
-              <a:t> calls are not available in normal Python. However, this extra functionality does not mean Jupyter Notebooks are always the way forward – they’re less portable as Jupyter Notebooks need to be run in a visual interface that isn’t always available, such as when running on a HPC cluster. They’re also a bit less modular as it’s harder work to spread code across multiple notebooks. However, you can import .</a:t>
-            </a:r>
-            <a:r>
-              <a:rPr lang="en-GB" dirty="0" err="1">
-                <a:solidFill>
-                  <a:schemeClr val="accent1"/>
-                </a:solidFill>
-              </a:rPr>
-              <a:t>py</a:t>
-            </a:r>
-            <a:r>
-              <a:rPr lang="en-GB" dirty="0">
-                <a:solidFill>
-                  <a:schemeClr val="accent1"/>
-                </a:solidFill>
-              </a:rPr>
-              <a:t> files into Jupyter Notebooks by writing “import” and then the name of a “.</a:t>
-            </a:r>
-            <a:r>
-              <a:rPr lang="en-GB" dirty="0" err="1">
-                <a:solidFill>
-                  <a:schemeClr val="accent1"/>
-                </a:solidFill>
-              </a:rPr>
-              <a:t>py</a:t>
-            </a:r>
-            <a:r>
-              <a:rPr lang="en-GB" dirty="0">
-                <a:solidFill>
-                  <a:schemeClr val="accent1"/>
-                </a:solidFill>
-              </a:rPr>
-              <a:t>” file in the same directory without the “.</a:t>
-            </a:r>
-            <a:r>
-              <a:rPr lang="en-GB" dirty="0" err="1">
-                <a:solidFill>
-                  <a:schemeClr val="accent1"/>
-                </a:solidFill>
-              </a:rPr>
-              <a:t>py</a:t>
-            </a:r>
-            <a:r>
-              <a:rPr lang="en-GB" dirty="0">
-                <a:solidFill>
-                  <a:schemeClr val="accent1"/>
-                </a:solidFill>
-              </a:rPr>
-              <a:t>” extension.</a:t>
+              <a:t>Sample requirements files can be found in “Exercise Sample Solutions/Requirements”</a:t>
             </a:r>
           </a:p>
         </p:txBody>
@@ -2443,7 +2390,7 @@
           <a:p>
             <a:fld id="{6A641EC8-C9F8-4A58-A1A7-F7D817526EEC}" type="slidenum">
               <a:rPr lang="en-GB" smtClean="0"/>
-              <a:t>21</a:t>
+              <a:t>18</a:t>
             </a:fld>
             <a:endParaRPr lang="en-GB"/>
           </a:p>
@@ -2452,7 +2399,7 @@
     </p:spTree>
     <p:extLst>
       <p:ext uri="{BB962C8B-B14F-4D97-AF65-F5344CB8AC3E}">
-        <p14:creationId xmlns:p14="http://schemas.microsoft.com/office/powerpoint/2010/main" val="656540530"/>
+        <p14:creationId xmlns:p14="http://schemas.microsoft.com/office/powerpoint/2010/main" val="2312806874"/>
       </p:ext>
     </p:extLst>
   </p:cSld>
@@ -2508,52 +2455,7 @@
           <a:p>
             <a:r>
               <a:rPr lang="en-GB" dirty="0"/>
-              <a:t>Integrated Development Environments (IDEs) are applications which are designed to help write and run code. In general, this is what I recommend you use to write Python code due to a large collection of quality of life features ad the integrations of common tasks. There are several IDEs you could use and it’s possible to configure them to your work and taste. As a result, I’m not going to give you a extensive introduction, but will give a brief overview of a couple of features of Visual Studio Code, which is a common and powerful IDE.</a:t>
-            </a:r>
-          </a:p>
-          <a:p>
-            <a:endParaRPr lang="en-GB" dirty="0"/>
-          </a:p>
-          <a:p>
-            <a:r>
-              <a:rPr lang="en-GB" dirty="0"/>
-              <a:t>Demonstration: Open VS Code and use “File&gt;Open Folder” open the directory containing the course materials. Open Examples/Command Line/file_1.py.</a:t>
-            </a:r>
-          </a:p>
-          <a:p>
-            <a:endParaRPr lang="en-GB" dirty="0"/>
-          </a:p>
-          <a:p>
-            <a:r>
-              <a:rPr lang="en-GB" dirty="0"/>
-              <a:t>Don’t worry about the first10 lines or so for now – we’ll return to these later. Most IDEs are very modular and extendible, so you might have to install an extension to make it recognise the Python code. You might receive a prompt, or you can look for the “Extensions” button on the left.  This will allow you to install extra functionality specific to tasks or languages. For example, searching for Python will show a number of Python extensions. These provide features such as syntax highlighting, autocomplete, tooltips and enabling running and debugging within the IDE.</a:t>
-            </a:r>
-          </a:p>
-          <a:p>
-            <a:endParaRPr lang="en-GB" dirty="0"/>
-          </a:p>
-          <a:p>
-            <a:r>
-              <a:rPr lang="en-GB" dirty="0"/>
-              <a:t>Note, at the bottom of the screen, the VS code tells us which Python environment is selected and we can change this by clicking on it. This doesn’t always work smoothly and some troubleshooting may sometimes be required. If we click the green triangle button, this will run the current Python code. This will create a Python kernel to run the code and display the results in a terminal which opens at the bottom of the IDE.</a:t>
-            </a:r>
-          </a:p>
-          <a:p>
-            <a:endParaRPr lang="en-GB" dirty="0"/>
-          </a:p>
-          <a:p>
-            <a:r>
-              <a:rPr lang="en-GB" dirty="0"/>
-              <a:t>In addition to running code normally, it’s possible to use an IDE to do a debug run of a code. In VS Code click the “Run and Debug” button on the left. This will step through the code, pausing at “breakpoints”. In VS Code, the values of variables will also be displayed. This is very useful for checking how the code progresses, both in terms of the values of variables and the course the interpreter takes though the code. This can make it much easier to track down problems.</a:t>
-            </a:r>
-          </a:p>
-          <a:p>
-            <a:endParaRPr lang="en-GB" dirty="0"/>
-          </a:p>
-          <a:p>
-            <a:r>
-              <a:rPr lang="en-GB" dirty="0"/>
-              <a:t>Demonstration: Still in Examples/Command Line/file_1.py. Add breakpoints by clicking next to the line numbers 13 (b = 1 + a) and 15 (a = b + 2). Red dots should appear. Open the debug and run tab on the left. Click “Run and Debug” and select “Python file”. Use the “play” control to step through the breakpoints. Observe the values of variables changing.</a:t>
+              <a:t>A Python “kernel” is n operating system process that runs Python code. It exists separately to the applications with a graphical user interface you use to write code. A single Python kernel may be active for a long time ad will sit idle when no code is running. When using a Python kernel, it may run on your computer, or hosted remotely on a server. Many applications can create a kernel.</a:t>
             </a:r>
           </a:p>
         </p:txBody>
@@ -2575,7 +2477,7 @@
           <a:p>
             <a:fld id="{6A641EC8-C9F8-4A58-A1A7-F7D817526EEC}" type="slidenum">
               <a:rPr lang="en-GB" smtClean="0"/>
-              <a:t>22</a:t>
+              <a:t>19</a:t>
             </a:fld>
             <a:endParaRPr lang="en-GB"/>
           </a:p>
@@ -2584,7 +2486,7 @@
     </p:spTree>
     <p:extLst>
       <p:ext uri="{BB962C8B-B14F-4D97-AF65-F5344CB8AC3E}">
-        <p14:creationId xmlns:p14="http://schemas.microsoft.com/office/powerpoint/2010/main" val="406240098"/>
+        <p14:creationId xmlns:p14="http://schemas.microsoft.com/office/powerpoint/2010/main" val="3040209493"/>
       </p:ext>
     </p:extLst>
   </p:cSld>
@@ -2638,6 +2540,29 @@
           <a:bodyPr/>
           <a:lstStyle/>
           <a:p>
+            <a:pPr marL="0" marR="0" lvl="0" indent="0" algn="l" defTabSz="914400" rtl="0" eaLnBrk="1" fontAlgn="auto" latinLnBrk="0" hangingPunct="1">
+              <a:lnSpc>
+                <a:spcPct val="100000"/>
+              </a:lnSpc>
+              <a:spcBef>
+                <a:spcPts val="0"/>
+              </a:spcBef>
+              <a:spcAft>
+                <a:spcPts val="0"/>
+              </a:spcAft>
+              <a:buClrTx/>
+              <a:buSzTx/>
+              <a:buFontTx/>
+              <a:buNone/>
+              <a:tabLst/>
+              <a:defRPr/>
+            </a:pPr>
+            <a:r>
+              <a:rPr lang="en-GB" dirty="0"/>
+              <a:t>No additional notes.</a:t>
+            </a:r>
+          </a:p>
+          <a:p>
             <a:endParaRPr lang="en-GB" dirty="0"/>
           </a:p>
         </p:txBody>
@@ -2649,7 +2574,7 @@
             <a:spLocks noGrp="1"/>
           </p:cNvSpPr>
           <p:nvPr>
-            <p:ph type="sldNum" sz="quarter" idx="10"/>
+            <p:ph type="sldNum" sz="quarter" idx="5"/>
           </p:nvPr>
         </p:nvSpPr>
         <p:spPr/>
@@ -2657,9 +2582,9 @@
           <a:bodyPr/>
           <a:lstStyle/>
           <a:p>
-            <a:fld id="{6A641EC8-C9F8-4A58-A1A7-F7D817526EEC}" type="slidenum">
+            <a:fld id="{3AE2EC8F-0D0C-480E-9701-891381D03195}" type="slidenum">
               <a:rPr lang="en-GB" smtClean="0"/>
-              <a:t>5</a:t>
+              <a:t>2</a:t>
             </a:fld>
             <a:endParaRPr lang="en-GB"/>
           </a:p>
@@ -2668,7 +2593,7 @@
     </p:spTree>
     <p:extLst>
       <p:ext uri="{BB962C8B-B14F-4D97-AF65-F5344CB8AC3E}">
-        <p14:creationId xmlns:p14="http://schemas.microsoft.com/office/powerpoint/2010/main" val="2283586298"/>
+        <p14:creationId xmlns:p14="http://schemas.microsoft.com/office/powerpoint/2010/main" val="2116338273"/>
       </p:ext>
     </p:extLst>
   </p:cSld>
@@ -2724,7 +2649,15 @@
           <a:p>
             <a:r>
               <a:rPr lang="en-GB" dirty="0"/>
-              <a:t>Python files can be run from the command line. This can be the terminal in Mac/Linux, Windows PowerShell or command prompt, or an Anaconda terminal. In many cases, these command lines can be opened from within a IDE. If you’ve already got an IDE open, this is a convenient place to run files from.</a:t>
+              <a:t>It’s possible to open a Python kernel on the command line (such as the terminal in Linux or Mac, or the </a:t>
+            </a:r>
+            <a:r>
+              <a:rPr lang="en-GB" dirty="0" err="1"/>
+              <a:t>powerhsell</a:t>
+            </a:r>
+            <a:r>
+              <a:rPr lang="en-GB" dirty="0"/>
+              <a:t> or command prompt in Windows, or MCD.exe from within Anaconda) by typing “python”. Following this, further commands will be interpreted as individual Python commands. It’s possible to include indented blocks, such as “for” or “if” statements, using spaces to mark the level of indent. The indented blocks can e ended when a blank line is entered. However, this interface is cumbersome and difficult to use, and the code entered will not be saved to be re-used. Thus, this is only really useful for testing very short pieces of code – perhaps checking a module is installed and can be imported.</a:t>
             </a:r>
           </a:p>
           <a:p>
@@ -2733,16 +2666,23 @@
           <a:p>
             <a:r>
               <a:rPr lang="en-GB" dirty="0"/>
-              <a:t>To run a file, simply type “python” followed by the name of the file.</a:t>
-            </a:r>
-          </a:p>
-          <a:p>
-            <a:endParaRPr lang="en-GB" dirty="0"/>
-          </a:p>
-          <a:p>
+              <a:t>Demonstration: Open terminal. Type “python”. Type “print(“Hi”). Type “for </a:t>
+            </a:r>
+            <a:r>
+              <a:rPr lang="en-GB" dirty="0" err="1"/>
+              <a:t>i</a:t>
+            </a:r>
             <a:r>
               <a:rPr lang="en-GB" dirty="0"/>
-              <a:t>Demonstration: Within VS Code, create a new terminal (if one isn’t open already) by clicking “Terminal&gt;New Terminal”. If necessary write “cd Exercise/Command Line”. Write “python file_1.py” to run the script.</a:t>
+              <a:t> in range(5):”. Type “ print(</a:t>
+            </a:r>
+            <a:r>
+              <a:rPr lang="en-GB" dirty="0" err="1"/>
+              <a:t>i</a:t>
+            </a:r>
+            <a:r>
+              <a:rPr lang="en-GB" dirty="0"/>
+              <a:t>)” (note the space before “print”). Type “ print(“A”)”. Type “”.</a:t>
             </a:r>
           </a:p>
         </p:txBody>
@@ -2764,7 +2704,7 @@
           <a:p>
             <a:fld id="{6A641EC8-C9F8-4A58-A1A7-F7D817526EEC}" type="slidenum">
               <a:rPr lang="en-GB" smtClean="0"/>
-              <a:t>23</a:t>
+              <a:t>20</a:t>
             </a:fld>
             <a:endParaRPr lang="en-GB"/>
           </a:p>
@@ -2773,7 +2713,7 @@
     </p:spTree>
     <p:extLst>
       <p:ext uri="{BB962C8B-B14F-4D97-AF65-F5344CB8AC3E}">
-        <p14:creationId xmlns:p14="http://schemas.microsoft.com/office/powerpoint/2010/main" val="2324684938"/>
+        <p14:creationId xmlns:p14="http://schemas.microsoft.com/office/powerpoint/2010/main" val="1932458035"/>
       </p:ext>
     </p:extLst>
   </p:cSld>
@@ -2829,21 +2769,271 @@
           <a:p>
             <a:r>
               <a:rPr lang="en-GB" dirty="0"/>
-              <a:t>Demonstration: Run Examples/Command Line/python file_1.py and observe the name of __name__ printed is “__main__”. Run Examples/Command Line/python file_2.py and observe file_1.py now has the name “file_1</a:t>
-            </a:r>
-            <a:r>
-              <a:rPr lang="en-GB"/>
-              <a:t>” and </a:t>
+              <a:t>Jupyter notebooks are a type of file based around the JSON file format ad typically have the extension “.</a:t>
+            </a:r>
+            <a:r>
+              <a:rPr lang="en-GB" dirty="0" err="1"/>
+              <a:t>ipynb</a:t>
             </a:r>
             <a:r>
               <a:rPr lang="en-GB" dirty="0"/>
-              <a:t>file_2.py has </a:t>
-            </a:r>
-            <a:r>
-              <a:rPr lang="en-GB"/>
-              <a:t>the name “__main__”.</a:t>
-            </a:r>
+              <a:t>”. They are a series of cells containing either markdown code or Python code. Markdown cells contain static content that can flexibly display text, images, equations and so on. The Python cells may be individually run to execute the code they contain. Normally, when a Jupyter notebook is opened, a Python kernel is created and an interface for editing and running code is opened in the browser. There area variety of applications that can view, edit and run a Jupyter Notebook, including Anaconda which runs on your computer and Google </a:t>
+            </a:r>
+            <a:r>
+              <a:rPr lang="en-GB" dirty="0" err="1"/>
+              <a:t>Colab</a:t>
+            </a:r>
+            <a:r>
+              <a:rPr lang="en-GB" dirty="0"/>
+              <a:t>, which run remotely on Google’s servers.</a:t>
+            </a:r>
+            <a:br>
+              <a:rPr lang="en-GB" dirty="0"/>
+            </a:br>
+            <a:br>
+              <a:rPr lang="en-GB" dirty="0"/>
+            </a:br>
+            <a:r>
+              <a:rPr lang="en-GB" dirty="0"/>
+              <a:t>Demonstration (</a:t>
+            </a:r>
+            <a:r>
+              <a:rPr lang="en-GB" dirty="0" err="1"/>
+              <a:t>Colab</a:t>
+            </a:r>
+            <a:r>
+              <a:rPr lang="en-GB" dirty="0"/>
+              <a:t>): Search for “</a:t>
+            </a:r>
+            <a:r>
+              <a:rPr lang="en-GB" dirty="0" err="1"/>
+              <a:t>colab</a:t>
+            </a:r>
+            <a:r>
+              <a:rPr lang="en-GB" dirty="0"/>
+              <a:t>”. Open “Welcome to </a:t>
+            </a:r>
+            <a:r>
+              <a:rPr lang="en-GB" dirty="0" err="1"/>
+              <a:t>Colaboratory</a:t>
+            </a:r>
+            <a:r>
+              <a:rPr lang="en-GB" dirty="0"/>
+              <a:t> and run a code cell.</a:t>
+            </a:r>
+          </a:p>
+          <a:p>
             <a:endParaRPr lang="en-GB" dirty="0"/>
+          </a:p>
+          <a:p>
+            <a:pPr marL="0" marR="0" lvl="0" indent="0" algn="l" defTabSz="914400" rtl="0" eaLnBrk="1" fontAlgn="auto" latinLnBrk="0" hangingPunct="1">
+              <a:lnSpc>
+                <a:spcPct val="100000"/>
+              </a:lnSpc>
+              <a:spcBef>
+                <a:spcPts val="0"/>
+              </a:spcBef>
+              <a:spcAft>
+                <a:spcPts val="0"/>
+              </a:spcAft>
+              <a:buClrTx/>
+              <a:buSzTx/>
+              <a:buFontTx/>
+              <a:buNone/>
+              <a:tabLst/>
+              <a:defRPr/>
+            </a:pPr>
+            <a:r>
+              <a:rPr lang="en-GB" dirty="0"/>
+              <a:t>Demonstration (Anaconda): Open Anaconda. Launch Jupyter Notebook. Open </a:t>
+            </a:r>
+            <a:r>
+              <a:rPr lang="en-GB" dirty="0">
+                <a:solidFill>
+                  <a:schemeClr val="accent1"/>
+                </a:solidFill>
+              </a:rPr>
+              <a:t>Examples/Notebooks/</a:t>
+            </a:r>
+            <a:r>
+              <a:rPr lang="en-GB" dirty="0" err="1">
+                <a:solidFill>
+                  <a:schemeClr val="accent1"/>
+                </a:solidFill>
+              </a:rPr>
+              <a:t>Sample.ipynb</a:t>
+            </a:r>
+            <a:r>
+              <a:rPr lang="en-GB" dirty="0">
+                <a:solidFill>
+                  <a:schemeClr val="accent1"/>
+                </a:solidFill>
+              </a:rPr>
+              <a:t>.</a:t>
+            </a:r>
+          </a:p>
+          <a:p>
+            <a:pPr marL="0" marR="0" lvl="0" indent="0" algn="l" defTabSz="914400" rtl="0" eaLnBrk="1" fontAlgn="auto" latinLnBrk="0" hangingPunct="1">
+              <a:lnSpc>
+                <a:spcPct val="100000"/>
+              </a:lnSpc>
+              <a:spcBef>
+                <a:spcPts val="0"/>
+              </a:spcBef>
+              <a:spcAft>
+                <a:spcPts val="0"/>
+              </a:spcAft>
+              <a:buClrTx/>
+              <a:buSzTx/>
+              <a:buFontTx/>
+              <a:buNone/>
+              <a:tabLst/>
+              <a:defRPr/>
+            </a:pPr>
+            <a:endParaRPr lang="en-GB" dirty="0">
+              <a:solidFill>
+                <a:schemeClr val="accent1"/>
+              </a:solidFill>
+            </a:endParaRPr>
+          </a:p>
+          <a:p>
+            <a:pPr marL="0" marR="0" lvl="0" indent="0" algn="l" defTabSz="914400" rtl="0" eaLnBrk="1" fontAlgn="auto" latinLnBrk="0" hangingPunct="1">
+              <a:lnSpc>
+                <a:spcPct val="100000"/>
+              </a:lnSpc>
+              <a:spcBef>
+                <a:spcPts val="0"/>
+              </a:spcBef>
+              <a:spcAft>
+                <a:spcPts val="0"/>
+              </a:spcAft>
+              <a:buClrTx/>
+              <a:buSzTx/>
+              <a:buFontTx/>
+              <a:buNone/>
+              <a:tabLst/>
+              <a:defRPr/>
+            </a:pPr>
+            <a:r>
+              <a:rPr lang="en-GB" dirty="0">
+                <a:solidFill>
+                  <a:schemeClr val="accent1"/>
+                </a:solidFill>
+              </a:rPr>
+              <a:t>It’s possible to include console commands by beginning the line with an exclamation mark. For instance, in the Notebook opened in Anaconda, we use the current python command to install </a:t>
+            </a:r>
+            <a:r>
+              <a:rPr lang="en-GB" dirty="0" err="1">
+                <a:solidFill>
+                  <a:schemeClr val="accent1"/>
+                </a:solidFill>
+              </a:rPr>
+              <a:t>numpy</a:t>
+            </a:r>
+            <a:r>
+              <a:rPr lang="en-GB" dirty="0">
+                <a:solidFill>
+                  <a:schemeClr val="accent1"/>
+                </a:solidFill>
+              </a:rPr>
+              <a:t> and matplotlib from within  Notebook. This particular use can be useful if you want to ship a notebook without a full Python environment, but this can be sued for all sorts of things. Commands beginning with a “$” are </a:t>
+            </a:r>
+            <a:r>
+              <a:rPr lang="en-GB" dirty="0" err="1">
+                <a:solidFill>
+                  <a:schemeClr val="accent1"/>
+                </a:solidFill>
+              </a:rPr>
+              <a:t>iPython</a:t>
+            </a:r>
+            <a:r>
+              <a:rPr lang="en-GB" dirty="0">
+                <a:solidFill>
+                  <a:schemeClr val="accent1"/>
+                </a:solidFill>
+              </a:rPr>
+              <a:t> commands. </a:t>
+            </a:r>
+            <a:r>
+              <a:rPr lang="en-GB" dirty="0" err="1">
+                <a:solidFill>
+                  <a:schemeClr val="accent1"/>
+                </a:solidFill>
+              </a:rPr>
+              <a:t>iPython</a:t>
+            </a:r>
+            <a:r>
+              <a:rPr lang="en-GB" dirty="0">
+                <a:solidFill>
+                  <a:schemeClr val="accent1"/>
+                </a:solidFill>
+              </a:rPr>
+              <a:t> is a particular type of Python run in Notebooks and contains some extra features. Command line commands and </a:t>
+            </a:r>
+            <a:r>
+              <a:rPr lang="en-GB" dirty="0" err="1">
+                <a:solidFill>
+                  <a:schemeClr val="accent1"/>
+                </a:solidFill>
+              </a:rPr>
+              <a:t>iPython</a:t>
+            </a:r>
+            <a:r>
+              <a:rPr lang="en-GB" dirty="0">
+                <a:solidFill>
+                  <a:schemeClr val="accent1"/>
+                </a:solidFill>
+              </a:rPr>
+              <a:t> calls are not available in normal Python. However, this extra functionality does not mean Jupyter Notebooks are always the way forward – they’re less portable as Jupyter Notebooks need to be run in a visual interface that isn’t always available, such as when running on a HPC cluster. They’re also a bit less modular as it’s harder work to spread code across multiple notebooks. However, you can import .</a:t>
+            </a:r>
+            <a:r>
+              <a:rPr lang="en-GB" dirty="0" err="1">
+                <a:solidFill>
+                  <a:schemeClr val="accent1"/>
+                </a:solidFill>
+              </a:rPr>
+              <a:t>py</a:t>
+            </a:r>
+            <a:r>
+              <a:rPr lang="en-GB" dirty="0">
+                <a:solidFill>
+                  <a:schemeClr val="accent1"/>
+                </a:solidFill>
+              </a:rPr>
+              <a:t> files into Jupyter Notebooks by writing “import” and then the name of a “.</a:t>
+            </a:r>
+            <a:r>
+              <a:rPr lang="en-GB" dirty="0" err="1">
+                <a:solidFill>
+                  <a:schemeClr val="accent1"/>
+                </a:solidFill>
+              </a:rPr>
+              <a:t>py</a:t>
+            </a:r>
+            <a:r>
+              <a:rPr lang="en-GB" dirty="0">
+                <a:solidFill>
+                  <a:schemeClr val="accent1"/>
+                </a:solidFill>
+              </a:rPr>
+              <a:t>” file in the same directory without the “.</a:t>
+            </a:r>
+            <a:r>
+              <a:rPr lang="en-GB" dirty="0" err="1">
+                <a:solidFill>
+                  <a:schemeClr val="accent1"/>
+                </a:solidFill>
+              </a:rPr>
+              <a:t>py</a:t>
+            </a:r>
+            <a:r>
+              <a:rPr lang="en-GB" dirty="0">
+                <a:solidFill>
+                  <a:schemeClr val="accent1"/>
+                </a:solidFill>
+              </a:rPr>
+              <a:t>” extension.</a:t>
+            </a:r>
           </a:p>
         </p:txBody>
       </p:sp>
@@ -2864,7 +3054,7 @@
           <a:p>
             <a:fld id="{6A641EC8-C9F8-4A58-A1A7-F7D817526EEC}" type="slidenum">
               <a:rPr lang="en-GB" smtClean="0"/>
-              <a:t>24</a:t>
+              <a:t>21</a:t>
             </a:fld>
             <a:endParaRPr lang="en-GB"/>
           </a:p>
@@ -2873,7 +3063,7 @@
     </p:spTree>
     <p:extLst>
       <p:ext uri="{BB962C8B-B14F-4D97-AF65-F5344CB8AC3E}">
-        <p14:creationId xmlns:p14="http://schemas.microsoft.com/office/powerpoint/2010/main" val="3234088912"/>
+        <p14:creationId xmlns:p14="http://schemas.microsoft.com/office/powerpoint/2010/main" val="656540530"/>
       </p:ext>
     </p:extLst>
   </p:cSld>
@@ -2927,7 +3117,55 @@
           <a:bodyPr/>
           <a:lstStyle/>
           <a:p>
+            <a:r>
+              <a:rPr lang="en-GB" dirty="0"/>
+              <a:t>Integrated Development Environments (IDEs) are applications which are designed to help write and run code. In general, this is what I recommend you use to write Python code due to a large collection of quality of life features ad the integrations of common tasks. There are several IDEs you could use and it’s possible to configure them to your work and taste. As a result, I’m not going to give you a extensive introduction, but will give a brief overview of a couple of features of Visual Studio Code, which is a common and powerful IDE.</a:t>
+            </a:r>
+          </a:p>
+          <a:p>
             <a:endParaRPr lang="en-GB" dirty="0"/>
+          </a:p>
+          <a:p>
+            <a:r>
+              <a:rPr lang="en-GB" dirty="0"/>
+              <a:t>Demonstration: Open VS Code and use “File&gt;Open Folder” open the directory containing the course materials. Open Examples/Command Line/file_1.py.</a:t>
+            </a:r>
+          </a:p>
+          <a:p>
+            <a:endParaRPr lang="en-GB" dirty="0"/>
+          </a:p>
+          <a:p>
+            <a:r>
+              <a:rPr lang="en-GB" dirty="0"/>
+              <a:t>Don’t worry about the first10 lines or so for now – we’ll return to these later. Most IDEs are very modular and extendible, so you might have to install an extension to make it recognise the Python code. You might receive a prompt, or you can look for the “Extensions” button on the left.  This will allow you to install extra functionality specific to tasks or languages. For example, searching for Python will show a number of Python extensions. These provide features such as syntax highlighting, autocomplete, tooltips and enabling running and debugging within the IDE.</a:t>
+            </a:r>
+          </a:p>
+          <a:p>
+            <a:endParaRPr lang="en-GB" dirty="0"/>
+          </a:p>
+          <a:p>
+            <a:r>
+              <a:rPr lang="en-GB" dirty="0"/>
+              <a:t>Note, at the bottom of the screen, the VS code tells us which Python environment is selected and we can change this by clicking on it. This doesn’t always work smoothly and some troubleshooting may sometimes be required. If we click the green triangle button, this will run the current Python code. This will create a Python kernel to run the code and display the results in a terminal which opens at the bottom of the IDE.</a:t>
+            </a:r>
+          </a:p>
+          <a:p>
+            <a:endParaRPr lang="en-GB" dirty="0"/>
+          </a:p>
+          <a:p>
+            <a:r>
+              <a:rPr lang="en-GB" dirty="0"/>
+              <a:t>In addition to running code normally, it’s possible to use an IDE to do a debug run of a code. In VS Code click the “Run and Debug” button on the left. This will step through the code, pausing at “breakpoints”. In VS Code, the values of variables will also be displayed. This is very useful for checking how the code progresses, both in terms of the values of variables and the course the interpreter takes though the code. This can make it much easier to track down problems.</a:t>
+            </a:r>
+          </a:p>
+          <a:p>
+            <a:endParaRPr lang="en-GB" dirty="0"/>
+          </a:p>
+          <a:p>
+            <a:r>
+              <a:rPr lang="en-GB" dirty="0"/>
+              <a:t>Demonstration: Still in Examples/Command Line/file_1.py. Add breakpoints by clicking next to the line numbers 13 (b = 1 + a) and 15 (a = b + 2). Red dots should appear. Open the debug and run tab on the left. Click “Run and Debug” and select “Python file”. Use the “play” control to step through the breakpoints. Observe the values of variables changing.</a:t>
+            </a:r>
           </a:p>
         </p:txBody>
       </p:sp>
@@ -2948,7 +3186,7 @@
           <a:p>
             <a:fld id="{6A641EC8-C9F8-4A58-A1A7-F7D817526EEC}" type="slidenum">
               <a:rPr lang="en-GB" smtClean="0"/>
-              <a:t>25</a:t>
+              <a:t>22</a:t>
             </a:fld>
             <a:endParaRPr lang="en-GB"/>
           </a:p>
@@ -2957,7 +3195,7 @@
     </p:spTree>
     <p:extLst>
       <p:ext uri="{BB962C8B-B14F-4D97-AF65-F5344CB8AC3E}">
-        <p14:creationId xmlns:p14="http://schemas.microsoft.com/office/powerpoint/2010/main" val="2639569105"/>
+        <p14:creationId xmlns:p14="http://schemas.microsoft.com/office/powerpoint/2010/main" val="406240098"/>
       </p:ext>
     </p:extLst>
   </p:cSld>
@@ -3013,7 +3251,7 @@
           <a:p>
             <a:r>
               <a:rPr lang="en-GB" dirty="0"/>
-              <a:t>The idea of “flags” is common to many programs and Python is no exception. After writing the name of the program (in this case “python”) on the command line this can be followed by a series of words which modify how the program is run. Like many programs, in Python, this is in the form a hyphen followed by one or more letters. Multiple flags can be provided in a single invocation of Python by separating them with spaces.</a:t>
+              <a:t>Python files can be run from the command line. This can be the terminal in Mac/Linux, Windows PowerShell or command prompt, or an Anaconda terminal. In many cases, these command lines can be opened from within a IDE. If you’ve already got an IDE open, this is a convenient place to run files from.</a:t>
             </a:r>
           </a:p>
           <a:p>
@@ -3022,7 +3260,7 @@
           <a:p>
             <a:r>
               <a:rPr lang="en-GB" dirty="0"/>
-              <a:t>The fact of flags are often niche in usage and useful for more advanced users, but we’re going to run through a few more accessible ones to demonstrate the concept.</a:t>
+              <a:t>To run a file, simply type “python” followed by the name of the file.</a:t>
             </a:r>
           </a:p>
           <a:p>
@@ -3031,185 +3269,8 @@
           <a:p>
             <a:r>
               <a:rPr lang="en-GB" dirty="0"/>
-              <a:t>Normally, when Python imports a file, it will compile into a bytecode file with the extension .</a:t>
-            </a:r>
-            <a:r>
-              <a:rPr lang="en-GB" dirty="0" err="1"/>
-              <a:t>pyc</a:t>
-            </a:r>
-            <a:r>
-              <a:rPr lang="en-GB" dirty="0"/>
-              <a:t> if this hasn’t already been done. Code from a .</a:t>
-            </a:r>
-            <a:r>
-              <a:rPr lang="en-GB" dirty="0" err="1"/>
-              <a:t>pyc</a:t>
-            </a:r>
-            <a:r>
-              <a:rPr lang="en-GB" dirty="0"/>
-              <a:t> file can be run faster than code from a .</a:t>
-            </a:r>
-            <a:r>
-              <a:rPr lang="en-GB" dirty="0" err="1"/>
-              <a:t>py</a:t>
-            </a:r>
-            <a:r>
-              <a:rPr lang="en-GB" dirty="0"/>
-              <a:t> file as a .</a:t>
-            </a:r>
-            <a:r>
-              <a:rPr lang="en-GB" dirty="0" err="1"/>
-              <a:t>py</a:t>
-            </a:r>
-            <a:r>
-              <a:rPr lang="en-GB" dirty="0"/>
-              <a:t> file must be interpreted directly from the inefficient human-readable source code as the code execution progresses However, the flag “-B” suppresses the creation of the .</a:t>
-            </a:r>
-            <a:r>
-              <a:rPr lang="en-GB" dirty="0" err="1"/>
-              <a:t>pyc</a:t>
-            </a:r>
-            <a:r>
-              <a:rPr lang="en-GB" dirty="0"/>
-              <a:t> file, instead forcing the code to be run directly from the .</a:t>
-            </a:r>
-            <a:r>
-              <a:rPr lang="en-GB" dirty="0" err="1"/>
-              <a:t>py</a:t>
-            </a:r>
-            <a:r>
-              <a:rPr lang="en-GB" dirty="0"/>
-              <a:t> file.</a:t>
-            </a:r>
-          </a:p>
-          <a:p>
-            <a:endParaRPr lang="en-GB" dirty="0"/>
-          </a:p>
-          <a:p>
-            <a:r>
-              <a:rPr lang="en-GB" dirty="0"/>
-              <a:t>Demonstration: Change Directory into Examples/Flags. Type “python –B main_file.py”. Note the code will run without producing any .</a:t>
-            </a:r>
-            <a:r>
-              <a:rPr lang="en-GB" dirty="0" err="1"/>
-              <a:t>pyc</a:t>
-            </a:r>
-            <a:r>
-              <a:rPr lang="en-GB" dirty="0"/>
-              <a:t> files (the code will </a:t>
-            </a:r>
-            <a:r>
-              <a:rPr lang="en-GB" dirty="0" err="1"/>
-              <a:t>en</a:t>
-            </a:r>
-            <a:r>
-              <a:rPr lang="en-GB" dirty="0"/>
-              <a:t> with an error, but don’t worry about this right now). Now type “python main_file.py”. Note a folder named “__</a:t>
-            </a:r>
-            <a:r>
-              <a:rPr lang="en-GB" dirty="0" err="1"/>
-              <a:t>pycache</a:t>
-            </a:r>
-            <a:r>
-              <a:rPr lang="en-GB" dirty="0"/>
-              <a:t>__” will be created, containing a .</a:t>
-            </a:r>
-            <a:r>
-              <a:rPr lang="en-GB" dirty="0" err="1"/>
-              <a:t>pyc</a:t>
-            </a:r>
-            <a:r>
-              <a:rPr lang="en-GB" dirty="0"/>
-              <a:t> file relating to the quadratic.py file, which was imported from main_file.py.</a:t>
-            </a:r>
-          </a:p>
-          <a:p>
-            <a:endParaRPr lang="en-GB" dirty="0"/>
-          </a:p>
-          <a:p>
-            <a:r>
-              <a:rPr lang="en-GB" dirty="0"/>
-              <a:t>When we ran the code before, it ended with an error as the assert statement on line 3 of quadratic.py was violated as x is less tan zero in </a:t>
-            </a:r>
-            <a:r>
-              <a:rPr lang="en-GB" dirty="0" err="1"/>
-              <a:t>th</a:t>
-            </a:r>
-            <a:r>
-              <a:rPr lang="en-GB" dirty="0"/>
-              <a:t> second call to quadratic in main_file.py. Assert statements like this can be useful when developing a code or for checking user inputs. They are included by writing the word “assert” then a bool expression in parentheses. If this expression is True, the code will progress, but if it is False, an </a:t>
-            </a:r>
-            <a:r>
-              <a:rPr lang="en-GB" dirty="0" err="1"/>
-              <a:t>AssertionError</a:t>
-            </a:r>
-            <a:r>
-              <a:rPr lang="en-GB" dirty="0"/>
-              <a:t> will be </a:t>
-            </a:r>
-            <a:r>
-              <a:rPr lang="en-GB"/>
-              <a:t>raised. However</a:t>
-            </a:r>
-            <a:r>
-              <a:rPr lang="en-GB" dirty="0"/>
-              <a:t>, they can be suppressed with the –O flag, which prevents assert statements and some other non-vital statements from being executed.</a:t>
-            </a:r>
-          </a:p>
-          <a:p>
-            <a:endParaRPr lang="en-GB" dirty="0"/>
-          </a:p>
-          <a:p>
-            <a:r>
-              <a:rPr lang="en-GB" dirty="0"/>
-              <a:t>Demonstration: Type “python –O main_file.py”. Note the file executed without the </a:t>
-            </a:r>
-            <a:r>
-              <a:rPr lang="en-GB" dirty="0" err="1"/>
-              <a:t>AssertionError</a:t>
-            </a:r>
-            <a:r>
-              <a:rPr lang="en-GB" dirty="0"/>
-              <a:t> being raised and causing the code to end in a error.</a:t>
-            </a:r>
-          </a:p>
-          <a:p>
-            <a:endParaRPr lang="en-GB" dirty="0"/>
-          </a:p>
-          <a:p>
-            <a:r>
-              <a:rPr lang="en-GB" dirty="0"/>
-              <a:t>Python normally does a lot of stuff silently behind the scenes when it is run. Adding the “-v” flag causes Python to print a log documenting many of these behind-the-scenes actions. This is normally most useful when something has gone wrong with the Python environment and more information on exactly what step goes wrong is helpful for debugging it and fixing it.</a:t>
-            </a:r>
-          </a:p>
-          <a:p>
-            <a:endParaRPr lang="en-GB" dirty="0"/>
-          </a:p>
-          <a:p>
-            <a:pPr marL="0" marR="0" lvl="0" indent="0" algn="l" defTabSz="914400" rtl="0" eaLnBrk="1" fontAlgn="auto" latinLnBrk="0" hangingPunct="1">
-              <a:lnSpc>
-                <a:spcPct val="100000"/>
-              </a:lnSpc>
-              <a:spcBef>
-                <a:spcPts val="0"/>
-              </a:spcBef>
-              <a:spcAft>
-                <a:spcPts val="0"/>
-              </a:spcAft>
-              <a:buClrTx/>
-              <a:buSzTx/>
-              <a:buFontTx/>
-              <a:buNone/>
-              <a:tabLst/>
-              <a:defRPr/>
-            </a:pPr>
-            <a:r>
-              <a:rPr lang="en-GB" dirty="0"/>
-              <a:t>Demonstration: Type “python –v main_file.py”. Note the extra information appearing in the terminal.</a:t>
-            </a:r>
-          </a:p>
-          <a:p>
-            <a:endParaRPr lang="en-GB" dirty="0"/>
+              <a:t>Demonstration: Within VS Code, create a new terminal (if one isn’t open already) by clicking “Terminal&gt;New Terminal”. If necessary write “cd Exercise/Command Line”. Write “python file_1.py” to run the script.</a:t>
+            </a:r>
           </a:p>
         </p:txBody>
       </p:sp>
@@ -3230,7 +3291,7 @@
           <a:p>
             <a:fld id="{6A641EC8-C9F8-4A58-A1A7-F7D817526EEC}" type="slidenum">
               <a:rPr lang="en-GB" smtClean="0"/>
-              <a:t>26</a:t>
+              <a:t>23</a:t>
             </a:fld>
             <a:endParaRPr lang="en-GB"/>
           </a:p>
@@ -3239,7 +3300,7 @@
     </p:spTree>
     <p:extLst>
       <p:ext uri="{BB962C8B-B14F-4D97-AF65-F5344CB8AC3E}">
-        <p14:creationId xmlns:p14="http://schemas.microsoft.com/office/powerpoint/2010/main" val="2213957797"/>
+        <p14:creationId xmlns:p14="http://schemas.microsoft.com/office/powerpoint/2010/main" val="2324684938"/>
       </p:ext>
     </p:extLst>
   </p:cSld>
@@ -3295,88 +3356,21 @@
           <a:p>
             <a:r>
               <a:rPr lang="en-GB" dirty="0"/>
-              <a:t>Another example of a flag is the “-m” flag which is used to run code from an installed module whose name follows the “-m”. One particularly useful example is the “</a:t>
-            </a:r>
-            <a:r>
-              <a:rPr lang="en-GB" dirty="0" err="1"/>
-              <a:t>unittest</a:t>
+              <a:t>Demonstration: Run Examples/Command Line/python file_1.py and observe the name of __name__ printed is “__main__”. Run Examples/Command Line/python file_2.py and observe file_1.py now has the name “file_1</a:t>
+            </a:r>
+            <a:r>
+              <a:rPr lang="en-GB"/>
+              <a:t>” and </a:t>
             </a:r>
             <a:r>
               <a:rPr lang="en-GB" dirty="0"/>
-              <a:t>” module, which allows pre-written tests to be automatically executed. This is an example of the vital software development practice of unit-testing, which allows continuous checking of whether a code is behaving as intended as it is developed. This becomes more and more useful as codes become bigger and more developers are involved.</a:t>
-            </a:r>
-          </a:p>
-          <a:p>
+              <a:t>file_2.py has </a:t>
+            </a:r>
+            <a:r>
+              <a:rPr lang="en-GB"/>
+              <a:t>the name “__main__”.</a:t>
+            </a:r>
             <a:endParaRPr lang="en-GB" dirty="0"/>
-          </a:p>
-          <a:p>
-            <a:r>
-              <a:rPr lang="en-GB" dirty="0"/>
-              <a:t>We’re not going to dwell on the exact implementation details of the unit tests using the </a:t>
-            </a:r>
-            <a:r>
-              <a:rPr lang="en-GB" dirty="0" err="1"/>
-              <a:t>unittest</a:t>
-            </a:r>
-            <a:r>
-              <a:rPr lang="en-GB" dirty="0"/>
-              <a:t> module. Instead, we have a relatively simple example in the “Examples/Unit testing” directory. hypotenuse.py contains a piece of code designed to calculate the hypotenuse of a right-angled triangle given the lengths of the other two sides. test_hypotenuse.py contains a series of tests designed to test the code works as intended. We can activate the </a:t>
-            </a:r>
-            <a:r>
-              <a:rPr lang="en-GB" dirty="0" err="1"/>
-              <a:t>unittest</a:t>
-            </a:r>
-            <a:r>
-              <a:rPr lang="en-GB" dirty="0"/>
-              <a:t> module by writing “</a:t>
-            </a:r>
-            <a:r>
-              <a:rPr lang="en-GB" sz="1200" dirty="0">
-                <a:latin typeface="Courier New" panose="02070309020205020404" pitchFamily="49" charset="0"/>
-                <a:cs typeface="Courier New" panose="02070309020205020404" pitchFamily="49" charset="0"/>
-              </a:rPr>
-              <a:t>python –m </a:t>
-            </a:r>
-            <a:r>
-              <a:rPr lang="en-GB" sz="1200" dirty="0" err="1">
-                <a:latin typeface="Courier New" panose="02070309020205020404" pitchFamily="49" charset="0"/>
-                <a:cs typeface="Courier New" panose="02070309020205020404" pitchFamily="49" charset="0"/>
-              </a:rPr>
-              <a:t>unittest</a:t>
-            </a:r>
-            <a:r>
-              <a:rPr lang="en-GB" sz="1200" dirty="0">
-                <a:latin typeface="Courier New" panose="02070309020205020404" pitchFamily="49" charset="0"/>
-                <a:cs typeface="Courier New" panose="02070309020205020404" pitchFamily="49" charset="0"/>
-              </a:rPr>
-              <a:t>” followed by the name of the script the tests are contained in – in this case “test_hypotenuse.py”.</a:t>
-            </a:r>
-            <a:endParaRPr lang="en-GB" dirty="0"/>
-          </a:p>
-          <a:p>
-            <a:endParaRPr lang="en-GB" dirty="0"/>
-          </a:p>
-          <a:p>
-            <a:r>
-              <a:rPr lang="en-GB" dirty="0"/>
-              <a:t>Demonstration: Change directory into “Examples/Unit testing” Type “python –m </a:t>
-            </a:r>
-            <a:r>
-              <a:rPr lang="en-GB" dirty="0" err="1"/>
-              <a:t>unittest</a:t>
-            </a:r>
-            <a:r>
-              <a:rPr lang="en-GB" dirty="0"/>
-              <a:t> test_hypotenuse.py”. You should see 4 tests have been run. One of them “</a:t>
-            </a:r>
-            <a:r>
-              <a:rPr lang="en-GB" dirty="0" err="1"/>
-              <a:t>test_negative_b</a:t>
-            </a:r>
-            <a:r>
-              <a:rPr lang="en-GB" dirty="0"/>
-              <a:t>” failed. Look in test_hypotenuse.py to see what this test is for. Then check hypotenuse.py to see what needs to be changed to fix it.</a:t>
-            </a:r>
           </a:p>
         </p:txBody>
       </p:sp>
@@ -3397,7 +3391,7 @@
           <a:p>
             <a:fld id="{6A641EC8-C9F8-4A58-A1A7-F7D817526EEC}" type="slidenum">
               <a:rPr lang="en-GB" smtClean="0"/>
-              <a:t>27</a:t>
+              <a:t>24</a:t>
             </a:fld>
             <a:endParaRPr lang="en-GB"/>
           </a:p>
@@ -3406,7 +3400,7 @@
     </p:spTree>
     <p:extLst>
       <p:ext uri="{BB962C8B-B14F-4D97-AF65-F5344CB8AC3E}">
-        <p14:creationId xmlns:p14="http://schemas.microsoft.com/office/powerpoint/2010/main" val="3550059089"/>
+        <p14:creationId xmlns:p14="http://schemas.microsoft.com/office/powerpoint/2010/main" val="3234088912"/>
       </p:ext>
     </p:extLst>
   </p:cSld>
@@ -3460,44 +3454,30 @@
           <a:bodyPr/>
           <a:lstStyle/>
           <a:p>
+            <a:pPr marL="0" marR="0" lvl="0" indent="0" algn="l" defTabSz="914400" rtl="0" eaLnBrk="1" fontAlgn="auto" latinLnBrk="0" hangingPunct="1">
+              <a:lnSpc>
+                <a:spcPct val="100000"/>
+              </a:lnSpc>
+              <a:spcBef>
+                <a:spcPts val="0"/>
+              </a:spcBef>
+              <a:spcAft>
+                <a:spcPts val="0"/>
+              </a:spcAft>
+              <a:buClrTx/>
+              <a:buSzTx/>
+              <a:buFontTx/>
+              <a:buNone/>
+              <a:tabLst/>
+              <a:defRPr/>
+            </a:pPr>
             <a:r>
               <a:rPr lang="en-GB" dirty="0"/>
-              <a:t>Like many programs, Python produced two types of output. </a:t>
-            </a:r>
-            <a:r>
-              <a:rPr lang="en-GB" dirty="0" err="1"/>
-              <a:t>Stdout</a:t>
-            </a:r>
-            <a:r>
-              <a:rPr lang="en-GB" dirty="0"/>
-              <a:t> (standard output) is the output produced by print statements and other normal pieces of code. Stderr (standard error) is produced by errors, such as exception messages. If we’re running Python from the terminal, these two types of messages will both be printed in the terminal. However, sometimes, we want to store this output. Perhaps we’re running code on a remote machine, such as a HPC and we want to guarantee the output is available after the terminal session is closed. Perhaps we want to be able to search a large output for a particular string and this is easier done in a file than a terminal.</a:t>
+              <a:t>No additional notes.</a:t>
             </a:r>
           </a:p>
           <a:p>
             <a:endParaRPr lang="en-GB" dirty="0"/>
-          </a:p>
-          <a:p>
-            <a:r>
-              <a:rPr lang="en-GB" dirty="0"/>
-              <a:t>We can redirect </a:t>
-            </a:r>
-            <a:r>
-              <a:rPr lang="en-GB" dirty="0" err="1"/>
-              <a:t>stdout</a:t>
-            </a:r>
-            <a:r>
-              <a:rPr lang="en-GB" dirty="0"/>
-              <a:t> by writing “&gt;” then the name of the file to hold the output at the end of the command. We can redirect stderr by writing “2&gt;” then the name of the filename to hold the output at the end of the command. We may use neither, either or both of these commands.</a:t>
-            </a:r>
-          </a:p>
-          <a:p>
-            <a:endParaRPr lang="en-GB" dirty="0"/>
-          </a:p>
-          <a:p>
-            <a:r>
-              <a:rPr lang="en-GB" dirty="0"/>
-              <a:t>Demonstration: Change directory into “Examples/Redirection”. Type “python redirection.py” to run the code with no redirection. Note the output appears in the terminal. Now type “python redirection.py &gt;out.txt 2&gt;err.txt”. Note the terminal doesn’t show the output anymore and it is instead recorded in out.txt and err.txt.</a:t>
-            </a:r>
           </a:p>
         </p:txBody>
       </p:sp>
@@ -3518,7 +3498,7 @@
           <a:p>
             <a:fld id="{6A641EC8-C9F8-4A58-A1A7-F7D817526EEC}" type="slidenum">
               <a:rPr lang="en-GB" smtClean="0"/>
-              <a:t>28</a:t>
+              <a:t>25</a:t>
             </a:fld>
             <a:endParaRPr lang="en-GB"/>
           </a:p>
@@ -3527,7 +3507,7 @@
     </p:spTree>
     <p:extLst>
       <p:ext uri="{BB962C8B-B14F-4D97-AF65-F5344CB8AC3E}">
-        <p14:creationId xmlns:p14="http://schemas.microsoft.com/office/powerpoint/2010/main" val="3439239164"/>
+        <p14:creationId xmlns:p14="http://schemas.microsoft.com/office/powerpoint/2010/main" val="2639569105"/>
       </p:ext>
     </p:extLst>
   </p:cSld>
@@ -3581,6 +3561,196 @@
           <a:bodyPr/>
           <a:lstStyle/>
           <a:p>
+            <a:r>
+              <a:rPr lang="en-GB" dirty="0"/>
+              <a:t>The idea of “flags” is common to many programs and Python is no exception. After writing the name of the program (in this case “python”) on the command line this can be followed by a series of words which modify how the program is run. Like many programs, in Python, this is in the form a hyphen followed by one or more letters. Multiple flags can be provided in a single invocation of Python by separating them with spaces.</a:t>
+            </a:r>
+          </a:p>
+          <a:p>
+            <a:endParaRPr lang="en-GB" dirty="0"/>
+          </a:p>
+          <a:p>
+            <a:r>
+              <a:rPr lang="en-GB" dirty="0"/>
+              <a:t>The fact of flags are often niche in usage and useful for more advanced users, but we’re going to run through a few more accessible ones to demonstrate the concept.</a:t>
+            </a:r>
+          </a:p>
+          <a:p>
+            <a:endParaRPr lang="en-GB" dirty="0"/>
+          </a:p>
+          <a:p>
+            <a:r>
+              <a:rPr lang="en-GB" dirty="0"/>
+              <a:t>Normally, when Python imports a file, it will compile into a bytecode file with the extension .</a:t>
+            </a:r>
+            <a:r>
+              <a:rPr lang="en-GB" dirty="0" err="1"/>
+              <a:t>pyc</a:t>
+            </a:r>
+            <a:r>
+              <a:rPr lang="en-GB" dirty="0"/>
+              <a:t> if this hasn’t already been done. Code from a .</a:t>
+            </a:r>
+            <a:r>
+              <a:rPr lang="en-GB" dirty="0" err="1"/>
+              <a:t>pyc</a:t>
+            </a:r>
+            <a:r>
+              <a:rPr lang="en-GB" dirty="0"/>
+              <a:t> file can be run faster than code from a .</a:t>
+            </a:r>
+            <a:r>
+              <a:rPr lang="en-GB" dirty="0" err="1"/>
+              <a:t>py</a:t>
+            </a:r>
+            <a:r>
+              <a:rPr lang="en-GB" dirty="0"/>
+              <a:t> file as a .</a:t>
+            </a:r>
+            <a:r>
+              <a:rPr lang="en-GB" dirty="0" err="1"/>
+              <a:t>py</a:t>
+            </a:r>
+            <a:r>
+              <a:rPr lang="en-GB" dirty="0"/>
+              <a:t> file must be interpreted directly from the inefficient human-readable source code as the code execution progresses However, the flag “-B” suppresses the creation of the .</a:t>
+            </a:r>
+            <a:r>
+              <a:rPr lang="en-GB" dirty="0" err="1"/>
+              <a:t>pyc</a:t>
+            </a:r>
+            <a:r>
+              <a:rPr lang="en-GB" dirty="0"/>
+              <a:t> file, instead forcing the code to be run directly from the .</a:t>
+            </a:r>
+            <a:r>
+              <a:rPr lang="en-GB" dirty="0" err="1"/>
+              <a:t>py</a:t>
+            </a:r>
+            <a:r>
+              <a:rPr lang="en-GB" dirty="0"/>
+              <a:t> file.</a:t>
+            </a:r>
+          </a:p>
+          <a:p>
+            <a:endParaRPr lang="en-GB" dirty="0"/>
+          </a:p>
+          <a:p>
+            <a:r>
+              <a:rPr lang="en-GB" dirty="0"/>
+              <a:t>Demonstration: Change Directory into Examples/Flags. Type “python –B main_file.py”. Note the code will run without producing any .</a:t>
+            </a:r>
+            <a:r>
+              <a:rPr lang="en-GB" dirty="0" err="1"/>
+              <a:t>pyc</a:t>
+            </a:r>
+            <a:r>
+              <a:rPr lang="en-GB" dirty="0"/>
+              <a:t> files (the code will </a:t>
+            </a:r>
+            <a:r>
+              <a:rPr lang="en-GB" dirty="0" err="1"/>
+              <a:t>en</a:t>
+            </a:r>
+            <a:r>
+              <a:rPr lang="en-GB" dirty="0"/>
+              <a:t> with an error, but don’t worry about this right now). Now type “python main_file.py”. Note a folder named “__</a:t>
+            </a:r>
+            <a:r>
+              <a:rPr lang="en-GB" dirty="0" err="1"/>
+              <a:t>pycache</a:t>
+            </a:r>
+            <a:r>
+              <a:rPr lang="en-GB" dirty="0"/>
+              <a:t>__” will be created, containing a .</a:t>
+            </a:r>
+            <a:r>
+              <a:rPr lang="en-GB" dirty="0" err="1"/>
+              <a:t>pyc</a:t>
+            </a:r>
+            <a:r>
+              <a:rPr lang="en-GB" dirty="0"/>
+              <a:t> file relating to the quadratic.py file, which was imported from main_file.py.</a:t>
+            </a:r>
+          </a:p>
+          <a:p>
+            <a:endParaRPr lang="en-GB" dirty="0"/>
+          </a:p>
+          <a:p>
+            <a:r>
+              <a:rPr lang="en-GB" dirty="0"/>
+              <a:t>When we ran the code before, it ended with an error as the assert statement on line 3 of quadratic.py was violated as x is less tan zero in </a:t>
+            </a:r>
+            <a:r>
+              <a:rPr lang="en-GB" dirty="0" err="1"/>
+              <a:t>th</a:t>
+            </a:r>
+            <a:r>
+              <a:rPr lang="en-GB" dirty="0"/>
+              <a:t> second call to quadratic in main_file.py. Assert statements like this can be useful when developing a code or for checking user inputs. They are included by writing the word “assert” then a bool expression in parentheses. If this expression is True, the code will progress, but if it is False, an </a:t>
+            </a:r>
+            <a:r>
+              <a:rPr lang="en-GB" dirty="0" err="1"/>
+              <a:t>AssertionError</a:t>
+            </a:r>
+            <a:r>
+              <a:rPr lang="en-GB" dirty="0"/>
+              <a:t> will be raised. However, they can be suppressed with the –O flag, which prevents assert statements and some other non-vital statements from being executed.</a:t>
+            </a:r>
+          </a:p>
+          <a:p>
+            <a:endParaRPr lang="en-GB" dirty="0"/>
+          </a:p>
+          <a:p>
+            <a:r>
+              <a:rPr lang="en-GB" dirty="0"/>
+              <a:t>Demonstration: Type “python –O main_file.py”. Note the file executed without the </a:t>
+            </a:r>
+            <a:r>
+              <a:rPr lang="en-GB" dirty="0" err="1"/>
+              <a:t>AssertionError</a:t>
+            </a:r>
+            <a:r>
+              <a:rPr lang="en-GB" dirty="0"/>
+              <a:t> being raised and causing the code to end in a error.</a:t>
+            </a:r>
+          </a:p>
+          <a:p>
+            <a:endParaRPr lang="en-GB" dirty="0"/>
+          </a:p>
+          <a:p>
+            <a:r>
+              <a:rPr lang="en-GB" dirty="0"/>
+              <a:t>Python normally does a lot of stuff silently behind the scenes when it is run. Adding the “-v” flag causes Python to print a log documenting many of these behind-the-scenes actions. This is normally most useful when something has gone wrong with the Python environment and more information on exactly what step goes wrong is helpful for debugging it and fixing it.</a:t>
+            </a:r>
+          </a:p>
+          <a:p>
+            <a:endParaRPr lang="en-GB" dirty="0"/>
+          </a:p>
+          <a:p>
+            <a:pPr marL="0" marR="0" lvl="0" indent="0" algn="l" defTabSz="914400" rtl="0" eaLnBrk="1" fontAlgn="auto" latinLnBrk="0" hangingPunct="1">
+              <a:lnSpc>
+                <a:spcPct val="100000"/>
+              </a:lnSpc>
+              <a:spcBef>
+                <a:spcPts val="0"/>
+              </a:spcBef>
+              <a:spcAft>
+                <a:spcPts val="0"/>
+              </a:spcAft>
+              <a:buClrTx/>
+              <a:buSzTx/>
+              <a:buFontTx/>
+              <a:buNone/>
+              <a:tabLst/>
+              <a:defRPr/>
+            </a:pPr>
+            <a:r>
+              <a:rPr lang="en-GB" dirty="0"/>
+              <a:t>Demonstration: Type “python –v main_file.py”. Note the extra information appearing in the terminal.</a:t>
+            </a:r>
+          </a:p>
+          <a:p>
             <a:endParaRPr lang="en-GB" dirty="0"/>
           </a:p>
         </p:txBody>
@@ -3602,7 +3772,7 @@
           <a:p>
             <a:fld id="{6A641EC8-C9F8-4A58-A1A7-F7D817526EEC}" type="slidenum">
               <a:rPr lang="en-GB" smtClean="0"/>
-              <a:t>29</a:t>
+              <a:t>26</a:t>
             </a:fld>
             <a:endParaRPr lang="en-GB"/>
           </a:p>
@@ -3611,7 +3781,7 @@
     </p:spTree>
     <p:extLst>
       <p:ext uri="{BB962C8B-B14F-4D97-AF65-F5344CB8AC3E}">
-        <p14:creationId xmlns:p14="http://schemas.microsoft.com/office/powerpoint/2010/main" val="3757685623"/>
+        <p14:creationId xmlns:p14="http://schemas.microsoft.com/office/powerpoint/2010/main" val="2213957797"/>
       </p:ext>
     </p:extLst>
   </p:cSld>
@@ -3665,7 +3835,90 @@
           <a:bodyPr/>
           <a:lstStyle/>
           <a:p>
+            <a:r>
+              <a:rPr lang="en-GB" dirty="0"/>
+              <a:t>Another example of a flag is the “-m” flag which is used to run code from an installed module whose name follows the “-m”. One particularly useful example is the “</a:t>
+            </a:r>
+            <a:r>
+              <a:rPr lang="en-GB" dirty="0" err="1"/>
+              <a:t>unittest</a:t>
+            </a:r>
+            <a:r>
+              <a:rPr lang="en-GB" dirty="0"/>
+              <a:t>” module, which allows pre-written tests to be automatically executed. This is an example of the vital software development practice of unit-testing, which allows continuous checking of whether a code is behaving as intended as it is developed. This becomes more and more useful as codes become bigger and more developers are involved.</a:t>
+            </a:r>
+          </a:p>
+          <a:p>
             <a:endParaRPr lang="en-GB" dirty="0"/>
+          </a:p>
+          <a:p>
+            <a:r>
+              <a:rPr lang="en-GB" dirty="0"/>
+              <a:t>We’re not going to dwell on the exact implementation details of the unit tests using the </a:t>
+            </a:r>
+            <a:r>
+              <a:rPr lang="en-GB" dirty="0" err="1"/>
+              <a:t>unittest</a:t>
+            </a:r>
+            <a:r>
+              <a:rPr lang="en-GB" dirty="0"/>
+              <a:t> module. Instead, we have a relatively simple example in the “Examples/Unit testing” directory. hypotenuse.py contains a piece of code designed to calculate the hypotenuse of a right-angled triangle given the lengths of the other two sides. test_hypotenuse.py contains a series of tests designed to test the code works as intended. We can activate the </a:t>
+            </a:r>
+            <a:r>
+              <a:rPr lang="en-GB" dirty="0" err="1"/>
+              <a:t>unittest</a:t>
+            </a:r>
+            <a:r>
+              <a:rPr lang="en-GB" dirty="0"/>
+              <a:t> module by writing “</a:t>
+            </a:r>
+            <a:r>
+              <a:rPr lang="en-GB" sz="1200" dirty="0">
+                <a:latin typeface="Courier New" panose="02070309020205020404" pitchFamily="49" charset="0"/>
+                <a:cs typeface="Courier New" panose="02070309020205020404" pitchFamily="49" charset="0"/>
+              </a:rPr>
+              <a:t>python –m </a:t>
+            </a:r>
+            <a:r>
+              <a:rPr lang="en-GB" sz="1200" dirty="0" err="1">
+                <a:latin typeface="Courier New" panose="02070309020205020404" pitchFamily="49" charset="0"/>
+                <a:cs typeface="Courier New" panose="02070309020205020404" pitchFamily="49" charset="0"/>
+              </a:rPr>
+              <a:t>unittest</a:t>
+            </a:r>
+            <a:r>
+              <a:rPr lang="en-GB" sz="1200" dirty="0">
+                <a:latin typeface="Courier New" panose="02070309020205020404" pitchFamily="49" charset="0"/>
+                <a:cs typeface="Courier New" panose="02070309020205020404" pitchFamily="49" charset="0"/>
+              </a:rPr>
+              <a:t>” followed by the name of the script the tests are contained in – in this case “test_hypotenuse.py”.</a:t>
+            </a:r>
+            <a:endParaRPr lang="en-GB" dirty="0"/>
+          </a:p>
+          <a:p>
+            <a:endParaRPr lang="en-GB" dirty="0"/>
+          </a:p>
+          <a:p>
+            <a:r>
+              <a:rPr lang="en-GB" dirty="0"/>
+              <a:t>Demonstration: Change directory into “Examples/Unit testing” Type “python –m </a:t>
+            </a:r>
+            <a:r>
+              <a:rPr lang="en-GB" dirty="0" err="1"/>
+              <a:t>unittest</a:t>
+            </a:r>
+            <a:r>
+              <a:rPr lang="en-GB" dirty="0"/>
+              <a:t> test_hypotenuse.py”. You should see 4 tests have been run. One of them “</a:t>
+            </a:r>
+            <a:r>
+              <a:rPr lang="en-GB" dirty="0" err="1"/>
+              <a:t>test_negative_b</a:t>
+            </a:r>
+            <a:r>
+              <a:rPr lang="en-GB" dirty="0"/>
+              <a:t>” failed. Look in test_hypotenuse.py to see what this test is for. Then check hypotenuse.py to see what needs to be changed to fix it.</a:t>
+            </a:r>
           </a:p>
         </p:txBody>
       </p:sp>
@@ -3686,7 +3939,7 @@
           <a:p>
             <a:fld id="{6A641EC8-C9F8-4A58-A1A7-F7D817526EEC}" type="slidenum">
               <a:rPr lang="en-GB" smtClean="0"/>
-              <a:t>30</a:t>
+              <a:t>27</a:t>
             </a:fld>
             <a:endParaRPr lang="en-GB"/>
           </a:p>
@@ -3695,7 +3948,7 @@
     </p:spTree>
     <p:extLst>
       <p:ext uri="{BB962C8B-B14F-4D97-AF65-F5344CB8AC3E}">
-        <p14:creationId xmlns:p14="http://schemas.microsoft.com/office/powerpoint/2010/main" val="459102031"/>
+        <p14:creationId xmlns:p14="http://schemas.microsoft.com/office/powerpoint/2010/main" val="3550059089"/>
       </p:ext>
     </p:extLst>
   </p:cSld>
@@ -3749,7 +4002,44 @@
           <a:bodyPr/>
           <a:lstStyle/>
           <a:p>
+            <a:r>
+              <a:rPr lang="en-GB" dirty="0"/>
+              <a:t>Like many programs, Python produced two types of output. </a:t>
+            </a:r>
+            <a:r>
+              <a:rPr lang="en-GB" dirty="0" err="1"/>
+              <a:t>Stdout</a:t>
+            </a:r>
+            <a:r>
+              <a:rPr lang="en-GB" dirty="0"/>
+              <a:t> (standard output) is the output produced by print statements and other normal pieces of code. Stderr (standard error) is produced by errors, such as exception messages. If we’re running Python from the terminal, these two types of messages will both be printed in the terminal. However, sometimes, we want to store this output. Perhaps we’re running code on a remote machine, such as a HPC and we want to guarantee the output is available after the terminal session is closed. Perhaps we want to be able to search a large output for a particular string and this is easier done in a file than a terminal.</a:t>
+            </a:r>
+          </a:p>
+          <a:p>
             <a:endParaRPr lang="en-GB" dirty="0"/>
+          </a:p>
+          <a:p>
+            <a:r>
+              <a:rPr lang="en-GB" dirty="0"/>
+              <a:t>We can redirect </a:t>
+            </a:r>
+            <a:r>
+              <a:rPr lang="en-GB" dirty="0" err="1"/>
+              <a:t>stdout</a:t>
+            </a:r>
+            <a:r>
+              <a:rPr lang="en-GB" dirty="0"/>
+              <a:t> by writing “&gt;” then the name of the file to hold the output at the end of the command. We can redirect stderr by writing “2&gt;” then the name of the filename to hold the output at the end of the command. We may use neither, either or both of these commands.</a:t>
+            </a:r>
+          </a:p>
+          <a:p>
+            <a:endParaRPr lang="en-GB" dirty="0"/>
+          </a:p>
+          <a:p>
+            <a:r>
+              <a:rPr lang="en-GB" dirty="0"/>
+              <a:t>Demonstration: Change directory into “Examples/Redirection”. Type “python redirection.py” to run the code with no redirection. Note the output appears in the terminal. Now type “python redirection.py &gt;out.txt 2&gt;err.txt”. Note the terminal doesn’t show the output anymore and it is instead recorded in out.txt and err.txt.</a:t>
+            </a:r>
           </a:p>
         </p:txBody>
       </p:sp>
@@ -3770,7 +4060,7 @@
           <a:p>
             <a:fld id="{6A641EC8-C9F8-4A58-A1A7-F7D817526EEC}" type="slidenum">
               <a:rPr lang="en-GB" smtClean="0"/>
-              <a:t>31</a:t>
+              <a:t>28</a:t>
             </a:fld>
             <a:endParaRPr lang="en-GB"/>
           </a:p>
@@ -3779,7 +4069,7 @@
     </p:spTree>
     <p:extLst>
       <p:ext uri="{BB962C8B-B14F-4D97-AF65-F5344CB8AC3E}">
-        <p14:creationId xmlns:p14="http://schemas.microsoft.com/office/powerpoint/2010/main" val="3856228538"/>
+        <p14:creationId xmlns:p14="http://schemas.microsoft.com/office/powerpoint/2010/main" val="3439239164"/>
       </p:ext>
     </p:extLst>
   </p:cSld>
@@ -3833,7 +4123,18 @@
           <a:bodyPr/>
           <a:lstStyle/>
           <a:p>
-            <a:endParaRPr lang="en-GB" dirty="0"/>
+            <a:r>
+              <a:rPr lang="en-GB" dirty="0"/>
+              <a:t>Sample solution found in “Exercise Sample Solutions/Asserts and Redirection”. To run the .</a:t>
+            </a:r>
+            <a:r>
+              <a:rPr lang="en-GB" dirty="0" err="1"/>
+              <a:t>py</a:t>
+            </a:r>
+            <a:r>
+              <a:rPr lang="en-GB" dirty="0"/>
+              <a:t> file with the assert statement active, use “python file1.py”. To run it without the assert statement being active, use “python –O file1.py”. </a:t>
+            </a:r>
           </a:p>
         </p:txBody>
       </p:sp>
@@ -3854,7 +4155,7 @@
           <a:p>
             <a:fld id="{6A641EC8-C9F8-4A58-A1A7-F7D817526EEC}" type="slidenum">
               <a:rPr lang="en-GB" smtClean="0"/>
-              <a:t>32</a:t>
+              <a:t>29</a:t>
             </a:fld>
             <a:endParaRPr lang="en-GB"/>
           </a:p>
@@ -3863,7 +4164,7 @@
     </p:spTree>
     <p:extLst>
       <p:ext uri="{BB962C8B-B14F-4D97-AF65-F5344CB8AC3E}">
-        <p14:creationId xmlns:p14="http://schemas.microsoft.com/office/powerpoint/2010/main" val="573271477"/>
+        <p14:creationId xmlns:p14="http://schemas.microsoft.com/office/powerpoint/2010/main" val="3757685623"/>
       </p:ext>
     </p:extLst>
   </p:cSld>
@@ -3917,27 +4218,26 @@
           <a:bodyPr/>
           <a:lstStyle/>
           <a:p>
+            <a:pPr marL="0" marR="0" lvl="0" indent="0" algn="l" defTabSz="914400" rtl="0" eaLnBrk="1" fontAlgn="auto" latinLnBrk="0" hangingPunct="1">
+              <a:lnSpc>
+                <a:spcPct val="100000"/>
+              </a:lnSpc>
+              <a:spcBef>
+                <a:spcPts val="0"/>
+              </a:spcBef>
+              <a:spcAft>
+                <a:spcPts val="0"/>
+              </a:spcAft>
+              <a:buClrTx/>
+              <a:buSzTx/>
+              <a:buFontTx/>
+              <a:buNone/>
+              <a:tabLst/>
+              <a:defRPr/>
+            </a:pPr>
             <a:r>
               <a:rPr lang="en-GB" dirty="0"/>
-              <a:t>You can install a version of Python on your computer. This can be a standalone Python program, or installed and managed by another program such as Anaconda. A specific instance of Python is known as an installation and you may have multiple installations of Python on your computer at once. Each installation will be a particular version of Python such as 3.9 or 2.7. Successive versions of Python have added more functionality. You can see what version of Python is currently active in your system by typing “python –version”. </a:t>
-            </a:r>
-          </a:p>
-          <a:p>
-            <a:endParaRPr lang="en-GB" dirty="0"/>
-          </a:p>
-          <a:p>
-            <a:r>
-              <a:rPr lang="en-GB" dirty="0"/>
-              <a:t>Python 2 and Python 3 are two major iterations of the Python language. Although Python 2 is still actively in use in some places, this is largely for legacy reasons. Python 3 is a well-established language and should be the one you use unless you have a good reason not to.</a:t>
-            </a:r>
-          </a:p>
-          <a:p>
-            <a:endParaRPr lang="en-GB" dirty="0"/>
-          </a:p>
-          <a:p>
-            <a:r>
-              <a:rPr lang="en-GB" dirty="0"/>
-              <a:t>A Python installation contains a Python interpreter which contains instructions for how Python source code should be interpreted according to the rules of the version of Python installed. It also contains a collection of libraries which contain what are known as “built-in” modules, such as the “math” module.</a:t>
+              <a:t>No additional notes.</a:t>
             </a:r>
           </a:p>
         </p:txBody>
@@ -3949,7 +4249,7 @@
             <a:spLocks noGrp="1"/>
           </p:cNvSpPr>
           <p:nvPr>
-            <p:ph type="sldNum" sz="quarter" idx="10"/>
+            <p:ph type="sldNum" sz="quarter" idx="5"/>
           </p:nvPr>
         </p:nvSpPr>
         <p:spPr/>
@@ -3957,9 +4257,9 @@
           <a:bodyPr/>
           <a:lstStyle/>
           <a:p>
-            <a:fld id="{6A641EC8-C9F8-4A58-A1A7-F7D817526EEC}" type="slidenum">
+            <a:fld id="{3AE2EC8F-0D0C-480E-9701-891381D03195}" type="slidenum">
               <a:rPr lang="en-GB" smtClean="0"/>
-              <a:t>6</a:t>
+              <a:t>3</a:t>
             </a:fld>
             <a:endParaRPr lang="en-GB"/>
           </a:p>
@@ -3968,7 +4268,7 @@
     </p:spTree>
     <p:extLst>
       <p:ext uri="{BB962C8B-B14F-4D97-AF65-F5344CB8AC3E}">
-        <p14:creationId xmlns:p14="http://schemas.microsoft.com/office/powerpoint/2010/main" val="1632070600"/>
+        <p14:creationId xmlns:p14="http://schemas.microsoft.com/office/powerpoint/2010/main" val="3091800649"/>
       </p:ext>
     </p:extLst>
   </p:cSld>
@@ -4022,7 +4322,10 @@
           <a:bodyPr/>
           <a:lstStyle/>
           <a:p>
-            <a:endParaRPr lang="en-GB" dirty="0"/>
+            <a:r>
+              <a:rPr lang="en-GB" dirty="0"/>
+              <a:t>No additional notes.</a:t>
+            </a:r>
           </a:p>
         </p:txBody>
       </p:sp>
@@ -4043,7 +4346,7 @@
           <a:p>
             <a:fld id="{6A641EC8-C9F8-4A58-A1A7-F7D817526EEC}" type="slidenum">
               <a:rPr lang="en-GB" smtClean="0"/>
-              <a:t>33</a:t>
+              <a:t>30</a:t>
             </a:fld>
             <a:endParaRPr lang="en-GB"/>
           </a:p>
@@ -4052,7 +4355,7 @@
     </p:spTree>
     <p:extLst>
       <p:ext uri="{BB962C8B-B14F-4D97-AF65-F5344CB8AC3E}">
-        <p14:creationId xmlns:p14="http://schemas.microsoft.com/office/powerpoint/2010/main" val="3909243973"/>
+        <p14:creationId xmlns:p14="http://schemas.microsoft.com/office/powerpoint/2010/main" val="459102031"/>
       </p:ext>
     </p:extLst>
   </p:cSld>
@@ -4106,6 +4409,29 @@
           <a:bodyPr/>
           <a:lstStyle/>
           <a:p>
+            <a:pPr marL="0" marR="0" lvl="0" indent="0" algn="l" defTabSz="914400" rtl="0" eaLnBrk="1" fontAlgn="auto" latinLnBrk="0" hangingPunct="1">
+              <a:lnSpc>
+                <a:spcPct val="100000"/>
+              </a:lnSpc>
+              <a:spcBef>
+                <a:spcPts val="0"/>
+              </a:spcBef>
+              <a:spcAft>
+                <a:spcPts val="0"/>
+              </a:spcAft>
+              <a:buClrTx/>
+              <a:buSzTx/>
+              <a:buFontTx/>
+              <a:buNone/>
+              <a:tabLst/>
+              <a:defRPr/>
+            </a:pPr>
+            <a:r>
+              <a:rPr lang="en-GB" dirty="0"/>
+              <a:t>No additional notes.</a:t>
+            </a:r>
+          </a:p>
+          <a:p>
             <a:endParaRPr lang="en-GB" dirty="0"/>
           </a:p>
         </p:txBody>
@@ -4127,7 +4453,7 @@
           <a:p>
             <a:fld id="{6A641EC8-C9F8-4A58-A1A7-F7D817526EEC}" type="slidenum">
               <a:rPr lang="en-GB" smtClean="0"/>
-              <a:t>34</a:t>
+              <a:t>31</a:t>
             </a:fld>
             <a:endParaRPr lang="en-GB"/>
           </a:p>
@@ -4136,7 +4462,7 @@
     </p:spTree>
     <p:extLst>
       <p:ext uri="{BB962C8B-B14F-4D97-AF65-F5344CB8AC3E}">
-        <p14:creationId xmlns:p14="http://schemas.microsoft.com/office/powerpoint/2010/main" val="2822767280"/>
+        <p14:creationId xmlns:p14="http://schemas.microsoft.com/office/powerpoint/2010/main" val="3856228538"/>
       </p:ext>
     </p:extLst>
   </p:cSld>
@@ -4190,7 +4516,19 @@
           <a:bodyPr/>
           <a:lstStyle/>
           <a:p>
+            <a:r>
+              <a:rPr lang="en-GB" dirty="0"/>
+              <a:t>Now you have a way to specify information to your program each time it is run, you might be tempted to do this every time. However, this interface quickly becomes unwieldy as the amount of information specified grows. For large amounts of information, using one or more input files which are read and interpreted by the code is a good solution. In general, input files are easier to edit that a long list of command line arguments and you can preserve input options to use in future runs. In fact, by specifying the path to the input file as a command line argument, you can have several input files for different problems and choose which one you want to use at run time. This is a common and powerful way to combine command line arguments and input files.</a:t>
+            </a:r>
+          </a:p>
+          <a:p>
             <a:endParaRPr lang="en-GB" dirty="0"/>
+          </a:p>
+          <a:p>
+            <a:r>
+              <a:rPr lang="en-GB" dirty="0"/>
+              <a:t>We’re not going to go into detail on how to open, read and parse files in this course, but it is worth bearing in mind as a valid alternative.</a:t>
+            </a:r>
           </a:p>
         </p:txBody>
       </p:sp>
@@ -4211,7 +4549,7 @@
           <a:p>
             <a:fld id="{6A641EC8-C9F8-4A58-A1A7-F7D817526EEC}" type="slidenum">
               <a:rPr lang="en-GB" smtClean="0"/>
-              <a:t>35</a:t>
+              <a:t>32</a:t>
             </a:fld>
             <a:endParaRPr lang="en-GB"/>
           </a:p>
@@ -4220,7 +4558,7 @@
     </p:spTree>
     <p:extLst>
       <p:ext uri="{BB962C8B-B14F-4D97-AF65-F5344CB8AC3E}">
-        <p14:creationId xmlns:p14="http://schemas.microsoft.com/office/powerpoint/2010/main" val="146435962"/>
+        <p14:creationId xmlns:p14="http://schemas.microsoft.com/office/powerpoint/2010/main" val="573271477"/>
       </p:ext>
     </p:extLst>
   </p:cSld>
@@ -4295,7 +4633,7 @@
           <a:p>
             <a:fld id="{6A641EC8-C9F8-4A58-A1A7-F7D817526EEC}" type="slidenum">
               <a:rPr lang="en-GB" smtClean="0"/>
-              <a:t>36</a:t>
+              <a:t>33</a:t>
             </a:fld>
             <a:endParaRPr lang="en-GB"/>
           </a:p>
@@ -4304,7 +4642,7 @@
     </p:spTree>
     <p:extLst>
       <p:ext uri="{BB962C8B-B14F-4D97-AF65-F5344CB8AC3E}">
-        <p14:creationId xmlns:p14="http://schemas.microsoft.com/office/powerpoint/2010/main" val="1977625569"/>
+        <p14:creationId xmlns:p14="http://schemas.microsoft.com/office/powerpoint/2010/main" val="3909243973"/>
       </p:ext>
     </p:extLst>
   </p:cSld>
@@ -4358,6 +4696,17 @@
           <a:bodyPr/>
           <a:lstStyle/>
           <a:p>
+            <a:r>
+              <a:rPr lang="en-GB" dirty="0"/>
+              <a:t>Sample solution in “Exercise Sample Solutions/Command Line Arguments/sample_solution.py”. It can be run with the command “python sample_solution.py </a:t>
+            </a:r>
+            <a:r>
+              <a:rPr lang="en-GB" sz="1200" dirty="0">
+                <a:latin typeface="+mj-lt"/>
+                <a:cs typeface="Courier New" panose="02070309020205020404" pitchFamily="49" charset="0"/>
+              </a:rPr>
+              <a:t>1 5 0 2 10 1” to produce the graph on the next page.</a:t>
+            </a:r>
             <a:endParaRPr lang="en-GB" dirty="0"/>
           </a:p>
         </p:txBody>
@@ -4379,7 +4728,7 @@
           <a:p>
             <a:fld id="{6A641EC8-C9F8-4A58-A1A7-F7D817526EEC}" type="slidenum">
               <a:rPr lang="en-GB" smtClean="0"/>
-              <a:t>37</a:t>
+              <a:t>34</a:t>
             </a:fld>
             <a:endParaRPr lang="en-GB"/>
           </a:p>
@@ -4388,7 +4737,7 @@
     </p:spTree>
     <p:extLst>
       <p:ext uri="{BB962C8B-B14F-4D97-AF65-F5344CB8AC3E}">
-        <p14:creationId xmlns:p14="http://schemas.microsoft.com/office/powerpoint/2010/main" val="1108802818"/>
+        <p14:creationId xmlns:p14="http://schemas.microsoft.com/office/powerpoint/2010/main" val="2822767280"/>
       </p:ext>
     </p:extLst>
   </p:cSld>
@@ -4463,6 +4812,298 @@
           <a:p>
             <a:fld id="{6A641EC8-C9F8-4A58-A1A7-F7D817526EEC}" type="slidenum">
               <a:rPr lang="en-GB" smtClean="0"/>
+              <a:t>35</a:t>
+            </a:fld>
+            <a:endParaRPr lang="en-GB"/>
+          </a:p>
+        </p:txBody>
+      </p:sp>
+    </p:spTree>
+    <p:extLst>
+      <p:ext uri="{BB962C8B-B14F-4D97-AF65-F5344CB8AC3E}">
+        <p14:creationId xmlns:p14="http://schemas.microsoft.com/office/powerpoint/2010/main" val="146435962"/>
+      </p:ext>
+    </p:extLst>
+  </p:cSld>
+  <p:clrMapOvr>
+    <a:masterClrMapping/>
+  </p:clrMapOvr>
+</p:notes>
+</file>
+
+<file path=ppt/notesSlides/notesSlide36.xml><?xml version="1.0" encoding="utf-8"?>
+<p:notes xmlns:a="http://schemas.openxmlformats.org/drawingml/2006/main" xmlns:r="http://schemas.openxmlformats.org/officeDocument/2006/relationships" xmlns:p="http://schemas.openxmlformats.org/presentationml/2006/main">
+  <p:cSld>
+    <p:spTree>
+      <p:nvGrpSpPr>
+        <p:cNvPr id="1" name=""/>
+        <p:cNvGrpSpPr/>
+        <p:nvPr/>
+      </p:nvGrpSpPr>
+      <p:grpSpPr>
+        <a:xfrm>
+          <a:off x="0" y="0"/>
+          <a:ext cx="0" cy="0"/>
+          <a:chOff x="0" y="0"/>
+          <a:chExt cx="0" cy="0"/>
+        </a:xfrm>
+      </p:grpSpPr>
+      <p:sp>
+        <p:nvSpPr>
+          <p:cNvPr id="2" name="Slide Image Placeholder 1"/>
+          <p:cNvSpPr>
+            <a:spLocks noGrp="1" noRot="1" noChangeAspect="1"/>
+          </p:cNvSpPr>
+          <p:nvPr>
+            <p:ph type="sldImg"/>
+          </p:nvPr>
+        </p:nvSpPr>
+        <p:spPr/>
+      </p:sp>
+      <p:sp>
+        <p:nvSpPr>
+          <p:cNvPr id="3" name="Notes Placeholder 2"/>
+          <p:cNvSpPr>
+            <a:spLocks noGrp="1"/>
+          </p:cNvSpPr>
+          <p:nvPr>
+            <p:ph type="body" idx="1"/>
+          </p:nvPr>
+        </p:nvSpPr>
+        <p:spPr/>
+        <p:txBody>
+          <a:bodyPr/>
+          <a:lstStyle/>
+          <a:p>
+            <a:pPr marL="0" marR="0" lvl="0" indent="0" algn="l" defTabSz="914400" rtl="0" eaLnBrk="1" fontAlgn="auto" latinLnBrk="0" hangingPunct="1">
+              <a:lnSpc>
+                <a:spcPct val="100000"/>
+              </a:lnSpc>
+              <a:spcBef>
+                <a:spcPts val="0"/>
+              </a:spcBef>
+              <a:spcAft>
+                <a:spcPts val="0"/>
+              </a:spcAft>
+              <a:buClrTx/>
+              <a:buSzTx/>
+              <a:buFontTx/>
+              <a:buNone/>
+              <a:tabLst/>
+              <a:defRPr/>
+            </a:pPr>
+            <a:r>
+              <a:rPr lang="en-GB" dirty="0"/>
+              <a:t>No additional notes.</a:t>
+            </a:r>
+          </a:p>
+        </p:txBody>
+      </p:sp>
+      <p:sp>
+        <p:nvSpPr>
+          <p:cNvPr id="4" name="Slide Number Placeholder 3"/>
+          <p:cNvSpPr>
+            <a:spLocks noGrp="1"/>
+          </p:cNvSpPr>
+          <p:nvPr>
+            <p:ph type="sldNum" sz="quarter" idx="10"/>
+          </p:nvPr>
+        </p:nvSpPr>
+        <p:spPr/>
+        <p:txBody>
+          <a:bodyPr/>
+          <a:lstStyle/>
+          <a:p>
+            <a:fld id="{6A641EC8-C9F8-4A58-A1A7-F7D817526EEC}" type="slidenum">
+              <a:rPr lang="en-GB" smtClean="0"/>
+              <a:t>36</a:t>
+            </a:fld>
+            <a:endParaRPr lang="en-GB"/>
+          </a:p>
+        </p:txBody>
+      </p:sp>
+    </p:spTree>
+    <p:extLst>
+      <p:ext uri="{BB962C8B-B14F-4D97-AF65-F5344CB8AC3E}">
+        <p14:creationId xmlns:p14="http://schemas.microsoft.com/office/powerpoint/2010/main" val="1977625569"/>
+      </p:ext>
+    </p:extLst>
+  </p:cSld>
+  <p:clrMapOvr>
+    <a:masterClrMapping/>
+  </p:clrMapOvr>
+</p:notes>
+</file>
+
+<file path=ppt/notesSlides/notesSlide37.xml><?xml version="1.0" encoding="utf-8"?>
+<p:notes xmlns:a="http://schemas.openxmlformats.org/drawingml/2006/main" xmlns:r="http://schemas.openxmlformats.org/officeDocument/2006/relationships" xmlns:p="http://schemas.openxmlformats.org/presentationml/2006/main">
+  <p:cSld>
+    <p:spTree>
+      <p:nvGrpSpPr>
+        <p:cNvPr id="1" name=""/>
+        <p:cNvGrpSpPr/>
+        <p:nvPr/>
+      </p:nvGrpSpPr>
+      <p:grpSpPr>
+        <a:xfrm>
+          <a:off x="0" y="0"/>
+          <a:ext cx="0" cy="0"/>
+          <a:chOff x="0" y="0"/>
+          <a:chExt cx="0" cy="0"/>
+        </a:xfrm>
+      </p:grpSpPr>
+      <p:sp>
+        <p:nvSpPr>
+          <p:cNvPr id="2" name="Slide Image Placeholder 1"/>
+          <p:cNvSpPr>
+            <a:spLocks noGrp="1" noRot="1" noChangeAspect="1"/>
+          </p:cNvSpPr>
+          <p:nvPr>
+            <p:ph type="sldImg"/>
+          </p:nvPr>
+        </p:nvSpPr>
+        <p:spPr/>
+      </p:sp>
+      <p:sp>
+        <p:nvSpPr>
+          <p:cNvPr id="3" name="Notes Placeholder 2"/>
+          <p:cNvSpPr>
+            <a:spLocks noGrp="1"/>
+          </p:cNvSpPr>
+          <p:nvPr>
+            <p:ph type="body" idx="1"/>
+          </p:nvPr>
+        </p:nvSpPr>
+        <p:spPr/>
+        <p:txBody>
+          <a:bodyPr/>
+          <a:lstStyle/>
+          <a:p>
+            <a:pPr marL="0" marR="0" lvl="0" indent="0" algn="l" defTabSz="914400" rtl="0" eaLnBrk="1" fontAlgn="auto" latinLnBrk="0" hangingPunct="1">
+              <a:lnSpc>
+                <a:spcPct val="100000"/>
+              </a:lnSpc>
+              <a:spcBef>
+                <a:spcPts val="0"/>
+              </a:spcBef>
+              <a:spcAft>
+                <a:spcPts val="0"/>
+              </a:spcAft>
+              <a:buClrTx/>
+              <a:buSzTx/>
+              <a:buFontTx/>
+              <a:buNone/>
+              <a:tabLst/>
+              <a:defRPr/>
+            </a:pPr>
+            <a:r>
+              <a:rPr lang="en-GB" dirty="0"/>
+              <a:t>No additional notes.</a:t>
+            </a:r>
+          </a:p>
+        </p:txBody>
+      </p:sp>
+      <p:sp>
+        <p:nvSpPr>
+          <p:cNvPr id="4" name="Slide Number Placeholder 3"/>
+          <p:cNvSpPr>
+            <a:spLocks noGrp="1"/>
+          </p:cNvSpPr>
+          <p:nvPr>
+            <p:ph type="sldNum" sz="quarter" idx="10"/>
+          </p:nvPr>
+        </p:nvSpPr>
+        <p:spPr/>
+        <p:txBody>
+          <a:bodyPr/>
+          <a:lstStyle/>
+          <a:p>
+            <a:fld id="{6A641EC8-C9F8-4A58-A1A7-F7D817526EEC}" type="slidenum">
+              <a:rPr lang="en-GB" smtClean="0"/>
+              <a:t>37</a:t>
+            </a:fld>
+            <a:endParaRPr lang="en-GB"/>
+          </a:p>
+        </p:txBody>
+      </p:sp>
+    </p:spTree>
+    <p:extLst>
+      <p:ext uri="{BB962C8B-B14F-4D97-AF65-F5344CB8AC3E}">
+        <p14:creationId xmlns:p14="http://schemas.microsoft.com/office/powerpoint/2010/main" val="1108802818"/>
+      </p:ext>
+    </p:extLst>
+  </p:cSld>
+  <p:clrMapOvr>
+    <a:masterClrMapping/>
+  </p:clrMapOvr>
+</p:notes>
+</file>
+
+<file path=ppt/notesSlides/notesSlide38.xml><?xml version="1.0" encoding="utf-8"?>
+<p:notes xmlns:a="http://schemas.openxmlformats.org/drawingml/2006/main" xmlns:r="http://schemas.openxmlformats.org/officeDocument/2006/relationships" xmlns:p="http://schemas.openxmlformats.org/presentationml/2006/main">
+  <p:cSld>
+    <p:spTree>
+      <p:nvGrpSpPr>
+        <p:cNvPr id="1" name=""/>
+        <p:cNvGrpSpPr/>
+        <p:nvPr/>
+      </p:nvGrpSpPr>
+      <p:grpSpPr>
+        <a:xfrm>
+          <a:off x="0" y="0"/>
+          <a:ext cx="0" cy="0"/>
+          <a:chOff x="0" y="0"/>
+          <a:chExt cx="0" cy="0"/>
+        </a:xfrm>
+      </p:grpSpPr>
+      <p:sp>
+        <p:nvSpPr>
+          <p:cNvPr id="2" name="Slide Image Placeholder 1"/>
+          <p:cNvSpPr>
+            <a:spLocks noGrp="1" noRot="1" noChangeAspect="1"/>
+          </p:cNvSpPr>
+          <p:nvPr>
+            <p:ph type="sldImg"/>
+          </p:nvPr>
+        </p:nvSpPr>
+        <p:spPr/>
+      </p:sp>
+      <p:sp>
+        <p:nvSpPr>
+          <p:cNvPr id="3" name="Notes Placeholder 2"/>
+          <p:cNvSpPr>
+            <a:spLocks noGrp="1"/>
+          </p:cNvSpPr>
+          <p:nvPr>
+            <p:ph type="body" idx="1"/>
+          </p:nvPr>
+        </p:nvSpPr>
+        <p:spPr/>
+        <p:txBody>
+          <a:bodyPr/>
+          <a:lstStyle/>
+          <a:p>
+            <a:endParaRPr lang="en-GB" dirty="0"/>
+          </a:p>
+        </p:txBody>
+      </p:sp>
+      <p:sp>
+        <p:nvSpPr>
+          <p:cNvPr id="4" name="Slide Number Placeholder 3"/>
+          <p:cNvSpPr>
+            <a:spLocks noGrp="1"/>
+          </p:cNvSpPr>
+          <p:nvPr>
+            <p:ph type="sldNum" sz="quarter" idx="10"/>
+          </p:nvPr>
+        </p:nvSpPr>
+        <p:spPr/>
+        <p:txBody>
+          <a:bodyPr/>
+          <a:lstStyle/>
+          <a:p>
+            <a:fld id="{6A641EC8-C9F8-4A58-A1A7-F7D817526EEC}" type="slidenum">
+              <a:rPr lang="en-GB" smtClean="0"/>
               <a:t>38</a:t>
             </a:fld>
             <a:endParaRPr lang="en-GB"/>
@@ -4482,7 +5123,7 @@
 </p:notes>
 </file>
 
-<file path=ppt/notesSlides/notesSlide36.xml><?xml version="1.0" encoding="utf-8"?>
+<file path=ppt/notesSlides/notesSlide39.xml><?xml version="1.0" encoding="utf-8"?>
 <p:notes xmlns:a="http://schemas.openxmlformats.org/drawingml/2006/main" xmlns:r="http://schemas.openxmlformats.org/officeDocument/2006/relationships" xmlns:p="http://schemas.openxmlformats.org/presentationml/2006/main">
   <p:cSld>
     <p:spTree>
@@ -4777,29 +5418,31 @@
           <a:bodyPr/>
           <a:lstStyle/>
           <a:p>
+            <a:pPr marL="0" marR="0" lvl="0" indent="0" algn="l" defTabSz="914400" rtl="0" eaLnBrk="1" fontAlgn="auto" latinLnBrk="0" hangingPunct="1">
+              <a:lnSpc>
+                <a:spcPct val="100000"/>
+              </a:lnSpc>
+              <a:spcBef>
+                <a:spcPts val="0"/>
+              </a:spcBef>
+              <a:spcAft>
+                <a:spcPts val="0"/>
+              </a:spcAft>
+              <a:buClrTx/>
+              <a:buSzTx/>
+              <a:buFontTx/>
+              <a:buNone/>
+              <a:tabLst/>
+              <a:defRPr/>
+            </a:pPr>
             <a:r>
               <a:rPr lang="en-GB" dirty="0"/>
-              <a:t>Standalone Python installation can be installed from the Python website. You can install several of these and they will be separate application within your computer. When installing Python applications, you may sometimes be asked if you want to add installations to the “path” of your computer. This is a list of directories held by the operating system of your computer which tells it where to look for programs. It can be difficult to give specific advice but, sometimes, having multiple installations of Python in your path can cause problems as components of different installations can be found when the code is running and they may not be compatible.</a:t>
+              <a:t>No additional notes.</a:t>
             </a:r>
           </a:p>
           <a:p>
             <a:endParaRPr lang="en-GB" dirty="0"/>
           </a:p>
-          <a:p>
-            <a:r>
-              <a:rPr lang="en-GB" dirty="0"/>
-              <a:t>Python installations can be installed within the Anaconda application by opening the environment tab, clicking “Create”, selecting a version and giving it a name. It might take a minute or so to download and install the installation. You can have several installations installed at once and can switch between them by clicking on the installation. This typically avoids issues related to the path on your computer and so is a more reliable option if you have limited experience.</a:t>
-            </a:r>
-          </a:p>
-          <a:p>
-            <a:endParaRPr lang="en-GB" dirty="0"/>
-          </a:p>
-          <a:p>
-            <a:r>
-              <a:rPr lang="en-GB" dirty="0"/>
-              <a:t>Demonstration: create a new installation in Anaconda using a recent version of Python.</a:t>
-            </a:r>
-          </a:p>
         </p:txBody>
       </p:sp>
       <p:sp>
@@ -4809,7 +5452,7 @@
             <a:spLocks noGrp="1"/>
           </p:cNvSpPr>
           <p:nvPr>
-            <p:ph type="sldNum" sz="quarter" idx="10"/>
+            <p:ph type="sldNum" sz="quarter" idx="5"/>
           </p:nvPr>
         </p:nvSpPr>
         <p:spPr/>
@@ -4817,9 +5460,9 @@
           <a:bodyPr/>
           <a:lstStyle/>
           <a:p>
-            <a:fld id="{6A641EC8-C9F8-4A58-A1A7-F7D817526EEC}" type="slidenum">
+            <a:fld id="{3AE2EC8F-0D0C-480E-9701-891381D03195}" type="slidenum">
               <a:rPr lang="en-GB" smtClean="0"/>
-              <a:t>7</a:t>
+              <a:t>4</a:t>
             </a:fld>
             <a:endParaRPr lang="en-GB"/>
           </a:p>
@@ -4828,7 +5471,7 @@
     </p:spTree>
     <p:extLst>
       <p:ext uri="{BB962C8B-B14F-4D97-AF65-F5344CB8AC3E}">
-        <p14:creationId xmlns:p14="http://schemas.microsoft.com/office/powerpoint/2010/main" val="1461934269"/>
+        <p14:creationId xmlns:p14="http://schemas.microsoft.com/office/powerpoint/2010/main" val="476101840"/>
       </p:ext>
     </p:extLst>
   </p:cSld>
@@ -4882,19 +5525,30 @@
           <a:bodyPr/>
           <a:lstStyle/>
           <a:p>
+            <a:pPr marL="0" marR="0" lvl="0" indent="0" algn="l" defTabSz="914400" rtl="0" eaLnBrk="1" fontAlgn="auto" latinLnBrk="0" hangingPunct="1">
+              <a:lnSpc>
+                <a:spcPct val="100000"/>
+              </a:lnSpc>
+              <a:spcBef>
+                <a:spcPts val="0"/>
+              </a:spcBef>
+              <a:spcAft>
+                <a:spcPts val="0"/>
+              </a:spcAft>
+              <a:buClrTx/>
+              <a:buSzTx/>
+              <a:buFontTx/>
+              <a:buNone/>
+              <a:tabLst/>
+              <a:defRPr/>
+            </a:pPr>
             <a:r>
               <a:rPr lang="en-GB" dirty="0"/>
-              <a:t>A Python environment is an isolated installation of Python, including any packages that may have been installed. This can be useful for managing multiple projects which may have different dependencies in terms of the packages they use. This can be particularly useful when different packages require different versions of Python. This is particularly common for some older packages which only support Python 2.X.</a:t>
+              <a:t>No additional notes.</a:t>
             </a:r>
           </a:p>
           <a:p>
             <a:endParaRPr lang="en-GB" dirty="0"/>
-          </a:p>
-          <a:p>
-            <a:r>
-              <a:rPr lang="en-GB" dirty="0"/>
-              <a:t>This allows different environments for different projects with only the packages needed for that project installed. It also means , when starting a new project, you can use a newer version of Python, without having to force an upgrade of Python version for other projects, which could possibly break them.</a:t>
-            </a:r>
           </a:p>
         </p:txBody>
       </p:sp>
@@ -4915,7 +5569,7 @@
           <a:p>
             <a:fld id="{6A641EC8-C9F8-4A58-A1A7-F7D817526EEC}" type="slidenum">
               <a:rPr lang="en-GB" smtClean="0"/>
-              <a:t>8</a:t>
+              <a:t>5</a:t>
             </a:fld>
             <a:endParaRPr lang="en-GB"/>
           </a:p>
@@ -4924,7 +5578,7 @@
     </p:spTree>
     <p:extLst>
       <p:ext uri="{BB962C8B-B14F-4D97-AF65-F5344CB8AC3E}">
-        <p14:creationId xmlns:p14="http://schemas.microsoft.com/office/powerpoint/2010/main" val="258869543"/>
+        <p14:creationId xmlns:p14="http://schemas.microsoft.com/office/powerpoint/2010/main" val="2283586298"/>
       </p:ext>
     </p:extLst>
   </p:cSld>
@@ -4980,48 +5634,25 @@
           <a:p>
             <a:r>
               <a:rPr lang="en-GB" dirty="0"/>
-              <a:t>In Anaconda, the different environments are listed in the “environment” tab. In fact, we’ve already seen these earlier when we installed a new version of Python. We can clone an existing environment using “Clone”. “Backup” creates a specification of the current environment as .</a:t>
-            </a:r>
-            <a:r>
-              <a:rPr lang="en-GB" dirty="0" err="1"/>
-              <a:t>yaml</a:t>
-            </a:r>
+              <a:t>You can install a version of Python on your computer. This can be a standalone Python program, or installed and managed by another program such as Anaconda. A specific instance of Python is known as an installation and you may have multiple installations of Python on your computer at once. Each installation will be a particular version of Python such as 3.9 or 2.7. Successive versions of Python have added more functionality. You can see what version of Python is currently active in your system by typing “python –version”. </a:t>
+            </a:r>
+          </a:p>
+          <a:p>
+            <a:endParaRPr lang="en-GB" dirty="0"/>
+          </a:p>
+          <a:p>
             <a:r>
               <a:rPr lang="en-GB" dirty="0"/>
-              <a:t> file (this is similar to a requirements file, which we’ll look at in more detail later). “Import” creates an environment from a .</a:t>
-            </a:r>
-            <a:r>
-              <a:rPr lang="en-GB" dirty="0" err="1"/>
-              <a:t>yaml</a:t>
-            </a:r>
+              <a:t>Python 2 and Python 3 are two major iterations of the Python language. Although Python 2 is still actively in use in some places, this is largely for legacy reasons. Python 3 is a well-established language and should be the one you use unless you have a good reason not to.</a:t>
+            </a:r>
+          </a:p>
+          <a:p>
+            <a:endParaRPr lang="en-GB" dirty="0"/>
+          </a:p>
+          <a:p>
             <a:r>
               <a:rPr lang="en-GB" dirty="0"/>
-              <a:t> file creates with the “Backup” button. “Remove” will delete the selected environment.</a:t>
-            </a:r>
-          </a:p>
-          <a:p>
-            <a:endParaRPr lang="en-GB" dirty="0"/>
-          </a:p>
-          <a:p>
-            <a:r>
-              <a:rPr lang="en-GB" dirty="0"/>
-              <a:t>Demonstration: Create a new Python environment. Clone it. Back it up. Create another copy from the .</a:t>
-            </a:r>
-            <a:r>
-              <a:rPr lang="en-GB" dirty="0" err="1"/>
-              <a:t>yaml</a:t>
-            </a:r>
-            <a:r>
-              <a:rPr lang="en-GB" dirty="0"/>
-              <a:t>. Remove the copy created from the </a:t>
-            </a:r>
-            <a:r>
-              <a:rPr lang="en-GB" dirty="0" err="1"/>
-              <a:t>yaml</a:t>
-            </a:r>
-            <a:r>
-              <a:rPr lang="en-GB" dirty="0"/>
-              <a:t>.</a:t>
+              <a:t>A Python installation contains a Python interpreter which contains instructions for how Python source code should be interpreted according to the rules of the version of Python installed. It also contains a collection of libraries which contain what are known as “built-in” modules, such as the “math” module.</a:t>
             </a:r>
           </a:p>
         </p:txBody>
@@ -5043,7 +5674,7 @@
           <a:p>
             <a:fld id="{6A641EC8-C9F8-4A58-A1A7-F7D817526EEC}" type="slidenum">
               <a:rPr lang="en-GB" smtClean="0"/>
-              <a:t>9</a:t>
+              <a:t>6</a:t>
             </a:fld>
             <a:endParaRPr lang="en-GB"/>
           </a:p>
@@ -5052,7 +5683,7 @@
     </p:spTree>
     <p:extLst>
       <p:ext uri="{BB962C8B-B14F-4D97-AF65-F5344CB8AC3E}">
-        <p14:creationId xmlns:p14="http://schemas.microsoft.com/office/powerpoint/2010/main" val="1413254815"/>
+        <p14:creationId xmlns:p14="http://schemas.microsoft.com/office/powerpoint/2010/main" val="1632070600"/>
       </p:ext>
     </p:extLst>
   </p:cSld>
@@ -5106,37 +5737,9 @@
           <a:bodyPr/>
           <a:lstStyle/>
           <a:p>
-            <a:pPr marL="0" marR="0" lvl="0" indent="0" algn="l" defTabSz="914400" rtl="0" eaLnBrk="1" fontAlgn="auto" latinLnBrk="0" hangingPunct="1">
-              <a:lnSpc>
-                <a:spcPct val="100000"/>
-              </a:lnSpc>
-              <a:spcBef>
-                <a:spcPts val="0"/>
-              </a:spcBef>
-              <a:spcAft>
-                <a:spcPts val="0"/>
-              </a:spcAft>
-              <a:buClrTx/>
-              <a:buSzTx/>
-              <a:buFontTx/>
-              <a:buNone/>
-              <a:tabLst/>
-              <a:defRPr/>
-            </a:pPr>
-            <a:r>
-              <a:rPr lang="en-GB" dirty="0" err="1"/>
-              <a:t>Venv</a:t>
-            </a:r>
             <a:r>
               <a:rPr lang="en-GB" dirty="0"/>
-              <a:t> is a Python modules which allows the creation of multiple “virtual environments” within a single Python installation. </a:t>
-            </a:r>
-            <a:r>
-              <a:rPr lang="en-GB" sz="1200" dirty="0">
-                <a:latin typeface="Courier New" panose="02070309020205020404" pitchFamily="49" charset="0"/>
-                <a:cs typeface="Courier New" panose="02070309020205020404" pitchFamily="49" charset="0"/>
-              </a:rPr>
-              <a:t>We can use these virtual environments in a similar way to environments managed by Anaconda. As such, you will normally choose to use one method or the other, not both.</a:t>
+              <a:t>Standalone Python installation can be installed from the Python website. You can install several of these and they will be separate application within your computer. When installing Python applications, you may sometimes be asked if you want to add installations to the “path” of your computer. This is a list of directories held by the operating system of your computer which tells it where to look for programs. It can be difficult to give specific advice but, sometimes, having multiple installations of Python in your path can cause problems as components of different installations can be found when the code is running and they may not be compatible.</a:t>
             </a:r>
           </a:p>
           <a:p>
@@ -5145,152 +5748,17 @@
           <a:p>
             <a:r>
               <a:rPr lang="en-GB" dirty="0"/>
-              <a:t>By writing “</a:t>
-            </a:r>
-            <a:r>
-              <a:rPr lang="en-GB" sz="1200" dirty="0">
-                <a:latin typeface="Courier New" panose="02070309020205020404" pitchFamily="49" charset="0"/>
-                <a:cs typeface="Courier New" panose="02070309020205020404" pitchFamily="49" charset="0"/>
-              </a:rPr>
-              <a:t>python3 -m </a:t>
-            </a:r>
-            <a:r>
-              <a:rPr lang="en-GB" sz="1200" dirty="0" err="1">
-                <a:latin typeface="Courier New" panose="02070309020205020404" pitchFamily="49" charset="0"/>
-                <a:cs typeface="Courier New" panose="02070309020205020404" pitchFamily="49" charset="0"/>
-              </a:rPr>
-              <a:t>venv</a:t>
-            </a:r>
-            <a:r>
-              <a:rPr lang="en-GB" sz="1200" dirty="0">
-                <a:latin typeface="Courier New" panose="02070309020205020404" pitchFamily="49" charset="0"/>
-                <a:cs typeface="Courier New" panose="02070309020205020404" pitchFamily="49" charset="0"/>
-              </a:rPr>
-              <a:t> .\Exercises\</a:t>
-            </a:r>
-            <a:r>
-              <a:rPr lang="en-GB" sz="1200" dirty="0" err="1">
-                <a:latin typeface="Courier New" panose="02070309020205020404" pitchFamily="49" charset="0"/>
-                <a:cs typeface="Courier New" panose="02070309020205020404" pitchFamily="49" charset="0"/>
-              </a:rPr>
-              <a:t>Example_environment</a:t>
-            </a:r>
-            <a:r>
-              <a:rPr lang="en-GB" sz="1200" dirty="0">
-                <a:latin typeface="Courier New" panose="02070309020205020404" pitchFamily="49" charset="0"/>
-                <a:cs typeface="Courier New" panose="02070309020205020404" pitchFamily="49" charset="0"/>
-              </a:rPr>
-              <a:t>\”  we will create an environment that is stored inside the specified directory. Note that the slashes will need to be other way around in Mac and Linux due to the different convention of how slashes operate in Mac and Linux. This new environment will use the same version of Python as the currently active Python version. </a:t>
-            </a:r>
-          </a:p>
-          <a:p>
-            <a:r>
-              <a:rPr lang="en-GB" sz="1200" dirty="0">
-                <a:latin typeface="Courier New" panose="02070309020205020404" pitchFamily="49" charset="0"/>
-                <a:cs typeface="Courier New" panose="02070309020205020404" pitchFamily="49" charset="0"/>
-              </a:rPr>
-              <a:t>To activate this new environment, different commands will be used dependent on whether you’re using Windows, or Apple or Linux. You should see the name of the directory in parentheses at the start of the command line, indicating that the environment is active. If we install modules they will be installed in this environment and if we run files it will use this environment. Regardless of operating system, typing “deactivate” will deactivate the virtual environment.</a:t>
-            </a:r>
-          </a:p>
-          <a:p>
-            <a:endParaRPr lang="en-GB" sz="1200" dirty="0">
-              <a:latin typeface="Courier New" panose="02070309020205020404" pitchFamily="49" charset="0"/>
-              <a:cs typeface="Courier New" panose="02070309020205020404" pitchFamily="49" charset="0"/>
-            </a:endParaRPr>
-          </a:p>
-          <a:p>
-            <a:r>
-              <a:rPr lang="en-GB" sz="1200" dirty="0">
-                <a:latin typeface="Courier New" panose="02070309020205020404" pitchFamily="49" charset="0"/>
-                <a:cs typeface="Courier New" panose="02070309020205020404" pitchFamily="49" charset="0"/>
-              </a:rPr>
-              <a:t>Demonstration: Open up VS Code and open a command prompt terminal (check it’s command prompt not </a:t>
-            </a:r>
-            <a:r>
-              <a:rPr lang="en-GB" sz="1200" dirty="0" err="1">
-                <a:latin typeface="Courier New" panose="02070309020205020404" pitchFamily="49" charset="0"/>
-                <a:cs typeface="Courier New" panose="02070309020205020404" pitchFamily="49" charset="0"/>
-              </a:rPr>
-              <a:t>Powershell</a:t>
-            </a:r>
-            <a:r>
-              <a:rPr lang="en-GB" sz="1200" dirty="0">
-                <a:latin typeface="Courier New" panose="02070309020205020404" pitchFamily="49" charset="0"/>
-                <a:cs typeface="Courier New" panose="02070309020205020404" pitchFamily="49" charset="0"/>
-              </a:rPr>
-              <a:t>). Change directory into main directory of the course materials. Use the command “python3 -m </a:t>
-            </a:r>
-            <a:r>
-              <a:rPr lang="en-GB" sz="1200" dirty="0" err="1">
-                <a:latin typeface="Courier New" panose="02070309020205020404" pitchFamily="49" charset="0"/>
-                <a:cs typeface="Courier New" panose="02070309020205020404" pitchFamily="49" charset="0"/>
-              </a:rPr>
-              <a:t>venv</a:t>
-            </a:r>
-            <a:r>
-              <a:rPr lang="en-GB" sz="1200" dirty="0">
-                <a:latin typeface="Courier New" panose="02070309020205020404" pitchFamily="49" charset="0"/>
-                <a:cs typeface="Courier New" panose="02070309020205020404" pitchFamily="49" charset="0"/>
-              </a:rPr>
-              <a:t> .\Exercises\</a:t>
-            </a:r>
-            <a:r>
-              <a:rPr lang="en-GB" sz="1200" dirty="0" err="1">
-                <a:latin typeface="Courier New" panose="02070309020205020404" pitchFamily="49" charset="0"/>
-                <a:cs typeface="Courier New" panose="02070309020205020404" pitchFamily="49" charset="0"/>
-              </a:rPr>
-              <a:t>Example_environment</a:t>
-            </a:r>
-            <a:r>
-              <a:rPr lang="en-GB" sz="1200" dirty="0">
-                <a:latin typeface="Courier New" panose="02070309020205020404" pitchFamily="49" charset="0"/>
-                <a:cs typeface="Courier New" panose="02070309020205020404" pitchFamily="49" charset="0"/>
-              </a:rPr>
-              <a:t>\ “ to create a new environment. Use the command “</a:t>
-            </a:r>
-            <a:r>
-              <a:rPr lang="fr-FR" dirty="0">
-                <a:latin typeface="Courier New" panose="02070309020205020404" pitchFamily="49" charset="0"/>
-                <a:cs typeface="Courier New" panose="02070309020205020404" pitchFamily="49" charset="0"/>
-              </a:rPr>
-              <a:t>.\</a:t>
-            </a:r>
-            <a:r>
-              <a:rPr lang="fr-FR" dirty="0" err="1">
-                <a:latin typeface="Courier New" panose="02070309020205020404" pitchFamily="49" charset="0"/>
-                <a:cs typeface="Courier New" panose="02070309020205020404" pitchFamily="49" charset="0"/>
-              </a:rPr>
-              <a:t>Exercises</a:t>
-            </a:r>
-            <a:r>
-              <a:rPr lang="fr-FR" dirty="0">
-                <a:latin typeface="Courier New" panose="02070309020205020404" pitchFamily="49" charset="0"/>
-                <a:cs typeface="Courier New" panose="02070309020205020404" pitchFamily="49" charset="0"/>
-              </a:rPr>
-              <a:t>\</a:t>
-            </a:r>
-            <a:r>
-              <a:rPr lang="fr-FR" dirty="0" err="1">
-                <a:latin typeface="Courier New" panose="02070309020205020404" pitchFamily="49" charset="0"/>
-                <a:cs typeface="Courier New" panose="02070309020205020404" pitchFamily="49" charset="0"/>
-              </a:rPr>
-              <a:t>Example_environment</a:t>
-            </a:r>
-            <a:r>
-              <a:rPr lang="fr-FR" dirty="0">
-                <a:latin typeface="Courier New" panose="02070309020205020404" pitchFamily="49" charset="0"/>
-                <a:cs typeface="Courier New" panose="02070309020205020404" pitchFamily="49" charset="0"/>
-              </a:rPr>
-              <a:t>\Scripts\activate.bat</a:t>
-            </a:r>
-            <a:r>
-              <a:rPr lang="en-GB" dirty="0">
-                <a:latin typeface="Courier New" panose="02070309020205020404" pitchFamily="49" charset="0"/>
-                <a:cs typeface="Courier New" panose="02070309020205020404" pitchFamily="49" charset="0"/>
-              </a:rPr>
-              <a:t>” to activate it. Note the name of the directory in parentheses. Use the command “deactivate” to deactivate it.</a:t>
-            </a:r>
+              <a:t>Python installations can be installed within the Anaconda application by opening the environment tab, clicking “Create”, selecting a version and giving it a name. It might take a minute or so to download and install the installation. You can have several installations installed at once and can switch between them by clicking on the installation. This typically avoids issues related to the path on your computer and so is a more reliable option if you have limited experience.</a:t>
+            </a:r>
+          </a:p>
+          <a:p>
             <a:endParaRPr lang="en-GB" dirty="0"/>
+          </a:p>
+          <a:p>
+            <a:r>
+              <a:rPr lang="en-GB" dirty="0"/>
+              <a:t>Demonstration: create a new installation in Anaconda using a recent version of Python.</a:t>
+            </a:r>
           </a:p>
         </p:txBody>
       </p:sp>
@@ -5311,7 +5779,7 @@
           <a:p>
             <a:fld id="{6A641EC8-C9F8-4A58-A1A7-F7D817526EEC}" type="slidenum">
               <a:rPr lang="en-GB" smtClean="0"/>
-              <a:t>10</a:t>
+              <a:t>7</a:t>
             </a:fld>
             <a:endParaRPr lang="en-GB"/>
           </a:p>
@@ -5320,7 +5788,7 @@
     </p:spTree>
     <p:extLst>
       <p:ext uri="{BB962C8B-B14F-4D97-AF65-F5344CB8AC3E}">
-        <p14:creationId xmlns:p14="http://schemas.microsoft.com/office/powerpoint/2010/main" val="939960531"/>
+        <p14:creationId xmlns:p14="http://schemas.microsoft.com/office/powerpoint/2010/main" val="1461934269"/>
       </p:ext>
     </p:extLst>
   </p:cSld>
@@ -5374,7 +5842,19 @@
           <a:bodyPr/>
           <a:lstStyle/>
           <a:p>
+            <a:r>
+              <a:rPr lang="en-GB" dirty="0"/>
+              <a:t>A Python environment is an isolated installation of Python, including any packages that may have been installed. This can be useful for managing multiple projects which may have different dependencies in terms of the packages they use. This can be particularly useful when different packages require different versions of Python. This is particularly common for some older packages which only support Python 2.X.</a:t>
+            </a:r>
+          </a:p>
+          <a:p>
             <a:endParaRPr lang="en-GB" dirty="0"/>
+          </a:p>
+          <a:p>
+            <a:r>
+              <a:rPr lang="en-GB" dirty="0"/>
+              <a:t>This allows different environments for different projects with only the packages needed for that project installed. It also means , when starting a new project, you can use a newer version of Python, without having to force an upgrade of Python version for other projects, which could possibly break them.</a:t>
+            </a:r>
           </a:p>
         </p:txBody>
       </p:sp>
@@ -5395,7 +5875,7 @@
           <a:p>
             <a:fld id="{6A641EC8-C9F8-4A58-A1A7-F7D817526EEC}" type="slidenum">
               <a:rPr lang="en-GB" smtClean="0"/>
-              <a:t>11</a:t>
+              <a:t>8</a:t>
             </a:fld>
             <a:endParaRPr lang="en-GB"/>
           </a:p>
@@ -5404,7 +5884,7 @@
     </p:spTree>
     <p:extLst>
       <p:ext uri="{BB962C8B-B14F-4D97-AF65-F5344CB8AC3E}">
-        <p14:creationId xmlns:p14="http://schemas.microsoft.com/office/powerpoint/2010/main" val="1781581534"/>
+        <p14:creationId xmlns:p14="http://schemas.microsoft.com/office/powerpoint/2010/main" val="258869543"/>
       </p:ext>
     </p:extLst>
   </p:cSld>
@@ -5460,7 +5940,23 @@
           <a:p>
             <a:r>
               <a:rPr lang="en-GB" dirty="0"/>
-              <a:t>Before we move further, we’re going to take a little time to define some terms that we’ll be using.</a:t>
+              <a:t>In Anaconda, the different environments are listed in the “environment” tab. In fact, we’ve already seen these earlier when we installed a new version of Python. We can clone an existing environment using “Clone”. “Backup” creates a specification of the current environment as .</a:t>
+            </a:r>
+            <a:r>
+              <a:rPr lang="en-GB" dirty="0" err="1"/>
+              <a:t>yaml</a:t>
+            </a:r>
+            <a:r>
+              <a:rPr lang="en-GB" dirty="0"/>
+              <a:t> file (this is similar to a requirements file, which we’ll look at in more detail later). “Import” creates an environment from a .</a:t>
+            </a:r>
+            <a:r>
+              <a:rPr lang="en-GB" dirty="0" err="1"/>
+              <a:t>yaml</a:t>
+            </a:r>
+            <a:r>
+              <a:rPr lang="en-GB" dirty="0"/>
+              <a:t> file creates with the “Backup” button. “Remove” will delete the selected environment.</a:t>
             </a:r>
           </a:p>
           <a:p>
@@ -5469,41 +5965,23 @@
           <a:p>
             <a:r>
               <a:rPr lang="en-GB" dirty="0"/>
-              <a:t>A Python script is a plain text file which typically has the extension “.</a:t>
+              <a:t>Demonstration: Create a new Python environment. Clone it. Back it up. Create another copy from the .</a:t>
             </a:r>
             <a:r>
               <a:rPr lang="en-GB" dirty="0" err="1"/>
-              <a:t>py</a:t>
+              <a:t>yaml</a:t>
             </a:r>
             <a:r>
               <a:rPr lang="en-GB" dirty="0"/>
-              <a:t>”. This contains Python code and is designed to be able to be run directly. A “module” is also a “.</a:t>
+              <a:t>. Remove the copy created from the </a:t>
             </a:r>
             <a:r>
               <a:rPr lang="en-GB" dirty="0" err="1"/>
-              <a:t>py</a:t>
+              <a:t>yaml</a:t>
             </a:r>
             <a:r>
               <a:rPr lang="en-GB" dirty="0"/>
-              <a:t>” file but it is not designed to be run directly, but instead may be accessed from other modules using the “import” statement. A script and a module are the same type of file, the distinction comes from their intended use rather than some technical difference.</a:t>
-            </a:r>
-          </a:p>
-          <a:p>
-            <a:endParaRPr lang="en-GB" dirty="0"/>
-          </a:p>
-          <a:p>
-            <a:r>
-              <a:rPr lang="en-GB" dirty="0"/>
-              <a:t>A package is a collection of modules which typically has some kind of cohesive purpose.  This may be a collection of several files in a directory structure. Often a package will contain a file named “__init__.py”. This can contain code to be executed when the package is initialised but can also be empty. Its mere existence causes Python to treat the files in the package differently to normal modules. This prevents naming conflicts where directories within the module would otherwise hide modules loaded later in the initialisation process.</a:t>
-            </a:r>
-          </a:p>
-          <a:p>
-            <a:endParaRPr lang="en-GB" dirty="0"/>
-          </a:p>
-          <a:p>
-            <a:r>
-              <a:rPr lang="en-GB" dirty="0"/>
-              <a:t>A library is a (sometimes large) collection of modules, such as matplotlib. The Python standard library is a collection of modules, such as the “math” module, which is included in a Python installation.</a:t>
+              <a:t>.</a:t>
             </a:r>
           </a:p>
         </p:txBody>
@@ -5525,7 +6003,7 @@
           <a:p>
             <a:fld id="{6A641EC8-C9F8-4A58-A1A7-F7D817526EEC}" type="slidenum">
               <a:rPr lang="en-GB" smtClean="0"/>
-              <a:t>12</a:t>
+              <a:t>9</a:t>
             </a:fld>
             <a:endParaRPr lang="en-GB"/>
           </a:p>
@@ -5534,7 +6012,7 @@
     </p:spTree>
     <p:extLst>
       <p:ext uri="{BB962C8B-B14F-4D97-AF65-F5344CB8AC3E}">
-        <p14:creationId xmlns:p14="http://schemas.microsoft.com/office/powerpoint/2010/main" val="771415652"/>
+        <p14:creationId xmlns:p14="http://schemas.microsoft.com/office/powerpoint/2010/main" val="1413254815"/>
       </p:ext>
     </p:extLst>
   </p:cSld>
@@ -10406,7 +10884,7 @@
                 <a:latin typeface="Courier New" panose="02070309020205020404" pitchFamily="49" charset="0"/>
                 <a:cs typeface="Courier New" panose="02070309020205020404" pitchFamily="49" charset="0"/>
               </a:rPr>
-              <a:t>Exercises/requirements </a:t>
+              <a:t>Exercises/Requirements </a:t>
             </a:r>
             <a:r>
               <a:rPr lang="en-GB" sz="2200" dirty="0">
@@ -10518,7 +10996,7 @@
                 <a:latin typeface="Courier New" panose="02070309020205020404" pitchFamily="49" charset="0"/>
                 <a:cs typeface="Courier New" panose="02070309020205020404" pitchFamily="49" charset="0"/>
               </a:rPr>
-              <a:t>Exercises/requirements </a:t>
+              <a:t>Exercises/Requirements </a:t>
             </a:r>
             <a:r>
               <a:rPr lang="en-GB" sz="2200" dirty="0">
@@ -13258,7 +13736,7 @@
         </p:spPr>
         <p:txBody>
           <a:bodyPr>
-            <a:normAutofit lnSpcReduction="10000"/>
+            <a:normAutofit fontScale="92500"/>
           </a:bodyPr>
           <a:lstStyle/>
           <a:p>
@@ -13329,6 +13807,34 @@
                 <a:cs typeface="Courier New" panose="02070309020205020404" pitchFamily="49" charset="0"/>
               </a:rPr>
               <a:t> statement which will fail</a:t>
+            </a:r>
+          </a:p>
+          <a:p>
+            <a:pPr lvl="1">
+              <a:lnSpc>
+                <a:spcPct val="107000"/>
+              </a:lnSpc>
+            </a:pPr>
+            <a:r>
+              <a:rPr lang="en-GB" sz="2200" dirty="0">
+                <a:latin typeface="+mj-lt"/>
+                <a:cs typeface="Courier New" panose="02070309020205020404" pitchFamily="49" charset="0"/>
+              </a:rPr>
+              <a:t>A </a:t>
+            </a:r>
+            <a:r>
+              <a:rPr lang="en-GB" sz="2200" dirty="0">
+                <a:latin typeface="Courier New" panose="02070309020205020404" pitchFamily="49" charset="0"/>
+                <a:cs typeface="Courier New" panose="02070309020205020404" pitchFamily="49" charset="0"/>
+              </a:rPr>
+              <a:t>print</a:t>
+            </a:r>
+            <a:r>
+              <a:rPr lang="en-GB" sz="2200" dirty="0">
+                <a:latin typeface="+mj-lt"/>
+                <a:cs typeface="Courier New" panose="02070309020205020404" pitchFamily="49" charset="0"/>
+              </a:rPr>
+              <a:t> statement which will be executed</a:t>
             </a:r>
           </a:p>
           <a:p>
@@ -13924,7 +14430,7 @@
         </p:spPr>
         <p:txBody>
           <a:bodyPr>
-            <a:normAutofit/>
+            <a:normAutofit fontScale="92500" lnSpcReduction="10000"/>
           </a:bodyPr>
           <a:lstStyle/>
           <a:p>
@@ -13981,6 +14487,20 @@
                 <a:cs typeface="Courier New" panose="02070309020205020404" pitchFamily="49" charset="0"/>
               </a:rPr>
               <a:t>is a list containing each argument on the command line as an entry</a:t>
+            </a:r>
+          </a:p>
+          <a:p>
+            <a:pPr lvl="1">
+              <a:lnSpc>
+                <a:spcPct val="107000"/>
+              </a:lnSpc>
+            </a:pPr>
+            <a:r>
+              <a:rPr lang="en-GB" sz="2200" dirty="0">
+                <a:latin typeface="+mj-lt"/>
+                <a:cs typeface="Courier New" panose="02070309020205020404" pitchFamily="49" charset="0"/>
+              </a:rPr>
+              <a:t>Populated from the command line each time the code is run</a:t>
             </a:r>
           </a:p>
           <a:p>
@@ -15063,7 +15583,7 @@
                 <a:latin typeface="+mj-lt"/>
                 <a:cs typeface="Courier New" panose="02070309020205020404" pitchFamily="49" charset="0"/>
               </a:rPr>
-              <a:t>) is way of defining a loosely isolated environment for running applications</a:t>
+              <a:t>) are a way of defining a loosely isolated environment for running applications</a:t>
             </a:r>
           </a:p>
           <a:p>

</xml_diff>

<commit_message>
New command line arguments exercise
</commit_message>
<xml_diff>
--- a/Managing and Running Python Effectively.pptx
+++ b/Managing and Running Python Effectively.pptx
@@ -5,10 +5,10 @@
     <p:sldMasterId id="2147483648" r:id="rId1"/>
   </p:sldMasterIdLst>
   <p:notesMasterIdLst>
-    <p:notesMasterId r:id="rId40"/>
+    <p:notesMasterId r:id="rId41"/>
   </p:notesMasterIdLst>
   <p:handoutMasterIdLst>
-    <p:handoutMasterId r:id="rId41"/>
+    <p:handoutMasterId r:id="rId42"/>
   </p:handoutMasterIdLst>
   <p:sldIdLst>
     <p:sldId id="264" r:id="rId2"/>
@@ -42,13 +42,14 @@
     <p:sldId id="528" r:id="rId30"/>
     <p:sldId id="529" r:id="rId31"/>
     <p:sldId id="536" r:id="rId32"/>
-    <p:sldId id="530" r:id="rId33"/>
-    <p:sldId id="534" r:id="rId34"/>
-    <p:sldId id="535" r:id="rId35"/>
-    <p:sldId id="532" r:id="rId36"/>
-    <p:sldId id="533" r:id="rId37"/>
-    <p:sldId id="329" r:id="rId38"/>
-    <p:sldId id="280" r:id="rId39"/>
+    <p:sldId id="537" r:id="rId33"/>
+    <p:sldId id="530" r:id="rId34"/>
+    <p:sldId id="534" r:id="rId35"/>
+    <p:sldId id="535" r:id="rId36"/>
+    <p:sldId id="532" r:id="rId37"/>
+    <p:sldId id="533" r:id="rId38"/>
+    <p:sldId id="329" r:id="rId39"/>
+    <p:sldId id="280" r:id="rId40"/>
   </p:sldIdLst>
   <p:sldSz cx="9144000" cy="6858000" type="screen4x3"/>
   <p:notesSz cx="7099300" cy="10234613"/>
@@ -183,6 +184,7 @@
             <p14:sldId id="528"/>
             <p14:sldId id="529"/>
             <p14:sldId id="536"/>
+            <p14:sldId id="537"/>
             <p14:sldId id="530"/>
             <p14:sldId id="534"/>
             <p14:sldId id="535"/>
@@ -464,7 +466,7 @@
           <a:p>
             <a:fld id="{88EB714B-C3CC-4216-88C1-02913905B1CF}" type="datetimeFigureOut">
               <a:rPr lang="en-GB" smtClean="0"/>
-              <a:t>08/03/2022</a:t>
+              <a:t>09/03/2022</a:t>
             </a:fld>
             <a:endParaRPr lang="en-GB"/>
           </a:p>
@@ -4261,7 +4263,19 @@
           <a:bodyPr/>
           <a:lstStyle/>
           <a:p>
+            <a:r>
+              <a:rPr lang="en-GB" dirty="0"/>
+              <a:t>Now you have a way to specify information to your program each time it is run, you might be tempted to do this every time. However, this interface quickly becomes unwieldy as the amount of information specified grows. For large amounts of information, using one or more input files which are read and interpreted by the code is a good solution. In general, input files are easier to edit that a long list of command line arguments and you can preserve input options to use in future runs. In fact, by specifying the path to the input file as a command line argument, you can have several input files for different problems and choose which one you want to use at run time. This is a common and powerful way to combine command line arguments and input files.</a:t>
+            </a:r>
+          </a:p>
+          <a:p>
             <a:endParaRPr lang="en-GB" dirty="0"/>
+          </a:p>
+          <a:p>
+            <a:r>
+              <a:rPr lang="en-GB" dirty="0"/>
+              <a:t>We’re not going to go into detail on how to open, read and parse files in this course, but it is worth bearing in mind as a valid alternative.</a:t>
+            </a:r>
           </a:p>
         </p:txBody>
       </p:sp>
@@ -4291,7 +4305,7 @@
     </p:spTree>
     <p:extLst>
       <p:ext uri="{BB962C8B-B14F-4D97-AF65-F5344CB8AC3E}">
-        <p14:creationId xmlns:p14="http://schemas.microsoft.com/office/powerpoint/2010/main" val="3909243973"/>
+        <p14:creationId xmlns:p14="http://schemas.microsoft.com/office/powerpoint/2010/main" val="1036564747"/>
       </p:ext>
     </p:extLst>
   </p:cSld>
@@ -4345,17 +4359,6 @@
           <a:bodyPr/>
           <a:lstStyle/>
           <a:p>
-            <a:r>
-              <a:rPr lang="en-GB" dirty="0"/>
-              <a:t>Sample solution in “Exercise Sample Solutions/Command Line Arguments/sample_solution.py”. It can be run with the command “python sample_solution.py </a:t>
-            </a:r>
-            <a:r>
-              <a:rPr lang="en-GB" sz="1200" dirty="0">
-                <a:latin typeface="+mj-lt"/>
-                <a:cs typeface="Courier New" panose="02070309020205020404" pitchFamily="49" charset="0"/>
-              </a:rPr>
-              <a:t>1 5 0 2 10 1” to produce the graph on the next page.</a:t>
-            </a:r>
             <a:endParaRPr lang="en-GB" dirty="0"/>
           </a:p>
         </p:txBody>
@@ -4386,7 +4389,7 @@
     </p:spTree>
     <p:extLst>
       <p:ext uri="{BB962C8B-B14F-4D97-AF65-F5344CB8AC3E}">
-        <p14:creationId xmlns:p14="http://schemas.microsoft.com/office/powerpoint/2010/main" val="2822767280"/>
+        <p14:creationId xmlns:p14="http://schemas.microsoft.com/office/powerpoint/2010/main" val="3909243973"/>
       </p:ext>
     </p:extLst>
   </p:cSld>
@@ -4440,6 +4443,17 @@
           <a:bodyPr/>
           <a:lstStyle/>
           <a:p>
+            <a:r>
+              <a:rPr lang="en-GB" dirty="0"/>
+              <a:t>Sample solution in “Exercise Sample Solutions/Command Line Arguments/sample_solution.py”. It can be run with the command “python sample_solution.py </a:t>
+            </a:r>
+            <a:r>
+              <a:rPr lang="en-GB" sz="1200" dirty="0">
+                <a:latin typeface="+mj-lt"/>
+                <a:cs typeface="Courier New" panose="02070309020205020404" pitchFamily="49" charset="0"/>
+              </a:rPr>
+              <a:t>1 5 0 2 10 1” to produce the graph on the next page.</a:t>
+            </a:r>
             <a:endParaRPr lang="en-GB" dirty="0"/>
           </a:p>
         </p:txBody>
@@ -4470,7 +4484,7 @@
     </p:spTree>
     <p:extLst>
       <p:ext uri="{BB962C8B-B14F-4D97-AF65-F5344CB8AC3E}">
-        <p14:creationId xmlns:p14="http://schemas.microsoft.com/office/powerpoint/2010/main" val="146435962"/>
+        <p14:creationId xmlns:p14="http://schemas.microsoft.com/office/powerpoint/2010/main" val="2822767280"/>
       </p:ext>
     </p:extLst>
   </p:cSld>
@@ -4524,27 +4538,7 @@
           <a:bodyPr/>
           <a:lstStyle/>
           <a:p>
-            <a:pPr marL="0" marR="0" lvl="0" indent="0" algn="l" defTabSz="914400" rtl="0" eaLnBrk="1" fontAlgn="auto" latinLnBrk="0" hangingPunct="1">
-              <a:lnSpc>
-                <a:spcPct val="100000"/>
-              </a:lnSpc>
-              <a:spcBef>
-                <a:spcPts val="0"/>
-              </a:spcBef>
-              <a:spcAft>
-                <a:spcPts val="0"/>
-              </a:spcAft>
-              <a:buClrTx/>
-              <a:buSzTx/>
-              <a:buFontTx/>
-              <a:buNone/>
-              <a:tabLst/>
-              <a:defRPr/>
-            </a:pPr>
-            <a:r>
-              <a:rPr lang="en-GB" dirty="0"/>
-              <a:t>No additional notes.</a:t>
-            </a:r>
+            <a:endParaRPr lang="en-GB" dirty="0"/>
           </a:p>
         </p:txBody>
       </p:sp>
@@ -4574,7 +4568,7 @@
     </p:spTree>
     <p:extLst>
       <p:ext uri="{BB962C8B-B14F-4D97-AF65-F5344CB8AC3E}">
-        <p14:creationId xmlns:p14="http://schemas.microsoft.com/office/powerpoint/2010/main" val="1977625569"/>
+        <p14:creationId xmlns:p14="http://schemas.microsoft.com/office/powerpoint/2010/main" val="146435962"/>
       </p:ext>
     </p:extLst>
   </p:cSld>
@@ -4678,7 +4672,7 @@
     </p:spTree>
     <p:extLst>
       <p:ext uri="{BB962C8B-B14F-4D97-AF65-F5344CB8AC3E}">
-        <p14:creationId xmlns:p14="http://schemas.microsoft.com/office/powerpoint/2010/main" val="1108802818"/>
+        <p14:creationId xmlns:p14="http://schemas.microsoft.com/office/powerpoint/2010/main" val="1977625569"/>
       </p:ext>
     </p:extLst>
   </p:cSld>
@@ -4732,7 +4726,27 @@
           <a:bodyPr/>
           <a:lstStyle/>
           <a:p>
-            <a:endParaRPr lang="en-GB" dirty="0"/>
+            <a:pPr marL="0" marR="0" lvl="0" indent="0" algn="l" defTabSz="914400" rtl="0" eaLnBrk="1" fontAlgn="auto" latinLnBrk="0" hangingPunct="1">
+              <a:lnSpc>
+                <a:spcPct val="100000"/>
+              </a:lnSpc>
+              <a:spcBef>
+                <a:spcPts val="0"/>
+              </a:spcBef>
+              <a:spcAft>
+                <a:spcPts val="0"/>
+              </a:spcAft>
+              <a:buClrTx/>
+              <a:buSzTx/>
+              <a:buFontTx/>
+              <a:buNone/>
+              <a:tabLst/>
+              <a:defRPr/>
+            </a:pPr>
+            <a:r>
+              <a:rPr lang="en-GB" dirty="0"/>
+              <a:t>No additional notes.</a:t>
+            </a:r>
           </a:p>
         </p:txBody>
       </p:sp>
@@ -4754,6 +4768,90 @@
             <a:fld id="{6A641EC8-C9F8-4A58-A1A7-F7D817526EEC}" type="slidenum">
               <a:rPr lang="en-GB" smtClean="0"/>
               <a:t>37</a:t>
+            </a:fld>
+            <a:endParaRPr lang="en-GB"/>
+          </a:p>
+        </p:txBody>
+      </p:sp>
+    </p:spTree>
+    <p:extLst>
+      <p:ext uri="{BB962C8B-B14F-4D97-AF65-F5344CB8AC3E}">
+        <p14:creationId xmlns:p14="http://schemas.microsoft.com/office/powerpoint/2010/main" val="1108802818"/>
+      </p:ext>
+    </p:extLst>
+  </p:cSld>
+  <p:clrMapOvr>
+    <a:masterClrMapping/>
+  </p:clrMapOvr>
+</p:notes>
+</file>
+
+<file path=ppt/notesSlides/notesSlide37.xml><?xml version="1.0" encoding="utf-8"?>
+<p:notes xmlns:a="http://schemas.openxmlformats.org/drawingml/2006/main" xmlns:r="http://schemas.openxmlformats.org/officeDocument/2006/relationships" xmlns:p="http://schemas.openxmlformats.org/presentationml/2006/main">
+  <p:cSld>
+    <p:spTree>
+      <p:nvGrpSpPr>
+        <p:cNvPr id="1" name=""/>
+        <p:cNvGrpSpPr/>
+        <p:nvPr/>
+      </p:nvGrpSpPr>
+      <p:grpSpPr>
+        <a:xfrm>
+          <a:off x="0" y="0"/>
+          <a:ext cx="0" cy="0"/>
+          <a:chOff x="0" y="0"/>
+          <a:chExt cx="0" cy="0"/>
+        </a:xfrm>
+      </p:grpSpPr>
+      <p:sp>
+        <p:nvSpPr>
+          <p:cNvPr id="2" name="Slide Image Placeholder 1"/>
+          <p:cNvSpPr>
+            <a:spLocks noGrp="1" noRot="1" noChangeAspect="1"/>
+          </p:cNvSpPr>
+          <p:nvPr>
+            <p:ph type="sldImg"/>
+          </p:nvPr>
+        </p:nvSpPr>
+        <p:spPr/>
+      </p:sp>
+      <p:sp>
+        <p:nvSpPr>
+          <p:cNvPr id="3" name="Notes Placeholder 2"/>
+          <p:cNvSpPr>
+            <a:spLocks noGrp="1"/>
+          </p:cNvSpPr>
+          <p:nvPr>
+            <p:ph type="body" idx="1"/>
+          </p:nvPr>
+        </p:nvSpPr>
+        <p:spPr/>
+        <p:txBody>
+          <a:bodyPr/>
+          <a:lstStyle/>
+          <a:p>
+            <a:endParaRPr lang="en-GB" dirty="0"/>
+          </a:p>
+        </p:txBody>
+      </p:sp>
+      <p:sp>
+        <p:nvSpPr>
+          <p:cNvPr id="4" name="Slide Number Placeholder 3"/>
+          <p:cNvSpPr>
+            <a:spLocks noGrp="1"/>
+          </p:cNvSpPr>
+          <p:nvPr>
+            <p:ph type="sldNum" sz="quarter" idx="10"/>
+          </p:nvPr>
+        </p:nvSpPr>
+        <p:spPr/>
+        <p:txBody>
+          <a:bodyPr/>
+          <a:lstStyle/>
+          <a:p>
+            <a:fld id="{6A641EC8-C9F8-4A58-A1A7-F7D817526EEC}" type="slidenum">
+              <a:rPr lang="en-GB" smtClean="0"/>
+              <a:t>38</a:t>
             </a:fld>
             <a:endParaRPr lang="en-GB"/>
           </a:p>
@@ -4772,7 +4870,7 @@
 </p:notes>
 </file>
 
-<file path=ppt/notesSlides/notesSlide37.xml><?xml version="1.0" encoding="utf-8"?>
+<file path=ppt/notesSlides/notesSlide38.xml><?xml version="1.0" encoding="utf-8"?>
 <p:notes xmlns:a="http://schemas.openxmlformats.org/drawingml/2006/main" xmlns:r="http://schemas.openxmlformats.org/officeDocument/2006/relationships" xmlns:p="http://schemas.openxmlformats.org/presentationml/2006/main">
   <p:cSld>
     <p:spTree>
@@ -4949,7 +5047,7 @@
                   <a:spcPct val="0"/>
                 </a:spcBef>
               </a:pPr>
-              <a:t>38</a:t>
+              <a:t>39</a:t>
             </a:fld>
             <a:endParaRPr lang="en-US" altLang="en-US"/>
           </a:p>
@@ -6168,7 +6266,7 @@
           <a:p>
             <a:fld id="{EB0080F8-EA1C-491D-963C-2C881B2F918F}" type="datetimeFigureOut">
               <a:rPr lang="en-GB" smtClean="0"/>
-              <a:t>08/03/2022</a:t>
+              <a:t>09/03/2022</a:t>
             </a:fld>
             <a:endParaRPr lang="en-GB"/>
           </a:p>
@@ -6318,7 +6416,7 @@
           <a:p>
             <a:fld id="{EB0080F8-EA1C-491D-963C-2C881B2F918F}" type="datetimeFigureOut">
               <a:rPr lang="en-GB" smtClean="0"/>
-              <a:t>08/03/2022</a:t>
+              <a:t>09/03/2022</a:t>
             </a:fld>
             <a:endParaRPr lang="en-GB"/>
           </a:p>
@@ -7851,7 +7949,7 @@
           <a:p>
             <a:fld id="{EB0080F8-EA1C-491D-963C-2C881B2F918F}" type="datetimeFigureOut">
               <a:rPr lang="en-GB" smtClean="0"/>
-              <a:t>08/03/2022</a:t>
+              <a:t>09/03/2022</a:t>
             </a:fld>
             <a:endParaRPr lang="en-GB"/>
           </a:p>
@@ -14147,7 +14245,7 @@
         </p:spPr>
         <p:txBody>
           <a:bodyPr>
-            <a:normAutofit/>
+            <a:normAutofit lnSpcReduction="10000"/>
           </a:bodyPr>
           <a:lstStyle/>
           <a:p>
@@ -14161,21 +14259,21 @@
                 <a:latin typeface="+mj-lt"/>
                 <a:cs typeface="Courier New" panose="02070309020205020404" pitchFamily="49" charset="0"/>
               </a:rPr>
-              <a:t>The code in </a:t>
+              <a:t>Write a script named </a:t>
             </a:r>
             <a:r>
               <a:rPr lang="en-GB" sz="2600" dirty="0">
                 <a:latin typeface="Courier New" panose="02070309020205020404" pitchFamily="49" charset="0"/>
                 <a:cs typeface="Courier New" panose="02070309020205020404" pitchFamily="49" charset="0"/>
               </a:rPr>
-              <a:t>Exercises/Command Line Arguments/sin_plotter.py </a:t>
-            </a:r>
-            <a:r>
-              <a:rPr lang="en-GB" sz="2600" dirty="0">
-                <a:latin typeface="+mj-lt"/>
-                <a:cs typeface="Courier New" panose="02070309020205020404" pitchFamily="49" charset="0"/>
-              </a:rPr>
-              <a:t>plots the sum of a number of sin functions</a:t>
+              <a:t>divider.py </a:t>
+            </a:r>
+            <a:r>
+              <a:rPr lang="en-GB" sz="2600" dirty="0">
+                <a:latin typeface="+mj-lt"/>
+                <a:cs typeface="Courier New" panose="02070309020205020404" pitchFamily="49" charset="0"/>
+              </a:rPr>
+              <a:t>designed to calculate and print the result when one value is divided by another</a:t>
             </a:r>
           </a:p>
           <a:p>
@@ -14189,7 +14287,7 @@
                 <a:latin typeface="+mj-lt"/>
                 <a:cs typeface="Courier New" panose="02070309020205020404" pitchFamily="49" charset="0"/>
               </a:rPr>
-              <a:t>It can be called by passing a list of lists. Each inner list describes a sin function in the format [amplitude, wavelength, phase]</a:t>
+              <a:t>The script should read arguments provided on the command line</a:t>
             </a:r>
           </a:p>
           <a:p>
@@ -14203,16 +14301,86 @@
                 <a:latin typeface="+mj-lt"/>
                 <a:cs typeface="Courier New" panose="02070309020205020404" pitchFamily="49" charset="0"/>
               </a:rPr>
-              <a:t>An example call to this function is given in </a:t>
+              <a:t>The first is the numerator</a:t>
+            </a:r>
+          </a:p>
+          <a:p>
+            <a:pPr>
+              <a:lnSpc>
+                <a:spcPct val="107000"/>
+              </a:lnSpc>
+            </a:pPr>
+            <a:r>
+              <a:rPr lang="en-GB" sz="2600" dirty="0">
+                <a:latin typeface="+mj-lt"/>
+                <a:cs typeface="Courier New" panose="02070309020205020404" pitchFamily="49" charset="0"/>
+              </a:rPr>
+              <a:t>The second is the denominator</a:t>
+            </a:r>
+          </a:p>
+          <a:p>
+            <a:pPr>
+              <a:lnSpc>
+                <a:spcPct val="107000"/>
+              </a:lnSpc>
+            </a:pPr>
+            <a:r>
+              <a:rPr lang="en-GB" sz="2600" dirty="0">
+                <a:latin typeface="+mj-lt"/>
+                <a:cs typeface="Courier New" panose="02070309020205020404" pitchFamily="49" charset="0"/>
+              </a:rPr>
+              <a:t>So, using the command </a:t>
             </a:r>
             <a:r>
               <a:rPr lang="en-GB" sz="2600" dirty="0">
                 <a:latin typeface="Courier New" panose="02070309020205020404" pitchFamily="49" charset="0"/>
                 <a:cs typeface="Courier New" panose="02070309020205020404" pitchFamily="49" charset="0"/>
               </a:rPr>
-              <a:t>Exercises/Command Line Arguments/example_call.py</a:t>
-            </a:r>
-            <a:endParaRPr lang="en-GB" sz="2600" dirty="0">
+              <a:t>python divider.py 5 2 </a:t>
+            </a:r>
+            <a:r>
+              <a:rPr lang="en-GB" sz="2600" dirty="0">
+                <a:latin typeface="+mj-lt"/>
+                <a:cs typeface="Courier New" panose="02070309020205020404" pitchFamily="49" charset="0"/>
+              </a:rPr>
+              <a:t>should cause the value </a:t>
+            </a:r>
+            <a:r>
+              <a:rPr lang="en-GB" sz="2600" dirty="0">
+                <a:latin typeface="Courier New" panose="02070309020205020404" pitchFamily="49" charset="0"/>
+                <a:cs typeface="Courier New" panose="02070309020205020404" pitchFamily="49" charset="0"/>
+              </a:rPr>
+              <a:t>2.5</a:t>
+            </a:r>
+            <a:r>
+              <a:rPr lang="en-GB" sz="2600" dirty="0">
+                <a:latin typeface="+mj-lt"/>
+                <a:cs typeface="Courier New" panose="02070309020205020404" pitchFamily="49" charset="0"/>
+              </a:rPr>
+              <a:t> to be printed</a:t>
+            </a:r>
+          </a:p>
+          <a:p>
+            <a:pPr>
+              <a:lnSpc>
+                <a:spcPct val="107000"/>
+              </a:lnSpc>
+            </a:pPr>
+            <a:r>
+              <a:rPr lang="en-GB" sz="2600" dirty="0">
+                <a:latin typeface="+mj-lt"/>
+                <a:cs typeface="Courier New" panose="02070309020205020404" pitchFamily="49" charset="0"/>
+              </a:rPr>
+              <a:t>Consider what your code should do if the number of arguments </a:t>
+            </a:r>
+            <a:r>
+              <a:rPr lang="en-GB" sz="2600">
+                <a:latin typeface="+mj-lt"/>
+                <a:cs typeface="Courier New" panose="02070309020205020404" pitchFamily="49" charset="0"/>
+              </a:rPr>
+              <a:t>provided is not 2</a:t>
+            </a:r>
+            <a:endParaRPr lang="en-GB" sz="2200" dirty="0">
               <a:latin typeface="+mj-lt"/>
               <a:cs typeface="Courier New" panose="02070309020205020404" pitchFamily="49" charset="0"/>
             </a:endParaRPr>
@@ -14222,18 +14390,18 @@
     </p:spTree>
     <p:extLst>
       <p:ext uri="{BB962C8B-B14F-4D97-AF65-F5344CB8AC3E}">
-        <p14:creationId xmlns:p14="http://schemas.microsoft.com/office/powerpoint/2010/main" val="2326194894"/>
+        <p14:creationId xmlns:p14="http://schemas.microsoft.com/office/powerpoint/2010/main" val="36838629"/>
       </p:ext>
     </p:extLst>
   </p:cSld>
   <p:clrMapOvr>
     <a:masterClrMapping/>
   </p:clrMapOvr>
-  <mc:AlternateContent xmlns:mc="http://schemas.openxmlformats.org/markup-compatibility/2006" xmlns:p14="http://schemas.microsoft.com/office/powerpoint/2010/main">
-    <mc:Choice Requires="p14">
+  <mc:AlternateContent xmlns:mc="http://schemas.openxmlformats.org/markup-compatibility/2006">
+    <mc:Choice xmlns:p14="http://schemas.microsoft.com/office/powerpoint/2010/main" Requires="p14">
       <p:transition p14:dur="10"/>
     </mc:Choice>
-    <mc:Fallback xmlns="">
+    <mc:Fallback>
       <p:transition/>
     </mc:Fallback>
   </mc:AlternateContent>
@@ -14297,6 +14465,156 @@
         </p:spPr>
         <p:txBody>
           <a:bodyPr>
+            <a:normAutofit/>
+          </a:bodyPr>
+          <a:lstStyle/>
+          <a:p>
+            <a:pPr>
+              <a:lnSpc>
+                <a:spcPct val="107000"/>
+              </a:lnSpc>
+            </a:pPr>
+            <a:r>
+              <a:rPr lang="en-GB" sz="2600" dirty="0">
+                <a:latin typeface="+mj-lt"/>
+                <a:cs typeface="Courier New" panose="02070309020205020404" pitchFamily="49" charset="0"/>
+              </a:rPr>
+              <a:t>The code in </a:t>
+            </a:r>
+            <a:r>
+              <a:rPr lang="en-GB" sz="2600" dirty="0">
+                <a:latin typeface="Courier New" panose="02070309020205020404" pitchFamily="49" charset="0"/>
+                <a:cs typeface="Courier New" panose="02070309020205020404" pitchFamily="49" charset="0"/>
+              </a:rPr>
+              <a:t>Exercises/Command Line Arguments/sin_plotter.py </a:t>
+            </a:r>
+            <a:r>
+              <a:rPr lang="en-GB" sz="2600" dirty="0">
+                <a:latin typeface="+mj-lt"/>
+                <a:cs typeface="Courier New" panose="02070309020205020404" pitchFamily="49" charset="0"/>
+              </a:rPr>
+              <a:t>plots the sum of a number of sin functions</a:t>
+            </a:r>
+          </a:p>
+          <a:p>
+            <a:pPr>
+              <a:lnSpc>
+                <a:spcPct val="107000"/>
+              </a:lnSpc>
+            </a:pPr>
+            <a:r>
+              <a:rPr lang="en-GB" sz="2600" dirty="0">
+                <a:latin typeface="+mj-lt"/>
+                <a:cs typeface="Courier New" panose="02070309020205020404" pitchFamily="49" charset="0"/>
+              </a:rPr>
+              <a:t>It can be called by passing a list of lists. Each inner list describes a sin function in the format [amplitude, wavelength, phase]</a:t>
+            </a:r>
+          </a:p>
+          <a:p>
+            <a:pPr>
+              <a:lnSpc>
+                <a:spcPct val="107000"/>
+              </a:lnSpc>
+            </a:pPr>
+            <a:r>
+              <a:rPr lang="en-GB" sz="2600" dirty="0">
+                <a:latin typeface="+mj-lt"/>
+                <a:cs typeface="Courier New" panose="02070309020205020404" pitchFamily="49" charset="0"/>
+              </a:rPr>
+              <a:t>An example call to this function is given in </a:t>
+            </a:r>
+            <a:r>
+              <a:rPr lang="en-GB" sz="2600" dirty="0">
+                <a:latin typeface="Courier New" panose="02070309020205020404" pitchFamily="49" charset="0"/>
+                <a:cs typeface="Courier New" panose="02070309020205020404" pitchFamily="49" charset="0"/>
+              </a:rPr>
+              <a:t>Exercises/Command Line Arguments/example_call.py</a:t>
+            </a:r>
+            <a:endParaRPr lang="en-GB" sz="2600" dirty="0">
+              <a:latin typeface="+mj-lt"/>
+              <a:cs typeface="Courier New" panose="02070309020205020404" pitchFamily="49" charset="0"/>
+            </a:endParaRPr>
+          </a:p>
+        </p:txBody>
+      </p:sp>
+    </p:spTree>
+    <p:extLst>
+      <p:ext uri="{BB962C8B-B14F-4D97-AF65-F5344CB8AC3E}">
+        <p14:creationId xmlns:p14="http://schemas.microsoft.com/office/powerpoint/2010/main" val="2326194894"/>
+      </p:ext>
+    </p:extLst>
+  </p:cSld>
+  <p:clrMapOvr>
+    <a:masterClrMapping/>
+  </p:clrMapOvr>
+  <mc:AlternateContent xmlns:mc="http://schemas.openxmlformats.org/markup-compatibility/2006" xmlns:p14="http://schemas.microsoft.com/office/powerpoint/2010/main">
+    <mc:Choice Requires="p14">
+      <p:transition p14:dur="10"/>
+    </mc:Choice>
+    <mc:Fallback xmlns="">
+      <p:transition/>
+    </mc:Fallback>
+  </mc:AlternateContent>
+</p:sld>
+</file>
+
+<file path=ppt/slides/slide34.xml><?xml version="1.0" encoding="utf-8"?>
+<p:sld xmlns:a="http://schemas.openxmlformats.org/drawingml/2006/main" xmlns:r="http://schemas.openxmlformats.org/officeDocument/2006/relationships" xmlns:p="http://schemas.openxmlformats.org/presentationml/2006/main">
+  <p:cSld>
+    <p:spTree>
+      <p:nvGrpSpPr>
+        <p:cNvPr id="1" name=""/>
+        <p:cNvGrpSpPr/>
+        <p:nvPr/>
+      </p:nvGrpSpPr>
+      <p:grpSpPr>
+        <a:xfrm>
+          <a:off x="0" y="0"/>
+          <a:ext cx="0" cy="0"/>
+          <a:chOff x="0" y="0"/>
+          <a:chExt cx="0" cy="0"/>
+        </a:xfrm>
+      </p:grpSpPr>
+      <p:sp>
+        <p:nvSpPr>
+          <p:cNvPr id="2" name="Title 1"/>
+          <p:cNvSpPr>
+            <a:spLocks noGrp="1"/>
+          </p:cNvSpPr>
+          <p:nvPr>
+            <p:ph type="title"/>
+          </p:nvPr>
+        </p:nvSpPr>
+        <p:spPr/>
+        <p:txBody>
+          <a:bodyPr/>
+          <a:lstStyle/>
+          <a:p>
+            <a:r>
+              <a:rPr lang="en-GB" sz="4000" dirty="0"/>
+              <a:t>Exercise</a:t>
+            </a:r>
+          </a:p>
+        </p:txBody>
+      </p:sp>
+      <p:sp>
+        <p:nvSpPr>
+          <p:cNvPr id="3" name="Content Placeholder 2"/>
+          <p:cNvSpPr>
+            <a:spLocks noGrp="1"/>
+          </p:cNvSpPr>
+          <p:nvPr>
+            <p:ph idx="1"/>
+          </p:nvPr>
+        </p:nvSpPr>
+        <p:spPr>
+          <a:xfrm>
+            <a:off x="457200" y="1600200"/>
+            <a:ext cx="8435280" cy="4800600"/>
+          </a:xfrm>
+        </p:spPr>
+        <p:txBody>
+          <a:bodyPr>
             <a:normAutofit fontScale="92500"/>
           </a:bodyPr>
           <a:lstStyle/>
@@ -14442,7 +14760,7 @@
 </p:sld>
 </file>
 
-<file path=ppt/slides/slide34.xml><?xml version="1.0" encoding="utf-8"?>
+<file path=ppt/slides/slide35.xml><?xml version="1.0" encoding="utf-8"?>
 <p:sld xmlns:a="http://schemas.openxmlformats.org/drawingml/2006/main" xmlns:r="http://schemas.openxmlformats.org/officeDocument/2006/relationships" xmlns:p="http://schemas.openxmlformats.org/presentationml/2006/main">
   <p:cSld>
     <p:spTree>
@@ -14532,212 +14850,6 @@
 </p:sld>
 </file>
 
-<file path=ppt/slides/slide35.xml><?xml version="1.0" encoding="utf-8"?>
-<p:sld xmlns:a="http://schemas.openxmlformats.org/drawingml/2006/main" xmlns:r="http://schemas.openxmlformats.org/officeDocument/2006/relationships" xmlns:p="http://schemas.openxmlformats.org/presentationml/2006/main">
-  <p:cSld>
-    <p:spTree>
-      <p:nvGrpSpPr>
-        <p:cNvPr id="1" name=""/>
-        <p:cNvGrpSpPr/>
-        <p:nvPr/>
-      </p:nvGrpSpPr>
-      <p:grpSpPr>
-        <a:xfrm>
-          <a:off x="0" y="0"/>
-          <a:ext cx="0" cy="0"/>
-          <a:chOff x="0" y="0"/>
-          <a:chExt cx="0" cy="0"/>
-        </a:xfrm>
-      </p:grpSpPr>
-      <p:sp>
-        <p:nvSpPr>
-          <p:cNvPr id="2" name="Title 1"/>
-          <p:cNvSpPr>
-            <a:spLocks noGrp="1"/>
-          </p:cNvSpPr>
-          <p:nvPr>
-            <p:ph type="title"/>
-          </p:nvPr>
-        </p:nvSpPr>
-        <p:spPr/>
-        <p:txBody>
-          <a:bodyPr/>
-          <a:lstStyle/>
-          <a:p>
-            <a:r>
-              <a:rPr lang="en-GB" sz="4000" dirty="0"/>
-              <a:t>Taking it Further - HPC</a:t>
-            </a:r>
-          </a:p>
-        </p:txBody>
-      </p:sp>
-      <p:sp>
-        <p:nvSpPr>
-          <p:cNvPr id="3" name="Content Placeholder 2"/>
-          <p:cNvSpPr>
-            <a:spLocks noGrp="1"/>
-          </p:cNvSpPr>
-          <p:nvPr>
-            <p:ph idx="1"/>
-          </p:nvPr>
-        </p:nvSpPr>
-        <p:spPr>
-          <a:xfrm>
-            <a:off x="457200" y="1600200"/>
-            <a:ext cx="8435280" cy="4800600"/>
-          </a:xfrm>
-        </p:spPr>
-        <p:txBody>
-          <a:bodyPr>
-            <a:normAutofit fontScale="92500"/>
-          </a:bodyPr>
-          <a:lstStyle/>
-          <a:p>
-            <a:pPr>
-              <a:lnSpc>
-                <a:spcPct val="107000"/>
-              </a:lnSpc>
-            </a:pPr>
-            <a:r>
-              <a:rPr lang="en-GB" sz="2600" dirty="0">
-                <a:latin typeface="+mj-lt"/>
-                <a:cs typeface="Courier New" panose="02070309020205020404" pitchFamily="49" charset="0"/>
-              </a:rPr>
-              <a:t>High Performance Computing (HPC) clusters allow you to access powerful computers to run large jobs quickly</a:t>
-            </a:r>
-          </a:p>
-          <a:p>
-            <a:pPr>
-              <a:lnSpc>
-                <a:spcPct val="107000"/>
-              </a:lnSpc>
-            </a:pPr>
-            <a:r>
-              <a:rPr lang="en-GB" sz="2600" dirty="0">
-                <a:latin typeface="+mj-lt"/>
-                <a:cs typeface="Courier New" panose="02070309020205020404" pitchFamily="49" charset="0"/>
-              </a:rPr>
-              <a:t>You will need to transfer your code to the HPC cluster</a:t>
-            </a:r>
-          </a:p>
-          <a:p>
-            <a:pPr>
-              <a:lnSpc>
-                <a:spcPct val="107000"/>
-              </a:lnSpc>
-            </a:pPr>
-            <a:r>
-              <a:rPr lang="en-GB" sz="2600" dirty="0">
-                <a:latin typeface="+mj-lt"/>
-                <a:cs typeface="Courier New" panose="02070309020205020404" pitchFamily="49" charset="0"/>
-              </a:rPr>
-              <a:t>Code will be run remotely using terminal commands</a:t>
-            </a:r>
-          </a:p>
-          <a:p>
-            <a:pPr>
-              <a:lnSpc>
-                <a:spcPct val="107000"/>
-              </a:lnSpc>
-            </a:pPr>
-            <a:r>
-              <a:rPr lang="en-GB" sz="2600" dirty="0">
-                <a:latin typeface="+mj-lt"/>
-                <a:cs typeface="Courier New" panose="02070309020205020404" pitchFamily="49" charset="0"/>
-              </a:rPr>
-              <a:t>You will typically need to create an environment for your code</a:t>
-            </a:r>
-          </a:p>
-          <a:p>
-            <a:pPr>
-              <a:lnSpc>
-                <a:spcPct val="107000"/>
-              </a:lnSpc>
-            </a:pPr>
-            <a:r>
-              <a:rPr lang="en-GB" sz="2600" dirty="0">
-                <a:latin typeface="+mj-lt"/>
-                <a:cs typeface="Courier New" panose="02070309020205020404" pitchFamily="49" charset="0"/>
-              </a:rPr>
-              <a:t>Python-specific instructions for Imperial’s HPC cluster can be found </a:t>
-            </a:r>
-            <a:r>
-              <a:rPr lang="en-GB" sz="2600" dirty="0">
-                <a:latin typeface="+mj-lt"/>
-                <a:cs typeface="Courier New" panose="02070309020205020404" pitchFamily="49" charset="0"/>
-                <a:hlinkClick r:id="rId3"/>
-              </a:rPr>
-              <a:t>here</a:t>
-            </a:r>
-            <a:endParaRPr lang="en-GB" sz="2600" dirty="0">
-              <a:latin typeface="+mj-lt"/>
-              <a:cs typeface="Courier New" panose="02070309020205020404" pitchFamily="49" charset="0"/>
-            </a:endParaRPr>
-          </a:p>
-          <a:p>
-            <a:pPr>
-              <a:lnSpc>
-                <a:spcPct val="107000"/>
-              </a:lnSpc>
-            </a:pPr>
-            <a:r>
-              <a:rPr lang="en-GB" sz="2600" dirty="0">
-                <a:latin typeface="+mj-lt"/>
-                <a:cs typeface="Courier New" panose="02070309020205020404" pitchFamily="49" charset="0"/>
-              </a:rPr>
-              <a:t>General information about using HPC at Imperial can be found </a:t>
-            </a:r>
-            <a:r>
-              <a:rPr lang="en-GB" sz="2600" dirty="0">
-                <a:latin typeface="+mj-lt"/>
-                <a:cs typeface="Courier New" panose="02070309020205020404" pitchFamily="49" charset="0"/>
-                <a:hlinkClick r:id="rId4"/>
-              </a:rPr>
-              <a:t>here</a:t>
-            </a:r>
-            <a:r>
-              <a:rPr lang="en-GB" sz="2600" dirty="0">
-                <a:latin typeface="+mj-lt"/>
-                <a:cs typeface="Courier New" panose="02070309020205020404" pitchFamily="49" charset="0"/>
-              </a:rPr>
-              <a:t> or you may register for the Graduate School course </a:t>
-            </a:r>
-            <a:r>
-              <a:rPr lang="en-GB" sz="2600" dirty="0">
-                <a:latin typeface="+mj-lt"/>
-                <a:cs typeface="Courier New" panose="02070309020205020404" pitchFamily="49" charset="0"/>
-                <a:hlinkClick r:id="rId5"/>
-              </a:rPr>
-              <a:t>here</a:t>
-            </a:r>
-            <a:endParaRPr lang="en-GB" sz="2600" dirty="0">
-              <a:latin typeface="+mj-lt"/>
-              <a:cs typeface="Courier New" panose="02070309020205020404" pitchFamily="49" charset="0"/>
-            </a:endParaRPr>
-          </a:p>
-        </p:txBody>
-      </p:sp>
-    </p:spTree>
-    <p:extLst>
-      <p:ext uri="{BB962C8B-B14F-4D97-AF65-F5344CB8AC3E}">
-        <p14:creationId xmlns:p14="http://schemas.microsoft.com/office/powerpoint/2010/main" val="2357441072"/>
-      </p:ext>
-    </p:extLst>
-  </p:cSld>
-  <p:clrMapOvr>
-    <a:masterClrMapping/>
-  </p:clrMapOvr>
-  <mc:AlternateContent xmlns:mc="http://schemas.openxmlformats.org/markup-compatibility/2006" xmlns:p14="http://schemas.microsoft.com/office/powerpoint/2010/main">
-    <mc:Choice Requires="p14">
-      <p:transition p14:dur="10"/>
-    </mc:Choice>
-    <mc:Fallback xmlns="">
-      <p:transition/>
-    </mc:Fallback>
-  </mc:AlternateContent>
-</p:sld>
-</file>
-
 <file path=ppt/slides/slide36.xml><?xml version="1.0" encoding="utf-8"?>
 <p:sld xmlns:a="http://schemas.openxmlformats.org/drawingml/2006/main" xmlns:r="http://schemas.openxmlformats.org/officeDocument/2006/relationships" xmlns:p="http://schemas.openxmlformats.org/presentationml/2006/main">
   <p:cSld>
@@ -14765,19 +14877,14 @@
             <p:ph type="title"/>
           </p:nvPr>
         </p:nvSpPr>
-        <p:spPr>
-          <a:xfrm>
-            <a:off x="457200" y="274638"/>
-            <a:ext cx="6017172" cy="1143000"/>
-          </a:xfrm>
-        </p:spPr>
+        <p:spPr/>
         <p:txBody>
           <a:bodyPr/>
           <a:lstStyle/>
           <a:p>
             <a:r>
               <a:rPr lang="en-GB" sz="4000" dirty="0"/>
-              <a:t>Taking it Further - Containers</a:t>
+              <a:t>Taking it Further - HPC</a:t>
             </a:r>
           </a:p>
         </p:txBody>
@@ -14800,7 +14907,7 @@
         </p:spPr>
         <p:txBody>
           <a:bodyPr>
-            <a:normAutofit/>
+            <a:normAutofit fontScale="92500"/>
           </a:bodyPr>
           <a:lstStyle/>
           <a:p>
@@ -14814,7 +14921,63 @@
                 <a:latin typeface="+mj-lt"/>
                 <a:cs typeface="Courier New" panose="02070309020205020404" pitchFamily="49" charset="0"/>
               </a:rPr>
-              <a:t>Containers (such as </a:t>
+              <a:t>High Performance Computing (HPC) clusters allow you to access powerful computers to run large jobs quickly</a:t>
+            </a:r>
+          </a:p>
+          <a:p>
+            <a:pPr>
+              <a:lnSpc>
+                <a:spcPct val="107000"/>
+              </a:lnSpc>
+            </a:pPr>
+            <a:r>
+              <a:rPr lang="en-GB" sz="2600" dirty="0">
+                <a:latin typeface="+mj-lt"/>
+                <a:cs typeface="Courier New" panose="02070309020205020404" pitchFamily="49" charset="0"/>
+              </a:rPr>
+              <a:t>You will need to transfer your code to the HPC cluster</a:t>
+            </a:r>
+          </a:p>
+          <a:p>
+            <a:pPr>
+              <a:lnSpc>
+                <a:spcPct val="107000"/>
+              </a:lnSpc>
+            </a:pPr>
+            <a:r>
+              <a:rPr lang="en-GB" sz="2600" dirty="0">
+                <a:latin typeface="+mj-lt"/>
+                <a:cs typeface="Courier New" panose="02070309020205020404" pitchFamily="49" charset="0"/>
+              </a:rPr>
+              <a:t>Code will be run remotely using terminal commands</a:t>
+            </a:r>
+          </a:p>
+          <a:p>
+            <a:pPr>
+              <a:lnSpc>
+                <a:spcPct val="107000"/>
+              </a:lnSpc>
+            </a:pPr>
+            <a:r>
+              <a:rPr lang="en-GB" sz="2600" dirty="0">
+                <a:latin typeface="+mj-lt"/>
+                <a:cs typeface="Courier New" panose="02070309020205020404" pitchFamily="49" charset="0"/>
+              </a:rPr>
+              <a:t>You will typically need to create an environment for your code</a:t>
+            </a:r>
+          </a:p>
+          <a:p>
+            <a:pPr>
+              <a:lnSpc>
+                <a:spcPct val="107000"/>
+              </a:lnSpc>
+            </a:pPr>
+            <a:r>
+              <a:rPr lang="en-GB" sz="2600" dirty="0">
+                <a:latin typeface="+mj-lt"/>
+                <a:cs typeface="Courier New" panose="02070309020205020404" pitchFamily="49" charset="0"/>
+              </a:rPr>
+              <a:t>Python-specific instructions for Imperial’s HPC cluster can be found </a:t>
             </a:r>
             <a:r>
               <a:rPr lang="en-GB" sz="2600" dirty="0">
@@ -14822,78 +14985,7 @@
                 <a:cs typeface="Courier New" panose="02070309020205020404" pitchFamily="49" charset="0"/>
                 <a:hlinkClick r:id="rId3"/>
               </a:rPr>
-              <a:t>Docker</a:t>
-            </a:r>
-            <a:r>
-              <a:rPr lang="en-GB" sz="2600" dirty="0">
-                <a:latin typeface="+mj-lt"/>
-                <a:cs typeface="Courier New" panose="02070309020205020404" pitchFamily="49" charset="0"/>
-              </a:rPr>
-              <a:t>) are a way of defining a loosely isolated environment for running applications</a:t>
-            </a:r>
-          </a:p>
-          <a:p>
-            <a:pPr>
-              <a:lnSpc>
-                <a:spcPct val="107000"/>
-              </a:lnSpc>
-            </a:pPr>
-            <a:r>
-              <a:rPr lang="en-GB" sz="2600" dirty="0">
-                <a:latin typeface="+mj-lt"/>
-                <a:cs typeface="Courier New" panose="02070309020205020404" pitchFamily="49" charset="0"/>
-              </a:rPr>
-              <a:t>Allows dependencies of applications to be packaged and isolated from the rest of the Operating System</a:t>
-            </a:r>
-          </a:p>
-          <a:p>
-            <a:pPr>
-              <a:lnSpc>
-                <a:spcPct val="107000"/>
-              </a:lnSpc>
-            </a:pPr>
-            <a:r>
-              <a:rPr lang="en-GB" sz="2600" dirty="0">
-                <a:latin typeface="+mj-lt"/>
-                <a:cs typeface="Courier New" panose="02070309020205020404" pitchFamily="49" charset="0"/>
-              </a:rPr>
-              <a:t>Ensures all developers and users are using the same environment</a:t>
-            </a:r>
-          </a:p>
-          <a:p>
-            <a:pPr>
-              <a:lnSpc>
-                <a:spcPct val="107000"/>
-              </a:lnSpc>
-            </a:pPr>
-            <a:r>
-              <a:rPr lang="en-GB" sz="2600" dirty="0">
-                <a:latin typeface="+mj-lt"/>
-                <a:cs typeface="Courier New" panose="02070309020205020404" pitchFamily="49" charset="0"/>
-              </a:rPr>
-              <a:t>Can also be useful for deploying more complex apps to HPC</a:t>
-            </a:r>
-          </a:p>
-          <a:p>
-            <a:pPr>
-              <a:lnSpc>
-                <a:spcPct val="107000"/>
-              </a:lnSpc>
-            </a:pPr>
-            <a:r>
-              <a:rPr lang="en-GB" sz="2600" dirty="0">
-                <a:latin typeface="+mj-lt"/>
-                <a:cs typeface="Courier New" panose="02070309020205020404" pitchFamily="49" charset="0"/>
-              </a:rPr>
-              <a:t>Can be used for </a:t>
-            </a:r>
-            <a:r>
-              <a:rPr lang="en-GB" sz="2600" dirty="0">
-                <a:latin typeface="+mj-lt"/>
-                <a:cs typeface="Courier New" panose="02070309020205020404" pitchFamily="49" charset="0"/>
-                <a:hlinkClick r:id="rId4"/>
-              </a:rPr>
-              <a:t>Python development</a:t>
+              <a:t>here</a:t>
             </a:r>
             <a:endParaRPr lang="en-GB" sz="2600" dirty="0">
               <a:latin typeface="+mj-lt"/>
@@ -14911,7 +15003,22 @@
                 <a:latin typeface="+mj-lt"/>
                 <a:cs typeface="Courier New" panose="02070309020205020404" pitchFamily="49" charset="0"/>
               </a:rPr>
-              <a:t>The Graduate School offers a </a:t>
+              <a:t>General information about using HPC at Imperial can be found </a:t>
+            </a:r>
+            <a:r>
+              <a:rPr lang="en-GB" sz="2600" dirty="0">
+                <a:latin typeface="+mj-lt"/>
+                <a:cs typeface="Courier New" panose="02070309020205020404" pitchFamily="49" charset="0"/>
+                <a:hlinkClick r:id="rId4"/>
+              </a:rPr>
+              <a:t>here</a:t>
+            </a:r>
+            <a:r>
+              <a:rPr lang="en-GB" sz="2600" dirty="0">
+                <a:latin typeface="+mj-lt"/>
+                <a:cs typeface="Courier New" panose="02070309020205020404" pitchFamily="49" charset="0"/>
+              </a:rPr>
+              <a:t> or you may register for the Graduate School course </a:t>
             </a:r>
             <a:r>
               <a:rPr lang="en-GB" sz="2600" dirty="0">
@@ -14919,30 +15026,19 @@
                 <a:cs typeface="Courier New" panose="02070309020205020404" pitchFamily="49" charset="0"/>
                 <a:hlinkClick r:id="rId5"/>
               </a:rPr>
-              <a:t>course on containers</a:t>
+              <a:t>here</a:t>
             </a:r>
             <a:endParaRPr lang="en-GB" sz="2600" dirty="0">
               <a:latin typeface="+mj-lt"/>
               <a:cs typeface="Courier New" panose="02070309020205020404" pitchFamily="49" charset="0"/>
             </a:endParaRPr>
           </a:p>
-          <a:p>
-            <a:pPr>
-              <a:lnSpc>
-                <a:spcPct val="107000"/>
-              </a:lnSpc>
-            </a:pPr>
-            <a:endParaRPr lang="en-GB" sz="2600" dirty="0">
-              <a:latin typeface="+mj-lt"/>
-              <a:cs typeface="Courier New" panose="02070309020205020404" pitchFamily="49" charset="0"/>
-            </a:endParaRPr>
-          </a:p>
         </p:txBody>
       </p:sp>
     </p:spTree>
     <p:extLst>
       <p:ext uri="{BB962C8B-B14F-4D97-AF65-F5344CB8AC3E}">
-        <p14:creationId xmlns:p14="http://schemas.microsoft.com/office/powerpoint/2010/main" val="3576927260"/>
+        <p14:creationId xmlns:p14="http://schemas.microsoft.com/office/powerpoint/2010/main" val="2357441072"/>
       </p:ext>
     </p:extLst>
   </p:cSld>
@@ -14987,6 +15083,228 @@
             <p:ph type="title"/>
           </p:nvPr>
         </p:nvSpPr>
+        <p:spPr>
+          <a:xfrm>
+            <a:off x="457200" y="274638"/>
+            <a:ext cx="6017172" cy="1143000"/>
+          </a:xfrm>
+        </p:spPr>
+        <p:txBody>
+          <a:bodyPr/>
+          <a:lstStyle/>
+          <a:p>
+            <a:r>
+              <a:rPr lang="en-GB" sz="4000" dirty="0"/>
+              <a:t>Taking it Further - Containers</a:t>
+            </a:r>
+          </a:p>
+        </p:txBody>
+      </p:sp>
+      <p:sp>
+        <p:nvSpPr>
+          <p:cNvPr id="3" name="Content Placeholder 2"/>
+          <p:cNvSpPr>
+            <a:spLocks noGrp="1"/>
+          </p:cNvSpPr>
+          <p:nvPr>
+            <p:ph idx="1"/>
+          </p:nvPr>
+        </p:nvSpPr>
+        <p:spPr>
+          <a:xfrm>
+            <a:off x="457200" y="1600200"/>
+            <a:ext cx="8435280" cy="4800600"/>
+          </a:xfrm>
+        </p:spPr>
+        <p:txBody>
+          <a:bodyPr>
+            <a:normAutofit/>
+          </a:bodyPr>
+          <a:lstStyle/>
+          <a:p>
+            <a:pPr>
+              <a:lnSpc>
+                <a:spcPct val="107000"/>
+              </a:lnSpc>
+            </a:pPr>
+            <a:r>
+              <a:rPr lang="en-GB" sz="2600" dirty="0">
+                <a:latin typeface="+mj-lt"/>
+                <a:cs typeface="Courier New" panose="02070309020205020404" pitchFamily="49" charset="0"/>
+              </a:rPr>
+              <a:t>Containers (such as </a:t>
+            </a:r>
+            <a:r>
+              <a:rPr lang="en-GB" sz="2600" dirty="0">
+                <a:latin typeface="+mj-lt"/>
+                <a:cs typeface="Courier New" panose="02070309020205020404" pitchFamily="49" charset="0"/>
+                <a:hlinkClick r:id="rId3"/>
+              </a:rPr>
+              <a:t>Docker</a:t>
+            </a:r>
+            <a:r>
+              <a:rPr lang="en-GB" sz="2600" dirty="0">
+                <a:latin typeface="+mj-lt"/>
+                <a:cs typeface="Courier New" panose="02070309020205020404" pitchFamily="49" charset="0"/>
+              </a:rPr>
+              <a:t>) are a way of defining a loosely isolated environment for running applications</a:t>
+            </a:r>
+          </a:p>
+          <a:p>
+            <a:pPr>
+              <a:lnSpc>
+                <a:spcPct val="107000"/>
+              </a:lnSpc>
+            </a:pPr>
+            <a:r>
+              <a:rPr lang="en-GB" sz="2600" dirty="0">
+                <a:latin typeface="+mj-lt"/>
+                <a:cs typeface="Courier New" panose="02070309020205020404" pitchFamily="49" charset="0"/>
+              </a:rPr>
+              <a:t>Allows dependencies of applications to be packaged and isolated from the rest of the Operating System</a:t>
+            </a:r>
+          </a:p>
+          <a:p>
+            <a:pPr>
+              <a:lnSpc>
+                <a:spcPct val="107000"/>
+              </a:lnSpc>
+            </a:pPr>
+            <a:r>
+              <a:rPr lang="en-GB" sz="2600" dirty="0">
+                <a:latin typeface="+mj-lt"/>
+                <a:cs typeface="Courier New" panose="02070309020205020404" pitchFamily="49" charset="0"/>
+              </a:rPr>
+              <a:t>Ensures all developers and users are using the same environment</a:t>
+            </a:r>
+          </a:p>
+          <a:p>
+            <a:pPr>
+              <a:lnSpc>
+                <a:spcPct val="107000"/>
+              </a:lnSpc>
+            </a:pPr>
+            <a:r>
+              <a:rPr lang="en-GB" sz="2600" dirty="0">
+                <a:latin typeface="+mj-lt"/>
+                <a:cs typeface="Courier New" panose="02070309020205020404" pitchFamily="49" charset="0"/>
+              </a:rPr>
+              <a:t>Can also be useful for deploying more complex apps to HPC</a:t>
+            </a:r>
+          </a:p>
+          <a:p>
+            <a:pPr>
+              <a:lnSpc>
+                <a:spcPct val="107000"/>
+              </a:lnSpc>
+            </a:pPr>
+            <a:r>
+              <a:rPr lang="en-GB" sz="2600" dirty="0">
+                <a:latin typeface="+mj-lt"/>
+                <a:cs typeface="Courier New" panose="02070309020205020404" pitchFamily="49" charset="0"/>
+              </a:rPr>
+              <a:t>Can be used for </a:t>
+            </a:r>
+            <a:r>
+              <a:rPr lang="en-GB" sz="2600" dirty="0">
+                <a:latin typeface="+mj-lt"/>
+                <a:cs typeface="Courier New" panose="02070309020205020404" pitchFamily="49" charset="0"/>
+                <a:hlinkClick r:id="rId4"/>
+              </a:rPr>
+              <a:t>Python development</a:t>
+            </a:r>
+            <a:endParaRPr lang="en-GB" sz="2600" dirty="0">
+              <a:latin typeface="+mj-lt"/>
+              <a:cs typeface="Courier New" panose="02070309020205020404" pitchFamily="49" charset="0"/>
+            </a:endParaRPr>
+          </a:p>
+          <a:p>
+            <a:pPr>
+              <a:lnSpc>
+                <a:spcPct val="107000"/>
+              </a:lnSpc>
+            </a:pPr>
+            <a:r>
+              <a:rPr lang="en-GB" sz="2600" dirty="0">
+                <a:latin typeface="+mj-lt"/>
+                <a:cs typeface="Courier New" panose="02070309020205020404" pitchFamily="49" charset="0"/>
+              </a:rPr>
+              <a:t>The Graduate School offers a </a:t>
+            </a:r>
+            <a:r>
+              <a:rPr lang="en-GB" sz="2600" dirty="0">
+                <a:latin typeface="+mj-lt"/>
+                <a:cs typeface="Courier New" panose="02070309020205020404" pitchFamily="49" charset="0"/>
+                <a:hlinkClick r:id="rId5"/>
+              </a:rPr>
+              <a:t>course on containers</a:t>
+            </a:r>
+            <a:endParaRPr lang="en-GB" sz="2600" dirty="0">
+              <a:latin typeface="+mj-lt"/>
+              <a:cs typeface="Courier New" panose="02070309020205020404" pitchFamily="49" charset="0"/>
+            </a:endParaRPr>
+          </a:p>
+          <a:p>
+            <a:pPr>
+              <a:lnSpc>
+                <a:spcPct val="107000"/>
+              </a:lnSpc>
+            </a:pPr>
+            <a:endParaRPr lang="en-GB" sz="2600" dirty="0">
+              <a:latin typeface="+mj-lt"/>
+              <a:cs typeface="Courier New" panose="02070309020205020404" pitchFamily="49" charset="0"/>
+            </a:endParaRPr>
+          </a:p>
+        </p:txBody>
+      </p:sp>
+    </p:spTree>
+    <p:extLst>
+      <p:ext uri="{BB962C8B-B14F-4D97-AF65-F5344CB8AC3E}">
+        <p14:creationId xmlns:p14="http://schemas.microsoft.com/office/powerpoint/2010/main" val="3576927260"/>
+      </p:ext>
+    </p:extLst>
+  </p:cSld>
+  <p:clrMapOvr>
+    <a:masterClrMapping/>
+  </p:clrMapOvr>
+  <mc:AlternateContent xmlns:mc="http://schemas.openxmlformats.org/markup-compatibility/2006" xmlns:p14="http://schemas.microsoft.com/office/powerpoint/2010/main">
+    <mc:Choice Requires="p14">
+      <p:transition p14:dur="10"/>
+    </mc:Choice>
+    <mc:Fallback xmlns="">
+      <p:transition/>
+    </mc:Fallback>
+  </mc:AlternateContent>
+</p:sld>
+</file>
+
+<file path=ppt/slides/slide38.xml><?xml version="1.0" encoding="utf-8"?>
+<p:sld xmlns:a="http://schemas.openxmlformats.org/drawingml/2006/main" xmlns:r="http://schemas.openxmlformats.org/officeDocument/2006/relationships" xmlns:p="http://schemas.openxmlformats.org/presentationml/2006/main">
+  <p:cSld>
+    <p:spTree>
+      <p:nvGrpSpPr>
+        <p:cNvPr id="1" name=""/>
+        <p:cNvGrpSpPr/>
+        <p:nvPr/>
+      </p:nvGrpSpPr>
+      <p:grpSpPr>
+        <a:xfrm>
+          <a:off x="0" y="0"/>
+          <a:ext cx="0" cy="0"/>
+          <a:chOff x="0" y="0"/>
+          <a:chExt cx="0" cy="0"/>
+        </a:xfrm>
+      </p:grpSpPr>
+      <p:sp>
+        <p:nvSpPr>
+          <p:cNvPr id="2" name="Title 1"/>
+          <p:cNvSpPr>
+            <a:spLocks noGrp="1"/>
+          </p:cNvSpPr>
+          <p:nvPr>
+            <p:ph type="title"/>
+          </p:nvPr>
+        </p:nvSpPr>
         <p:spPr/>
         <p:txBody>
           <a:bodyPr/>
@@ -15095,7 +15413,7 @@
 </p:sld>
 </file>
 
-<file path=ppt/slides/slide38.xml><?xml version="1.0" encoding="utf-8"?>
+<file path=ppt/slides/slide39.xml><?xml version="1.0" encoding="utf-8"?>
 <p:sld xmlns:a="http://schemas.openxmlformats.org/drawingml/2006/main" xmlns:r="http://schemas.openxmlformats.org/officeDocument/2006/relationships" xmlns:p="http://schemas.openxmlformats.org/presentationml/2006/main">
   <p:cSld>
     <p:spTree>

</xml_diff>

<commit_message>
Modified command line arguments exercise
</commit_message>
<xml_diff>
--- a/Managing and Running Python Effectively.pptx
+++ b/Managing and Running Python Effectively.pptx
@@ -14245,7 +14245,7 @@
         </p:spPr>
         <p:txBody>
           <a:bodyPr>
-            <a:normAutofit lnSpcReduction="10000"/>
+            <a:normAutofit fontScale="92500"/>
           </a:bodyPr>
           <a:lstStyle/>
           <a:p>
@@ -14291,6 +14291,34 @@
             </a:r>
           </a:p>
           <a:p>
+            <a:pPr lvl="1">
+              <a:lnSpc>
+                <a:spcPct val="107000"/>
+              </a:lnSpc>
+            </a:pPr>
+            <a:r>
+              <a:rPr lang="en-GB" sz="2200" dirty="0">
+                <a:latin typeface="+mj-lt"/>
+                <a:cs typeface="Courier New" panose="02070309020205020404" pitchFamily="49" charset="0"/>
+              </a:rPr>
+              <a:t>The first is the numerator</a:t>
+            </a:r>
+          </a:p>
+          <a:p>
+            <a:pPr lvl="1">
+              <a:lnSpc>
+                <a:spcPct val="107000"/>
+              </a:lnSpc>
+            </a:pPr>
+            <a:r>
+              <a:rPr lang="en-GB" sz="2200" dirty="0">
+                <a:latin typeface="+mj-lt"/>
+                <a:cs typeface="Courier New" panose="02070309020205020404" pitchFamily="49" charset="0"/>
+              </a:rPr>
+              <a:t>The second is the denominator</a:t>
+            </a:r>
+          </a:p>
+          <a:p>
             <a:pPr>
               <a:lnSpc>
                 <a:spcPct val="107000"/>
@@ -14301,7 +14329,35 @@
                 <a:latin typeface="+mj-lt"/>
                 <a:cs typeface="Courier New" panose="02070309020205020404" pitchFamily="49" charset="0"/>
               </a:rPr>
-              <a:t>The first is the numerator</a:t>
+              <a:t>So, using the command </a:t>
+            </a:r>
+            <a:r>
+              <a:rPr lang="en-GB" sz="2600" dirty="0">
+                <a:latin typeface="Courier New" panose="02070309020205020404" pitchFamily="49" charset="0"/>
+                <a:cs typeface="Courier New" panose="02070309020205020404" pitchFamily="49" charset="0"/>
+              </a:rPr>
+              <a:t>python divider.py 5.2 2 </a:t>
+            </a:r>
+            <a:r>
+              <a:rPr lang="en-GB" sz="2600" dirty="0">
+                <a:latin typeface="+mj-lt"/>
+                <a:cs typeface="Courier New" panose="02070309020205020404" pitchFamily="49" charset="0"/>
+              </a:rPr>
+              <a:t>should cause the value </a:t>
+            </a:r>
+            <a:r>
+              <a:rPr lang="en-GB" sz="2600" dirty="0">
+                <a:latin typeface="Courier New" panose="02070309020205020404" pitchFamily="49" charset="0"/>
+                <a:cs typeface="Courier New" panose="02070309020205020404" pitchFamily="49" charset="0"/>
+              </a:rPr>
+              <a:t>2.6</a:t>
+            </a:r>
+            <a:r>
+              <a:rPr lang="en-GB" sz="2600" dirty="0">
+                <a:latin typeface="+mj-lt"/>
+                <a:cs typeface="Courier New" panose="02070309020205020404" pitchFamily="49" charset="0"/>
+              </a:rPr>
+              <a:t> to be printed</a:t>
             </a:r>
           </a:p>
           <a:p>
@@ -14315,72 +14371,37 @@
                 <a:latin typeface="+mj-lt"/>
                 <a:cs typeface="Courier New" panose="02070309020205020404" pitchFamily="49" charset="0"/>
               </a:rPr>
-              <a:t>The second is the denominator</a:t>
-            </a:r>
-          </a:p>
-          <a:p>
-            <a:pPr>
-              <a:lnSpc>
-                <a:spcPct val="107000"/>
-              </a:lnSpc>
-            </a:pPr>
-            <a:r>
-              <a:rPr lang="en-GB" sz="2600" dirty="0">
-                <a:latin typeface="+mj-lt"/>
-                <a:cs typeface="Courier New" panose="02070309020205020404" pitchFamily="49" charset="0"/>
-              </a:rPr>
-              <a:t>So, using the command </a:t>
-            </a:r>
-            <a:r>
-              <a:rPr lang="en-GB" sz="2600" dirty="0">
-                <a:latin typeface="Courier New" panose="02070309020205020404" pitchFamily="49" charset="0"/>
-                <a:cs typeface="Courier New" panose="02070309020205020404" pitchFamily="49" charset="0"/>
-              </a:rPr>
-              <a:t>python divider.py 5 2 </a:t>
-            </a:r>
-            <a:r>
-              <a:rPr lang="en-GB" sz="2600" dirty="0">
-                <a:latin typeface="+mj-lt"/>
-                <a:cs typeface="Courier New" panose="02070309020205020404" pitchFamily="49" charset="0"/>
-              </a:rPr>
-              <a:t>should cause the value </a:t>
-            </a:r>
-            <a:r>
-              <a:rPr lang="en-GB" sz="2600" dirty="0">
-                <a:latin typeface="Courier New" panose="02070309020205020404" pitchFamily="49" charset="0"/>
-                <a:cs typeface="Courier New" panose="02070309020205020404" pitchFamily="49" charset="0"/>
-              </a:rPr>
-              <a:t>2.5</a:t>
-            </a:r>
-            <a:r>
-              <a:rPr lang="en-GB" sz="2600" dirty="0">
-                <a:latin typeface="+mj-lt"/>
-                <a:cs typeface="Courier New" panose="02070309020205020404" pitchFamily="49" charset="0"/>
-              </a:rPr>
-              <a:t> to be printed</a:t>
-            </a:r>
-          </a:p>
-          <a:p>
-            <a:pPr>
-              <a:lnSpc>
-                <a:spcPct val="107000"/>
-              </a:lnSpc>
-            </a:pPr>
-            <a:r>
-              <a:rPr lang="en-GB" sz="2600" dirty="0">
-                <a:latin typeface="+mj-lt"/>
-                <a:cs typeface="Courier New" panose="02070309020205020404" pitchFamily="49" charset="0"/>
-              </a:rPr>
-              <a:t>Consider what your code should do if the number of arguments </a:t>
-            </a:r>
-            <a:r>
-              <a:rPr lang="en-GB" sz="2600">
-                <a:latin typeface="+mj-lt"/>
-                <a:cs typeface="Courier New" panose="02070309020205020404" pitchFamily="49" charset="0"/>
-              </a:rPr>
-              <a:t>provided is not 2</a:t>
-            </a:r>
-            <a:endParaRPr lang="en-GB" sz="2200" dirty="0">
+              <a:t>Consider what your code should do if</a:t>
+            </a:r>
+          </a:p>
+          <a:p>
+            <a:pPr lvl="1">
+              <a:lnSpc>
+                <a:spcPct val="107000"/>
+              </a:lnSpc>
+            </a:pPr>
+            <a:r>
+              <a:rPr lang="en-GB" sz="2200" dirty="0">
+                <a:latin typeface="+mj-lt"/>
+                <a:cs typeface="Courier New" panose="02070309020205020404" pitchFamily="49" charset="0"/>
+              </a:rPr>
+              <a:t>The number of arguments provided is not 2</a:t>
+            </a:r>
+          </a:p>
+          <a:p>
+            <a:pPr lvl="1">
+              <a:lnSpc>
+                <a:spcPct val="107000"/>
+              </a:lnSpc>
+            </a:pPr>
+            <a:r>
+              <a:rPr lang="en-GB" sz="2200" dirty="0">
+                <a:latin typeface="+mj-lt"/>
+                <a:cs typeface="Courier New" panose="02070309020205020404" pitchFamily="49" charset="0"/>
+              </a:rPr>
+              <a:t>The arguments cannot be converted to floats</a:t>
+            </a:r>
+            <a:endParaRPr lang="en-GB" sz="1800" dirty="0">
               <a:latin typeface="+mj-lt"/>
               <a:cs typeface="Courier New" panose="02070309020205020404" pitchFamily="49" charset="0"/>
             </a:endParaRPr>

</xml_diff>

<commit_message>
Updated exercises to follow-along
</commit_message>
<xml_diff>
--- a/Managing and Running Python Effectively.pptx
+++ b/Managing and Running Python Effectively.pptx
@@ -14,19 +14,19 @@
     <p:sldId id="264" r:id="rId2"/>
     <p:sldId id="504" r:id="rId3"/>
     <p:sldId id="267" r:id="rId4"/>
-    <p:sldId id="330" r:id="rId5"/>
-    <p:sldId id="332" r:id="rId6"/>
-    <p:sldId id="331" r:id="rId7"/>
-    <p:sldId id="505" r:id="rId8"/>
-    <p:sldId id="506" r:id="rId9"/>
-    <p:sldId id="507" r:id="rId10"/>
+    <p:sldId id="538" r:id="rId5"/>
+    <p:sldId id="330" r:id="rId6"/>
+    <p:sldId id="332" r:id="rId7"/>
+    <p:sldId id="331" r:id="rId8"/>
+    <p:sldId id="505" r:id="rId9"/>
+    <p:sldId id="506" r:id="rId10"/>
     <p:sldId id="508" r:id="rId11"/>
     <p:sldId id="509" r:id="rId12"/>
     <p:sldId id="510" r:id="rId13"/>
     <p:sldId id="511" r:id="rId14"/>
     <p:sldId id="512" r:id="rId15"/>
     <p:sldId id="513" r:id="rId16"/>
-    <p:sldId id="514" r:id="rId17"/>
+    <p:sldId id="539" r:id="rId17"/>
     <p:sldId id="518" r:id="rId18"/>
     <p:sldId id="516" r:id="rId19"/>
     <p:sldId id="522" r:id="rId20"/>
@@ -150,19 +150,19 @@
             <p14:sldId id="264"/>
             <p14:sldId id="504"/>
             <p14:sldId id="267"/>
+            <p14:sldId id="538"/>
             <p14:sldId id="330"/>
             <p14:sldId id="332"/>
             <p14:sldId id="331"/>
             <p14:sldId id="505"/>
             <p14:sldId id="506"/>
-            <p14:sldId id="507"/>
             <p14:sldId id="508"/>
             <p14:sldId id="509"/>
             <p14:sldId id="510"/>
             <p14:sldId id="511"/>
             <p14:sldId id="512"/>
             <p14:sldId id="513"/>
-            <p14:sldId id="514"/>
+            <p14:sldId id="539"/>
             <p14:sldId id="518"/>
             <p14:sldId id="516"/>
             <p14:sldId id="522"/>
@@ -205,16 +205,123 @@
 </p:presentation>
 </file>
 
-<file path=ppt/revisionInfo.xml><?xml version="1.0" encoding="utf-8"?>
-<p1510:revInfo xmlns:a="http://schemas.openxmlformats.org/drawingml/2006/main" xmlns:r="http://schemas.openxmlformats.org/officeDocument/2006/relationships" xmlns:p1510="http://schemas.microsoft.com/office/powerpoint/2015/10/main">
-  <p1510:revLst>
-    <p1510:client id="{5AD9EAAA-18DC-440A-8D78-EF3BAEE36A4A}" v="1" dt="2022-10-10T14:30:32.487"/>
-  </p1510:revLst>
-</p1510:revInfo>
-</file>
-
 <file path=ppt/changesInfos/changesInfo1.xml><?xml version="1.0" encoding="utf-8"?>
 <pc:chgInfo xmlns:a="http://schemas.openxmlformats.org/drawingml/2006/main" xmlns:r="http://schemas.openxmlformats.org/officeDocument/2006/relationships" xmlns:ac="http://schemas.microsoft.com/office/drawing/2013/main/command" xmlns:pc="http://schemas.microsoft.com/office/powerpoint/2013/main/command">
+  <pc:docChgLst>
+    <pc:chgData name="Cooling, Chris" userId="6dcf99c9-2ba5-410a-8445-0893a3d1421f" providerId="ADAL" clId="{44D7B7C4-35F4-4EB5-AB85-2A71B4D71862}"/>
+    <pc:docChg chg="custSel addSld delSld modSld modSection">
+      <pc:chgData name="Cooling, Chris" userId="6dcf99c9-2ba5-410a-8445-0893a3d1421f" providerId="ADAL" clId="{44D7B7C4-35F4-4EB5-AB85-2A71B4D71862}" dt="2022-11-16T15:03:41.097" v="221" actId="113"/>
+      <pc:docMkLst>
+        <pc:docMk/>
+      </pc:docMkLst>
+      <pc:sldChg chg="modSp mod">
+        <pc:chgData name="Cooling, Chris" userId="6dcf99c9-2ba5-410a-8445-0893a3d1421f" providerId="ADAL" clId="{44D7B7C4-35F4-4EB5-AB85-2A71B4D71862}" dt="2022-11-16T14:49:11.648" v="6" actId="20577"/>
+        <pc:sldMkLst>
+          <pc:docMk/>
+          <pc:sldMk cId="3722377785" sldId="506"/>
+        </pc:sldMkLst>
+        <pc:spChg chg="mod">
+          <ac:chgData name="Cooling, Chris" userId="6dcf99c9-2ba5-410a-8445-0893a3d1421f" providerId="ADAL" clId="{44D7B7C4-35F4-4EB5-AB85-2A71B4D71862}" dt="2022-11-16T14:48:55.187" v="2" actId="20577"/>
+          <ac:spMkLst>
+            <pc:docMk/>
+            <pc:sldMk cId="3722377785" sldId="506"/>
+            <ac:spMk id="3" creationId="{00000000-0000-0000-0000-000000000000}"/>
+          </ac:spMkLst>
+        </pc:spChg>
+        <pc:spChg chg="mod">
+          <ac:chgData name="Cooling, Chris" userId="6dcf99c9-2ba5-410a-8445-0893a3d1421f" providerId="ADAL" clId="{44D7B7C4-35F4-4EB5-AB85-2A71B4D71862}" dt="2022-11-16T14:49:00.344" v="4" actId="20577"/>
+          <ac:spMkLst>
+            <pc:docMk/>
+            <pc:sldMk cId="3722377785" sldId="506"/>
+            <ac:spMk id="6" creationId="{E7EAC41F-8844-487B-B6C6-AD2B9807F716}"/>
+          </ac:spMkLst>
+        </pc:spChg>
+        <pc:spChg chg="mod">
+          <ac:chgData name="Cooling, Chris" userId="6dcf99c9-2ba5-410a-8445-0893a3d1421f" providerId="ADAL" clId="{44D7B7C4-35F4-4EB5-AB85-2A71B4D71862}" dt="2022-11-16T14:49:11.648" v="6" actId="20577"/>
+          <ac:spMkLst>
+            <pc:docMk/>
+            <pc:sldMk cId="3722377785" sldId="506"/>
+            <ac:spMk id="7" creationId="{47C6CEA6-F798-483D-BA27-99EB245F8892}"/>
+          </ac:spMkLst>
+        </pc:spChg>
+      </pc:sldChg>
+      <pc:sldChg chg="del">
+        <pc:chgData name="Cooling, Chris" userId="6dcf99c9-2ba5-410a-8445-0893a3d1421f" providerId="ADAL" clId="{44D7B7C4-35F4-4EB5-AB85-2A71B4D71862}" dt="2022-11-16T14:51:01.416" v="7" actId="2696"/>
+        <pc:sldMkLst>
+          <pc:docMk/>
+          <pc:sldMk cId="1846204080" sldId="507"/>
+        </pc:sldMkLst>
+      </pc:sldChg>
+      <pc:sldChg chg="modSp mod">
+        <pc:chgData name="Cooling, Chris" userId="6dcf99c9-2ba5-410a-8445-0893a3d1421f" providerId="ADAL" clId="{44D7B7C4-35F4-4EB5-AB85-2A71B4D71862}" dt="2022-11-16T14:55:39.754" v="150" actId="27636"/>
+        <pc:sldMkLst>
+          <pc:docMk/>
+          <pc:sldMk cId="495827477" sldId="512"/>
+        </pc:sldMkLst>
+        <pc:spChg chg="mod">
+          <ac:chgData name="Cooling, Chris" userId="6dcf99c9-2ba5-410a-8445-0893a3d1421f" providerId="ADAL" clId="{44D7B7C4-35F4-4EB5-AB85-2A71B4D71862}" dt="2022-11-16T14:55:39.754" v="150" actId="27636"/>
+          <ac:spMkLst>
+            <pc:docMk/>
+            <pc:sldMk cId="495827477" sldId="512"/>
+            <ac:spMk id="3" creationId="{00000000-0000-0000-0000-000000000000}"/>
+          </ac:spMkLst>
+        </pc:spChg>
+      </pc:sldChg>
+      <pc:sldChg chg="del">
+        <pc:chgData name="Cooling, Chris" userId="6dcf99c9-2ba5-410a-8445-0893a3d1421f" providerId="ADAL" clId="{44D7B7C4-35F4-4EB5-AB85-2A71B4D71862}" dt="2022-11-16T15:01:10.539" v="151" actId="47"/>
+        <pc:sldMkLst>
+          <pc:docMk/>
+          <pc:sldMk cId="1234567131" sldId="514"/>
+        </pc:sldMkLst>
+      </pc:sldChg>
+      <pc:sldChg chg="modSp add mod">
+        <pc:chgData name="Cooling, Chris" userId="6dcf99c9-2ba5-410a-8445-0893a3d1421f" providerId="ADAL" clId="{44D7B7C4-35F4-4EB5-AB85-2A71B4D71862}" dt="2022-11-16T14:51:50.695" v="123" actId="1076"/>
+        <pc:sldMkLst>
+          <pc:docMk/>
+          <pc:sldMk cId="3665092893" sldId="538"/>
+        </pc:sldMkLst>
+        <pc:spChg chg="mod">
+          <ac:chgData name="Cooling, Chris" userId="6dcf99c9-2ba5-410a-8445-0893a3d1421f" providerId="ADAL" clId="{44D7B7C4-35F4-4EB5-AB85-2A71B4D71862}" dt="2022-11-16T14:51:14.143" v="16" actId="20577"/>
+          <ac:spMkLst>
+            <pc:docMk/>
+            <pc:sldMk cId="3665092893" sldId="538"/>
+            <ac:spMk id="2" creationId="{00000000-0000-0000-0000-000000000000}"/>
+          </ac:spMkLst>
+        </pc:spChg>
+        <pc:spChg chg="mod">
+          <ac:chgData name="Cooling, Chris" userId="6dcf99c9-2ba5-410a-8445-0893a3d1421f" providerId="ADAL" clId="{44D7B7C4-35F4-4EB5-AB85-2A71B4D71862}" dt="2022-11-16T14:51:50.695" v="123" actId="1076"/>
+          <ac:spMkLst>
+            <pc:docMk/>
+            <pc:sldMk cId="3665092893" sldId="538"/>
+            <ac:spMk id="3" creationId="{00000000-0000-0000-0000-000000000000}"/>
+          </ac:spMkLst>
+        </pc:spChg>
+      </pc:sldChg>
+      <pc:sldChg chg="modSp add mod">
+        <pc:chgData name="Cooling, Chris" userId="6dcf99c9-2ba5-410a-8445-0893a3d1421f" providerId="ADAL" clId="{44D7B7C4-35F4-4EB5-AB85-2A71B4D71862}" dt="2022-11-16T15:03:41.097" v="221" actId="113"/>
+        <pc:sldMkLst>
+          <pc:docMk/>
+          <pc:sldMk cId="4279717336" sldId="539"/>
+        </pc:sldMkLst>
+        <pc:spChg chg="mod">
+          <ac:chgData name="Cooling, Chris" userId="6dcf99c9-2ba5-410a-8445-0893a3d1421f" providerId="ADAL" clId="{44D7B7C4-35F4-4EB5-AB85-2A71B4D71862}" dt="2022-11-16T15:03:12.368" v="167" actId="20577"/>
+          <ac:spMkLst>
+            <pc:docMk/>
+            <pc:sldMk cId="4279717336" sldId="539"/>
+            <ac:spMk id="2" creationId="{00000000-0000-0000-0000-000000000000}"/>
+          </ac:spMkLst>
+        </pc:spChg>
+        <pc:spChg chg="mod">
+          <ac:chgData name="Cooling, Chris" userId="6dcf99c9-2ba5-410a-8445-0893a3d1421f" providerId="ADAL" clId="{44D7B7C4-35F4-4EB5-AB85-2A71B4D71862}" dt="2022-11-16T15:03:41.097" v="221" actId="113"/>
+          <ac:spMkLst>
+            <pc:docMk/>
+            <pc:sldMk cId="4279717336" sldId="539"/>
+            <ac:spMk id="3" creationId="{00000000-0000-0000-0000-000000000000}"/>
+          </ac:spMkLst>
+        </pc:spChg>
+      </pc:sldChg>
+    </pc:docChg>
+  </pc:docChgLst>
   <pc:docChgLst>
     <pc:chgData name="Cooling, Chris" userId="6dcf99c9-2ba5-410a-8445-0893a3d1421f" providerId="ADAL" clId="{5AD9EAAA-18DC-440A-8D78-EF3BAEE36A4A}"/>
     <pc:docChg chg="addSld delSld modSld modSection">
@@ -490,7 +597,7 @@
           <a:p>
             <a:fld id="{88EB714B-C3CC-4216-88C1-02913905B1CF}" type="datetimeFigureOut">
               <a:rPr lang="en-GB" smtClean="0"/>
-              <a:t>10/10/2022</a:t>
+              <a:t>16/11/2022</a:t>
             </a:fld>
             <a:endParaRPr lang="en-GB"/>
           </a:p>
@@ -2040,8 +2147,123 @@
           <a:p>
             <a:r>
               <a:rPr lang="en-GB" dirty="0"/>
-              <a:t>Sample requirements files can be found in “Exercise Sample Solutions/Requirements”</a:t>
-            </a:r>
+              <a:t>In Anaconda, you create a new environment managed by Anaconda with the command “</a:t>
+            </a:r>
+            <a:r>
+              <a:rPr lang="en-GB" sz="1200" dirty="0" err="1">
+                <a:latin typeface="Courier New" panose="02070309020205020404" pitchFamily="49" charset="0"/>
+                <a:cs typeface="Courier New" panose="02070309020205020404" pitchFamily="49" charset="0"/>
+              </a:rPr>
+              <a:t>conda</a:t>
+            </a:r>
+            <a:r>
+              <a:rPr lang="en-GB" sz="1200" dirty="0">
+                <a:latin typeface="Courier New" panose="02070309020205020404" pitchFamily="49" charset="0"/>
+                <a:cs typeface="Courier New" panose="02070309020205020404" pitchFamily="49" charset="0"/>
+              </a:rPr>
+              <a:t> create --name </a:t>
+            </a:r>
+            <a:r>
+              <a:rPr lang="en-GB" sz="1200" dirty="0" err="1">
+                <a:latin typeface="Courier New" panose="02070309020205020404" pitchFamily="49" charset="0"/>
+                <a:cs typeface="Courier New" panose="02070309020205020404" pitchFamily="49" charset="0"/>
+              </a:rPr>
+              <a:t>env_name</a:t>
+            </a:r>
+            <a:r>
+              <a:rPr lang="en-GB" sz="1200" dirty="0">
+                <a:latin typeface="Courier New" panose="02070309020205020404" pitchFamily="49" charset="0"/>
+                <a:cs typeface="Courier New" panose="02070309020205020404" pitchFamily="49" charset="0"/>
+              </a:rPr>
+              <a:t> –file” and then the path to the file you want to use. This will create a brand new environment with the specified packages installed.</a:t>
+            </a:r>
+          </a:p>
+          <a:p>
+            <a:endParaRPr lang="en-GB" sz="1200" dirty="0">
+              <a:latin typeface="Courier New" panose="02070309020205020404" pitchFamily="49" charset="0"/>
+              <a:cs typeface="Courier New" panose="02070309020205020404" pitchFamily="49" charset="0"/>
+            </a:endParaRPr>
+          </a:p>
+          <a:p>
+            <a:r>
+              <a:rPr lang="en-GB" sz="1200" dirty="0">
+                <a:latin typeface="Courier New" panose="02070309020205020404" pitchFamily="49" charset="0"/>
+                <a:cs typeface="Courier New" panose="02070309020205020404" pitchFamily="49" charset="0"/>
+              </a:rPr>
+              <a:t>In pip, you can use the command “pip3 install – r” followed by the path to the requirements file. This will install all the packages named in the requirements file into the currently active environment. This does not create a new environment like the </a:t>
+            </a:r>
+            <a:r>
+              <a:rPr lang="en-GB" sz="1200" dirty="0" err="1">
+                <a:latin typeface="Courier New" panose="02070309020205020404" pitchFamily="49" charset="0"/>
+                <a:cs typeface="Courier New" panose="02070309020205020404" pitchFamily="49" charset="0"/>
+              </a:rPr>
+              <a:t>conda</a:t>
+            </a:r>
+            <a:r>
+              <a:rPr lang="en-GB" sz="1200" dirty="0">
+                <a:latin typeface="Courier New" panose="02070309020205020404" pitchFamily="49" charset="0"/>
+                <a:cs typeface="Courier New" panose="02070309020205020404" pitchFamily="49" charset="0"/>
+              </a:rPr>
+              <a:t> command but instead adds to an existing environment.</a:t>
+            </a:r>
+          </a:p>
+          <a:p>
+            <a:endParaRPr lang="en-GB" sz="1200" dirty="0">
+              <a:latin typeface="Courier New" panose="02070309020205020404" pitchFamily="49" charset="0"/>
+              <a:cs typeface="Courier New" panose="02070309020205020404" pitchFamily="49" charset="0"/>
+            </a:endParaRPr>
+          </a:p>
+          <a:p>
+            <a:r>
+              <a:rPr lang="en-GB" sz="1200" dirty="0">
+                <a:latin typeface="Courier New" panose="02070309020205020404" pitchFamily="49" charset="0"/>
+                <a:cs typeface="Courier New" panose="02070309020205020404" pitchFamily="49" charset="0"/>
+              </a:rPr>
+              <a:t>Demonstration: Create a new </a:t>
+            </a:r>
+            <a:r>
+              <a:rPr lang="en-GB" sz="1200" dirty="0" err="1">
+                <a:latin typeface="Courier New" panose="02070309020205020404" pitchFamily="49" charset="0"/>
+                <a:cs typeface="Courier New" panose="02070309020205020404" pitchFamily="49" charset="0"/>
+              </a:rPr>
+              <a:t>conda</a:t>
+            </a:r>
+            <a:r>
+              <a:rPr lang="en-GB" sz="1200" dirty="0">
+                <a:latin typeface="Courier New" panose="02070309020205020404" pitchFamily="49" charset="0"/>
+                <a:cs typeface="Courier New" panose="02070309020205020404" pitchFamily="49" charset="0"/>
+              </a:rPr>
+              <a:t> environment using the requirements file generated in the previous example using the command “</a:t>
+            </a:r>
+            <a:r>
+              <a:rPr lang="en-GB" sz="1200" dirty="0" err="1">
+                <a:latin typeface="Courier New" panose="02070309020205020404" pitchFamily="49" charset="0"/>
+                <a:cs typeface="Courier New" panose="02070309020205020404" pitchFamily="49" charset="0"/>
+              </a:rPr>
+              <a:t>conda</a:t>
+            </a:r>
+            <a:r>
+              <a:rPr lang="en-GB" sz="1200" dirty="0">
+                <a:latin typeface="Courier New" panose="02070309020205020404" pitchFamily="49" charset="0"/>
+                <a:cs typeface="Courier New" panose="02070309020205020404" pitchFamily="49" charset="0"/>
+              </a:rPr>
+              <a:t> create –name </a:t>
+            </a:r>
+            <a:r>
+              <a:rPr lang="en-GB" sz="1200" dirty="0" err="1">
+                <a:latin typeface="Courier New" panose="02070309020205020404" pitchFamily="49" charset="0"/>
+                <a:cs typeface="Courier New" panose="02070309020205020404" pitchFamily="49" charset="0"/>
+              </a:rPr>
+              <a:t>req</a:t>
+            </a:r>
+            <a:r>
+              <a:rPr lang="en-GB" sz="1200" dirty="0">
+                <a:latin typeface="Courier New" panose="02070309020205020404" pitchFamily="49" charset="0"/>
+                <a:cs typeface="Courier New" panose="02070309020205020404" pitchFamily="49" charset="0"/>
+              </a:rPr>
+              <a:t> –file requirements_conda.txt </a:t>
+            </a:r>
+            <a:endParaRPr lang="en-GB" dirty="0"/>
           </a:p>
         </p:txBody>
       </p:sp>
@@ -2071,7 +2293,7 @@
     </p:spTree>
     <p:extLst>
       <p:ext uri="{BB962C8B-B14F-4D97-AF65-F5344CB8AC3E}">
-        <p14:creationId xmlns:p14="http://schemas.microsoft.com/office/powerpoint/2010/main" val="2312806874"/>
+        <p14:creationId xmlns:p14="http://schemas.microsoft.com/office/powerpoint/2010/main" val="4259722742"/>
       </p:ext>
     </p:extLst>
   </p:cSld>
@@ -4718,28 +4940,30 @@
           <a:bodyPr/>
           <a:lstStyle/>
           <a:p>
+            <a:pPr marL="0" marR="0" lvl="0" indent="0" algn="l" defTabSz="914400" rtl="0" eaLnBrk="1" fontAlgn="auto" latinLnBrk="0" hangingPunct="1">
+              <a:lnSpc>
+                <a:spcPct val="100000"/>
+              </a:lnSpc>
+              <a:spcBef>
+                <a:spcPts val="0"/>
+              </a:spcBef>
+              <a:spcAft>
+                <a:spcPts val="0"/>
+              </a:spcAft>
+              <a:buClrTx/>
+              <a:buSzTx/>
+              <a:buFontTx/>
+              <a:buNone/>
+              <a:tabLst/>
+              <a:defRPr/>
+            </a:pPr>
             <a:r>
               <a:rPr lang="en-GB" dirty="0"/>
-              <a:t>You can install a version of Python on your computer. This can be a standalone Python program, or installed and managed by another program such as Anaconda. A specific instance of Python is known as an installation and you may have multiple installations of Python on your computer at once. Each installation will be a particular version of Python such as 3.9 or 2.7. Successive versions of Python have added more functionality. You can see what version of Python is currently active in your system by typing “python –version”. </a:t>
+              <a:t>No additional notes.</a:t>
             </a:r>
           </a:p>
           <a:p>
             <a:endParaRPr lang="en-GB" dirty="0"/>
-          </a:p>
-          <a:p>
-            <a:r>
-              <a:rPr lang="en-GB" dirty="0"/>
-              <a:t>Python 2 and Python 3 are two major iterations of the Python language. Although Python 2 is still actively in use in some places, this is largely for legacy reasons. Python 3 is a well-established language and should be the one you use unless you have a good reason not to.</a:t>
-            </a:r>
-          </a:p>
-          <a:p>
-            <a:endParaRPr lang="en-GB" dirty="0"/>
-          </a:p>
-          <a:p>
-            <a:r>
-              <a:rPr lang="en-GB" dirty="0"/>
-              <a:t>A Python installation contains a Python interpreter which contains instructions for how Python source code should be interpreted according to the rules of the version of Python installed. It also contains a collection of libraries which contain what are known as “built-in” modules, such as the “math” module.</a:t>
-            </a:r>
           </a:p>
         </p:txBody>
       </p:sp>
@@ -4769,7 +4993,7 @@
     </p:spTree>
     <p:extLst>
       <p:ext uri="{BB962C8B-B14F-4D97-AF65-F5344CB8AC3E}">
-        <p14:creationId xmlns:p14="http://schemas.microsoft.com/office/powerpoint/2010/main" val="1632070600"/>
+        <p14:creationId xmlns:p14="http://schemas.microsoft.com/office/powerpoint/2010/main" val="1678527270"/>
       </p:ext>
     </p:extLst>
   </p:cSld>
@@ -4825,7 +5049,7 @@
           <a:p>
             <a:r>
               <a:rPr lang="en-GB" dirty="0"/>
-              <a:t>Standalone Python installation can be installed from the Python website. You can install several of these and they will be separate application within your computer. When installing Python applications, you may sometimes be asked if you want to add installations to the “path” of your computer. This is a list of directories held by the operating system of your computer which tells it where to look for programs. It can be difficult to give specific advice but, sometimes, having multiple installations of Python in your path can cause problems as components of different installations can be found when the code is running and they may not be compatible.</a:t>
+              <a:t>You can install a version of Python on your computer. This can be a standalone Python program, or installed and managed by another program such as Anaconda. A specific instance of Python is known as an installation and you may have multiple installations of Python on your computer at once. Each installation will be a particular version of Python such as 3.9 or 2.7. Successive versions of Python have added more functionality. You can see what version of Python is currently active in your system by typing “python –version”. </a:t>
             </a:r>
           </a:p>
           <a:p>
@@ -4834,7 +5058,7 @@
           <a:p>
             <a:r>
               <a:rPr lang="en-GB" dirty="0"/>
-              <a:t>Python installations can be installed within the Anaconda application by opening the environment tab, clicking “Create”, selecting a version and giving it a name. It might take a minute or so to download and install the installation. You can have several installations installed at once and can switch between them by clicking on the installation. This typically avoids issues related to the path on your computer and so is a more reliable option if you have limited experience.</a:t>
+              <a:t>Python 2 and Python 3 are two major iterations of the Python language. Although Python 2 is still actively in use in some places, this is largely for legacy reasons. Python 3 is a well-established language and should be the one you use unless you have a good reason not to.</a:t>
             </a:r>
           </a:p>
           <a:p>
@@ -4843,7 +5067,7 @@
           <a:p>
             <a:r>
               <a:rPr lang="en-GB" dirty="0"/>
-              <a:t>Demonstration: create a new installation in Anaconda using a recent version of Python.</a:t>
+              <a:t>A Python installation contains a Python interpreter which contains instructions for how Python source code should be interpreted according to the rules of the version of Python installed. It also contains a collection of libraries which contain what are known as “built-in” modules, such as the “math” module.</a:t>
             </a:r>
           </a:p>
         </p:txBody>
@@ -4874,7 +5098,7 @@
     </p:spTree>
     <p:extLst>
       <p:ext uri="{BB962C8B-B14F-4D97-AF65-F5344CB8AC3E}">
-        <p14:creationId xmlns:p14="http://schemas.microsoft.com/office/powerpoint/2010/main" val="1461934269"/>
+        <p14:creationId xmlns:p14="http://schemas.microsoft.com/office/powerpoint/2010/main" val="1632070600"/>
       </p:ext>
     </p:extLst>
   </p:cSld>
@@ -4930,7 +5154,7 @@
           <a:p>
             <a:r>
               <a:rPr lang="en-GB" dirty="0"/>
-              <a:t>A Python environment is an isolated installation of Python, including any packages that may have been installed. This can be useful for managing multiple projects which may have different dependencies in terms of the packages they use. This can be particularly useful when different packages require different versions of Python. This is particularly common for some older packages which only support Python 2.X.</a:t>
+              <a:t>Standalone Python installation can be installed from the Python website. You can install several of these and they will be separate application within your computer. When installing Python applications, you may sometimes be asked if you want to add installations to the “path” of your computer. This is a list of directories held by the operating system of your computer which tells it where to look for programs. It can be difficult to give specific advice but, sometimes, having multiple installations of Python in your path can cause problems as components of different installations can be found when the code is running and they may not be compatible.</a:t>
             </a:r>
           </a:p>
           <a:p>
@@ -4939,7 +5163,16 @@
           <a:p>
             <a:r>
               <a:rPr lang="en-GB" dirty="0"/>
-              <a:t>This allows different environments for different projects with only the packages needed for that project installed. It also means , when starting a new project, you can use a newer version of Python, without having to force an upgrade of Python version for other projects, which could possibly break them.</a:t>
+              <a:t>Python installations can be installed within the Anaconda application by opening the environment tab, clicking “Create”, selecting a version and giving it a name. It might take a minute or so to download and install the installation. You can have several installations installed at once and can switch between them by clicking on the installation. This typically avoids issues related to the path on your computer and so is a more reliable option if you have limited experience.</a:t>
+            </a:r>
+          </a:p>
+          <a:p>
+            <a:endParaRPr lang="en-GB" dirty="0"/>
+          </a:p>
+          <a:p>
+            <a:r>
+              <a:rPr lang="en-GB" dirty="0"/>
+              <a:t>Demonstration: create a new installation in Anaconda using a recent version of Python.</a:t>
             </a:r>
           </a:p>
         </p:txBody>
@@ -4970,7 +5203,7 @@
     </p:spTree>
     <p:extLst>
       <p:ext uri="{BB962C8B-B14F-4D97-AF65-F5344CB8AC3E}">
-        <p14:creationId xmlns:p14="http://schemas.microsoft.com/office/powerpoint/2010/main" val="258869543"/>
+        <p14:creationId xmlns:p14="http://schemas.microsoft.com/office/powerpoint/2010/main" val="1461934269"/>
       </p:ext>
     </p:extLst>
   </p:cSld>
@@ -5026,48 +5259,16 @@
           <a:p>
             <a:r>
               <a:rPr lang="en-GB" dirty="0"/>
-              <a:t>In Anaconda, the different environments are listed in the “environment” tab. In fact, we’ve already seen these earlier when we installed a new version of Python. We can clone an existing environment using “Clone”. “Backup” creates a specification of the current environment as .</a:t>
-            </a:r>
-            <a:r>
-              <a:rPr lang="en-GB" dirty="0" err="1"/>
-              <a:t>yaml</a:t>
-            </a:r>
+              <a:t>A Python environment is an isolated installation of Python, including any packages that may have been installed. This can be useful for managing multiple projects which may have different dependencies in terms of the packages they use. This can be particularly useful when different packages require different versions of Python. This is particularly common for some older packages which only support Python 2.X.</a:t>
+            </a:r>
+          </a:p>
+          <a:p>
+            <a:endParaRPr lang="en-GB" dirty="0"/>
+          </a:p>
+          <a:p>
             <a:r>
               <a:rPr lang="en-GB" dirty="0"/>
-              <a:t> file (this is similar to a requirements file, which we’ll look at in more detail later). “Import” creates an environment from a .</a:t>
-            </a:r>
-            <a:r>
-              <a:rPr lang="en-GB" dirty="0" err="1"/>
-              <a:t>yaml</a:t>
-            </a:r>
-            <a:r>
-              <a:rPr lang="en-GB" dirty="0"/>
-              <a:t> file creates with the “Backup” button. “Remove” will delete the selected environment.</a:t>
-            </a:r>
-          </a:p>
-          <a:p>
-            <a:endParaRPr lang="en-GB" dirty="0"/>
-          </a:p>
-          <a:p>
-            <a:r>
-              <a:rPr lang="en-GB" dirty="0"/>
-              <a:t>Demonstration: Create a new Python environment. Clone it. Back it up. Create another copy from the .</a:t>
-            </a:r>
-            <a:r>
-              <a:rPr lang="en-GB" dirty="0" err="1"/>
-              <a:t>yaml</a:t>
-            </a:r>
-            <a:r>
-              <a:rPr lang="en-GB" dirty="0"/>
-              <a:t>. Remove the copy created from the </a:t>
-            </a:r>
-            <a:r>
-              <a:rPr lang="en-GB" dirty="0" err="1"/>
-              <a:t>yaml</a:t>
-            </a:r>
-            <a:r>
-              <a:rPr lang="en-GB" dirty="0"/>
-              <a:t>.</a:t>
+              <a:t>This allows different environments for different projects with only the packages needed for that project installed. It also means , when starting a new project, you can use a newer version of Python, without having to force an upgrade of Python version for other projects, which could possibly break them.</a:t>
             </a:r>
           </a:p>
         </p:txBody>
@@ -5098,7 +5299,7 @@
     </p:spTree>
     <p:extLst>
       <p:ext uri="{BB962C8B-B14F-4D97-AF65-F5344CB8AC3E}">
-        <p14:creationId xmlns:p14="http://schemas.microsoft.com/office/powerpoint/2010/main" val="1413254815"/>
+        <p14:creationId xmlns:p14="http://schemas.microsoft.com/office/powerpoint/2010/main" val="258869543"/>
       </p:ext>
     </p:extLst>
   </p:cSld>
@@ -5152,37 +5353,25 @@
           <a:bodyPr/>
           <a:lstStyle/>
           <a:p>
-            <a:pPr marL="0" marR="0" lvl="0" indent="0" algn="l" defTabSz="914400" rtl="0" eaLnBrk="1" fontAlgn="auto" latinLnBrk="0" hangingPunct="1">
-              <a:lnSpc>
-                <a:spcPct val="100000"/>
-              </a:lnSpc>
-              <a:spcBef>
-                <a:spcPts val="0"/>
-              </a:spcBef>
-              <a:spcAft>
-                <a:spcPts val="0"/>
-              </a:spcAft>
-              <a:buClrTx/>
-              <a:buSzTx/>
-              <a:buFontTx/>
-              <a:buNone/>
-              <a:tabLst/>
-              <a:defRPr/>
-            </a:pPr>
+            <a:r>
+              <a:rPr lang="en-GB" dirty="0"/>
+              <a:t>In Anaconda, the different environments are listed in the “environment” tab. In fact, we’ve already seen these earlier when we installed a new version of Python. We can clone an existing environment using “Clone”. “Backup” creates a specification of the current environment as .</a:t>
+            </a:r>
             <a:r>
               <a:rPr lang="en-GB" dirty="0" err="1"/>
-              <a:t>Venv</a:t>
+              <a:t>yaml</a:t>
             </a:r>
             <a:r>
               <a:rPr lang="en-GB" dirty="0"/>
-              <a:t> is a Python modules which allows the creation of multiple “virtual environments” within a single Python installation. </a:t>
-            </a:r>
-            <a:r>
-              <a:rPr lang="en-GB" sz="1200" dirty="0">
-                <a:latin typeface="Courier New" panose="02070309020205020404" pitchFamily="49" charset="0"/>
-                <a:cs typeface="Courier New" panose="02070309020205020404" pitchFamily="49" charset="0"/>
-              </a:rPr>
-              <a:t>We can use these virtual environments in a similar way to environments managed by Anaconda. As such, you will normally choose to use one method or the other, not both.</a:t>
+              <a:t> file (this is similar to a requirements file, which we’ll look at in more detail later). “Import” creates an environment from a .</a:t>
+            </a:r>
+            <a:r>
+              <a:rPr lang="en-GB" dirty="0" err="1"/>
+              <a:t>yaml</a:t>
+            </a:r>
+            <a:r>
+              <a:rPr lang="en-GB" dirty="0"/>
+              <a:t> file creates with the “Backup” button. “Remove” will delete the selected environment.</a:t>
             </a:r>
           </a:p>
           <a:p>
@@ -5191,152 +5380,24 @@
           <a:p>
             <a:r>
               <a:rPr lang="en-GB" dirty="0"/>
-              <a:t>By writing “</a:t>
-            </a:r>
-            <a:r>
-              <a:rPr lang="en-GB" sz="1200" dirty="0">
-                <a:latin typeface="Courier New" panose="02070309020205020404" pitchFamily="49" charset="0"/>
-                <a:cs typeface="Courier New" panose="02070309020205020404" pitchFamily="49" charset="0"/>
-              </a:rPr>
-              <a:t>python3 -m </a:t>
-            </a:r>
-            <a:r>
-              <a:rPr lang="en-GB" sz="1200" dirty="0" err="1">
-                <a:latin typeface="Courier New" panose="02070309020205020404" pitchFamily="49" charset="0"/>
-                <a:cs typeface="Courier New" panose="02070309020205020404" pitchFamily="49" charset="0"/>
-              </a:rPr>
-              <a:t>venv</a:t>
-            </a:r>
-            <a:r>
-              <a:rPr lang="en-GB" sz="1200" dirty="0">
-                <a:latin typeface="Courier New" panose="02070309020205020404" pitchFamily="49" charset="0"/>
-                <a:cs typeface="Courier New" panose="02070309020205020404" pitchFamily="49" charset="0"/>
-              </a:rPr>
-              <a:t> .\Exercises\</a:t>
-            </a:r>
-            <a:r>
-              <a:rPr lang="en-GB" sz="1200" dirty="0" err="1">
-                <a:latin typeface="Courier New" panose="02070309020205020404" pitchFamily="49" charset="0"/>
-                <a:cs typeface="Courier New" panose="02070309020205020404" pitchFamily="49" charset="0"/>
-              </a:rPr>
-              <a:t>Example_environment</a:t>
-            </a:r>
-            <a:r>
-              <a:rPr lang="en-GB" sz="1200" dirty="0">
-                <a:latin typeface="Courier New" panose="02070309020205020404" pitchFamily="49" charset="0"/>
-                <a:cs typeface="Courier New" panose="02070309020205020404" pitchFamily="49" charset="0"/>
-              </a:rPr>
-              <a:t>\”  we will create an environment that is stored inside the specified directory. Note that the slashes will need to be other way around in Mac and Linux due to the different convention of how slashes operate in Mac and Linux. This new environment will use the same version of Python as the currently active Python version. </a:t>
-            </a:r>
-          </a:p>
-          <a:p>
-            <a:r>
-              <a:rPr lang="en-GB" sz="1200" dirty="0">
-                <a:latin typeface="Courier New" panose="02070309020205020404" pitchFamily="49" charset="0"/>
-                <a:cs typeface="Courier New" panose="02070309020205020404" pitchFamily="49" charset="0"/>
-              </a:rPr>
-              <a:t>To activate this new environment, different commands will be used dependent on whether you’re using Windows, or Apple or Linux. You should see the name of the directory in parentheses at the start of the command line, indicating that the environment is active. If we install modules they will be installed in this environment and if we run files it will use this environment. Regardless of operating system, typing “deactivate” will deactivate the virtual environment.</a:t>
-            </a:r>
-          </a:p>
-          <a:p>
-            <a:endParaRPr lang="en-GB" sz="1200" dirty="0">
-              <a:latin typeface="Courier New" panose="02070309020205020404" pitchFamily="49" charset="0"/>
-              <a:cs typeface="Courier New" panose="02070309020205020404" pitchFamily="49" charset="0"/>
-            </a:endParaRPr>
-          </a:p>
-          <a:p>
-            <a:r>
-              <a:rPr lang="en-GB" sz="1200" dirty="0">
-                <a:latin typeface="Courier New" panose="02070309020205020404" pitchFamily="49" charset="0"/>
-                <a:cs typeface="Courier New" panose="02070309020205020404" pitchFamily="49" charset="0"/>
-              </a:rPr>
-              <a:t>Demonstration: Open up VS Code and open a command prompt terminal (check it’s command prompt not </a:t>
-            </a:r>
-            <a:r>
-              <a:rPr lang="en-GB" sz="1200" dirty="0" err="1">
-                <a:latin typeface="Courier New" panose="02070309020205020404" pitchFamily="49" charset="0"/>
-                <a:cs typeface="Courier New" panose="02070309020205020404" pitchFamily="49" charset="0"/>
-              </a:rPr>
-              <a:t>Powershell</a:t>
-            </a:r>
-            <a:r>
-              <a:rPr lang="en-GB" sz="1200" dirty="0">
-                <a:latin typeface="Courier New" panose="02070309020205020404" pitchFamily="49" charset="0"/>
-                <a:cs typeface="Courier New" panose="02070309020205020404" pitchFamily="49" charset="0"/>
-              </a:rPr>
-              <a:t>). Change directory into main directory of the course materials. Use the command “python3 -m </a:t>
-            </a:r>
-            <a:r>
-              <a:rPr lang="en-GB" sz="1200" dirty="0" err="1">
-                <a:latin typeface="Courier New" panose="02070309020205020404" pitchFamily="49" charset="0"/>
-                <a:cs typeface="Courier New" panose="02070309020205020404" pitchFamily="49" charset="0"/>
-              </a:rPr>
-              <a:t>venv</a:t>
-            </a:r>
-            <a:r>
-              <a:rPr lang="en-GB" sz="1200" dirty="0">
-                <a:latin typeface="Courier New" panose="02070309020205020404" pitchFamily="49" charset="0"/>
-                <a:cs typeface="Courier New" panose="02070309020205020404" pitchFamily="49" charset="0"/>
-              </a:rPr>
-              <a:t> .\Exercises\</a:t>
-            </a:r>
-            <a:r>
-              <a:rPr lang="en-GB" sz="1200" dirty="0" err="1">
-                <a:latin typeface="Courier New" panose="02070309020205020404" pitchFamily="49" charset="0"/>
-                <a:cs typeface="Courier New" panose="02070309020205020404" pitchFamily="49" charset="0"/>
-              </a:rPr>
-              <a:t>Example_environment</a:t>
-            </a:r>
-            <a:r>
-              <a:rPr lang="en-GB" sz="1200" dirty="0">
-                <a:latin typeface="Courier New" panose="02070309020205020404" pitchFamily="49" charset="0"/>
-                <a:cs typeface="Courier New" panose="02070309020205020404" pitchFamily="49" charset="0"/>
-              </a:rPr>
-              <a:t>\ “ to create a new environment. Use the command “</a:t>
-            </a:r>
-            <a:r>
-              <a:rPr lang="fr-FR" dirty="0">
-                <a:latin typeface="Courier New" panose="02070309020205020404" pitchFamily="49" charset="0"/>
-                <a:cs typeface="Courier New" panose="02070309020205020404" pitchFamily="49" charset="0"/>
-              </a:rPr>
-              <a:t>.\</a:t>
-            </a:r>
-            <a:r>
-              <a:rPr lang="fr-FR" dirty="0" err="1">
-                <a:latin typeface="Courier New" panose="02070309020205020404" pitchFamily="49" charset="0"/>
-                <a:cs typeface="Courier New" panose="02070309020205020404" pitchFamily="49" charset="0"/>
-              </a:rPr>
-              <a:t>Exercises</a:t>
-            </a:r>
-            <a:r>
-              <a:rPr lang="fr-FR" dirty="0">
-                <a:latin typeface="Courier New" panose="02070309020205020404" pitchFamily="49" charset="0"/>
-                <a:cs typeface="Courier New" panose="02070309020205020404" pitchFamily="49" charset="0"/>
-              </a:rPr>
-              <a:t>\</a:t>
-            </a:r>
-            <a:r>
-              <a:rPr lang="fr-FR" dirty="0" err="1">
-                <a:latin typeface="Courier New" panose="02070309020205020404" pitchFamily="49" charset="0"/>
-                <a:cs typeface="Courier New" panose="02070309020205020404" pitchFamily="49" charset="0"/>
-              </a:rPr>
-              <a:t>Example_environment</a:t>
-            </a:r>
-            <a:r>
-              <a:rPr lang="fr-FR" dirty="0">
-                <a:latin typeface="Courier New" panose="02070309020205020404" pitchFamily="49" charset="0"/>
-                <a:cs typeface="Courier New" panose="02070309020205020404" pitchFamily="49" charset="0"/>
-              </a:rPr>
-              <a:t>\Scripts\activate.bat</a:t>
-            </a:r>
-            <a:r>
-              <a:rPr lang="en-GB" dirty="0">
-                <a:latin typeface="Courier New" panose="02070309020205020404" pitchFamily="49" charset="0"/>
-                <a:cs typeface="Courier New" panose="02070309020205020404" pitchFamily="49" charset="0"/>
-              </a:rPr>
-              <a:t>” to activate it. Note the name of the directory in parentheses. Use the command “deactivate” to deactivate it.</a:t>
-            </a:r>
-            <a:endParaRPr lang="en-GB" dirty="0"/>
+              <a:t>Demonstration: Create a new Python environment. Clone it. Back it up. Create another copy from the .</a:t>
+            </a:r>
+            <a:r>
+              <a:rPr lang="en-GB" dirty="0" err="1"/>
+              <a:t>yaml</a:t>
+            </a:r>
+            <a:r>
+              <a:rPr lang="en-GB" dirty="0"/>
+              <a:t>. Remove the copy created from the </a:t>
+            </a:r>
+            <a:r>
+              <a:rPr lang="en-GB" dirty="0" err="1"/>
+              <a:t>yaml</a:t>
+            </a:r>
+            <a:r>
+              <a:rPr lang="en-GB" dirty="0"/>
+              <a:t>.</a:t>
+            </a:r>
           </a:p>
         </p:txBody>
       </p:sp>
@@ -5366,7 +5427,7 @@
     </p:spTree>
     <p:extLst>
       <p:ext uri="{BB962C8B-B14F-4D97-AF65-F5344CB8AC3E}">
-        <p14:creationId xmlns:p14="http://schemas.microsoft.com/office/powerpoint/2010/main" val="939960531"/>
+        <p14:creationId xmlns:p14="http://schemas.microsoft.com/office/powerpoint/2010/main" val="1413254815"/>
       </p:ext>
     </p:extLst>
   </p:cSld>
@@ -5420,6 +5481,190 @@
           <a:bodyPr/>
           <a:lstStyle/>
           <a:p>
+            <a:pPr marL="0" marR="0" lvl="0" indent="0" algn="l" defTabSz="914400" rtl="0" eaLnBrk="1" fontAlgn="auto" latinLnBrk="0" hangingPunct="1">
+              <a:lnSpc>
+                <a:spcPct val="100000"/>
+              </a:lnSpc>
+              <a:spcBef>
+                <a:spcPts val="0"/>
+              </a:spcBef>
+              <a:spcAft>
+                <a:spcPts val="0"/>
+              </a:spcAft>
+              <a:buClrTx/>
+              <a:buSzTx/>
+              <a:buFontTx/>
+              <a:buNone/>
+              <a:tabLst/>
+              <a:defRPr/>
+            </a:pPr>
+            <a:r>
+              <a:rPr lang="en-GB" dirty="0" err="1"/>
+              <a:t>Venv</a:t>
+            </a:r>
+            <a:r>
+              <a:rPr lang="en-GB" dirty="0"/>
+              <a:t> is a Python modules which allows the creation of multiple “virtual environments” within a single Python installation. </a:t>
+            </a:r>
+            <a:r>
+              <a:rPr lang="en-GB" sz="1200" dirty="0">
+                <a:latin typeface="Courier New" panose="02070309020205020404" pitchFamily="49" charset="0"/>
+                <a:cs typeface="Courier New" panose="02070309020205020404" pitchFamily="49" charset="0"/>
+              </a:rPr>
+              <a:t>We can use these virtual environments in a similar way to environments managed by Anaconda. As such, you will normally choose to use one method or the other, not both.</a:t>
+            </a:r>
+          </a:p>
+          <a:p>
+            <a:endParaRPr lang="en-GB" dirty="0"/>
+          </a:p>
+          <a:p>
+            <a:r>
+              <a:rPr lang="en-GB" dirty="0"/>
+              <a:t>By writing “</a:t>
+            </a:r>
+            <a:r>
+              <a:rPr lang="en-GB" sz="1200" dirty="0">
+                <a:latin typeface="Courier New" panose="02070309020205020404" pitchFamily="49" charset="0"/>
+                <a:cs typeface="Courier New" panose="02070309020205020404" pitchFamily="49" charset="0"/>
+              </a:rPr>
+              <a:t>python3 -m </a:t>
+            </a:r>
+            <a:r>
+              <a:rPr lang="en-GB" sz="1200" dirty="0" err="1">
+                <a:latin typeface="Courier New" panose="02070309020205020404" pitchFamily="49" charset="0"/>
+                <a:cs typeface="Courier New" panose="02070309020205020404" pitchFamily="49" charset="0"/>
+              </a:rPr>
+              <a:t>venv</a:t>
+            </a:r>
+            <a:r>
+              <a:rPr lang="en-GB" sz="1200" dirty="0">
+                <a:latin typeface="Courier New" panose="02070309020205020404" pitchFamily="49" charset="0"/>
+                <a:cs typeface="Courier New" panose="02070309020205020404" pitchFamily="49" charset="0"/>
+              </a:rPr>
+              <a:t> .\Exercises\</a:t>
+            </a:r>
+            <a:r>
+              <a:rPr lang="en-GB" sz="1200" dirty="0" err="1">
+                <a:latin typeface="Courier New" panose="02070309020205020404" pitchFamily="49" charset="0"/>
+                <a:cs typeface="Courier New" panose="02070309020205020404" pitchFamily="49" charset="0"/>
+              </a:rPr>
+              <a:t>Example_environment</a:t>
+            </a:r>
+            <a:r>
+              <a:rPr lang="en-GB" sz="1200" dirty="0">
+                <a:latin typeface="Courier New" panose="02070309020205020404" pitchFamily="49" charset="0"/>
+                <a:cs typeface="Courier New" panose="02070309020205020404" pitchFamily="49" charset="0"/>
+              </a:rPr>
+              <a:t>\”  we will create an environment that is stored inside the specified directory. Note that the slashes will need to be other way around in Mac and Linux due to the different convention of how slashes operate in Mac and Linux. This new environment will use the same version of Python as the currently active Python version. </a:t>
+            </a:r>
+          </a:p>
+          <a:p>
+            <a:r>
+              <a:rPr lang="en-GB" sz="1200" dirty="0">
+                <a:latin typeface="Courier New" panose="02070309020205020404" pitchFamily="49" charset="0"/>
+                <a:cs typeface="Courier New" panose="02070309020205020404" pitchFamily="49" charset="0"/>
+              </a:rPr>
+              <a:t>To activate this new environment, different commands will be used dependent on whether you’re using Windows, or Apple or Linux. You should see the name of the directory in parentheses at the start of the command line, indicating that the environment is active. If we install modules they will be installed in this environment and if we run files it will use this environment. Regardless of operating system, typing “deactivate” will deactivate the virtual environment.</a:t>
+            </a:r>
+          </a:p>
+          <a:p>
+            <a:endParaRPr lang="en-GB" sz="1200" dirty="0">
+              <a:latin typeface="Courier New" panose="02070309020205020404" pitchFamily="49" charset="0"/>
+              <a:cs typeface="Courier New" panose="02070309020205020404" pitchFamily="49" charset="0"/>
+            </a:endParaRPr>
+          </a:p>
+          <a:p>
+            <a:r>
+              <a:rPr lang="en-GB" sz="1200" dirty="0">
+                <a:latin typeface="Courier New" panose="02070309020205020404" pitchFamily="49" charset="0"/>
+                <a:cs typeface="Courier New" panose="02070309020205020404" pitchFamily="49" charset="0"/>
+              </a:rPr>
+              <a:t>Demonstration: Open up VS Code and open a command prompt terminal (check it’s command prompt not </a:t>
+            </a:r>
+            <a:r>
+              <a:rPr lang="en-GB" sz="1200" dirty="0" err="1">
+                <a:latin typeface="Courier New" panose="02070309020205020404" pitchFamily="49" charset="0"/>
+                <a:cs typeface="Courier New" panose="02070309020205020404" pitchFamily="49" charset="0"/>
+              </a:rPr>
+              <a:t>Powershell</a:t>
+            </a:r>
+            <a:r>
+              <a:rPr lang="en-GB" sz="1200" dirty="0">
+                <a:latin typeface="Courier New" panose="02070309020205020404" pitchFamily="49" charset="0"/>
+                <a:cs typeface="Courier New" panose="02070309020205020404" pitchFamily="49" charset="0"/>
+              </a:rPr>
+              <a:t>). Change directory into main directory of the course materials. Use the command “python3 -m </a:t>
+            </a:r>
+            <a:r>
+              <a:rPr lang="en-GB" sz="1200" dirty="0" err="1">
+                <a:latin typeface="Courier New" panose="02070309020205020404" pitchFamily="49" charset="0"/>
+                <a:cs typeface="Courier New" panose="02070309020205020404" pitchFamily="49" charset="0"/>
+              </a:rPr>
+              <a:t>venv</a:t>
+            </a:r>
+            <a:r>
+              <a:rPr lang="en-GB" sz="1200" dirty="0">
+                <a:latin typeface="Courier New" panose="02070309020205020404" pitchFamily="49" charset="0"/>
+                <a:cs typeface="Courier New" panose="02070309020205020404" pitchFamily="49" charset="0"/>
+              </a:rPr>
+              <a:t> .\Exercises\</a:t>
+            </a:r>
+            <a:r>
+              <a:rPr lang="en-GB" sz="1200" dirty="0" err="1">
+                <a:latin typeface="Courier New" panose="02070309020205020404" pitchFamily="49" charset="0"/>
+                <a:cs typeface="Courier New" panose="02070309020205020404" pitchFamily="49" charset="0"/>
+              </a:rPr>
+              <a:t>Example_environment</a:t>
+            </a:r>
+            <a:r>
+              <a:rPr lang="en-GB" sz="1200" dirty="0">
+                <a:latin typeface="Courier New" panose="02070309020205020404" pitchFamily="49" charset="0"/>
+                <a:cs typeface="Courier New" panose="02070309020205020404" pitchFamily="49" charset="0"/>
+              </a:rPr>
+              <a:t>\ “ to create a new environment. Use the command “</a:t>
+            </a:r>
+            <a:r>
+              <a:rPr lang="fr-FR" dirty="0">
+                <a:latin typeface="Courier New" panose="02070309020205020404" pitchFamily="49" charset="0"/>
+                <a:cs typeface="Courier New" panose="02070309020205020404" pitchFamily="49" charset="0"/>
+              </a:rPr>
+              <a:t>.\</a:t>
+            </a:r>
+            <a:r>
+              <a:rPr lang="fr-FR" dirty="0" err="1">
+                <a:latin typeface="Courier New" panose="02070309020205020404" pitchFamily="49" charset="0"/>
+                <a:cs typeface="Courier New" panose="02070309020205020404" pitchFamily="49" charset="0"/>
+              </a:rPr>
+              <a:t>Exercises</a:t>
+            </a:r>
+            <a:r>
+              <a:rPr lang="fr-FR" dirty="0">
+                <a:latin typeface="Courier New" panose="02070309020205020404" pitchFamily="49" charset="0"/>
+                <a:cs typeface="Courier New" panose="02070309020205020404" pitchFamily="49" charset="0"/>
+              </a:rPr>
+              <a:t>\</a:t>
+            </a:r>
+            <a:r>
+              <a:rPr lang="fr-FR" dirty="0" err="1">
+                <a:latin typeface="Courier New" panose="02070309020205020404" pitchFamily="49" charset="0"/>
+                <a:cs typeface="Courier New" panose="02070309020205020404" pitchFamily="49" charset="0"/>
+              </a:rPr>
+              <a:t>Example_environment</a:t>
+            </a:r>
+            <a:r>
+              <a:rPr lang="fr-FR" dirty="0">
+                <a:latin typeface="Courier New" panose="02070309020205020404" pitchFamily="49" charset="0"/>
+                <a:cs typeface="Courier New" panose="02070309020205020404" pitchFamily="49" charset="0"/>
+              </a:rPr>
+              <a:t>\Scripts\activate.bat</a:t>
+            </a:r>
+            <a:r>
+              <a:rPr lang="en-GB" dirty="0">
+                <a:latin typeface="Courier New" panose="02070309020205020404" pitchFamily="49" charset="0"/>
+                <a:cs typeface="Courier New" panose="02070309020205020404" pitchFamily="49" charset="0"/>
+              </a:rPr>
+              <a:t>” to activate it. Note the name of the directory in parentheses. Use the command “deactivate” to deactivate it.</a:t>
+            </a:r>
             <a:endParaRPr lang="en-GB" dirty="0"/>
           </a:p>
         </p:txBody>
@@ -5450,7 +5695,7 @@
     </p:spTree>
     <p:extLst>
       <p:ext uri="{BB962C8B-B14F-4D97-AF65-F5344CB8AC3E}">
-        <p14:creationId xmlns:p14="http://schemas.microsoft.com/office/powerpoint/2010/main" val="1781581534"/>
+        <p14:creationId xmlns:p14="http://schemas.microsoft.com/office/powerpoint/2010/main" val="939960531"/>
       </p:ext>
     </p:extLst>
   </p:cSld>
@@ -5819,7 +6064,7 @@
           <a:p>
             <a:fld id="{EB0080F8-EA1C-491D-963C-2C881B2F918F}" type="datetimeFigureOut">
               <a:rPr lang="en-GB" smtClean="0"/>
-              <a:t>10/10/2022</a:t>
+              <a:t>16/11/2022</a:t>
             </a:fld>
             <a:endParaRPr lang="en-GB"/>
           </a:p>
@@ -5969,7 +6214,7 @@
           <a:p>
             <a:fld id="{EB0080F8-EA1C-491D-963C-2C881B2F918F}" type="datetimeFigureOut">
               <a:rPr lang="en-GB" smtClean="0"/>
-              <a:t>10/10/2022</a:t>
+              <a:t>16/11/2022</a:t>
             </a:fld>
             <a:endParaRPr lang="en-GB"/>
           </a:p>
@@ -7502,7 +7747,7 @@
           <a:p>
             <a:fld id="{EB0080F8-EA1C-491D-963C-2C881B2F918F}" type="datetimeFigureOut">
               <a:rPr lang="en-GB" smtClean="0"/>
-              <a:t>10/10/2022</a:t>
+              <a:t>16/11/2022</a:t>
             </a:fld>
             <a:endParaRPr lang="en-GB"/>
           </a:p>
@@ -9079,7 +9324,7 @@
                 <a:latin typeface="Courier New" panose="02070309020205020404" pitchFamily="49" charset="0"/>
                 <a:cs typeface="Courier New" panose="02070309020205020404" pitchFamily="49" charset="0"/>
               </a:rPr>
-              <a:t>pip3 freeze &gt; requirements.txt </a:t>
+              <a:t>pip3 freeze &gt; requirements_pip.txt </a:t>
             </a:r>
             <a:r>
               <a:rPr lang="en-GB" sz="2600" dirty="0">
@@ -9100,7 +9345,7 @@
                 <a:latin typeface="Courier New" panose="02070309020205020404" pitchFamily="49" charset="0"/>
                 <a:cs typeface="Courier New" panose="02070309020205020404" pitchFamily="49" charset="0"/>
               </a:rPr>
-              <a:t> list -e &gt; requirements.txt</a:t>
+              <a:t> list -e &gt; requirements_conda.txt</a:t>
             </a:r>
           </a:p>
           <a:p>
@@ -9411,7 +9656,7 @@
           <a:p>
             <a:r>
               <a:rPr lang="en-GB" sz="4000" dirty="0"/>
-              <a:t>Exercise</a:t>
+              <a:t>End of Exercise</a:t>
             </a:r>
           </a:p>
         </p:txBody>
@@ -9428,361 +9673,51 @@
         </p:nvSpPr>
         <p:spPr>
           <a:xfrm>
-            <a:off x="457200" y="1600200"/>
-            <a:ext cx="8435280" cy="4800600"/>
+            <a:off x="457200" y="3130062"/>
+            <a:ext cx="8435280" cy="597878"/>
           </a:xfrm>
         </p:spPr>
         <p:txBody>
           <a:bodyPr>
-            <a:normAutofit fontScale="77500" lnSpcReduction="20000"/>
+            <a:normAutofit/>
           </a:bodyPr>
           <a:lstStyle/>
           <a:p>
-            <a:pPr>
-              <a:lnSpc>
-                <a:spcPct val="107000"/>
-              </a:lnSpc>
-            </a:pPr>
-            <a:r>
-              <a:rPr lang="en-GB" sz="2600" dirty="0">
+            <a:pPr marL="0" indent="0" algn="ctr">
+              <a:lnSpc>
+                <a:spcPct val="107000"/>
+              </a:lnSpc>
+              <a:buNone/>
+            </a:pPr>
+            <a:r>
+              <a:rPr lang="en-GB" sz="2600" b="1" dirty="0">
                 <a:latin typeface="+mj-lt"/>
                 <a:cs typeface="Courier New" panose="02070309020205020404" pitchFamily="49" charset="0"/>
               </a:rPr>
-              <a:t>Anaconda</a:t>
-            </a:r>
-          </a:p>
-          <a:p>
-            <a:pPr lvl="1">
-              <a:lnSpc>
-                <a:spcPct val="107000"/>
-              </a:lnSpc>
-            </a:pPr>
-            <a:r>
-              <a:rPr lang="en-GB" sz="2200" dirty="0">
-                <a:latin typeface="+mj-lt"/>
-                <a:cs typeface="Courier New" panose="02070309020205020404" pitchFamily="49" charset="0"/>
-              </a:rPr>
-              <a:t>In a current environment install the </a:t>
-            </a:r>
-            <a:r>
-              <a:rPr lang="en-GB" sz="2200" dirty="0" err="1">
-                <a:latin typeface="Courier New" panose="02070309020205020404" pitchFamily="49" charset="0"/>
-                <a:cs typeface="Courier New" panose="02070309020205020404" pitchFamily="49" charset="0"/>
-              </a:rPr>
-              <a:t>numpy</a:t>
-            </a:r>
-            <a:r>
-              <a:rPr lang="en-GB" sz="2200" dirty="0">
-                <a:latin typeface="+mj-lt"/>
-                <a:cs typeface="Courier New" panose="02070309020205020404" pitchFamily="49" charset="0"/>
-              </a:rPr>
-              <a:t> package</a:t>
-            </a:r>
-          </a:p>
-          <a:p>
-            <a:pPr lvl="1">
-              <a:lnSpc>
-                <a:spcPct val="107000"/>
-              </a:lnSpc>
-            </a:pPr>
-            <a:r>
-              <a:rPr lang="en-GB" sz="2200" dirty="0">
-                <a:latin typeface="+mj-lt"/>
-                <a:cs typeface="Courier New" panose="02070309020205020404" pitchFamily="49" charset="0"/>
-              </a:rPr>
-              <a:t>Generate a requirements file named </a:t>
-            </a:r>
-            <a:r>
-              <a:rPr lang="en-GB" sz="2200" dirty="0">
-                <a:latin typeface="Courier New" panose="02070309020205020404" pitchFamily="49" charset="0"/>
-                <a:cs typeface="Courier New" panose="02070309020205020404" pitchFamily="49" charset="0"/>
-              </a:rPr>
-              <a:t>requirements_anaconda.txt </a:t>
-            </a:r>
-            <a:r>
-              <a:rPr lang="en-GB" sz="2200" dirty="0">
-                <a:latin typeface="+mj-lt"/>
-                <a:cs typeface="Courier New" panose="02070309020205020404" pitchFamily="49" charset="0"/>
-              </a:rPr>
-              <a:t>in the </a:t>
-            </a:r>
-            <a:r>
-              <a:rPr lang="en-GB" sz="2200" dirty="0">
-                <a:latin typeface="Courier New" panose="02070309020205020404" pitchFamily="49" charset="0"/>
-                <a:cs typeface="Courier New" panose="02070309020205020404" pitchFamily="49" charset="0"/>
-              </a:rPr>
-              <a:t>Exercises/Requirements </a:t>
-            </a:r>
-            <a:r>
-              <a:rPr lang="en-GB" sz="2200" dirty="0">
-                <a:latin typeface="+mj-lt"/>
-                <a:cs typeface="Courier New" panose="02070309020205020404" pitchFamily="49" charset="0"/>
-              </a:rPr>
-              <a:t>directory</a:t>
-            </a:r>
-          </a:p>
-          <a:p>
-            <a:pPr lvl="1">
-              <a:lnSpc>
-                <a:spcPct val="107000"/>
-              </a:lnSpc>
-            </a:pPr>
-            <a:r>
-              <a:rPr lang="en-GB" sz="2200" dirty="0">
-                <a:latin typeface="+mj-lt"/>
-                <a:cs typeface="Courier New" panose="02070309020205020404" pitchFamily="49" charset="0"/>
-              </a:rPr>
-              <a:t>Create a new environment using this requirements file Check the new environment has </a:t>
-            </a:r>
-            <a:r>
-              <a:rPr lang="en-GB" sz="2200" dirty="0" err="1">
-                <a:latin typeface="Courier New" panose="02070309020205020404" pitchFamily="49" charset="0"/>
-                <a:cs typeface="Courier New" panose="02070309020205020404" pitchFamily="49" charset="0"/>
-              </a:rPr>
-              <a:t>numpy</a:t>
-            </a:r>
-            <a:r>
-              <a:rPr lang="en-GB" sz="2200" dirty="0">
-                <a:latin typeface="+mj-lt"/>
-                <a:cs typeface="Courier New" panose="02070309020205020404" pitchFamily="49" charset="0"/>
-              </a:rPr>
-              <a:t> installed</a:t>
-            </a:r>
-          </a:p>
-          <a:p>
-            <a:pPr>
-              <a:lnSpc>
-                <a:spcPct val="107000"/>
-              </a:lnSpc>
-            </a:pPr>
-            <a:r>
-              <a:rPr lang="en-GB" sz="2600" dirty="0">
-                <a:latin typeface="+mj-lt"/>
-                <a:cs typeface="Courier New" panose="02070309020205020404" pitchFamily="49" charset="0"/>
-              </a:rPr>
-              <a:t>Pip</a:t>
-            </a:r>
-          </a:p>
-          <a:p>
-            <a:pPr lvl="1">
-              <a:lnSpc>
-                <a:spcPct val="107000"/>
-              </a:lnSpc>
-            </a:pPr>
-            <a:r>
-              <a:rPr lang="en-GB" sz="2200" dirty="0">
-                <a:latin typeface="+mj-lt"/>
-                <a:cs typeface="Courier New" panose="02070309020205020404" pitchFamily="49" charset="0"/>
-              </a:rPr>
-              <a:t>In a current environment install the </a:t>
-            </a:r>
-            <a:r>
-              <a:rPr lang="en-GB" sz="2200" dirty="0" err="1">
-                <a:latin typeface="Courier New" panose="02070309020205020404" pitchFamily="49" charset="0"/>
-                <a:cs typeface="Courier New" panose="02070309020205020404" pitchFamily="49" charset="0"/>
-              </a:rPr>
-              <a:t>numpy</a:t>
-            </a:r>
-            <a:r>
-              <a:rPr lang="en-GB" sz="2200" dirty="0">
-                <a:latin typeface="+mj-lt"/>
-                <a:cs typeface="Courier New" panose="02070309020205020404" pitchFamily="49" charset="0"/>
-              </a:rPr>
-              <a:t> package</a:t>
-            </a:r>
-          </a:p>
-          <a:p>
-            <a:pPr lvl="1">
-              <a:lnSpc>
-                <a:spcPct val="107000"/>
-              </a:lnSpc>
-            </a:pPr>
-            <a:r>
-              <a:rPr lang="en-GB" sz="2200" dirty="0">
-                <a:latin typeface="+mj-lt"/>
-                <a:cs typeface="Courier New" panose="02070309020205020404" pitchFamily="49" charset="0"/>
-              </a:rPr>
-              <a:t>Generate a requirements file named </a:t>
-            </a:r>
-            <a:r>
-              <a:rPr lang="en-GB" sz="2200" dirty="0">
-                <a:latin typeface="Courier New" panose="02070309020205020404" pitchFamily="49" charset="0"/>
-                <a:cs typeface="Courier New" panose="02070309020205020404" pitchFamily="49" charset="0"/>
-              </a:rPr>
-              <a:t>requirements_pip.txt </a:t>
-            </a:r>
-            <a:r>
-              <a:rPr lang="en-GB" sz="2200" dirty="0">
-                <a:latin typeface="+mj-lt"/>
-                <a:cs typeface="Courier New" panose="02070309020205020404" pitchFamily="49" charset="0"/>
-              </a:rPr>
-              <a:t>in the </a:t>
-            </a:r>
-            <a:r>
-              <a:rPr lang="en-GB" sz="2200" dirty="0">
-                <a:latin typeface="Courier New" panose="02070309020205020404" pitchFamily="49" charset="0"/>
-                <a:cs typeface="Courier New" panose="02070309020205020404" pitchFamily="49" charset="0"/>
-              </a:rPr>
-              <a:t>Exercises/Requirements </a:t>
-            </a:r>
-            <a:r>
-              <a:rPr lang="en-GB" sz="2200" dirty="0">
-                <a:latin typeface="+mj-lt"/>
-                <a:cs typeface="Courier New" panose="02070309020205020404" pitchFamily="49" charset="0"/>
-              </a:rPr>
-              <a:t>directory</a:t>
-            </a:r>
-          </a:p>
-          <a:p>
-            <a:pPr lvl="1">
-              <a:lnSpc>
-                <a:spcPct val="107000"/>
-              </a:lnSpc>
-            </a:pPr>
-            <a:r>
-              <a:rPr lang="en-GB" sz="2200" dirty="0">
-                <a:latin typeface="+mj-lt"/>
-                <a:cs typeface="Courier New" panose="02070309020205020404" pitchFamily="49" charset="0"/>
-              </a:rPr>
-              <a:t>Activate the virtual environment you created in the previous exercise</a:t>
-            </a:r>
-          </a:p>
-          <a:p>
-            <a:pPr lvl="1">
-              <a:lnSpc>
-                <a:spcPct val="107000"/>
-              </a:lnSpc>
-            </a:pPr>
-            <a:r>
-              <a:rPr lang="en-GB" sz="2200" dirty="0">
-                <a:latin typeface="+mj-lt"/>
-                <a:cs typeface="Courier New" panose="02070309020205020404" pitchFamily="49" charset="0"/>
-              </a:rPr>
-              <a:t>In the terminal write </a:t>
-            </a:r>
-            <a:r>
-              <a:rPr lang="en-GB" sz="2200" dirty="0">
-                <a:latin typeface="Courier New" panose="02070309020205020404" pitchFamily="49" charset="0"/>
-                <a:cs typeface="Courier New" panose="02070309020205020404" pitchFamily="49" charset="0"/>
-              </a:rPr>
-              <a:t>python</a:t>
-            </a:r>
-            <a:r>
-              <a:rPr lang="en-GB" sz="2200" dirty="0">
-                <a:latin typeface="+mj-lt"/>
-                <a:cs typeface="Courier New" panose="02070309020205020404" pitchFamily="49" charset="0"/>
-              </a:rPr>
-              <a:t> then </a:t>
-            </a:r>
-            <a:r>
-              <a:rPr lang="en-GB" sz="2200" dirty="0">
-                <a:latin typeface="Courier New" panose="02070309020205020404" pitchFamily="49" charset="0"/>
-                <a:cs typeface="Courier New" panose="02070309020205020404" pitchFamily="49" charset="0"/>
-              </a:rPr>
-              <a:t>import </a:t>
-            </a:r>
-            <a:r>
-              <a:rPr lang="en-GB" sz="2200" dirty="0" err="1">
-                <a:latin typeface="Courier New" panose="02070309020205020404" pitchFamily="49" charset="0"/>
-                <a:cs typeface="Courier New" panose="02070309020205020404" pitchFamily="49" charset="0"/>
-              </a:rPr>
-              <a:t>numpy</a:t>
-            </a:r>
-            <a:r>
-              <a:rPr lang="en-GB" sz="2200" dirty="0">
-                <a:latin typeface="Courier New" panose="02070309020205020404" pitchFamily="49" charset="0"/>
-                <a:cs typeface="Courier New" panose="02070309020205020404" pitchFamily="49" charset="0"/>
-              </a:rPr>
-              <a:t> </a:t>
-            </a:r>
-            <a:r>
-              <a:rPr lang="en-GB" sz="2200" dirty="0">
-                <a:latin typeface="+mj-lt"/>
-                <a:cs typeface="Courier New" panose="02070309020205020404" pitchFamily="49" charset="0"/>
-              </a:rPr>
-              <a:t>to verify </a:t>
-            </a:r>
-            <a:r>
-              <a:rPr lang="en-GB" sz="2200" dirty="0" err="1">
-                <a:latin typeface="+mj-lt"/>
-                <a:cs typeface="Courier New" panose="02070309020205020404" pitchFamily="49" charset="0"/>
-              </a:rPr>
-              <a:t>numpy</a:t>
-            </a:r>
-            <a:r>
-              <a:rPr lang="en-GB" sz="2200" dirty="0">
-                <a:latin typeface="+mj-lt"/>
-                <a:cs typeface="Courier New" panose="02070309020205020404" pitchFamily="49" charset="0"/>
-              </a:rPr>
-              <a:t> is installed</a:t>
-            </a:r>
-          </a:p>
-          <a:p>
-            <a:pPr>
-              <a:lnSpc>
-                <a:spcPct val="107000"/>
-              </a:lnSpc>
-            </a:pPr>
-            <a:r>
-              <a:rPr lang="en-GB" sz="2600" dirty="0">
-                <a:latin typeface="+mj-lt"/>
-                <a:cs typeface="Courier New" panose="02070309020205020404" pitchFamily="49" charset="0"/>
-              </a:rPr>
-              <a:t>Compare </a:t>
-            </a:r>
-            <a:r>
-              <a:rPr lang="en-GB" sz="2800" dirty="0">
-                <a:latin typeface="Courier New" panose="02070309020205020404" pitchFamily="49" charset="0"/>
-                <a:cs typeface="Courier New" panose="02070309020205020404" pitchFamily="49" charset="0"/>
-              </a:rPr>
-              <a:t>requirements_anaconda.txt </a:t>
-            </a:r>
-            <a:r>
-              <a:rPr lang="en-GB" sz="2800" dirty="0">
-                <a:latin typeface="+mj-lt"/>
-                <a:cs typeface="Courier New" panose="02070309020205020404" pitchFamily="49" charset="0"/>
-              </a:rPr>
-              <a:t>and</a:t>
-            </a:r>
-            <a:r>
-              <a:rPr lang="en-GB" sz="2800" dirty="0">
-                <a:latin typeface="Courier New" panose="02070309020205020404" pitchFamily="49" charset="0"/>
-                <a:cs typeface="Courier New" panose="02070309020205020404" pitchFamily="49" charset="0"/>
-              </a:rPr>
-              <a:t> requirements_pip.txt</a:t>
-            </a:r>
-          </a:p>
-          <a:p>
-            <a:pPr lvl="1">
-              <a:lnSpc>
-                <a:spcPct val="107000"/>
-              </a:lnSpc>
-            </a:pPr>
-            <a:r>
-              <a:rPr lang="en-GB" sz="2200" dirty="0">
-                <a:latin typeface="+mj-lt"/>
-                <a:cs typeface="Courier New" panose="02070309020205020404" pitchFamily="49" charset="0"/>
-              </a:rPr>
-              <a:t>What differences can you see in their format?</a:t>
-            </a:r>
+              <a:t>You can relax – you can stop following along!</a:t>
+            </a:r>
+            <a:endParaRPr lang="en-GB" sz="2600" b="1" dirty="0">
+              <a:latin typeface="Courier New" panose="02070309020205020404" pitchFamily="49" charset="0"/>
+              <a:cs typeface="Courier New" panose="02070309020205020404" pitchFamily="49" charset="0"/>
+            </a:endParaRPr>
           </a:p>
         </p:txBody>
       </p:sp>
     </p:spTree>
     <p:extLst>
       <p:ext uri="{BB962C8B-B14F-4D97-AF65-F5344CB8AC3E}">
-        <p14:creationId xmlns:p14="http://schemas.microsoft.com/office/powerpoint/2010/main" val="1234567131"/>
+        <p14:creationId xmlns:p14="http://schemas.microsoft.com/office/powerpoint/2010/main" val="4279717336"/>
       </p:ext>
     </p:extLst>
   </p:cSld>
   <p:clrMapOvr>
     <a:masterClrMapping/>
   </p:clrMapOvr>
-  <mc:AlternateContent xmlns:mc="http://schemas.openxmlformats.org/markup-compatibility/2006" xmlns:p14="http://schemas.microsoft.com/office/powerpoint/2010/main">
-    <mc:Choice Requires="p14">
+  <mc:AlternateContent xmlns:mc="http://schemas.openxmlformats.org/markup-compatibility/2006">
+    <mc:Choice xmlns:p14="http://schemas.microsoft.com/office/powerpoint/2010/main" Requires="p14">
       <p:transition p14:dur="10"/>
     </mc:Choice>
-    <mc:Fallback xmlns="">
+    <mc:Fallback>
       <p:transition/>
     </mc:Fallback>
   </mc:AlternateContent>
@@ -14030,7 +13965,7 @@
           <a:p>
             <a:r>
               <a:rPr lang="en-GB" sz="4000" dirty="0"/>
-              <a:t>Python Installations</a:t>
+              <a:t>Exercise</a:t>
             </a:r>
           </a:p>
         </p:txBody>
@@ -14047,172 +13982,51 @@
         </p:nvSpPr>
         <p:spPr>
           <a:xfrm>
-            <a:off x="457200" y="1600200"/>
-            <a:ext cx="8435280" cy="4876800"/>
+            <a:off x="457200" y="2857500"/>
+            <a:ext cx="8435280" cy="1143000"/>
           </a:xfrm>
         </p:spPr>
         <p:txBody>
           <a:bodyPr>
-            <a:normAutofit fontScale="92500" lnSpcReduction="20000"/>
+            <a:normAutofit/>
           </a:bodyPr>
           <a:lstStyle/>
           <a:p>
-            <a:pPr>
-              <a:lnSpc>
-                <a:spcPct val="107000"/>
-              </a:lnSpc>
-            </a:pPr>
-            <a:r>
-              <a:rPr lang="en-GB" sz="3000" dirty="0">
+            <a:pPr marL="0" lvl="0" indent="0" algn="ctr">
+              <a:lnSpc>
+                <a:spcPct val="107000"/>
+              </a:lnSpc>
+              <a:buNone/>
+            </a:pPr>
+            <a:r>
+              <a:rPr lang="en-GB" sz="3000" b="1" dirty="0">
                 <a:latin typeface="Arial" panose="020B0604020202020204" pitchFamily="34" charset="0"/>
                 <a:cs typeface="Arial" panose="020B0604020202020204" pitchFamily="34" charset="0"/>
               </a:rPr>
-              <a:t>A particular instance of a program installed on your computer</a:t>
-            </a:r>
-          </a:p>
-          <a:p>
-            <a:pPr lvl="1">
-              <a:lnSpc>
-                <a:spcPct val="107000"/>
-              </a:lnSpc>
-            </a:pPr>
-            <a:r>
-              <a:rPr lang="en-GB" sz="2600" dirty="0">
-                <a:latin typeface="Arial" panose="020B0604020202020204" pitchFamily="34" charset="0"/>
-                <a:cs typeface="Arial" panose="020B0604020202020204" pitchFamily="34" charset="0"/>
-              </a:rPr>
-              <a:t>Python</a:t>
-            </a:r>
-          </a:p>
-          <a:p>
-            <a:pPr lvl="1">
-              <a:lnSpc>
-                <a:spcPct val="107000"/>
-              </a:lnSpc>
-            </a:pPr>
-            <a:r>
-              <a:rPr lang="en-GB" sz="2600" dirty="0">
-                <a:latin typeface="Arial" panose="020B0604020202020204" pitchFamily="34" charset="0"/>
-                <a:cs typeface="Arial" panose="020B0604020202020204" pitchFamily="34" charset="0"/>
-              </a:rPr>
-              <a:t>Anaconda</a:t>
-            </a:r>
-          </a:p>
-          <a:p>
-            <a:pPr>
-              <a:lnSpc>
-                <a:spcPct val="107000"/>
-              </a:lnSpc>
-            </a:pPr>
-            <a:r>
-              <a:rPr lang="en-GB" sz="3000" dirty="0">
-                <a:latin typeface="Arial" panose="020B0604020202020204" pitchFamily="34" charset="0"/>
-                <a:cs typeface="Arial" panose="020B0604020202020204" pitchFamily="34" charset="0"/>
-              </a:rPr>
-              <a:t>Will be a particular version of Python e.g. 3.9 or 2.7</a:t>
-            </a:r>
-          </a:p>
-          <a:p>
-            <a:pPr lvl="1">
-              <a:lnSpc>
-                <a:spcPct val="107000"/>
-              </a:lnSpc>
-            </a:pPr>
-            <a:r>
-              <a:rPr lang="en-GB" sz="2600" dirty="0">
-                <a:latin typeface="Arial" panose="020B0604020202020204" pitchFamily="34" charset="0"/>
-                <a:cs typeface="Arial" panose="020B0604020202020204" pitchFamily="34" charset="0"/>
-              </a:rPr>
-              <a:t>Typing </a:t>
-            </a:r>
-            <a:r>
-              <a:rPr lang="en-GB" sz="2600" dirty="0">
-                <a:latin typeface="Courier New" panose="02070309020205020404" pitchFamily="49" charset="0"/>
-                <a:cs typeface="Courier New" panose="02070309020205020404" pitchFamily="49" charset="0"/>
-              </a:rPr>
-              <a:t>python --version</a:t>
-            </a:r>
-            <a:r>
-              <a:rPr lang="en-GB" sz="2600" dirty="0">
-                <a:latin typeface="Arial" panose="020B0604020202020204" pitchFamily="34" charset="0"/>
-                <a:cs typeface="Arial" panose="020B0604020202020204" pitchFamily="34" charset="0"/>
-              </a:rPr>
-              <a:t> in the terminal will give version number</a:t>
-            </a:r>
-          </a:p>
-          <a:p>
-            <a:pPr>
-              <a:lnSpc>
-                <a:spcPct val="107000"/>
-              </a:lnSpc>
-            </a:pPr>
-            <a:r>
-              <a:rPr lang="en-GB" sz="3000" dirty="0">
-                <a:latin typeface="Arial" panose="020B0604020202020204" pitchFamily="34" charset="0"/>
-                <a:cs typeface="Arial" panose="020B0604020202020204" pitchFamily="34" charset="0"/>
-              </a:rPr>
-              <a:t>Contains</a:t>
-            </a:r>
-          </a:p>
-          <a:p>
-            <a:pPr lvl="1">
-              <a:lnSpc>
-                <a:spcPct val="107000"/>
-              </a:lnSpc>
-            </a:pPr>
-            <a:r>
-              <a:rPr lang="en-GB" sz="2600" dirty="0">
-                <a:latin typeface="Arial" panose="020B0604020202020204" pitchFamily="34" charset="0"/>
-                <a:cs typeface="Arial" panose="020B0604020202020204" pitchFamily="34" charset="0"/>
-              </a:rPr>
-              <a:t>Python interpreter</a:t>
-            </a:r>
-          </a:p>
-          <a:p>
-            <a:pPr lvl="1">
-              <a:lnSpc>
-                <a:spcPct val="107000"/>
-              </a:lnSpc>
-            </a:pPr>
-            <a:r>
-              <a:rPr lang="en-GB" sz="2600" dirty="0">
-                <a:latin typeface="Arial" panose="020B0604020202020204" pitchFamily="34" charset="0"/>
-                <a:cs typeface="Arial" panose="020B0604020202020204" pitchFamily="34" charset="0"/>
-              </a:rPr>
-              <a:t>Core Python functionality</a:t>
-            </a:r>
-          </a:p>
-          <a:p>
-            <a:pPr lvl="1">
-              <a:lnSpc>
-                <a:spcPct val="107000"/>
-              </a:lnSpc>
-            </a:pPr>
-            <a:r>
-              <a:rPr lang="en-GB" sz="2600" dirty="0">
-                <a:latin typeface="Arial" panose="020B0604020202020204" pitchFamily="34" charset="0"/>
-                <a:cs typeface="Arial" panose="020B0604020202020204" pitchFamily="34" charset="0"/>
-              </a:rPr>
-              <a:t>Built-in modules</a:t>
-            </a:r>
+              <a:t>During the follow demonstration, follow along on your own computer</a:t>
+            </a:r>
+            <a:endParaRPr lang="en-GB" sz="3000" dirty="0">
+              <a:latin typeface="Arial" panose="020B0604020202020204" pitchFamily="34" charset="0"/>
+              <a:cs typeface="Arial" panose="020B0604020202020204" pitchFamily="34" charset="0"/>
+            </a:endParaRPr>
           </a:p>
         </p:txBody>
       </p:sp>
     </p:spTree>
     <p:extLst>
       <p:ext uri="{BB962C8B-B14F-4D97-AF65-F5344CB8AC3E}">
-        <p14:creationId xmlns:p14="http://schemas.microsoft.com/office/powerpoint/2010/main" val="2809994231"/>
+        <p14:creationId xmlns:p14="http://schemas.microsoft.com/office/powerpoint/2010/main" val="3665092893"/>
       </p:ext>
     </p:extLst>
   </p:cSld>
   <p:clrMapOvr>
     <a:masterClrMapping/>
   </p:clrMapOvr>
-  <mc:AlternateContent xmlns:mc="http://schemas.openxmlformats.org/markup-compatibility/2006" xmlns:p14="http://schemas.microsoft.com/office/powerpoint/2010/main">
-    <mc:Choice Requires="p14">
+  <mc:AlternateContent xmlns:mc="http://schemas.openxmlformats.org/markup-compatibility/2006">
+    <mc:Choice xmlns:p14="http://schemas.microsoft.com/office/powerpoint/2010/main" Requires="p14">
       <p:transition p14:dur="10"/>
     </mc:Choice>
-    <mc:Fallback xmlns="">
+    <mc:Fallback>
       <p:transition/>
     </mc:Fallback>
   </mc:AlternateContent>
@@ -14276,7 +14090,7 @@
         </p:spPr>
         <p:txBody>
           <a:bodyPr>
-            <a:normAutofit/>
+            <a:normAutofit fontScale="92500" lnSpcReduction="20000"/>
           </a:bodyPr>
           <a:lstStyle/>
           <a:p>
@@ -14290,7 +14104,7 @@
                 <a:latin typeface="Arial" panose="020B0604020202020204" pitchFamily="34" charset="0"/>
                 <a:cs typeface="Arial" panose="020B0604020202020204" pitchFamily="34" charset="0"/>
               </a:rPr>
-              <a:t>Python</a:t>
+              <a:t>A particular instance of a program installed on your computer</a:t>
             </a:r>
           </a:p>
           <a:p>
@@ -14304,61 +14118,21 @@
                 <a:latin typeface="Arial" panose="020B0604020202020204" pitchFamily="34" charset="0"/>
                 <a:cs typeface="Arial" panose="020B0604020202020204" pitchFamily="34" charset="0"/>
               </a:rPr>
-              <a:t>Install from the </a:t>
-            </a:r>
+              <a:t>Python</a:t>
+            </a:r>
+          </a:p>
+          <a:p>
+            <a:pPr lvl="1">
+              <a:lnSpc>
+                <a:spcPct val="107000"/>
+              </a:lnSpc>
+            </a:pPr>
             <a:r>
               <a:rPr lang="en-GB" sz="2600" dirty="0">
                 <a:latin typeface="Arial" panose="020B0604020202020204" pitchFamily="34" charset="0"/>
                 <a:cs typeface="Arial" panose="020B0604020202020204" pitchFamily="34" charset="0"/>
-                <a:hlinkClick r:id="rId3"/>
-              </a:rPr>
-              <a:t>Python website </a:t>
-            </a:r>
-            <a:endParaRPr lang="en-GB" sz="2600" dirty="0">
-              <a:latin typeface="Arial" panose="020B0604020202020204" pitchFamily="34" charset="0"/>
-              <a:cs typeface="Arial" panose="020B0604020202020204" pitchFamily="34" charset="0"/>
-            </a:endParaRPr>
-          </a:p>
-          <a:p>
-            <a:pPr lvl="1">
-              <a:lnSpc>
-                <a:spcPct val="107000"/>
-              </a:lnSpc>
-            </a:pPr>
-            <a:r>
-              <a:rPr lang="en-GB" sz="2600" dirty="0">
-                <a:latin typeface="Arial" panose="020B0604020202020204" pitchFamily="34" charset="0"/>
-                <a:cs typeface="Arial" panose="020B0604020202020204" pitchFamily="34" charset="0"/>
-              </a:rPr>
-              <a:t>Can have multiple versions installed</a:t>
-            </a:r>
-          </a:p>
-          <a:p>
-            <a:pPr lvl="1">
-              <a:lnSpc>
-                <a:spcPct val="107000"/>
-              </a:lnSpc>
-            </a:pPr>
-            <a:r>
-              <a:rPr lang="en-GB" sz="2600" dirty="0">
-                <a:latin typeface="Arial" panose="020B0604020202020204" pitchFamily="34" charset="0"/>
-                <a:cs typeface="Arial" panose="020B0604020202020204" pitchFamily="34" charset="0"/>
-              </a:rPr>
-              <a:t>“path” tells computer where to look for programs</a:t>
-            </a:r>
-          </a:p>
-          <a:p>
-            <a:pPr lvl="2">
-              <a:lnSpc>
-                <a:spcPct val="107000"/>
-              </a:lnSpc>
-            </a:pPr>
-            <a:r>
-              <a:rPr lang="en-GB" sz="2200" dirty="0">
-                <a:latin typeface="Arial" panose="020B0604020202020204" pitchFamily="34" charset="0"/>
-                <a:cs typeface="Arial" panose="020B0604020202020204" pitchFamily="34" charset="0"/>
-              </a:rPr>
-              <a:t>Sometimes too many entries on path can lead to problems</a:t>
+              </a:rPr>
+              <a:t>Anaconda</a:t>
             </a:r>
           </a:p>
           <a:p>
@@ -14372,7 +14146,7 @@
                 <a:latin typeface="Arial" panose="020B0604020202020204" pitchFamily="34" charset="0"/>
                 <a:cs typeface="Arial" panose="020B0604020202020204" pitchFamily="34" charset="0"/>
               </a:rPr>
-              <a:t>Anaconda</a:t>
+              <a:t>Will be a particular version of Python e.g. 3.9 or 2.7</a:t>
             </a:r>
           </a:p>
           <a:p>
@@ -14382,25 +14156,81 @@
               </a:lnSpc>
             </a:pPr>
             <a:r>
-              <a:rPr lang="en-GB" sz="2200" dirty="0">
+              <a:rPr lang="en-GB" sz="2600" dirty="0">
                 <a:latin typeface="Arial" panose="020B0604020202020204" pitchFamily="34" charset="0"/>
                 <a:cs typeface="Arial" panose="020B0604020202020204" pitchFamily="34" charset="0"/>
               </a:rPr>
-              <a:t>Can create from the environment tab</a:t>
-            </a:r>
-          </a:p>
-          <a:p>
-            <a:pPr lvl="1">
-              <a:lnSpc>
-                <a:spcPct val="107000"/>
-              </a:lnSpc>
-            </a:pPr>
-            <a:r>
-              <a:rPr lang="en-GB" sz="2200" dirty="0">
+              <a:t>Typing </a:t>
+            </a:r>
+            <a:r>
+              <a:rPr lang="en-GB" sz="2600" dirty="0">
+                <a:latin typeface="Courier New" panose="02070309020205020404" pitchFamily="49" charset="0"/>
+                <a:cs typeface="Courier New" panose="02070309020205020404" pitchFamily="49" charset="0"/>
+              </a:rPr>
+              <a:t>python --version</a:t>
+            </a:r>
+            <a:r>
+              <a:rPr lang="en-GB" sz="2600" dirty="0">
                 <a:latin typeface="Arial" panose="020B0604020202020204" pitchFamily="34" charset="0"/>
                 <a:cs typeface="Arial" panose="020B0604020202020204" pitchFamily="34" charset="0"/>
               </a:rPr>
-              <a:t>Click “Create”, give it a name and select a version</a:t>
+              <a:t> in the terminal will give version number</a:t>
+            </a:r>
+          </a:p>
+          <a:p>
+            <a:pPr>
+              <a:lnSpc>
+                <a:spcPct val="107000"/>
+              </a:lnSpc>
+            </a:pPr>
+            <a:r>
+              <a:rPr lang="en-GB" sz="3000" dirty="0">
+                <a:latin typeface="Arial" panose="020B0604020202020204" pitchFamily="34" charset="0"/>
+                <a:cs typeface="Arial" panose="020B0604020202020204" pitchFamily="34" charset="0"/>
+              </a:rPr>
+              <a:t>Contains</a:t>
+            </a:r>
+          </a:p>
+          <a:p>
+            <a:pPr lvl="1">
+              <a:lnSpc>
+                <a:spcPct val="107000"/>
+              </a:lnSpc>
+            </a:pPr>
+            <a:r>
+              <a:rPr lang="en-GB" sz="2600" dirty="0">
+                <a:latin typeface="Arial" panose="020B0604020202020204" pitchFamily="34" charset="0"/>
+                <a:cs typeface="Arial" panose="020B0604020202020204" pitchFamily="34" charset="0"/>
+              </a:rPr>
+              <a:t>Python interpreter</a:t>
+            </a:r>
+          </a:p>
+          <a:p>
+            <a:pPr lvl="1">
+              <a:lnSpc>
+                <a:spcPct val="107000"/>
+              </a:lnSpc>
+            </a:pPr>
+            <a:r>
+              <a:rPr lang="en-GB" sz="2600" dirty="0">
+                <a:latin typeface="Arial" panose="020B0604020202020204" pitchFamily="34" charset="0"/>
+                <a:cs typeface="Arial" panose="020B0604020202020204" pitchFamily="34" charset="0"/>
+              </a:rPr>
+              <a:t>Core Python functionality</a:t>
+            </a:r>
+          </a:p>
+          <a:p>
+            <a:pPr lvl="1">
+              <a:lnSpc>
+                <a:spcPct val="107000"/>
+              </a:lnSpc>
+            </a:pPr>
+            <a:r>
+              <a:rPr lang="en-GB" sz="2600" dirty="0">
+                <a:latin typeface="Arial" panose="020B0604020202020204" pitchFamily="34" charset="0"/>
+                <a:cs typeface="Arial" panose="020B0604020202020204" pitchFamily="34" charset="0"/>
+              </a:rPr>
+              <a:t>Built-in modules</a:t>
             </a:r>
           </a:p>
         </p:txBody>
@@ -14408,7 +14238,7 @@
     </p:spTree>
     <p:extLst>
       <p:ext uri="{BB962C8B-B14F-4D97-AF65-F5344CB8AC3E}">
-        <p14:creationId xmlns:p14="http://schemas.microsoft.com/office/powerpoint/2010/main" val="149702747"/>
+        <p14:creationId xmlns:p14="http://schemas.microsoft.com/office/powerpoint/2010/main" val="2809994231"/>
       </p:ext>
     </p:extLst>
   </p:cSld>
@@ -14460,7 +14290,7 @@
           <a:p>
             <a:r>
               <a:rPr lang="en-GB" sz="4000" dirty="0"/>
-              <a:t>Python Environments</a:t>
+              <a:t>Python Installations</a:t>
             </a:r>
           </a:p>
         </p:txBody>
@@ -14497,82 +14327,125 @@
                 <a:latin typeface="Arial" panose="020B0604020202020204" pitchFamily="34" charset="0"/>
                 <a:cs typeface="Arial" panose="020B0604020202020204" pitchFamily="34" charset="0"/>
               </a:rPr>
-              <a:t>An isolated installation of Python with associated installed packages</a:t>
-            </a:r>
-          </a:p>
-          <a:p>
-            <a:pPr>
-              <a:lnSpc>
-                <a:spcPct val="107000"/>
-              </a:lnSpc>
-            </a:pPr>
-            <a:r>
-              <a:rPr lang="en-GB" sz="3000" dirty="0">
+              <a:t>Python</a:t>
+            </a:r>
+          </a:p>
+          <a:p>
+            <a:pPr lvl="1">
+              <a:lnSpc>
+                <a:spcPct val="107000"/>
+              </a:lnSpc>
+            </a:pPr>
+            <a:r>
+              <a:rPr lang="en-GB" sz="2600" dirty="0">
                 <a:latin typeface="Arial" panose="020B0604020202020204" pitchFamily="34" charset="0"/>
                 <a:cs typeface="Arial" panose="020B0604020202020204" pitchFamily="34" charset="0"/>
               </a:rPr>
-              <a:t>Useful for managing projects with different dependencies</a:t>
-            </a:r>
-          </a:p>
-          <a:p>
-            <a:pPr lvl="1">
-              <a:lnSpc>
-                <a:spcPct val="107000"/>
-              </a:lnSpc>
-            </a:pPr>
+              <a:t>Install from the </a:t>
+            </a:r>
             <a:r>
               <a:rPr lang="en-GB" sz="2600" dirty="0">
                 <a:latin typeface="Arial" panose="020B0604020202020204" pitchFamily="34" charset="0"/>
                 <a:cs typeface="Arial" panose="020B0604020202020204" pitchFamily="34" charset="0"/>
-              </a:rPr>
-              <a:t>Different versions of Python sometimes required for different packages</a:t>
-            </a:r>
-          </a:p>
-          <a:p>
-            <a:pPr lvl="1">
-              <a:lnSpc>
-                <a:spcPct val="107000"/>
-              </a:lnSpc>
-            </a:pPr>
-            <a:r>
-              <a:rPr lang="en-GB" sz="2600" dirty="0">
-                <a:latin typeface="Arial" panose="020B0604020202020204" pitchFamily="34" charset="0"/>
-                <a:cs typeface="Arial" panose="020B0604020202020204" pitchFamily="34" charset="0"/>
-              </a:rPr>
-              <a:t>Allows different environments for different projects</a:t>
-            </a:r>
-          </a:p>
-          <a:p>
-            <a:pPr lvl="1">
-              <a:lnSpc>
-                <a:spcPct val="107000"/>
-              </a:lnSpc>
-            </a:pPr>
-            <a:r>
-              <a:rPr lang="en-GB" sz="2600" dirty="0">
-                <a:latin typeface="Arial" panose="020B0604020202020204" pitchFamily="34" charset="0"/>
-                <a:cs typeface="Arial" panose="020B0604020202020204" pitchFamily="34" charset="0"/>
-              </a:rPr>
-              <a:t>When starting a new project you might want to make use of functionality of new Python release</a:t>
-            </a:r>
-          </a:p>
-          <a:p>
-            <a:pPr>
-              <a:lnSpc>
-                <a:spcPct val="107000"/>
-              </a:lnSpc>
-            </a:pPr>
+                <a:hlinkClick r:id="rId3"/>
+              </a:rPr>
+              <a:t>Python website </a:t>
+            </a:r>
             <a:endParaRPr lang="en-GB" sz="2600" dirty="0">
               <a:latin typeface="Arial" panose="020B0604020202020204" pitchFamily="34" charset="0"/>
               <a:cs typeface="Arial" panose="020B0604020202020204" pitchFamily="34" charset="0"/>
             </a:endParaRPr>
           </a:p>
+          <a:p>
+            <a:pPr lvl="1">
+              <a:lnSpc>
+                <a:spcPct val="107000"/>
+              </a:lnSpc>
+            </a:pPr>
+            <a:r>
+              <a:rPr lang="en-GB" sz="2600" dirty="0">
+                <a:latin typeface="Arial" panose="020B0604020202020204" pitchFamily="34" charset="0"/>
+                <a:cs typeface="Arial" panose="020B0604020202020204" pitchFamily="34" charset="0"/>
+              </a:rPr>
+              <a:t>Can have multiple versions installed</a:t>
+            </a:r>
+          </a:p>
+          <a:p>
+            <a:pPr lvl="1">
+              <a:lnSpc>
+                <a:spcPct val="107000"/>
+              </a:lnSpc>
+            </a:pPr>
+            <a:r>
+              <a:rPr lang="en-GB" sz="2600" dirty="0">
+                <a:latin typeface="Arial" panose="020B0604020202020204" pitchFamily="34" charset="0"/>
+                <a:cs typeface="Arial" panose="020B0604020202020204" pitchFamily="34" charset="0"/>
+              </a:rPr>
+              <a:t>“path” tells computer where to look for programs</a:t>
+            </a:r>
+          </a:p>
+          <a:p>
+            <a:pPr lvl="2">
+              <a:lnSpc>
+                <a:spcPct val="107000"/>
+              </a:lnSpc>
+            </a:pPr>
+            <a:r>
+              <a:rPr lang="en-GB" sz="2200" dirty="0">
+                <a:latin typeface="Arial" panose="020B0604020202020204" pitchFamily="34" charset="0"/>
+                <a:cs typeface="Arial" panose="020B0604020202020204" pitchFamily="34" charset="0"/>
+              </a:rPr>
+              <a:t>Sometimes too many entries on path can lead to problems</a:t>
+            </a:r>
+          </a:p>
+          <a:p>
+            <a:pPr>
+              <a:lnSpc>
+                <a:spcPct val="107000"/>
+              </a:lnSpc>
+            </a:pPr>
+            <a:r>
+              <a:rPr lang="en-GB" sz="3000" dirty="0">
+                <a:latin typeface="Arial" panose="020B0604020202020204" pitchFamily="34" charset="0"/>
+                <a:cs typeface="Arial" panose="020B0604020202020204" pitchFamily="34" charset="0"/>
+              </a:rPr>
+              <a:t>Anaconda</a:t>
+            </a:r>
+          </a:p>
+          <a:p>
+            <a:pPr lvl="1">
+              <a:lnSpc>
+                <a:spcPct val="107000"/>
+              </a:lnSpc>
+            </a:pPr>
+            <a:r>
+              <a:rPr lang="en-GB" sz="2200" dirty="0">
+                <a:latin typeface="Arial" panose="020B0604020202020204" pitchFamily="34" charset="0"/>
+                <a:cs typeface="Arial" panose="020B0604020202020204" pitchFamily="34" charset="0"/>
+              </a:rPr>
+              <a:t>Can create from the environment tab</a:t>
+            </a:r>
+          </a:p>
+          <a:p>
+            <a:pPr lvl="1">
+              <a:lnSpc>
+                <a:spcPct val="107000"/>
+              </a:lnSpc>
+            </a:pPr>
+            <a:r>
+              <a:rPr lang="en-GB" sz="2200" dirty="0">
+                <a:latin typeface="Arial" panose="020B0604020202020204" pitchFamily="34" charset="0"/>
+                <a:cs typeface="Arial" panose="020B0604020202020204" pitchFamily="34" charset="0"/>
+              </a:rPr>
+              <a:t>Click “Create”, give it a name and select a version</a:t>
+            </a:r>
+          </a:p>
         </p:txBody>
       </p:sp>
     </p:spTree>
     <p:extLst>
       <p:ext uri="{BB962C8B-B14F-4D97-AF65-F5344CB8AC3E}">
-        <p14:creationId xmlns:p14="http://schemas.microsoft.com/office/powerpoint/2010/main" val="3525808550"/>
+        <p14:creationId xmlns:p14="http://schemas.microsoft.com/office/powerpoint/2010/main" val="149702747"/>
       </p:ext>
     </p:extLst>
   </p:cSld>
@@ -14624,7 +14497,7 @@
           <a:p>
             <a:r>
               <a:rPr lang="en-GB" sz="4000" dirty="0"/>
-              <a:t>Environments in Anaconda</a:t>
+              <a:t>Python Environments</a:t>
             </a:r>
           </a:p>
         </p:txBody>
@@ -14657,11 +14530,11 @@
               </a:lnSpc>
             </a:pPr>
             <a:r>
-              <a:rPr lang="en-GB" sz="2600" dirty="0">
+              <a:rPr lang="en-GB" sz="3000" dirty="0">
                 <a:latin typeface="Arial" panose="020B0604020202020204" pitchFamily="34" charset="0"/>
                 <a:cs typeface="Arial" panose="020B0604020202020204" pitchFamily="34" charset="0"/>
               </a:rPr>
-              <a:t>Go to environments tab</a:t>
+              <a:t>An isolated installation of Python with associated installed packages</a:t>
             </a:r>
           </a:p>
           <a:p>
@@ -14671,15 +14544,15 @@
               </a:lnSpc>
             </a:pPr>
             <a:r>
-              <a:rPr lang="en-GB" sz="2600" dirty="0">
+              <a:rPr lang="en-GB" sz="3000" dirty="0">
                 <a:latin typeface="Arial" panose="020B0604020202020204" pitchFamily="34" charset="0"/>
                 <a:cs typeface="Arial" panose="020B0604020202020204" pitchFamily="34" charset="0"/>
               </a:rPr>
-              <a:t>“Create” will create a new environment of a specific Python version</a:t>
-            </a:r>
-          </a:p>
-          <a:p>
-            <a:pPr>
+              <a:t>Useful for managing projects with different dependencies</a:t>
+            </a:r>
+          </a:p>
+          <a:p>
+            <a:pPr lvl="1">
               <a:lnSpc>
                 <a:spcPct val="107000"/>
               </a:lnSpc>
@@ -14689,11 +14562,11 @@
                 <a:latin typeface="Arial" panose="020B0604020202020204" pitchFamily="34" charset="0"/>
                 <a:cs typeface="Arial" panose="020B0604020202020204" pitchFamily="34" charset="0"/>
               </a:rPr>
-              <a:t>“Clone” will create a duplicate of another environment</a:t>
-            </a:r>
-          </a:p>
-          <a:p>
-            <a:pPr>
+              <a:t>Different versions of Python sometimes required for different packages</a:t>
+            </a:r>
+          </a:p>
+          <a:p>
+            <a:pPr lvl="1">
               <a:lnSpc>
                 <a:spcPct val="107000"/>
               </a:lnSpc>
@@ -14703,21 +14576,21 @@
                 <a:latin typeface="Arial" panose="020B0604020202020204" pitchFamily="34" charset="0"/>
                 <a:cs typeface="Arial" panose="020B0604020202020204" pitchFamily="34" charset="0"/>
               </a:rPr>
-              <a:t>“Backup” will save a specification of the current environment as a .</a:t>
-            </a:r>
-            <a:r>
-              <a:rPr lang="en-GB" sz="2600" dirty="0" err="1">
+              <a:t>Allows different environments for different projects</a:t>
+            </a:r>
+          </a:p>
+          <a:p>
+            <a:pPr lvl="1">
+              <a:lnSpc>
+                <a:spcPct val="107000"/>
+              </a:lnSpc>
+            </a:pPr>
+            <a:r>
+              <a:rPr lang="en-GB" sz="2600" dirty="0">
                 <a:latin typeface="Arial" panose="020B0604020202020204" pitchFamily="34" charset="0"/>
                 <a:cs typeface="Arial" panose="020B0604020202020204" pitchFamily="34" charset="0"/>
               </a:rPr>
-              <a:t>yaml</a:t>
-            </a:r>
-            <a:r>
-              <a:rPr lang="en-GB" sz="2600" dirty="0">
-                <a:latin typeface="Arial" panose="020B0604020202020204" pitchFamily="34" charset="0"/>
-                <a:cs typeface="Arial" panose="020B0604020202020204" pitchFamily="34" charset="0"/>
-              </a:rPr>
-              <a:t> file</a:t>
+              <a:t>When starting a new project you might want to make use of functionality of new Python release</a:t>
             </a:r>
           </a:p>
           <a:p>
@@ -14726,48 +14599,17 @@
                 <a:spcPct val="107000"/>
               </a:lnSpc>
             </a:pPr>
-            <a:r>
-              <a:rPr lang="en-GB" sz="2600" dirty="0">
-                <a:latin typeface="Arial" panose="020B0604020202020204" pitchFamily="34" charset="0"/>
-                <a:cs typeface="Arial" panose="020B0604020202020204" pitchFamily="34" charset="0"/>
-              </a:rPr>
-              <a:t>“Import” will create an environment from a .</a:t>
-            </a:r>
-            <a:r>
-              <a:rPr lang="en-GB" sz="2600" dirty="0" err="1">
-                <a:latin typeface="Arial" panose="020B0604020202020204" pitchFamily="34" charset="0"/>
-                <a:cs typeface="Arial" panose="020B0604020202020204" pitchFamily="34" charset="0"/>
-              </a:rPr>
-              <a:t>yaml</a:t>
-            </a:r>
-            <a:r>
-              <a:rPr lang="en-GB" sz="2600" dirty="0">
-                <a:latin typeface="Arial" panose="020B0604020202020204" pitchFamily="34" charset="0"/>
-                <a:cs typeface="Arial" panose="020B0604020202020204" pitchFamily="34" charset="0"/>
-              </a:rPr>
-              <a:t> file</a:t>
-            </a:r>
-          </a:p>
-          <a:p>
-            <a:pPr>
-              <a:lnSpc>
-                <a:spcPct val="107000"/>
-              </a:lnSpc>
-            </a:pPr>
-            <a:r>
-              <a:rPr lang="en-GB" sz="2600" dirty="0">
-                <a:latin typeface="Arial" panose="020B0604020202020204" pitchFamily="34" charset="0"/>
-                <a:cs typeface="Arial" panose="020B0604020202020204" pitchFamily="34" charset="0"/>
-              </a:rPr>
-              <a:t>“Remove” deletes an environment</a:t>
-            </a:r>
+            <a:endParaRPr lang="en-GB" sz="2600" dirty="0">
+              <a:latin typeface="Arial" panose="020B0604020202020204" pitchFamily="34" charset="0"/>
+              <a:cs typeface="Arial" panose="020B0604020202020204" pitchFamily="34" charset="0"/>
+            </a:endParaRPr>
           </a:p>
         </p:txBody>
       </p:sp>
     </p:spTree>
     <p:extLst>
       <p:ext uri="{BB962C8B-B14F-4D97-AF65-F5344CB8AC3E}">
-        <p14:creationId xmlns:p14="http://schemas.microsoft.com/office/powerpoint/2010/main" val="34194345"/>
+        <p14:creationId xmlns:p14="http://schemas.microsoft.com/office/powerpoint/2010/main" val="3525808550"/>
       </p:ext>
     </p:extLst>
   </p:cSld>
@@ -14819,6 +14661,201 @@
           <a:p>
             <a:r>
               <a:rPr lang="en-GB" sz="4000" dirty="0"/>
+              <a:t>Environments in Anaconda</a:t>
+            </a:r>
+          </a:p>
+        </p:txBody>
+      </p:sp>
+      <p:sp>
+        <p:nvSpPr>
+          <p:cNvPr id="3" name="Content Placeholder 2"/>
+          <p:cNvSpPr>
+            <a:spLocks noGrp="1"/>
+          </p:cNvSpPr>
+          <p:nvPr>
+            <p:ph idx="1"/>
+          </p:nvPr>
+        </p:nvSpPr>
+        <p:spPr>
+          <a:xfrm>
+            <a:off x="457200" y="1600200"/>
+            <a:ext cx="8435280" cy="4876800"/>
+          </a:xfrm>
+        </p:spPr>
+        <p:txBody>
+          <a:bodyPr>
+            <a:normAutofit/>
+          </a:bodyPr>
+          <a:lstStyle/>
+          <a:p>
+            <a:pPr>
+              <a:lnSpc>
+                <a:spcPct val="107000"/>
+              </a:lnSpc>
+            </a:pPr>
+            <a:r>
+              <a:rPr lang="en-GB" sz="2600" dirty="0">
+                <a:latin typeface="Arial" panose="020B0604020202020204" pitchFamily="34" charset="0"/>
+                <a:cs typeface="Arial" panose="020B0604020202020204" pitchFamily="34" charset="0"/>
+              </a:rPr>
+              <a:t>Go to environments tab</a:t>
+            </a:r>
+          </a:p>
+          <a:p>
+            <a:pPr>
+              <a:lnSpc>
+                <a:spcPct val="107000"/>
+              </a:lnSpc>
+            </a:pPr>
+            <a:r>
+              <a:rPr lang="en-GB" sz="2600" dirty="0">
+                <a:latin typeface="Arial" panose="020B0604020202020204" pitchFamily="34" charset="0"/>
+                <a:cs typeface="Arial" panose="020B0604020202020204" pitchFamily="34" charset="0"/>
+              </a:rPr>
+              <a:t>“Create” will create a new environment of a specific Python version</a:t>
+            </a:r>
+          </a:p>
+          <a:p>
+            <a:pPr>
+              <a:lnSpc>
+                <a:spcPct val="107000"/>
+              </a:lnSpc>
+            </a:pPr>
+            <a:r>
+              <a:rPr lang="en-GB" sz="2600" dirty="0">
+                <a:latin typeface="Arial" panose="020B0604020202020204" pitchFamily="34" charset="0"/>
+                <a:cs typeface="Arial" panose="020B0604020202020204" pitchFamily="34" charset="0"/>
+              </a:rPr>
+              <a:t>“Clone” will create a duplicate of another environment</a:t>
+            </a:r>
+          </a:p>
+          <a:p>
+            <a:pPr>
+              <a:lnSpc>
+                <a:spcPct val="107000"/>
+              </a:lnSpc>
+            </a:pPr>
+            <a:r>
+              <a:rPr lang="en-GB" sz="2600" dirty="0">
+                <a:latin typeface="Arial" panose="020B0604020202020204" pitchFamily="34" charset="0"/>
+                <a:cs typeface="Arial" panose="020B0604020202020204" pitchFamily="34" charset="0"/>
+              </a:rPr>
+              <a:t>“Backup” will save a specification of the current environment as a .</a:t>
+            </a:r>
+            <a:r>
+              <a:rPr lang="en-GB" sz="2600" dirty="0" err="1">
+                <a:latin typeface="Arial" panose="020B0604020202020204" pitchFamily="34" charset="0"/>
+                <a:cs typeface="Arial" panose="020B0604020202020204" pitchFamily="34" charset="0"/>
+              </a:rPr>
+              <a:t>yaml</a:t>
+            </a:r>
+            <a:r>
+              <a:rPr lang="en-GB" sz="2600" dirty="0">
+                <a:latin typeface="Arial" panose="020B0604020202020204" pitchFamily="34" charset="0"/>
+                <a:cs typeface="Arial" panose="020B0604020202020204" pitchFamily="34" charset="0"/>
+              </a:rPr>
+              <a:t> file</a:t>
+            </a:r>
+          </a:p>
+          <a:p>
+            <a:pPr>
+              <a:lnSpc>
+                <a:spcPct val="107000"/>
+              </a:lnSpc>
+            </a:pPr>
+            <a:r>
+              <a:rPr lang="en-GB" sz="2600" dirty="0">
+                <a:latin typeface="Arial" panose="020B0604020202020204" pitchFamily="34" charset="0"/>
+                <a:cs typeface="Arial" panose="020B0604020202020204" pitchFamily="34" charset="0"/>
+              </a:rPr>
+              <a:t>“Import” will create an environment from a .</a:t>
+            </a:r>
+            <a:r>
+              <a:rPr lang="en-GB" sz="2600" dirty="0" err="1">
+                <a:latin typeface="Arial" panose="020B0604020202020204" pitchFamily="34" charset="0"/>
+                <a:cs typeface="Arial" panose="020B0604020202020204" pitchFamily="34" charset="0"/>
+              </a:rPr>
+              <a:t>yaml</a:t>
+            </a:r>
+            <a:r>
+              <a:rPr lang="en-GB" sz="2600" dirty="0">
+                <a:latin typeface="Arial" panose="020B0604020202020204" pitchFamily="34" charset="0"/>
+                <a:cs typeface="Arial" panose="020B0604020202020204" pitchFamily="34" charset="0"/>
+              </a:rPr>
+              <a:t> file</a:t>
+            </a:r>
+          </a:p>
+          <a:p>
+            <a:pPr>
+              <a:lnSpc>
+                <a:spcPct val="107000"/>
+              </a:lnSpc>
+            </a:pPr>
+            <a:r>
+              <a:rPr lang="en-GB" sz="2600" dirty="0">
+                <a:latin typeface="Arial" panose="020B0604020202020204" pitchFamily="34" charset="0"/>
+                <a:cs typeface="Arial" panose="020B0604020202020204" pitchFamily="34" charset="0"/>
+              </a:rPr>
+              <a:t>“Remove” deletes an environment</a:t>
+            </a:r>
+          </a:p>
+        </p:txBody>
+      </p:sp>
+    </p:spTree>
+    <p:extLst>
+      <p:ext uri="{BB962C8B-B14F-4D97-AF65-F5344CB8AC3E}">
+        <p14:creationId xmlns:p14="http://schemas.microsoft.com/office/powerpoint/2010/main" val="34194345"/>
+      </p:ext>
+    </p:extLst>
+  </p:cSld>
+  <p:clrMapOvr>
+    <a:masterClrMapping/>
+  </p:clrMapOvr>
+  <mc:AlternateContent xmlns:mc="http://schemas.openxmlformats.org/markup-compatibility/2006" xmlns:p14="http://schemas.microsoft.com/office/powerpoint/2010/main">
+    <mc:Choice Requires="p14">
+      <p:transition p14:dur="10"/>
+    </mc:Choice>
+    <mc:Fallback xmlns="">
+      <p:transition/>
+    </mc:Fallback>
+  </mc:AlternateContent>
+</p:sld>
+</file>
+
+<file path=ppt/slides/slide9.xml><?xml version="1.0" encoding="utf-8"?>
+<p:sld xmlns:a="http://schemas.openxmlformats.org/drawingml/2006/main" xmlns:r="http://schemas.openxmlformats.org/officeDocument/2006/relationships" xmlns:p="http://schemas.openxmlformats.org/presentationml/2006/main">
+  <p:cSld>
+    <p:spTree>
+      <p:nvGrpSpPr>
+        <p:cNvPr id="1" name=""/>
+        <p:cNvGrpSpPr/>
+        <p:nvPr/>
+      </p:nvGrpSpPr>
+      <p:grpSpPr>
+        <a:xfrm>
+          <a:off x="0" y="0"/>
+          <a:ext cx="0" cy="0"/>
+          <a:chOff x="0" y="0"/>
+          <a:chExt cx="0" cy="0"/>
+        </a:xfrm>
+      </p:grpSpPr>
+      <p:sp>
+        <p:nvSpPr>
+          <p:cNvPr id="2" name="Title 1"/>
+          <p:cNvSpPr>
+            <a:spLocks noGrp="1"/>
+          </p:cNvSpPr>
+          <p:nvPr>
+            <p:ph type="title"/>
+          </p:nvPr>
+        </p:nvSpPr>
+        <p:spPr/>
+        <p:txBody>
+          <a:bodyPr/>
+          <a:lstStyle/>
+          <a:p>
+            <a:r>
+              <a:rPr lang="en-GB" sz="4000" dirty="0"/>
               <a:t>Environments in Venv</a:t>
             </a:r>
           </a:p>
@@ -14842,7 +14879,7 @@
         </p:spPr>
         <p:txBody>
           <a:bodyPr>
-            <a:normAutofit fontScale="77500" lnSpcReduction="20000"/>
+            <a:normAutofit fontScale="85000" lnSpcReduction="20000"/>
           </a:bodyPr>
           <a:lstStyle/>
           <a:p>
@@ -14896,7 +14933,21 @@
                 <a:latin typeface="Courier New" panose="02070309020205020404" pitchFamily="49" charset="0"/>
                 <a:cs typeface="Courier New" panose="02070309020205020404" pitchFamily="49" charset="0"/>
               </a:rPr>
-              <a:t>python3 -m venv .\Exercises\</a:t>
+              <a:t>python3 -m </a:t>
+            </a:r>
+            <a:r>
+              <a:rPr lang="en-GB" sz="2600" dirty="0" err="1">
+                <a:latin typeface="Courier New" panose="02070309020205020404" pitchFamily="49" charset="0"/>
+                <a:cs typeface="Courier New" panose="02070309020205020404" pitchFamily="49" charset="0"/>
+              </a:rPr>
+              <a:t>venv</a:t>
+            </a:r>
+            <a:r>
+              <a:rPr lang="en-GB" sz="2600" dirty="0">
+                <a:latin typeface="Courier New" panose="02070309020205020404" pitchFamily="49" charset="0"/>
+                <a:cs typeface="Courier New" panose="02070309020205020404" pitchFamily="49" charset="0"/>
+              </a:rPr>
+              <a:t> .</a:t>
             </a:r>
             <a:r>
               <a:rPr lang="en-GB" sz="2600" dirty="0" err="1">
@@ -15036,20 +15087,6 @@
                 <a:latin typeface="Courier New" panose="02070309020205020404" pitchFamily="49" charset="0"/>
                 <a:cs typeface="Courier New" panose="02070309020205020404" pitchFamily="49" charset="0"/>
               </a:rPr>
-              <a:t>Exercises</a:t>
-            </a:r>
-            <a:r>
-              <a:rPr lang="fr-FR" dirty="0">
-                <a:latin typeface="Courier New" panose="02070309020205020404" pitchFamily="49" charset="0"/>
-                <a:cs typeface="Courier New" panose="02070309020205020404" pitchFamily="49" charset="0"/>
-              </a:rPr>
-              <a:t>\</a:t>
-            </a:r>
-            <a:r>
-              <a:rPr lang="fr-FR" dirty="0" err="1">
-                <a:latin typeface="Courier New" panose="02070309020205020404" pitchFamily="49" charset="0"/>
-                <a:cs typeface="Courier New" panose="02070309020205020404" pitchFamily="49" charset="0"/>
-              </a:rPr>
               <a:t>Example_environment</a:t>
             </a:r>
             <a:r>
@@ -15142,21 +15179,21 @@
                 <a:latin typeface="Courier New" panose="02070309020205020404" pitchFamily="49" charset="0"/>
                 <a:cs typeface="Courier New" panose="02070309020205020404" pitchFamily="49" charset="0"/>
               </a:rPr>
-              <a:t>source ./</a:t>
+              <a:t>source . /</a:t>
             </a:r>
             <a:r>
               <a:rPr lang="fr-FR" dirty="0" err="1">
                 <a:latin typeface="Courier New" panose="02070309020205020404" pitchFamily="49" charset="0"/>
                 <a:cs typeface="Courier New" panose="02070309020205020404" pitchFamily="49" charset="0"/>
               </a:rPr>
-              <a:t>Exercises</a:t>
+              <a:t>Example_environment</a:t>
             </a:r>
             <a:r>
               <a:rPr lang="fr-FR" dirty="0">
                 <a:latin typeface="Courier New" panose="02070309020205020404" pitchFamily="49" charset="0"/>
                 <a:cs typeface="Courier New" panose="02070309020205020404" pitchFamily="49" charset="0"/>
               </a:rPr>
-              <a:t>/Example_environment/bin/</a:t>
+              <a:t>/ bin/</a:t>
             </a:r>
             <a:r>
               <a:rPr lang="fr-FR" dirty="0" err="1">
@@ -15341,279 +15378,6 @@
     <p:extLst>
       <p:ext uri="{BB962C8B-B14F-4D97-AF65-F5344CB8AC3E}">
         <p14:creationId xmlns:p14="http://schemas.microsoft.com/office/powerpoint/2010/main" val="3722377785"/>
-      </p:ext>
-    </p:extLst>
-  </p:cSld>
-  <p:clrMapOvr>
-    <a:masterClrMapping/>
-  </p:clrMapOvr>
-  <mc:AlternateContent xmlns:mc="http://schemas.openxmlformats.org/markup-compatibility/2006" xmlns:p14="http://schemas.microsoft.com/office/powerpoint/2010/main">
-    <mc:Choice Requires="p14">
-      <p:transition p14:dur="10"/>
-    </mc:Choice>
-    <mc:Fallback xmlns="">
-      <p:transition/>
-    </mc:Fallback>
-  </mc:AlternateContent>
-</p:sld>
-</file>
-
-<file path=ppt/slides/slide9.xml><?xml version="1.0" encoding="utf-8"?>
-<p:sld xmlns:a="http://schemas.openxmlformats.org/drawingml/2006/main" xmlns:r="http://schemas.openxmlformats.org/officeDocument/2006/relationships" xmlns:p="http://schemas.openxmlformats.org/presentationml/2006/main">
-  <p:cSld>
-    <p:spTree>
-      <p:nvGrpSpPr>
-        <p:cNvPr id="1" name=""/>
-        <p:cNvGrpSpPr/>
-        <p:nvPr/>
-      </p:nvGrpSpPr>
-      <p:grpSpPr>
-        <a:xfrm>
-          <a:off x="0" y="0"/>
-          <a:ext cx="0" cy="0"/>
-          <a:chOff x="0" y="0"/>
-          <a:chExt cx="0" cy="0"/>
-        </a:xfrm>
-      </p:grpSpPr>
-      <p:sp>
-        <p:nvSpPr>
-          <p:cNvPr id="2" name="Title 1"/>
-          <p:cNvSpPr>
-            <a:spLocks noGrp="1"/>
-          </p:cNvSpPr>
-          <p:nvPr>
-            <p:ph type="title"/>
-          </p:nvPr>
-        </p:nvSpPr>
-        <p:spPr/>
-        <p:txBody>
-          <a:bodyPr/>
-          <a:lstStyle/>
-          <a:p>
-            <a:r>
-              <a:rPr lang="en-GB" sz="4000" dirty="0"/>
-              <a:t>Exercise</a:t>
-            </a:r>
-          </a:p>
-        </p:txBody>
-      </p:sp>
-      <p:sp>
-        <p:nvSpPr>
-          <p:cNvPr id="3" name="Content Placeholder 2"/>
-          <p:cNvSpPr>
-            <a:spLocks noGrp="1"/>
-          </p:cNvSpPr>
-          <p:nvPr>
-            <p:ph idx="1"/>
-          </p:nvPr>
-        </p:nvSpPr>
-        <p:spPr>
-          <a:xfrm>
-            <a:off x="457200" y="1600200"/>
-            <a:ext cx="8435280" cy="4800600"/>
-          </a:xfrm>
-        </p:spPr>
-        <p:txBody>
-          <a:bodyPr>
-            <a:normAutofit/>
-          </a:bodyPr>
-          <a:lstStyle/>
-          <a:p>
-            <a:pPr>
-              <a:lnSpc>
-                <a:spcPct val="107000"/>
-              </a:lnSpc>
-            </a:pPr>
-            <a:r>
-              <a:rPr lang="en-GB" sz="2600" dirty="0">
-                <a:latin typeface="Arial" panose="020B0604020202020204" pitchFamily="34" charset="0"/>
-                <a:cs typeface="Arial" panose="020B0604020202020204" pitchFamily="34" charset="0"/>
-              </a:rPr>
-              <a:t>Anaconda</a:t>
-            </a:r>
-          </a:p>
-          <a:p>
-            <a:pPr lvl="1">
-              <a:lnSpc>
-                <a:spcPct val="107000"/>
-              </a:lnSpc>
-            </a:pPr>
-            <a:r>
-              <a:rPr lang="en-GB" sz="1800" dirty="0">
-                <a:latin typeface="Arial" panose="020B0604020202020204" pitchFamily="34" charset="0"/>
-                <a:cs typeface="Arial" panose="020B0604020202020204" pitchFamily="34" charset="0"/>
-              </a:rPr>
-              <a:t>Create a new environment with a different Python version</a:t>
-            </a:r>
-          </a:p>
-          <a:p>
-            <a:pPr lvl="1">
-              <a:lnSpc>
-                <a:spcPct val="107000"/>
-              </a:lnSpc>
-            </a:pPr>
-            <a:r>
-              <a:rPr lang="en-GB" sz="1800" dirty="0">
-                <a:latin typeface="Arial" panose="020B0604020202020204" pitchFamily="34" charset="0"/>
-                <a:cs typeface="Arial" panose="020B0604020202020204" pitchFamily="34" charset="0"/>
-              </a:rPr>
-              <a:t>Activate it</a:t>
-            </a:r>
-          </a:p>
-          <a:p>
-            <a:pPr lvl="1">
-              <a:lnSpc>
-                <a:spcPct val="107000"/>
-              </a:lnSpc>
-            </a:pPr>
-            <a:r>
-              <a:rPr lang="en-GB" sz="1800" dirty="0">
-                <a:latin typeface="Arial" panose="020B0604020202020204" pitchFamily="34" charset="0"/>
-                <a:cs typeface="Arial" panose="020B0604020202020204" pitchFamily="34" charset="0"/>
-              </a:rPr>
-              <a:t>Open a </a:t>
-            </a:r>
-            <a:r>
-              <a:rPr lang="en-GB" sz="1800" u="sng" dirty="0">
-                <a:latin typeface="Arial" panose="020B0604020202020204" pitchFamily="34" charset="0"/>
-                <a:cs typeface="Arial" panose="020B0604020202020204" pitchFamily="34" charset="0"/>
-              </a:rPr>
-              <a:t>new</a:t>
-            </a:r>
-            <a:r>
-              <a:rPr lang="en-GB" sz="1800" dirty="0">
-                <a:latin typeface="Arial" panose="020B0604020202020204" pitchFamily="34" charset="0"/>
-                <a:cs typeface="Arial" panose="020B0604020202020204" pitchFamily="34" charset="0"/>
-              </a:rPr>
-              <a:t> terminal in Anaconda</a:t>
-            </a:r>
-          </a:p>
-          <a:p>
-            <a:pPr lvl="1">
-              <a:lnSpc>
-                <a:spcPct val="107000"/>
-              </a:lnSpc>
-            </a:pPr>
-            <a:r>
-              <a:rPr lang="en-GB" sz="1800" dirty="0">
-                <a:latin typeface="Arial" panose="020B0604020202020204" pitchFamily="34" charset="0"/>
-                <a:cs typeface="Arial" panose="020B0604020202020204" pitchFamily="34" charset="0"/>
-              </a:rPr>
-              <a:t>Check the Python version has changed</a:t>
-            </a:r>
-          </a:p>
-          <a:p>
-            <a:pPr>
-              <a:lnSpc>
-                <a:spcPct val="107000"/>
-              </a:lnSpc>
-            </a:pPr>
-            <a:r>
-              <a:rPr lang="en-GB" sz="2200" dirty="0">
-                <a:latin typeface="Arial" panose="020B0604020202020204" pitchFamily="34" charset="0"/>
-                <a:cs typeface="Arial" panose="020B0604020202020204" pitchFamily="34" charset="0"/>
-              </a:rPr>
-              <a:t>Stand-alone Python</a:t>
-            </a:r>
-          </a:p>
-          <a:p>
-            <a:pPr lvl="1">
-              <a:lnSpc>
-                <a:spcPct val="107000"/>
-              </a:lnSpc>
-            </a:pPr>
-            <a:r>
-              <a:rPr lang="en-GB" sz="1800" dirty="0">
-                <a:latin typeface="Arial" panose="020B0604020202020204" pitchFamily="34" charset="0"/>
-                <a:cs typeface="Arial" panose="020B0604020202020204" pitchFamily="34" charset="0"/>
-              </a:rPr>
-              <a:t>Create a new environment in </a:t>
-            </a:r>
-            <a:r>
-              <a:rPr lang="en-GB" sz="1800" dirty="0">
-                <a:latin typeface="Courier New" panose="02070309020205020404" pitchFamily="49" charset="0"/>
-                <a:cs typeface="Courier New" panose="02070309020205020404" pitchFamily="49" charset="0"/>
-              </a:rPr>
-              <a:t>Exercises/</a:t>
-            </a:r>
-            <a:r>
-              <a:rPr lang="en-GB" sz="1800" dirty="0" err="1">
-                <a:latin typeface="Courier New" panose="02070309020205020404" pitchFamily="49" charset="0"/>
-                <a:cs typeface="Courier New" panose="02070309020205020404" pitchFamily="49" charset="0"/>
-              </a:rPr>
-              <a:t>Example_environment</a:t>
-            </a:r>
-            <a:r>
-              <a:rPr lang="en-GB" sz="1800" dirty="0">
-                <a:latin typeface="Courier New" panose="02070309020205020404" pitchFamily="49" charset="0"/>
-                <a:cs typeface="Courier New" panose="02070309020205020404" pitchFamily="49" charset="0"/>
-              </a:rPr>
-              <a:t> </a:t>
-            </a:r>
-            <a:r>
-              <a:rPr lang="en-GB" sz="1800" dirty="0">
-                <a:latin typeface="Arial" panose="020B0604020202020204" pitchFamily="34" charset="0"/>
-                <a:cs typeface="Arial" panose="020B0604020202020204" pitchFamily="34" charset="0"/>
-              </a:rPr>
-              <a:t>of the course materials</a:t>
-            </a:r>
-          </a:p>
-          <a:p>
-            <a:pPr lvl="1">
-              <a:lnSpc>
-                <a:spcPct val="107000"/>
-              </a:lnSpc>
-            </a:pPr>
-            <a:r>
-              <a:rPr lang="en-GB" sz="1800" dirty="0">
-                <a:latin typeface="Arial" panose="020B0604020202020204" pitchFamily="34" charset="0"/>
-                <a:cs typeface="Arial" panose="020B0604020202020204" pitchFamily="34" charset="0"/>
-              </a:rPr>
-              <a:t>Activate the new environment</a:t>
-            </a:r>
-          </a:p>
-          <a:p>
-            <a:pPr lvl="1">
-              <a:lnSpc>
-                <a:spcPct val="107000"/>
-              </a:lnSpc>
-            </a:pPr>
-            <a:r>
-              <a:rPr lang="en-GB" sz="1800" dirty="0">
-                <a:latin typeface="Arial" panose="020B0604020202020204" pitchFamily="34" charset="0"/>
-                <a:cs typeface="Arial" panose="020B0604020202020204" pitchFamily="34" charset="0"/>
-              </a:rPr>
-              <a:t>Deactivate it</a:t>
-            </a:r>
-          </a:p>
-          <a:p>
-            <a:pPr>
-              <a:lnSpc>
-                <a:spcPct val="107000"/>
-              </a:lnSpc>
-            </a:pPr>
-            <a:endParaRPr lang="en-GB" sz="2200" dirty="0">
-              <a:latin typeface="Arial" panose="020B0604020202020204" pitchFamily="34" charset="0"/>
-              <a:cs typeface="Arial" panose="020B0604020202020204" pitchFamily="34" charset="0"/>
-            </a:endParaRPr>
-          </a:p>
-          <a:p>
-            <a:pPr>
-              <a:lnSpc>
-                <a:spcPct val="107000"/>
-              </a:lnSpc>
-            </a:pPr>
-            <a:endParaRPr lang="en-GB" sz="2600" dirty="0">
-              <a:latin typeface="Arial" panose="020B0604020202020204" pitchFamily="34" charset="0"/>
-              <a:cs typeface="Arial" panose="020B0604020202020204" pitchFamily="34" charset="0"/>
-            </a:endParaRPr>
-          </a:p>
-        </p:txBody>
-      </p:sp>
-    </p:spTree>
-    <p:extLst>
-      <p:ext uri="{BB962C8B-B14F-4D97-AF65-F5344CB8AC3E}">
-        <p14:creationId xmlns:p14="http://schemas.microsoft.com/office/powerpoint/2010/main" val="1846204080"/>
       </p:ext>
     </p:extLst>
   </p:cSld>

</xml_diff>

<commit_message>
Re-added HPC and Docker slides
</commit_message>
<xml_diff>
--- a/Managing and Running Python Effectively.pptx
+++ b/Managing and Running Python Effectively.pptx
@@ -5,10 +5,10 @@
     <p:sldMasterId id="2147483648" r:id="rId1"/>
   </p:sldMasterIdLst>
   <p:notesMasterIdLst>
-    <p:notesMasterId r:id="rId35"/>
+    <p:notesMasterId r:id="rId37"/>
   </p:notesMasterIdLst>
   <p:handoutMasterIdLst>
-    <p:handoutMasterId r:id="rId36"/>
+    <p:handoutMasterId r:id="rId38"/>
   </p:handoutMasterIdLst>
   <p:sldIdLst>
     <p:sldId id="264" r:id="rId2"/>
@@ -42,8 +42,10 @@
     <p:sldId id="529" r:id="rId30"/>
     <p:sldId id="536" r:id="rId31"/>
     <p:sldId id="537" r:id="rId32"/>
-    <p:sldId id="335" r:id="rId33"/>
-    <p:sldId id="280" r:id="rId34"/>
+    <p:sldId id="532" r:id="rId33"/>
+    <p:sldId id="533" r:id="rId34"/>
+    <p:sldId id="335" r:id="rId35"/>
+    <p:sldId id="280" r:id="rId36"/>
   </p:sldIdLst>
   <p:sldSz cx="9144000" cy="6858000" type="screen4x3"/>
   <p:notesSz cx="7099300" cy="10234613"/>
@@ -178,6 +180,8 @@
             <p14:sldId id="529"/>
             <p14:sldId id="536"/>
             <p14:sldId id="537"/>
+            <p14:sldId id="532"/>
+            <p14:sldId id="533"/>
             <p14:sldId id="335"/>
             <p14:sldId id="280"/>
           </p14:sldIdLst>
@@ -203,6 +207,14 @@
     </p:ext>
   </p:extLst>
 </p:presentation>
+</file>
+
+<file path=ppt/revisionInfo.xml><?xml version="1.0" encoding="utf-8"?>
+<p1510:revInfo xmlns:a="http://schemas.openxmlformats.org/drawingml/2006/main" xmlns:r="http://schemas.openxmlformats.org/officeDocument/2006/relationships" xmlns:p1510="http://schemas.microsoft.com/office/powerpoint/2015/10/main">
+  <p1510:revLst>
+    <p1510:client id="{4E5177FB-C35E-43A8-B7E3-CC852D1C6D36}" v="1" dt="2022-12-02T11:39:48.471"/>
+  </p1510:revLst>
+</p1510:revInfo>
 </file>
 
 <file path=ppt/changesInfos/changesInfo1.xml><?xml version="1.0" encoding="utf-8"?>
@@ -360,6 +372,29 @@
       </pc:sldChg>
     </pc:docChg>
   </pc:docChgLst>
+  <pc:docChgLst>
+    <pc:chgData name="Cooling, Chris" userId="6dcf99c9-2ba5-410a-8445-0893a3d1421f" providerId="ADAL" clId="{4E5177FB-C35E-43A8-B7E3-CC852D1C6D36}"/>
+    <pc:docChg chg="addSld modSld">
+      <pc:chgData name="Cooling, Chris" userId="6dcf99c9-2ba5-410a-8445-0893a3d1421f" providerId="ADAL" clId="{4E5177FB-C35E-43A8-B7E3-CC852D1C6D36}" dt="2022-12-02T11:39:48.460" v="0"/>
+      <pc:docMkLst>
+        <pc:docMk/>
+      </pc:docMkLst>
+      <pc:sldChg chg="add">
+        <pc:chgData name="Cooling, Chris" userId="6dcf99c9-2ba5-410a-8445-0893a3d1421f" providerId="ADAL" clId="{4E5177FB-C35E-43A8-B7E3-CC852D1C6D36}" dt="2022-12-02T11:39:48.460" v="0"/>
+        <pc:sldMkLst>
+          <pc:docMk/>
+          <pc:sldMk cId="2357441072" sldId="532"/>
+        </pc:sldMkLst>
+      </pc:sldChg>
+      <pc:sldChg chg="add">
+        <pc:chgData name="Cooling, Chris" userId="6dcf99c9-2ba5-410a-8445-0893a3d1421f" providerId="ADAL" clId="{4E5177FB-C35E-43A8-B7E3-CC852D1C6D36}" dt="2022-12-02T11:39:48.460" v="0"/>
+        <pc:sldMkLst>
+          <pc:docMk/>
+          <pc:sldMk cId="3576927260" sldId="533"/>
+        </pc:sldMkLst>
+      </pc:sldChg>
+    </pc:docChg>
+  </pc:docChgLst>
 </pc:chgInfo>
 </file>
 
@@ -612,7 +647,7 @@
           <a:p>
             <a:fld id="{88EB714B-C3CC-4216-88C1-02913905B1CF}" type="datetimeFigureOut">
               <a:rPr lang="en-GB" smtClean="0"/>
-              <a:t>17/11/2022</a:t>
+              <a:t>02/12/2022</a:t>
             </a:fld>
             <a:endParaRPr lang="en-GB"/>
           </a:p>
@@ -4620,7 +4655,27 @@
           <a:bodyPr/>
           <a:lstStyle/>
           <a:p>
-            <a:endParaRPr lang="en-GB" dirty="0"/>
+            <a:pPr marL="0" marR="0" lvl="0" indent="0" algn="l" defTabSz="914400" rtl="0" eaLnBrk="1" fontAlgn="auto" latinLnBrk="0" hangingPunct="1">
+              <a:lnSpc>
+                <a:spcPct val="100000"/>
+              </a:lnSpc>
+              <a:spcBef>
+                <a:spcPts val="0"/>
+              </a:spcBef>
+              <a:spcAft>
+                <a:spcPts val="0"/>
+              </a:spcAft>
+              <a:buClrTx/>
+              <a:buSzTx/>
+              <a:buFontTx/>
+              <a:buNone/>
+              <a:tabLst/>
+              <a:defRPr/>
+            </a:pPr>
+            <a:r>
+              <a:rPr lang="en-GB" dirty="0"/>
+              <a:t>No additional notes.</a:t>
+            </a:r>
           </a:p>
         </p:txBody>
       </p:sp>
@@ -4642,6 +4697,194 @@
             <a:fld id="{6A641EC8-C9F8-4A58-A1A7-F7D817526EEC}" type="slidenum">
               <a:rPr lang="en-GB" smtClean="0"/>
               <a:t>32</a:t>
+            </a:fld>
+            <a:endParaRPr lang="en-GB"/>
+          </a:p>
+        </p:txBody>
+      </p:sp>
+    </p:spTree>
+    <p:extLst>
+      <p:ext uri="{BB962C8B-B14F-4D97-AF65-F5344CB8AC3E}">
+        <p14:creationId xmlns:p14="http://schemas.microsoft.com/office/powerpoint/2010/main" val="1977625569"/>
+      </p:ext>
+    </p:extLst>
+  </p:cSld>
+  <p:clrMapOvr>
+    <a:masterClrMapping/>
+  </p:clrMapOvr>
+</p:notes>
+</file>
+
+<file path=ppt/notesSlides/notesSlide33.xml><?xml version="1.0" encoding="utf-8"?>
+<p:notes xmlns:a="http://schemas.openxmlformats.org/drawingml/2006/main" xmlns:r="http://schemas.openxmlformats.org/officeDocument/2006/relationships" xmlns:p="http://schemas.openxmlformats.org/presentationml/2006/main">
+  <p:cSld>
+    <p:spTree>
+      <p:nvGrpSpPr>
+        <p:cNvPr id="1" name=""/>
+        <p:cNvGrpSpPr/>
+        <p:nvPr/>
+      </p:nvGrpSpPr>
+      <p:grpSpPr>
+        <a:xfrm>
+          <a:off x="0" y="0"/>
+          <a:ext cx="0" cy="0"/>
+          <a:chOff x="0" y="0"/>
+          <a:chExt cx="0" cy="0"/>
+        </a:xfrm>
+      </p:grpSpPr>
+      <p:sp>
+        <p:nvSpPr>
+          <p:cNvPr id="2" name="Slide Image Placeholder 1"/>
+          <p:cNvSpPr>
+            <a:spLocks noGrp="1" noRot="1" noChangeAspect="1"/>
+          </p:cNvSpPr>
+          <p:nvPr>
+            <p:ph type="sldImg"/>
+          </p:nvPr>
+        </p:nvSpPr>
+        <p:spPr/>
+      </p:sp>
+      <p:sp>
+        <p:nvSpPr>
+          <p:cNvPr id="3" name="Notes Placeholder 2"/>
+          <p:cNvSpPr>
+            <a:spLocks noGrp="1"/>
+          </p:cNvSpPr>
+          <p:nvPr>
+            <p:ph type="body" idx="1"/>
+          </p:nvPr>
+        </p:nvSpPr>
+        <p:spPr/>
+        <p:txBody>
+          <a:bodyPr/>
+          <a:lstStyle/>
+          <a:p>
+            <a:pPr marL="0" marR="0" lvl="0" indent="0" algn="l" defTabSz="914400" rtl="0" eaLnBrk="1" fontAlgn="auto" latinLnBrk="0" hangingPunct="1">
+              <a:lnSpc>
+                <a:spcPct val="100000"/>
+              </a:lnSpc>
+              <a:spcBef>
+                <a:spcPts val="0"/>
+              </a:spcBef>
+              <a:spcAft>
+                <a:spcPts val="0"/>
+              </a:spcAft>
+              <a:buClrTx/>
+              <a:buSzTx/>
+              <a:buFontTx/>
+              <a:buNone/>
+              <a:tabLst/>
+              <a:defRPr/>
+            </a:pPr>
+            <a:r>
+              <a:rPr lang="en-GB" dirty="0"/>
+              <a:t>No additional notes.</a:t>
+            </a:r>
+          </a:p>
+        </p:txBody>
+      </p:sp>
+      <p:sp>
+        <p:nvSpPr>
+          <p:cNvPr id="4" name="Slide Number Placeholder 3"/>
+          <p:cNvSpPr>
+            <a:spLocks noGrp="1"/>
+          </p:cNvSpPr>
+          <p:nvPr>
+            <p:ph type="sldNum" sz="quarter" idx="10"/>
+          </p:nvPr>
+        </p:nvSpPr>
+        <p:spPr/>
+        <p:txBody>
+          <a:bodyPr/>
+          <a:lstStyle/>
+          <a:p>
+            <a:fld id="{6A641EC8-C9F8-4A58-A1A7-F7D817526EEC}" type="slidenum">
+              <a:rPr lang="en-GB" smtClean="0"/>
+              <a:t>33</a:t>
+            </a:fld>
+            <a:endParaRPr lang="en-GB"/>
+          </a:p>
+        </p:txBody>
+      </p:sp>
+    </p:spTree>
+    <p:extLst>
+      <p:ext uri="{BB962C8B-B14F-4D97-AF65-F5344CB8AC3E}">
+        <p14:creationId xmlns:p14="http://schemas.microsoft.com/office/powerpoint/2010/main" val="1108802818"/>
+      </p:ext>
+    </p:extLst>
+  </p:cSld>
+  <p:clrMapOvr>
+    <a:masterClrMapping/>
+  </p:clrMapOvr>
+</p:notes>
+</file>
+
+<file path=ppt/notesSlides/notesSlide34.xml><?xml version="1.0" encoding="utf-8"?>
+<p:notes xmlns:a="http://schemas.openxmlformats.org/drawingml/2006/main" xmlns:r="http://schemas.openxmlformats.org/officeDocument/2006/relationships" xmlns:p="http://schemas.openxmlformats.org/presentationml/2006/main">
+  <p:cSld>
+    <p:spTree>
+      <p:nvGrpSpPr>
+        <p:cNvPr id="1" name=""/>
+        <p:cNvGrpSpPr/>
+        <p:nvPr/>
+      </p:nvGrpSpPr>
+      <p:grpSpPr>
+        <a:xfrm>
+          <a:off x="0" y="0"/>
+          <a:ext cx="0" cy="0"/>
+          <a:chOff x="0" y="0"/>
+          <a:chExt cx="0" cy="0"/>
+        </a:xfrm>
+      </p:grpSpPr>
+      <p:sp>
+        <p:nvSpPr>
+          <p:cNvPr id="2" name="Slide Image Placeholder 1"/>
+          <p:cNvSpPr>
+            <a:spLocks noGrp="1" noRot="1" noChangeAspect="1"/>
+          </p:cNvSpPr>
+          <p:nvPr>
+            <p:ph type="sldImg"/>
+          </p:nvPr>
+        </p:nvSpPr>
+        <p:spPr/>
+      </p:sp>
+      <p:sp>
+        <p:nvSpPr>
+          <p:cNvPr id="3" name="Notes Placeholder 2"/>
+          <p:cNvSpPr>
+            <a:spLocks noGrp="1"/>
+          </p:cNvSpPr>
+          <p:nvPr>
+            <p:ph type="body" idx="1"/>
+          </p:nvPr>
+        </p:nvSpPr>
+        <p:spPr/>
+        <p:txBody>
+          <a:bodyPr/>
+          <a:lstStyle/>
+          <a:p>
+            <a:endParaRPr lang="en-GB" dirty="0"/>
+          </a:p>
+        </p:txBody>
+      </p:sp>
+      <p:sp>
+        <p:nvSpPr>
+          <p:cNvPr id="4" name="Slide Number Placeholder 3"/>
+          <p:cNvSpPr>
+            <a:spLocks noGrp="1"/>
+          </p:cNvSpPr>
+          <p:nvPr>
+            <p:ph type="sldNum" sz="quarter" idx="10"/>
+          </p:nvPr>
+        </p:nvSpPr>
+        <p:spPr/>
+        <p:txBody>
+          <a:bodyPr/>
+          <a:lstStyle/>
+          <a:p>
+            <a:fld id="{6A641EC8-C9F8-4A58-A1A7-F7D817526EEC}" type="slidenum">
+              <a:rPr lang="en-GB" smtClean="0"/>
+              <a:t>34</a:t>
             </a:fld>
             <a:endParaRPr lang="en-GB"/>
           </a:p>
@@ -4660,7 +4903,7 @@
 </p:notes>
 </file>
 
-<file path=ppt/notesSlides/notesSlide33.xml><?xml version="1.0" encoding="utf-8"?>
+<file path=ppt/notesSlides/notesSlide35.xml><?xml version="1.0" encoding="utf-8"?>
 <p:notes xmlns:a="http://schemas.openxmlformats.org/drawingml/2006/main" xmlns:r="http://schemas.openxmlformats.org/officeDocument/2006/relationships" xmlns:p="http://schemas.openxmlformats.org/presentationml/2006/main">
   <p:cSld>
     <p:spTree>
@@ -4837,7 +5080,7 @@
                   <a:spcPct val="0"/>
                 </a:spcBef>
               </a:pPr>
-              <a:t>33</a:t>
+              <a:t>35</a:t>
             </a:fld>
             <a:endParaRPr lang="en-US" altLang="en-US"/>
           </a:p>
@@ -6079,7 +6322,7 @@
           <a:p>
             <a:fld id="{EB0080F8-EA1C-491D-963C-2C881B2F918F}" type="datetimeFigureOut">
               <a:rPr lang="en-GB" smtClean="0"/>
-              <a:t>17/11/2022</a:t>
+              <a:t>02/12/2022</a:t>
             </a:fld>
             <a:endParaRPr lang="en-GB"/>
           </a:p>
@@ -6229,7 +6472,7 @@
           <a:p>
             <a:fld id="{EB0080F8-EA1C-491D-963C-2C881B2F918F}" type="datetimeFigureOut">
               <a:rPr lang="en-GB" smtClean="0"/>
-              <a:t>17/11/2022</a:t>
+              <a:t>02/12/2022</a:t>
             </a:fld>
             <a:endParaRPr lang="en-GB"/>
           </a:p>
@@ -7762,7 +8005,7 @@
           <a:p>
             <a:fld id="{EB0080F8-EA1C-491D-963C-2C881B2F918F}" type="datetimeFigureOut">
               <a:rPr lang="en-GB" smtClean="0"/>
-              <a:t>17/11/2022</a:t>
+              <a:t>02/12/2022</a:t>
             </a:fld>
             <a:endParaRPr lang="en-GB"/>
           </a:p>
@@ -13686,6 +13929,434 @@
           <a:chExt cx="0" cy="0"/>
         </a:xfrm>
       </p:grpSpPr>
+      <p:sp>
+        <p:nvSpPr>
+          <p:cNvPr id="2" name="Title 1"/>
+          <p:cNvSpPr>
+            <a:spLocks noGrp="1"/>
+          </p:cNvSpPr>
+          <p:nvPr>
+            <p:ph type="title"/>
+          </p:nvPr>
+        </p:nvSpPr>
+        <p:spPr/>
+        <p:txBody>
+          <a:bodyPr/>
+          <a:lstStyle/>
+          <a:p>
+            <a:r>
+              <a:rPr lang="en-GB" sz="4000" dirty="0"/>
+              <a:t>Taking it Further - HPC</a:t>
+            </a:r>
+          </a:p>
+        </p:txBody>
+      </p:sp>
+      <p:sp>
+        <p:nvSpPr>
+          <p:cNvPr id="3" name="Content Placeholder 2"/>
+          <p:cNvSpPr>
+            <a:spLocks noGrp="1"/>
+          </p:cNvSpPr>
+          <p:nvPr>
+            <p:ph idx="1"/>
+          </p:nvPr>
+        </p:nvSpPr>
+        <p:spPr>
+          <a:xfrm>
+            <a:off x="457200" y="1600200"/>
+            <a:ext cx="8435280" cy="4800600"/>
+          </a:xfrm>
+        </p:spPr>
+        <p:txBody>
+          <a:bodyPr>
+            <a:normAutofit fontScale="92500"/>
+          </a:bodyPr>
+          <a:lstStyle/>
+          <a:p>
+            <a:pPr>
+              <a:lnSpc>
+                <a:spcPct val="107000"/>
+              </a:lnSpc>
+            </a:pPr>
+            <a:r>
+              <a:rPr lang="en-GB" sz="2600" dirty="0">
+                <a:latin typeface="+mj-lt"/>
+                <a:cs typeface="Courier New" panose="02070309020205020404" pitchFamily="49" charset="0"/>
+              </a:rPr>
+              <a:t>High Performance Computing (HPC) clusters allow you to access powerful computers to run large jobs quickly</a:t>
+            </a:r>
+          </a:p>
+          <a:p>
+            <a:pPr>
+              <a:lnSpc>
+                <a:spcPct val="107000"/>
+              </a:lnSpc>
+            </a:pPr>
+            <a:r>
+              <a:rPr lang="en-GB" sz="2600" dirty="0">
+                <a:latin typeface="+mj-lt"/>
+                <a:cs typeface="Courier New" panose="02070309020205020404" pitchFamily="49" charset="0"/>
+              </a:rPr>
+              <a:t>You will need to transfer your code to the HPC cluster</a:t>
+            </a:r>
+          </a:p>
+          <a:p>
+            <a:pPr>
+              <a:lnSpc>
+                <a:spcPct val="107000"/>
+              </a:lnSpc>
+            </a:pPr>
+            <a:r>
+              <a:rPr lang="en-GB" sz="2600" dirty="0">
+                <a:latin typeface="+mj-lt"/>
+                <a:cs typeface="Courier New" panose="02070309020205020404" pitchFamily="49" charset="0"/>
+              </a:rPr>
+              <a:t>Code will be run remotely using terminal commands</a:t>
+            </a:r>
+          </a:p>
+          <a:p>
+            <a:pPr>
+              <a:lnSpc>
+                <a:spcPct val="107000"/>
+              </a:lnSpc>
+            </a:pPr>
+            <a:r>
+              <a:rPr lang="en-GB" sz="2600" dirty="0">
+                <a:latin typeface="+mj-lt"/>
+                <a:cs typeface="Courier New" panose="02070309020205020404" pitchFamily="49" charset="0"/>
+              </a:rPr>
+              <a:t>You will typically need to create an environment for your code</a:t>
+            </a:r>
+          </a:p>
+          <a:p>
+            <a:pPr>
+              <a:lnSpc>
+                <a:spcPct val="107000"/>
+              </a:lnSpc>
+            </a:pPr>
+            <a:r>
+              <a:rPr lang="en-GB" sz="2600" dirty="0">
+                <a:latin typeface="+mj-lt"/>
+                <a:cs typeface="Courier New" panose="02070309020205020404" pitchFamily="49" charset="0"/>
+              </a:rPr>
+              <a:t>Python-specific instructions for Imperial’s HPC cluster can be found </a:t>
+            </a:r>
+            <a:r>
+              <a:rPr lang="en-GB" sz="2600" dirty="0">
+                <a:latin typeface="+mj-lt"/>
+                <a:cs typeface="Courier New" panose="02070309020205020404" pitchFamily="49" charset="0"/>
+                <a:hlinkClick r:id="rId3"/>
+              </a:rPr>
+              <a:t>here</a:t>
+            </a:r>
+            <a:endParaRPr lang="en-GB" sz="2600" dirty="0">
+              <a:latin typeface="+mj-lt"/>
+              <a:cs typeface="Courier New" panose="02070309020205020404" pitchFamily="49" charset="0"/>
+            </a:endParaRPr>
+          </a:p>
+          <a:p>
+            <a:pPr>
+              <a:lnSpc>
+                <a:spcPct val="107000"/>
+              </a:lnSpc>
+            </a:pPr>
+            <a:r>
+              <a:rPr lang="en-GB" sz="2600" dirty="0">
+                <a:latin typeface="+mj-lt"/>
+                <a:cs typeface="Courier New" panose="02070309020205020404" pitchFamily="49" charset="0"/>
+              </a:rPr>
+              <a:t>General information about using HPC at Imperial can be found </a:t>
+            </a:r>
+            <a:r>
+              <a:rPr lang="en-GB" sz="2600" dirty="0">
+                <a:latin typeface="+mj-lt"/>
+                <a:cs typeface="Courier New" panose="02070309020205020404" pitchFamily="49" charset="0"/>
+                <a:hlinkClick r:id="rId4"/>
+              </a:rPr>
+              <a:t>here</a:t>
+            </a:r>
+            <a:r>
+              <a:rPr lang="en-GB" sz="2600" dirty="0">
+                <a:latin typeface="+mj-lt"/>
+                <a:cs typeface="Courier New" panose="02070309020205020404" pitchFamily="49" charset="0"/>
+              </a:rPr>
+              <a:t> or you may register for the Graduate School course </a:t>
+            </a:r>
+            <a:r>
+              <a:rPr lang="en-GB" sz="2600" dirty="0">
+                <a:latin typeface="+mj-lt"/>
+                <a:cs typeface="Courier New" panose="02070309020205020404" pitchFamily="49" charset="0"/>
+                <a:hlinkClick r:id="rId5"/>
+              </a:rPr>
+              <a:t>here</a:t>
+            </a:r>
+            <a:endParaRPr lang="en-GB" sz="2600" dirty="0">
+              <a:latin typeface="+mj-lt"/>
+              <a:cs typeface="Courier New" panose="02070309020205020404" pitchFamily="49" charset="0"/>
+            </a:endParaRPr>
+          </a:p>
+        </p:txBody>
+      </p:sp>
+    </p:spTree>
+    <p:extLst>
+      <p:ext uri="{BB962C8B-B14F-4D97-AF65-F5344CB8AC3E}">
+        <p14:creationId xmlns:p14="http://schemas.microsoft.com/office/powerpoint/2010/main" val="2357441072"/>
+      </p:ext>
+    </p:extLst>
+  </p:cSld>
+  <p:clrMapOvr>
+    <a:masterClrMapping/>
+  </p:clrMapOvr>
+  <mc:AlternateContent xmlns:mc="http://schemas.openxmlformats.org/markup-compatibility/2006" xmlns:p14="http://schemas.microsoft.com/office/powerpoint/2010/main">
+    <mc:Choice Requires="p14">
+      <p:transition p14:dur="10"/>
+    </mc:Choice>
+    <mc:Fallback xmlns="">
+      <p:transition/>
+    </mc:Fallback>
+  </mc:AlternateContent>
+</p:sld>
+</file>
+
+<file path=ppt/slides/slide33.xml><?xml version="1.0" encoding="utf-8"?>
+<p:sld xmlns:a="http://schemas.openxmlformats.org/drawingml/2006/main" xmlns:r="http://schemas.openxmlformats.org/officeDocument/2006/relationships" xmlns:p="http://schemas.openxmlformats.org/presentationml/2006/main">
+  <p:cSld>
+    <p:spTree>
+      <p:nvGrpSpPr>
+        <p:cNvPr id="1" name=""/>
+        <p:cNvGrpSpPr/>
+        <p:nvPr/>
+      </p:nvGrpSpPr>
+      <p:grpSpPr>
+        <a:xfrm>
+          <a:off x="0" y="0"/>
+          <a:ext cx="0" cy="0"/>
+          <a:chOff x="0" y="0"/>
+          <a:chExt cx="0" cy="0"/>
+        </a:xfrm>
+      </p:grpSpPr>
+      <p:sp>
+        <p:nvSpPr>
+          <p:cNvPr id="2" name="Title 1"/>
+          <p:cNvSpPr>
+            <a:spLocks noGrp="1"/>
+          </p:cNvSpPr>
+          <p:nvPr>
+            <p:ph type="title"/>
+          </p:nvPr>
+        </p:nvSpPr>
+        <p:spPr>
+          <a:xfrm>
+            <a:off x="457200" y="274638"/>
+            <a:ext cx="6017172" cy="1143000"/>
+          </a:xfrm>
+        </p:spPr>
+        <p:txBody>
+          <a:bodyPr/>
+          <a:lstStyle/>
+          <a:p>
+            <a:r>
+              <a:rPr lang="en-GB" sz="4000" dirty="0"/>
+              <a:t>Taking it Further - Containers</a:t>
+            </a:r>
+          </a:p>
+        </p:txBody>
+      </p:sp>
+      <p:sp>
+        <p:nvSpPr>
+          <p:cNvPr id="3" name="Content Placeholder 2"/>
+          <p:cNvSpPr>
+            <a:spLocks noGrp="1"/>
+          </p:cNvSpPr>
+          <p:nvPr>
+            <p:ph idx="1"/>
+          </p:nvPr>
+        </p:nvSpPr>
+        <p:spPr>
+          <a:xfrm>
+            <a:off x="457200" y="1600200"/>
+            <a:ext cx="8435280" cy="4800600"/>
+          </a:xfrm>
+        </p:spPr>
+        <p:txBody>
+          <a:bodyPr>
+            <a:normAutofit/>
+          </a:bodyPr>
+          <a:lstStyle/>
+          <a:p>
+            <a:pPr>
+              <a:lnSpc>
+                <a:spcPct val="107000"/>
+              </a:lnSpc>
+            </a:pPr>
+            <a:r>
+              <a:rPr lang="en-GB" sz="2600" dirty="0">
+                <a:latin typeface="+mj-lt"/>
+                <a:cs typeface="Courier New" panose="02070309020205020404" pitchFamily="49" charset="0"/>
+              </a:rPr>
+              <a:t>Containers (such as </a:t>
+            </a:r>
+            <a:r>
+              <a:rPr lang="en-GB" sz="2600" dirty="0">
+                <a:latin typeface="+mj-lt"/>
+                <a:cs typeface="Courier New" panose="02070309020205020404" pitchFamily="49" charset="0"/>
+                <a:hlinkClick r:id="rId3"/>
+              </a:rPr>
+              <a:t>Docker</a:t>
+            </a:r>
+            <a:r>
+              <a:rPr lang="en-GB" sz="2600" dirty="0">
+                <a:latin typeface="+mj-lt"/>
+                <a:cs typeface="Courier New" panose="02070309020205020404" pitchFamily="49" charset="0"/>
+              </a:rPr>
+              <a:t>) are a way of defining a loosely isolated environment for running applications</a:t>
+            </a:r>
+          </a:p>
+          <a:p>
+            <a:pPr>
+              <a:lnSpc>
+                <a:spcPct val="107000"/>
+              </a:lnSpc>
+            </a:pPr>
+            <a:r>
+              <a:rPr lang="en-GB" sz="2600" dirty="0">
+                <a:latin typeface="+mj-lt"/>
+                <a:cs typeface="Courier New" panose="02070309020205020404" pitchFamily="49" charset="0"/>
+              </a:rPr>
+              <a:t>Allows dependencies of applications to be packaged and isolated from the rest of the Operating System</a:t>
+            </a:r>
+          </a:p>
+          <a:p>
+            <a:pPr>
+              <a:lnSpc>
+                <a:spcPct val="107000"/>
+              </a:lnSpc>
+            </a:pPr>
+            <a:r>
+              <a:rPr lang="en-GB" sz="2600" dirty="0">
+                <a:latin typeface="+mj-lt"/>
+                <a:cs typeface="Courier New" panose="02070309020205020404" pitchFamily="49" charset="0"/>
+              </a:rPr>
+              <a:t>Ensures all developers and users are using the same environment</a:t>
+            </a:r>
+          </a:p>
+          <a:p>
+            <a:pPr>
+              <a:lnSpc>
+                <a:spcPct val="107000"/>
+              </a:lnSpc>
+            </a:pPr>
+            <a:r>
+              <a:rPr lang="en-GB" sz="2600" dirty="0">
+                <a:latin typeface="+mj-lt"/>
+                <a:cs typeface="Courier New" panose="02070309020205020404" pitchFamily="49" charset="0"/>
+              </a:rPr>
+              <a:t>Can also be useful for deploying more complex apps to HPC</a:t>
+            </a:r>
+          </a:p>
+          <a:p>
+            <a:pPr>
+              <a:lnSpc>
+                <a:spcPct val="107000"/>
+              </a:lnSpc>
+            </a:pPr>
+            <a:r>
+              <a:rPr lang="en-GB" sz="2600" dirty="0">
+                <a:latin typeface="+mj-lt"/>
+                <a:cs typeface="Courier New" panose="02070309020205020404" pitchFamily="49" charset="0"/>
+              </a:rPr>
+              <a:t>Can be used for </a:t>
+            </a:r>
+            <a:r>
+              <a:rPr lang="en-GB" sz="2600" dirty="0">
+                <a:latin typeface="+mj-lt"/>
+                <a:cs typeface="Courier New" panose="02070309020205020404" pitchFamily="49" charset="0"/>
+                <a:hlinkClick r:id="rId4"/>
+              </a:rPr>
+              <a:t>Python development</a:t>
+            </a:r>
+            <a:endParaRPr lang="en-GB" sz="2600" dirty="0">
+              <a:latin typeface="+mj-lt"/>
+              <a:cs typeface="Courier New" panose="02070309020205020404" pitchFamily="49" charset="0"/>
+            </a:endParaRPr>
+          </a:p>
+          <a:p>
+            <a:pPr>
+              <a:lnSpc>
+                <a:spcPct val="107000"/>
+              </a:lnSpc>
+            </a:pPr>
+            <a:r>
+              <a:rPr lang="en-GB" sz="2600" dirty="0">
+                <a:latin typeface="+mj-lt"/>
+                <a:cs typeface="Courier New" panose="02070309020205020404" pitchFamily="49" charset="0"/>
+              </a:rPr>
+              <a:t>The Graduate School offers a </a:t>
+            </a:r>
+            <a:r>
+              <a:rPr lang="en-GB" sz="2600" dirty="0">
+                <a:latin typeface="+mj-lt"/>
+                <a:cs typeface="Courier New" panose="02070309020205020404" pitchFamily="49" charset="0"/>
+                <a:hlinkClick r:id="rId5"/>
+              </a:rPr>
+              <a:t>course on containers</a:t>
+            </a:r>
+            <a:endParaRPr lang="en-GB" sz="2600" dirty="0">
+              <a:latin typeface="+mj-lt"/>
+              <a:cs typeface="Courier New" panose="02070309020205020404" pitchFamily="49" charset="0"/>
+            </a:endParaRPr>
+          </a:p>
+          <a:p>
+            <a:pPr>
+              <a:lnSpc>
+                <a:spcPct val="107000"/>
+              </a:lnSpc>
+            </a:pPr>
+            <a:endParaRPr lang="en-GB" sz="2600" dirty="0">
+              <a:latin typeface="+mj-lt"/>
+              <a:cs typeface="Courier New" panose="02070309020205020404" pitchFamily="49" charset="0"/>
+            </a:endParaRPr>
+          </a:p>
+        </p:txBody>
+      </p:sp>
+    </p:spTree>
+    <p:extLst>
+      <p:ext uri="{BB962C8B-B14F-4D97-AF65-F5344CB8AC3E}">
+        <p14:creationId xmlns:p14="http://schemas.microsoft.com/office/powerpoint/2010/main" val="3576927260"/>
+      </p:ext>
+    </p:extLst>
+  </p:cSld>
+  <p:clrMapOvr>
+    <a:masterClrMapping/>
+  </p:clrMapOvr>
+  <mc:AlternateContent xmlns:mc="http://schemas.openxmlformats.org/markup-compatibility/2006" xmlns:p14="http://schemas.microsoft.com/office/powerpoint/2010/main">
+    <mc:Choice Requires="p14">
+      <p:transition p14:dur="10"/>
+    </mc:Choice>
+    <mc:Fallback xmlns="">
+      <p:transition/>
+    </mc:Fallback>
+  </mc:AlternateContent>
+</p:sld>
+</file>
+
+<file path=ppt/slides/slide34.xml><?xml version="1.0" encoding="utf-8"?>
+<p:sld xmlns:a="http://schemas.openxmlformats.org/drawingml/2006/main" xmlns:r="http://schemas.openxmlformats.org/officeDocument/2006/relationships" xmlns:p="http://schemas.openxmlformats.org/presentationml/2006/main">
+  <p:cSld>
+    <p:spTree>
+      <p:nvGrpSpPr>
+        <p:cNvPr id="1" name=""/>
+        <p:cNvGrpSpPr/>
+        <p:nvPr/>
+      </p:nvGrpSpPr>
+      <p:grpSpPr>
+        <a:xfrm>
+          <a:off x="0" y="0"/>
+          <a:ext cx="0" cy="0"/>
+          <a:chOff x="0" y="0"/>
+          <a:chExt cx="0" cy="0"/>
+        </a:xfrm>
+      </p:grpSpPr>
       <p:pic>
         <p:nvPicPr>
           <p:cNvPr id="5" name="Picture 4" descr="Qr code&#10;&#10;Description automatically generated">
@@ -13819,7 +14490,7 @@
 </p:sld>
 </file>
 
-<file path=ppt/slides/slide33.xml><?xml version="1.0" encoding="utf-8"?>
+<file path=ppt/slides/slide35.xml><?xml version="1.0" encoding="utf-8"?>
 <p:sld xmlns:a="http://schemas.openxmlformats.org/drawingml/2006/main" xmlns:r="http://schemas.openxmlformats.org/officeDocument/2006/relationships" xmlns:p="http://schemas.openxmlformats.org/presentationml/2006/main">
   <p:cSld>
     <p:spTree>

</xml_diff>

<commit_message>
Updated requirements file information
</commit_message>
<xml_diff>
--- a/Managing and Running Python Effectively.pptx
+++ b/Managing and Running Python Effectively.pptx
@@ -374,11 +374,26 @@
   </pc:docChgLst>
   <pc:docChgLst>
     <pc:chgData name="Cooling, Chris" userId="6dcf99c9-2ba5-410a-8445-0893a3d1421f" providerId="ADAL" clId="{4E5177FB-C35E-43A8-B7E3-CC852D1C6D36}"/>
-    <pc:docChg chg="addSld modSld">
-      <pc:chgData name="Cooling, Chris" userId="6dcf99c9-2ba5-410a-8445-0893a3d1421f" providerId="ADAL" clId="{4E5177FB-C35E-43A8-B7E3-CC852D1C6D36}" dt="2022-12-02T11:39:48.460" v="0"/>
+    <pc:docChg chg="custSel addSld modSld">
+      <pc:chgData name="Cooling, Chris" userId="6dcf99c9-2ba5-410a-8445-0893a3d1421f" providerId="ADAL" clId="{4E5177FB-C35E-43A8-B7E3-CC852D1C6D36}" dt="2022-12-09T10:49:16.913" v="36" actId="20577"/>
       <pc:docMkLst>
         <pc:docMk/>
       </pc:docMkLst>
+      <pc:sldChg chg="modSp mod">
+        <pc:chgData name="Cooling, Chris" userId="6dcf99c9-2ba5-410a-8445-0893a3d1421f" providerId="ADAL" clId="{4E5177FB-C35E-43A8-B7E3-CC852D1C6D36}" dt="2022-12-09T10:49:16.913" v="36" actId="20577"/>
+        <pc:sldMkLst>
+          <pc:docMk/>
+          <pc:sldMk cId="495827477" sldId="512"/>
+        </pc:sldMkLst>
+        <pc:spChg chg="mod">
+          <ac:chgData name="Cooling, Chris" userId="6dcf99c9-2ba5-410a-8445-0893a3d1421f" providerId="ADAL" clId="{4E5177FB-C35E-43A8-B7E3-CC852D1C6D36}" dt="2022-12-09T10:49:16.913" v="36" actId="20577"/>
+          <ac:spMkLst>
+            <pc:docMk/>
+            <pc:sldMk cId="495827477" sldId="512"/>
+            <ac:spMk id="3" creationId="{00000000-0000-0000-0000-000000000000}"/>
+          </ac:spMkLst>
+        </pc:spChg>
+      </pc:sldChg>
       <pc:sldChg chg="add">
         <pc:chgData name="Cooling, Chris" userId="6dcf99c9-2ba5-410a-8445-0893a3d1421f" providerId="ADAL" clId="{4E5177FB-C35E-43A8-B7E3-CC852D1C6D36}" dt="2022-12-02T11:39:48.460" v="0"/>
         <pc:sldMkLst>
@@ -647,7 +662,7 @@
           <a:p>
             <a:fld id="{88EB714B-C3CC-4216-88C1-02913905B1CF}" type="datetimeFigureOut">
               <a:rPr lang="en-GB" smtClean="0"/>
-              <a:t>02/12/2022</a:t>
+              <a:t>09/12/2022</a:t>
             </a:fld>
             <a:endParaRPr lang="en-GB"/>
           </a:p>
@@ -6322,7 +6337,7 @@
           <a:p>
             <a:fld id="{EB0080F8-EA1C-491D-963C-2C881B2F918F}" type="datetimeFigureOut">
               <a:rPr lang="en-GB" smtClean="0"/>
-              <a:t>02/12/2022</a:t>
+              <a:t>09/12/2022</a:t>
             </a:fld>
             <a:endParaRPr lang="en-GB"/>
           </a:p>
@@ -6472,7 +6487,7 @@
           <a:p>
             <a:fld id="{EB0080F8-EA1C-491D-963C-2C881B2F918F}" type="datetimeFigureOut">
               <a:rPr lang="en-GB" smtClean="0"/>
-              <a:t>02/12/2022</a:t>
+              <a:t>09/12/2022</a:t>
             </a:fld>
             <a:endParaRPr lang="en-GB"/>
           </a:p>
@@ -8005,7 +8020,7 @@
           <a:p>
             <a:fld id="{EB0080F8-EA1C-491D-963C-2C881B2F918F}" type="datetimeFigureOut">
               <a:rPr lang="en-GB" smtClean="0"/>
-              <a:t>02/12/2022</a:t>
+              <a:t>09/12/2022</a:t>
             </a:fld>
             <a:endParaRPr lang="en-GB"/>
           </a:p>
@@ -9547,7 +9562,7 @@
         </p:spPr>
         <p:txBody>
           <a:bodyPr>
-            <a:normAutofit fontScale="92500" lnSpcReduction="20000"/>
+            <a:normAutofit fontScale="85000" lnSpcReduction="20000"/>
           </a:bodyPr>
           <a:lstStyle/>
           <a:p>
@@ -9689,6 +9704,31 @@
               </a:rPr>
               <a:t>Can manually create a requirements file</a:t>
             </a:r>
+          </a:p>
+          <a:p>
+            <a:pPr lvl="1">
+              <a:lnSpc>
+                <a:spcPct val="107000"/>
+              </a:lnSpc>
+            </a:pPr>
+            <a:r>
+              <a:rPr lang="en-GB" sz="2200" dirty="0">
+                <a:latin typeface="+mj-lt"/>
+                <a:cs typeface="Courier New" panose="02070309020205020404" pitchFamily="49" charset="0"/>
+              </a:rPr>
+              <a:t>Can be a simple list </a:t>
+            </a:r>
+            <a:r>
+              <a:rPr lang="en-GB" sz="2200">
+                <a:latin typeface="+mj-lt"/>
+                <a:cs typeface="Courier New" panose="02070309020205020404" pitchFamily="49" charset="0"/>
+              </a:rPr>
+              <a:t>of packages</a:t>
+            </a:r>
+            <a:endParaRPr lang="en-GB" sz="2200" dirty="0">
+              <a:latin typeface="+mj-lt"/>
+              <a:cs typeface="Courier New" panose="02070309020205020404" pitchFamily="49" charset="0"/>
+            </a:endParaRPr>
           </a:p>
         </p:txBody>
       </p:sp>

</xml_diff>